<commit_message>
Ajout de la partie configuration de serveur web, base de données
</commit_message>
<xml_diff>
--- a/Diapo_commun/PresentationCommune.pptx
+++ b/Diapo_commun/PresentationCommune.pptx
@@ -10265,11 +10265,1977 @@
           </a:p>
         </p:txBody>
       </p:sp>
+      <p:sp>
+        <p:nvSpPr>
+          <p:cNvPr id="10" name="CustomShape 1">
+            <a:extLst>
+              <a:ext uri="{FF2B5EF4-FFF2-40B4-BE49-F238E27FC236}">
+                <a16:creationId xmlns:a16="http://schemas.microsoft.com/office/drawing/2014/main" id="{0677D7A2-EDF3-4926-B9BD-0DCEFF5A9510}"/>
+              </a:ext>
+            </a:extLst>
+          </p:cNvPr>
+          <p:cNvSpPr/>
+          <p:nvPr/>
+        </p:nvSpPr>
+        <p:spPr>
+          <a:xfrm>
+            <a:off x="0" y="1360800"/>
+            <a:ext cx="12191760" cy="5496840"/>
+          </a:xfrm>
+          <a:prstGeom prst="rect">
+            <a:avLst/>
+          </a:prstGeom>
+          <a:gradFill rotWithShape="0">
+            <a:gsLst>
+              <a:gs pos="0">
+                <a:srgbClr val="3965B5"/>
+              </a:gs>
+              <a:gs pos="100000">
+                <a:srgbClr val="3965B5"/>
+              </a:gs>
+            </a:gsLst>
+            <a:lin ang="4200000"/>
+          </a:gradFill>
+          <a:ln>
+            <a:noFill/>
+          </a:ln>
+        </p:spPr>
+        <p:style>
+          <a:lnRef idx="2">
+            <a:schemeClr val="accent1">
+              <a:shade val="50000"/>
+            </a:schemeClr>
+          </a:lnRef>
+          <a:fillRef idx="1">
+            <a:schemeClr val="accent1"/>
+          </a:fillRef>
+          <a:effectRef idx="0">
+            <a:schemeClr val="accent1"/>
+          </a:effectRef>
+          <a:fontRef idx="minor"/>
+        </p:style>
+      </p:sp>
+      <p:grpSp>
+        <p:nvGrpSpPr>
+          <p:cNvPr id="11" name="Group 2">
+            <a:extLst>
+              <a:ext uri="{FF2B5EF4-FFF2-40B4-BE49-F238E27FC236}">
+                <a16:creationId xmlns:a16="http://schemas.microsoft.com/office/drawing/2014/main" id="{596BAC3E-262D-40ED-A717-5F989751A5E2}"/>
+              </a:ext>
+            </a:extLst>
+          </p:cNvPr>
+          <p:cNvGrpSpPr/>
+          <p:nvPr/>
+        </p:nvGrpSpPr>
+        <p:grpSpPr>
+          <a:xfrm>
+            <a:off x="0" y="360"/>
+            <a:ext cx="12192000" cy="2552767"/>
+            <a:chOff x="0" y="360"/>
+            <a:chExt cx="12191760" cy="3048840"/>
+          </a:xfrm>
+        </p:grpSpPr>
+        <p:pic>
+          <p:nvPicPr>
+            <p:cNvPr id="12" name="Picture 10">
+              <a:extLst>
+                <a:ext uri="{FF2B5EF4-FFF2-40B4-BE49-F238E27FC236}">
+                  <a16:creationId xmlns:a16="http://schemas.microsoft.com/office/drawing/2014/main" id="{6CFF06B6-EEF2-4098-9477-E57B49809F4C}"/>
+                </a:ext>
+              </a:extLst>
+            </p:cNvPr>
+            <p:cNvPicPr/>
+            <p:nvPr/>
+          </p:nvPicPr>
+          <p:blipFill>
+            <a:blip r:embed="rId2"/>
+            <a:srcRect t="45717" b="9819"/>
+            <a:stretch/>
+          </p:blipFill>
+          <p:spPr>
+            <a:xfrm rot="10800000" flipH="1">
+              <a:off x="0" y="0"/>
+              <a:ext cx="12191760" cy="3048840"/>
+            </a:xfrm>
+            <a:prstGeom prst="rect">
+              <a:avLst/>
+            </a:prstGeom>
+            <a:ln w="0">
+              <a:noFill/>
+            </a:ln>
+          </p:spPr>
+        </p:pic>
+        <p:sp>
+          <p:nvSpPr>
+            <p:cNvPr id="13" name="CustomShape 3">
+              <a:extLst>
+                <a:ext uri="{FF2B5EF4-FFF2-40B4-BE49-F238E27FC236}">
+                  <a16:creationId xmlns:a16="http://schemas.microsoft.com/office/drawing/2014/main" id="{F4719E7F-8EC6-4992-98B8-89A44FBA079F}"/>
+                </a:ext>
+              </a:extLst>
+            </p:cNvPr>
+            <p:cNvSpPr/>
+            <p:nvPr/>
+          </p:nvSpPr>
+          <p:spPr>
+            <a:xfrm flipV="1">
+              <a:off x="2067480" y="1076400"/>
+              <a:ext cx="373320" cy="405000"/>
+            </a:xfrm>
+            <a:prstGeom prst="ellipse">
+              <a:avLst/>
+            </a:prstGeom>
+            <a:solidFill>
+              <a:srgbClr val="FFFFFF"/>
+            </a:solidFill>
+            <a:ln>
+              <a:noFill/>
+            </a:ln>
+          </p:spPr>
+          <p:style>
+            <a:lnRef idx="2">
+              <a:schemeClr val="accent1">
+                <a:shade val="50000"/>
+              </a:schemeClr>
+            </a:lnRef>
+            <a:fillRef idx="1">
+              <a:schemeClr val="accent1"/>
+            </a:fillRef>
+            <a:effectRef idx="0">
+              <a:schemeClr val="accent1"/>
+            </a:effectRef>
+            <a:fontRef idx="minor"/>
+          </p:style>
+        </p:sp>
+      </p:grpSp>
+      <p:sp>
+        <p:nvSpPr>
+          <p:cNvPr id="14" name="TextShape 4">
+            <a:extLst>
+              <a:ext uri="{FF2B5EF4-FFF2-40B4-BE49-F238E27FC236}">
+                <a16:creationId xmlns:a16="http://schemas.microsoft.com/office/drawing/2014/main" id="{8331CDFA-D7BF-4624-AE23-4E0AFA837F1B}"/>
+              </a:ext>
+            </a:extLst>
+          </p:cNvPr>
+          <p:cNvSpPr txBox="1"/>
+          <p:nvPr/>
+        </p:nvSpPr>
+        <p:spPr>
+          <a:xfrm>
+            <a:off x="350691" y="448200"/>
+            <a:ext cx="11563141" cy="1066320"/>
+          </a:xfrm>
+          <a:prstGeom prst="rect">
+            <a:avLst/>
+          </a:prstGeom>
+          <a:noFill/>
+          <a:ln w="0">
+            <a:noFill/>
+          </a:ln>
+        </p:spPr>
+        <p:txBody>
+          <a:bodyPr anchor="ctr">
+            <a:normAutofit fontScale="92500" lnSpcReduction="10000"/>
+          </a:bodyPr>
+          <a:lstStyle/>
+          <a:p>
+            <a:pPr>
+              <a:lnSpc>
+                <a:spcPct val="90000"/>
+              </a:lnSpc>
+            </a:pPr>
+            <a:r>
+              <a:rPr lang="fr-FR" sz="4000" b="0" strike="noStrike" spc="-1" dirty="0">
+                <a:solidFill>
+                  <a:srgbClr val="3F3F3F"/>
+                </a:solidFill>
+                <a:latin typeface="Calibri Light"/>
+              </a:rPr>
+              <a:t>IV. </a:t>
+            </a:r>
+            <a:r>
+              <a:rPr lang="fr-FR" sz="4000" b="0" strike="noStrike" spc="-1" dirty="0">
+                <a:solidFill>
+                  <a:srgbClr val="000000"/>
+                </a:solidFill>
+                <a:latin typeface="Calibri Light"/>
+              </a:rPr>
+              <a:t>Présentation de la partie :</a:t>
+            </a:r>
+            <a:r>
+              <a:rPr lang="fr-FR" sz="4000" spc="-1" dirty="0">
+                <a:solidFill>
+                  <a:srgbClr val="000000"/>
+                </a:solidFill>
+                <a:latin typeface="Calibri Light"/>
+              </a:rPr>
+              <a:t> Serveurs Web, de base de données</a:t>
+            </a:r>
+            <a:endParaRPr lang="fr-FR" sz="4000" b="0" strike="noStrike" spc="-1" dirty="0">
+              <a:solidFill>
+                <a:srgbClr val="000000"/>
+              </a:solidFill>
+              <a:latin typeface="Calibri"/>
+            </a:endParaRPr>
+          </a:p>
+        </p:txBody>
+      </p:sp>
+      <p:sp>
+        <p:nvSpPr>
+          <p:cNvPr id="15" name="TextShape 5">
+            <a:extLst>
+              <a:ext uri="{FF2B5EF4-FFF2-40B4-BE49-F238E27FC236}">
+                <a16:creationId xmlns:a16="http://schemas.microsoft.com/office/drawing/2014/main" id="{C378D56E-AFFA-4F84-B565-F37B9A82A03F}"/>
+              </a:ext>
+            </a:extLst>
+          </p:cNvPr>
+          <p:cNvSpPr txBox="1"/>
+          <p:nvPr/>
+        </p:nvSpPr>
+        <p:spPr>
+          <a:xfrm>
+            <a:off x="1179360" y="3049200"/>
+            <a:ext cx="9833040" cy="2945160"/>
+          </a:xfrm>
+          <a:prstGeom prst="rect">
+            <a:avLst/>
+          </a:prstGeom>
+          <a:noFill/>
+          <a:ln w="0">
+            <a:noFill/>
+          </a:ln>
+        </p:spPr>
+        <p:txBody>
+          <a:bodyPr anchor="ctr">
+            <a:normAutofit/>
+          </a:bodyPr>
+          <a:lstStyle/>
+          <a:p>
+            <a:pPr>
+              <a:lnSpc>
+                <a:spcPct val="90000"/>
+              </a:lnSpc>
+              <a:spcBef>
+                <a:spcPts val="1001"/>
+              </a:spcBef>
+            </a:pPr>
+            <a:endParaRPr lang="fr-FR" sz="2800" b="0" strike="noStrike" spc="-1">
+              <a:solidFill>
+                <a:srgbClr val="000000"/>
+              </a:solidFill>
+              <a:latin typeface="Calibri"/>
+            </a:endParaRPr>
+          </a:p>
+          <a:p>
+            <a:endParaRPr lang="fr-FR" sz="2800" b="0" strike="noStrike" spc="-1">
+              <a:solidFill>
+                <a:srgbClr val="000000"/>
+              </a:solidFill>
+              <a:latin typeface="Calibri"/>
+            </a:endParaRPr>
+          </a:p>
+        </p:txBody>
+      </p:sp>
+      <p:sp>
+        <p:nvSpPr>
+          <p:cNvPr id="16" name="TextShape 6">
+            <a:extLst>
+              <a:ext uri="{FF2B5EF4-FFF2-40B4-BE49-F238E27FC236}">
+                <a16:creationId xmlns:a16="http://schemas.microsoft.com/office/drawing/2014/main" id="{D2DB575A-A9C2-4D0B-976E-00BD560D7FBF}"/>
+              </a:ext>
+            </a:extLst>
+          </p:cNvPr>
+          <p:cNvSpPr txBox="1"/>
+          <p:nvPr/>
+        </p:nvSpPr>
+        <p:spPr>
+          <a:xfrm>
+            <a:off x="838080" y="6356520"/>
+            <a:ext cx="2742840" cy="364680"/>
+          </a:xfrm>
+          <a:prstGeom prst="rect">
+            <a:avLst/>
+          </a:prstGeom>
+          <a:noFill/>
+          <a:ln w="0">
+            <a:noFill/>
+          </a:ln>
+        </p:spPr>
+        <p:txBody>
+          <a:bodyPr anchor="ctr">
+            <a:noAutofit/>
+          </a:bodyPr>
+          <a:lstStyle/>
+          <a:p>
+            <a:pPr>
+              <a:lnSpc>
+                <a:spcPct val="100000"/>
+              </a:lnSpc>
+            </a:pPr>
+            <a:r>
+              <a:rPr lang="fr-FR" sz="1200" b="0" strike="noStrike" spc="-1">
+                <a:solidFill>
+                  <a:srgbClr val="FFFFFF"/>
+                </a:solidFill>
+                <a:latin typeface="Calibri"/>
+              </a:rPr>
+              <a:t>LP IOTIA</a:t>
+            </a:r>
+            <a:endParaRPr lang="fr-FR" sz="1200" b="0" strike="noStrike" spc="-1">
+              <a:latin typeface="Times New Roman"/>
+            </a:endParaRPr>
+          </a:p>
+        </p:txBody>
+      </p:sp>
+      <p:sp>
+        <p:nvSpPr>
+          <p:cNvPr id="17" name="TextShape 7">
+            <a:extLst>
+              <a:ext uri="{FF2B5EF4-FFF2-40B4-BE49-F238E27FC236}">
+                <a16:creationId xmlns:a16="http://schemas.microsoft.com/office/drawing/2014/main" id="{D20D8E5B-43B5-4359-8B3A-8424B08AD7C2}"/>
+              </a:ext>
+            </a:extLst>
+          </p:cNvPr>
+          <p:cNvSpPr txBox="1"/>
+          <p:nvPr/>
+        </p:nvSpPr>
+        <p:spPr>
+          <a:xfrm>
+            <a:off x="8610480" y="6356520"/>
+            <a:ext cx="2742840" cy="364680"/>
+          </a:xfrm>
+          <a:prstGeom prst="rect">
+            <a:avLst/>
+          </a:prstGeom>
+          <a:noFill/>
+          <a:ln w="0">
+            <a:noFill/>
+          </a:ln>
+        </p:spPr>
+        <p:txBody>
+          <a:bodyPr anchor="ctr">
+            <a:noAutofit/>
+          </a:bodyPr>
+          <a:lstStyle/>
+          <a:p>
+            <a:pPr algn="r">
+              <a:lnSpc>
+                <a:spcPct val="100000"/>
+              </a:lnSpc>
+            </a:pPr>
+            <a:fld id="{AB127B7B-A1D3-4150-B341-D24BF54BBC47}" type="slidenum">
+              <a:rPr lang="fr-FR" sz="1200" b="0" strike="noStrike" spc="-1">
+                <a:solidFill>
+                  <a:srgbClr val="FFFFFF"/>
+                </a:solidFill>
+                <a:latin typeface="Calibri"/>
+              </a:rPr>
+              <a:t>7</a:t>
+            </a:fld>
+            <a:endParaRPr lang="fr-FR" sz="1200" b="0" strike="noStrike" spc="-1">
+              <a:latin typeface="Times New Roman"/>
+            </a:endParaRPr>
+          </a:p>
+        </p:txBody>
+      </p:sp>
+      <p:sp>
+        <p:nvSpPr>
+          <p:cNvPr id="18" name="TextShape 5">
+            <a:extLst>
+              <a:ext uri="{FF2B5EF4-FFF2-40B4-BE49-F238E27FC236}">
+                <a16:creationId xmlns:a16="http://schemas.microsoft.com/office/drawing/2014/main" id="{C06D2F2F-ED84-4AF8-BC07-D32A9E5F5D27}"/>
+              </a:ext>
+            </a:extLst>
+          </p:cNvPr>
+          <p:cNvSpPr txBox="1"/>
+          <p:nvPr/>
+        </p:nvSpPr>
+        <p:spPr>
+          <a:xfrm>
+            <a:off x="1179360" y="3049200"/>
+            <a:ext cx="9833040" cy="2945160"/>
+          </a:xfrm>
+          <a:prstGeom prst="rect">
+            <a:avLst/>
+          </a:prstGeom>
+          <a:noFill/>
+          <a:ln w="0">
+            <a:noFill/>
+          </a:ln>
+        </p:spPr>
+        <p:txBody>
+          <a:bodyPr anchor="ctr">
+            <a:normAutofit/>
+          </a:bodyPr>
+          <a:lstStyle/>
+          <a:p>
+            <a:pPr>
+              <a:lnSpc>
+                <a:spcPct val="90000"/>
+              </a:lnSpc>
+              <a:spcBef>
+                <a:spcPts val="1001"/>
+              </a:spcBef>
+            </a:pPr>
+            <a:endParaRPr lang="fr-FR" sz="2800" b="0" strike="noStrike" spc="-1">
+              <a:solidFill>
+                <a:srgbClr val="000000"/>
+              </a:solidFill>
+              <a:latin typeface="Calibri"/>
+            </a:endParaRPr>
+          </a:p>
+          <a:p>
+            <a:endParaRPr lang="fr-FR" sz="2800" b="0" strike="noStrike" spc="-1">
+              <a:solidFill>
+                <a:srgbClr val="000000"/>
+              </a:solidFill>
+              <a:latin typeface="Calibri"/>
+            </a:endParaRPr>
+          </a:p>
+        </p:txBody>
+      </p:sp>
+      <p:sp>
+        <p:nvSpPr>
+          <p:cNvPr id="19" name="TextShape 6">
+            <a:extLst>
+              <a:ext uri="{FF2B5EF4-FFF2-40B4-BE49-F238E27FC236}">
+                <a16:creationId xmlns:a16="http://schemas.microsoft.com/office/drawing/2014/main" id="{EA85691A-6DED-45CA-B8E2-53B52E8D7E20}"/>
+              </a:ext>
+            </a:extLst>
+          </p:cNvPr>
+          <p:cNvSpPr txBox="1"/>
+          <p:nvPr/>
+        </p:nvSpPr>
+        <p:spPr>
+          <a:xfrm>
+            <a:off x="838080" y="6356520"/>
+            <a:ext cx="2742840" cy="364680"/>
+          </a:xfrm>
+          <a:prstGeom prst="rect">
+            <a:avLst/>
+          </a:prstGeom>
+          <a:noFill/>
+          <a:ln w="0">
+            <a:noFill/>
+          </a:ln>
+        </p:spPr>
+        <p:txBody>
+          <a:bodyPr anchor="ctr">
+            <a:noAutofit/>
+          </a:bodyPr>
+          <a:lstStyle/>
+          <a:p>
+            <a:pPr>
+              <a:lnSpc>
+                <a:spcPct val="100000"/>
+              </a:lnSpc>
+            </a:pPr>
+            <a:r>
+              <a:rPr lang="fr-FR" sz="1200" b="0" strike="noStrike" spc="-1">
+                <a:solidFill>
+                  <a:srgbClr val="FFFFFF"/>
+                </a:solidFill>
+                <a:latin typeface="Calibri"/>
+              </a:rPr>
+              <a:t>LP IOTIA</a:t>
+            </a:r>
+            <a:endParaRPr lang="fr-FR" sz="1200" b="0" strike="noStrike" spc="-1">
+              <a:latin typeface="Times New Roman"/>
+            </a:endParaRPr>
+          </a:p>
+        </p:txBody>
+      </p:sp>
+      <p:sp>
+        <p:nvSpPr>
+          <p:cNvPr id="20" name="TextShape 7">
+            <a:extLst>
+              <a:ext uri="{FF2B5EF4-FFF2-40B4-BE49-F238E27FC236}">
+                <a16:creationId xmlns:a16="http://schemas.microsoft.com/office/drawing/2014/main" id="{52EC156C-743F-411A-B9A0-BCDCEC371BFB}"/>
+              </a:ext>
+            </a:extLst>
+          </p:cNvPr>
+          <p:cNvSpPr txBox="1"/>
+          <p:nvPr/>
+        </p:nvSpPr>
+        <p:spPr>
+          <a:xfrm>
+            <a:off x="8610480" y="6356520"/>
+            <a:ext cx="2742840" cy="364680"/>
+          </a:xfrm>
+          <a:prstGeom prst="rect">
+            <a:avLst/>
+          </a:prstGeom>
+          <a:noFill/>
+          <a:ln w="0">
+            <a:noFill/>
+          </a:ln>
+        </p:spPr>
+        <p:txBody>
+          <a:bodyPr anchor="ctr">
+            <a:noAutofit/>
+          </a:bodyPr>
+          <a:lstStyle/>
+          <a:p>
+            <a:pPr algn="r">
+              <a:lnSpc>
+                <a:spcPct val="100000"/>
+              </a:lnSpc>
+            </a:pPr>
+            <a:fld id="{89852E89-60D3-43A7-B38E-7FD2E7927657}" type="slidenum">
+              <a:rPr lang="fr-FR" sz="1200" b="0" strike="noStrike" spc="-1">
+                <a:solidFill>
+                  <a:srgbClr val="FFFFFF"/>
+                </a:solidFill>
+                <a:latin typeface="Calibri"/>
+              </a:rPr>
+              <a:t>7</a:t>
+            </a:fld>
+            <a:endParaRPr lang="fr-FR" sz="1200" b="0" strike="noStrike" spc="-1">
+              <a:latin typeface="Times New Roman"/>
+            </a:endParaRPr>
+          </a:p>
+        </p:txBody>
+      </p:sp>
+      <p:sp>
+        <p:nvSpPr>
+          <p:cNvPr id="21" name="Espace réservé du contenu 2">
+            <a:extLst>
+              <a:ext uri="{FF2B5EF4-FFF2-40B4-BE49-F238E27FC236}">
+                <a16:creationId xmlns:a16="http://schemas.microsoft.com/office/drawing/2014/main" id="{4B5AC380-C1CE-4185-8A0F-F5A04270243C}"/>
+              </a:ext>
+            </a:extLst>
+          </p:cNvPr>
+          <p:cNvSpPr txBox="1">
+            <a:spLocks/>
+          </p:cNvSpPr>
+          <p:nvPr/>
+        </p:nvSpPr>
+        <p:spPr>
+          <a:xfrm>
+            <a:off x="249370" y="1865670"/>
+            <a:ext cx="5745308" cy="4965375"/>
+          </a:xfrm>
+          <a:prstGeom prst="rect">
+            <a:avLst/>
+          </a:prstGeom>
+        </p:spPr>
+        <p:txBody>
+          <a:bodyPr>
+            <a:normAutofit/>
+          </a:bodyPr>
+          <a:lstStyle>
+            <a:lvl1pPr marL="228600" indent="-228600" algn="l" defTabSz="914400" rtl="0" eaLnBrk="1" latinLnBrk="0" hangingPunct="1">
+              <a:lnSpc>
+                <a:spcPct val="90000"/>
+              </a:lnSpc>
+              <a:spcBef>
+                <a:spcPts val="1000"/>
+              </a:spcBef>
+              <a:buFont typeface="Arial" panose="020B0604020202020204" pitchFamily="34" charset="0"/>
+              <a:buChar char="•"/>
+              <a:defRPr sz="2800" kern="1200">
+                <a:solidFill>
+                  <a:schemeClr val="tx1"/>
+                </a:solidFill>
+                <a:latin typeface="+mn-lt"/>
+                <a:ea typeface="+mn-ea"/>
+                <a:cs typeface="+mn-cs"/>
+              </a:defRPr>
+            </a:lvl1pPr>
+            <a:lvl2pPr marL="685800" indent="-228600" algn="l" defTabSz="914400" rtl="0" eaLnBrk="1" latinLnBrk="0" hangingPunct="1">
+              <a:lnSpc>
+                <a:spcPct val="90000"/>
+              </a:lnSpc>
+              <a:spcBef>
+                <a:spcPts val="500"/>
+              </a:spcBef>
+              <a:buFont typeface="Arial" panose="020B0604020202020204" pitchFamily="34" charset="0"/>
+              <a:buChar char="•"/>
+              <a:defRPr sz="2400" kern="1200">
+                <a:solidFill>
+                  <a:schemeClr val="tx1"/>
+                </a:solidFill>
+                <a:latin typeface="+mn-lt"/>
+                <a:ea typeface="+mn-ea"/>
+                <a:cs typeface="+mn-cs"/>
+              </a:defRPr>
+            </a:lvl2pPr>
+            <a:lvl3pPr marL="1143000" indent="-228600" algn="l" defTabSz="914400" rtl="0" eaLnBrk="1" latinLnBrk="0" hangingPunct="1">
+              <a:lnSpc>
+                <a:spcPct val="90000"/>
+              </a:lnSpc>
+              <a:spcBef>
+                <a:spcPts val="500"/>
+              </a:spcBef>
+              <a:buFont typeface="Arial" panose="020B0604020202020204" pitchFamily="34" charset="0"/>
+              <a:buChar char="•"/>
+              <a:defRPr sz="2000" kern="1200">
+                <a:solidFill>
+                  <a:schemeClr val="tx1"/>
+                </a:solidFill>
+                <a:latin typeface="+mn-lt"/>
+                <a:ea typeface="+mn-ea"/>
+                <a:cs typeface="+mn-cs"/>
+              </a:defRPr>
+            </a:lvl3pPr>
+            <a:lvl4pPr marL="1600200" indent="-228600" algn="l" defTabSz="914400" rtl="0" eaLnBrk="1" latinLnBrk="0" hangingPunct="1">
+              <a:lnSpc>
+                <a:spcPct val="90000"/>
+              </a:lnSpc>
+              <a:spcBef>
+                <a:spcPts val="500"/>
+              </a:spcBef>
+              <a:buFont typeface="Arial" panose="020B0604020202020204" pitchFamily="34" charset="0"/>
+              <a:buChar char="•"/>
+              <a:defRPr sz="1800" kern="1200">
+                <a:solidFill>
+                  <a:schemeClr val="tx1"/>
+                </a:solidFill>
+                <a:latin typeface="+mn-lt"/>
+                <a:ea typeface="+mn-ea"/>
+                <a:cs typeface="+mn-cs"/>
+              </a:defRPr>
+            </a:lvl4pPr>
+            <a:lvl5pPr marL="2057400" indent="-228600" algn="l" defTabSz="914400" rtl="0" eaLnBrk="1" latinLnBrk="0" hangingPunct="1">
+              <a:lnSpc>
+                <a:spcPct val="90000"/>
+              </a:lnSpc>
+              <a:spcBef>
+                <a:spcPts val="500"/>
+              </a:spcBef>
+              <a:buFont typeface="Arial" panose="020B0604020202020204" pitchFamily="34" charset="0"/>
+              <a:buChar char="•"/>
+              <a:defRPr sz="1800" kern="1200">
+                <a:solidFill>
+                  <a:schemeClr val="tx1"/>
+                </a:solidFill>
+                <a:latin typeface="+mn-lt"/>
+                <a:ea typeface="+mn-ea"/>
+                <a:cs typeface="+mn-cs"/>
+              </a:defRPr>
+            </a:lvl5pPr>
+            <a:lvl6pPr marL="2514600" indent="-228600" algn="l" defTabSz="914400" rtl="0" eaLnBrk="1" latinLnBrk="0" hangingPunct="1">
+              <a:lnSpc>
+                <a:spcPct val="90000"/>
+              </a:lnSpc>
+              <a:spcBef>
+                <a:spcPts val="500"/>
+              </a:spcBef>
+              <a:buFont typeface="Arial" panose="020B0604020202020204" pitchFamily="34" charset="0"/>
+              <a:buChar char="•"/>
+              <a:defRPr sz="1800" kern="1200">
+                <a:solidFill>
+                  <a:schemeClr val="tx1"/>
+                </a:solidFill>
+                <a:latin typeface="+mn-lt"/>
+                <a:ea typeface="+mn-ea"/>
+                <a:cs typeface="+mn-cs"/>
+              </a:defRPr>
+            </a:lvl6pPr>
+            <a:lvl7pPr marL="2971800" indent="-228600" algn="l" defTabSz="914400" rtl="0" eaLnBrk="1" latinLnBrk="0" hangingPunct="1">
+              <a:lnSpc>
+                <a:spcPct val="90000"/>
+              </a:lnSpc>
+              <a:spcBef>
+                <a:spcPts val="500"/>
+              </a:spcBef>
+              <a:buFont typeface="Arial" panose="020B0604020202020204" pitchFamily="34" charset="0"/>
+              <a:buChar char="•"/>
+              <a:defRPr sz="1800" kern="1200">
+                <a:solidFill>
+                  <a:schemeClr val="tx1"/>
+                </a:solidFill>
+                <a:latin typeface="+mn-lt"/>
+                <a:ea typeface="+mn-ea"/>
+                <a:cs typeface="+mn-cs"/>
+              </a:defRPr>
+            </a:lvl7pPr>
+            <a:lvl8pPr marL="3429000" indent="-228600" algn="l" defTabSz="914400" rtl="0" eaLnBrk="1" latinLnBrk="0" hangingPunct="1">
+              <a:lnSpc>
+                <a:spcPct val="90000"/>
+              </a:lnSpc>
+              <a:spcBef>
+                <a:spcPts val="500"/>
+              </a:spcBef>
+              <a:buFont typeface="Arial" panose="020B0604020202020204" pitchFamily="34" charset="0"/>
+              <a:buChar char="•"/>
+              <a:defRPr sz="1800" kern="1200">
+                <a:solidFill>
+                  <a:schemeClr val="tx1"/>
+                </a:solidFill>
+                <a:latin typeface="+mn-lt"/>
+                <a:ea typeface="+mn-ea"/>
+                <a:cs typeface="+mn-cs"/>
+              </a:defRPr>
+            </a:lvl8pPr>
+            <a:lvl9pPr marL="3886200" indent="-228600" algn="l" defTabSz="914400" rtl="0" eaLnBrk="1" latinLnBrk="0" hangingPunct="1">
+              <a:lnSpc>
+                <a:spcPct val="90000"/>
+              </a:lnSpc>
+              <a:spcBef>
+                <a:spcPts val="500"/>
+              </a:spcBef>
+              <a:buFont typeface="Arial" panose="020B0604020202020204" pitchFamily="34" charset="0"/>
+              <a:buChar char="•"/>
+              <a:defRPr sz="1800" kern="1200">
+                <a:solidFill>
+                  <a:schemeClr val="tx1"/>
+                </a:solidFill>
+                <a:latin typeface="+mn-lt"/>
+                <a:ea typeface="+mn-ea"/>
+                <a:cs typeface="+mn-cs"/>
+              </a:defRPr>
+            </a:lvl9pPr>
+          </a:lstStyle>
+          <a:p>
+            <a:pPr>
+              <a:lnSpc>
+                <a:spcPct val="100000"/>
+              </a:lnSpc>
+            </a:pPr>
+            <a:r>
+              <a:rPr lang="fr-FR" sz="2400" dirty="0">
+                <a:solidFill>
+                  <a:schemeClr val="bg2"/>
+                </a:solidFill>
+              </a:rPr>
+              <a:t>Serveur Web :</a:t>
+            </a:r>
+          </a:p>
+          <a:p>
+            <a:pPr lvl="1">
+              <a:lnSpc>
+                <a:spcPct val="100000"/>
+              </a:lnSpc>
+            </a:pPr>
+            <a:r>
+              <a:rPr lang="fr-FR" sz="2000" dirty="0">
+                <a:solidFill>
+                  <a:schemeClr val="bg2"/>
+                </a:solidFill>
+              </a:rPr>
+              <a:t>Windows Server 2019</a:t>
+            </a:r>
+          </a:p>
+          <a:p>
+            <a:pPr lvl="1">
+              <a:lnSpc>
+                <a:spcPct val="100000"/>
+              </a:lnSpc>
+            </a:pPr>
+            <a:r>
+              <a:rPr lang="fr-FR" sz="2000" dirty="0">
+                <a:solidFill>
+                  <a:schemeClr val="bg2"/>
+                </a:solidFill>
+              </a:rPr>
+              <a:t>A deux interfaces </a:t>
+            </a:r>
+          </a:p>
+          <a:p>
+            <a:pPr lvl="2">
+              <a:lnSpc>
+                <a:spcPct val="100000"/>
+              </a:lnSpc>
+            </a:pPr>
+            <a:r>
+              <a:rPr lang="fr-FR" sz="1800" dirty="0">
+                <a:solidFill>
+                  <a:schemeClr val="bg2"/>
+                </a:solidFill>
+              </a:rPr>
+              <a:t>Une sur le sous réseau 134.59.143.0/27 avec l’adresse </a:t>
+            </a:r>
+            <a:r>
+              <a:rPr lang="fr-FR" sz="1800" dirty="0" err="1">
+                <a:solidFill>
+                  <a:schemeClr val="bg2"/>
+                </a:solidFill>
+              </a:rPr>
+              <a:t>ip</a:t>
+            </a:r>
+            <a:r>
+              <a:rPr lang="fr-FR" sz="1800" dirty="0">
+                <a:solidFill>
+                  <a:schemeClr val="bg2"/>
+                </a:solidFill>
+              </a:rPr>
+              <a:t> 134.59.143.225</a:t>
+            </a:r>
+          </a:p>
+          <a:p>
+            <a:pPr lvl="2">
+              <a:lnSpc>
+                <a:spcPct val="100000"/>
+              </a:lnSpc>
+            </a:pPr>
+            <a:r>
+              <a:rPr lang="fr-FR" sz="1800" dirty="0">
+                <a:solidFill>
+                  <a:schemeClr val="bg2"/>
+                </a:solidFill>
+              </a:rPr>
+              <a:t>Une sur le sous réseau 10.143.1.0/24 avec l’adresse </a:t>
+            </a:r>
+            <a:r>
+              <a:rPr lang="fr-FR" sz="1800" dirty="0" err="1">
+                <a:solidFill>
+                  <a:schemeClr val="bg2"/>
+                </a:solidFill>
+              </a:rPr>
+              <a:t>ip</a:t>
+            </a:r>
+            <a:r>
+              <a:rPr lang="fr-FR" sz="1800" dirty="0">
+                <a:solidFill>
+                  <a:schemeClr val="bg2"/>
+                </a:solidFill>
+              </a:rPr>
+              <a:t> 10.143.1.225</a:t>
+            </a:r>
+          </a:p>
+          <a:p>
+            <a:pPr lvl="1">
+              <a:lnSpc>
+                <a:spcPct val="100000"/>
+              </a:lnSpc>
+            </a:pPr>
+            <a:r>
+              <a:rPr lang="fr-FR" sz="2000" dirty="0">
+                <a:solidFill>
+                  <a:schemeClr val="bg2"/>
+                </a:solidFill>
+              </a:rPr>
+              <a:t>Hébergera les applications web et web services : </a:t>
+            </a:r>
+          </a:p>
+          <a:p>
+            <a:pPr lvl="2">
+              <a:lnSpc>
+                <a:spcPct val="100000"/>
+              </a:lnSpc>
+            </a:pPr>
+            <a:r>
+              <a:rPr lang="fr-FR" sz="1800" dirty="0">
+                <a:solidFill>
+                  <a:schemeClr val="bg2"/>
+                </a:solidFill>
+              </a:rPr>
+              <a:t>Smart-</a:t>
+            </a:r>
+            <a:r>
+              <a:rPr lang="fr-FR" sz="1800" dirty="0" err="1">
+                <a:solidFill>
+                  <a:schemeClr val="bg2"/>
+                </a:solidFill>
+              </a:rPr>
+              <a:t>Ecovid</a:t>
+            </a:r>
+            <a:r>
+              <a:rPr lang="fr-FR" sz="1800" dirty="0">
+                <a:solidFill>
+                  <a:schemeClr val="bg2"/>
+                </a:solidFill>
+              </a:rPr>
+              <a:t> développer en ASP. Net </a:t>
+            </a:r>
+            <a:r>
+              <a:rPr lang="fr-FR" sz="1800" dirty="0" err="1">
+                <a:solidFill>
+                  <a:schemeClr val="bg2"/>
+                </a:solidFill>
+              </a:rPr>
+              <a:t>Core</a:t>
+            </a:r>
+            <a:endParaRPr lang="fr-FR" sz="1800" dirty="0">
+              <a:solidFill>
+                <a:schemeClr val="bg2"/>
+              </a:solidFill>
+            </a:endParaRPr>
+          </a:p>
+          <a:p>
+            <a:pPr lvl="2">
+              <a:lnSpc>
+                <a:spcPct val="100000"/>
+              </a:lnSpc>
+            </a:pPr>
+            <a:r>
+              <a:rPr lang="fr-FR" sz="1800" dirty="0" err="1">
+                <a:solidFill>
+                  <a:schemeClr val="bg2"/>
+                </a:solidFill>
+              </a:rPr>
+              <a:t>WebServices</a:t>
+            </a:r>
+            <a:r>
+              <a:rPr lang="fr-FR" sz="1800" dirty="0">
+                <a:solidFill>
+                  <a:schemeClr val="bg2"/>
+                </a:solidFill>
+              </a:rPr>
+              <a:t> développer en </a:t>
+            </a:r>
+            <a:r>
+              <a:rPr lang="fr-FR" sz="1800" dirty="0" err="1">
+                <a:solidFill>
+                  <a:schemeClr val="bg2"/>
+                </a:solidFill>
+              </a:rPr>
+              <a:t>NodeJS</a:t>
+            </a:r>
+            <a:endParaRPr lang="fr-FR" sz="1800" dirty="0">
+              <a:solidFill>
+                <a:schemeClr val="bg2"/>
+              </a:solidFill>
+            </a:endParaRPr>
+          </a:p>
+          <a:p>
+            <a:pPr lvl="2">
+              <a:lnSpc>
+                <a:spcPct val="100000"/>
+              </a:lnSpc>
+            </a:pPr>
+            <a:r>
+              <a:rPr lang="fr-FR" sz="1800" dirty="0">
+                <a:solidFill>
+                  <a:schemeClr val="bg2"/>
+                </a:solidFill>
+              </a:rPr>
+              <a:t>Ainsi que PhpMyAdmin</a:t>
+            </a:r>
+          </a:p>
+          <a:p>
+            <a:pPr lvl="1">
+              <a:lnSpc>
+                <a:spcPct val="100000"/>
+              </a:lnSpc>
+            </a:pPr>
+            <a:r>
+              <a:rPr lang="fr-FR" sz="2000" dirty="0">
+                <a:solidFill>
+                  <a:schemeClr val="bg2"/>
+                </a:solidFill>
+              </a:rPr>
+              <a:t>Hébergera le broker MQTT centrale</a:t>
+            </a:r>
+          </a:p>
+        </p:txBody>
+      </p:sp>
+      <p:sp>
+        <p:nvSpPr>
+          <p:cNvPr id="22" name="Espace réservé du contenu 2">
+            <a:extLst>
+              <a:ext uri="{FF2B5EF4-FFF2-40B4-BE49-F238E27FC236}">
+                <a16:creationId xmlns:a16="http://schemas.microsoft.com/office/drawing/2014/main" id="{5FF3DCC0-1B57-4CF1-8B37-D5F86FA78102}"/>
+              </a:ext>
+            </a:extLst>
+          </p:cNvPr>
+          <p:cNvSpPr txBox="1">
+            <a:spLocks/>
+          </p:cNvSpPr>
+          <p:nvPr/>
+        </p:nvSpPr>
+        <p:spPr>
+          <a:xfrm>
+            <a:off x="6726690" y="1876680"/>
+            <a:ext cx="5240136" cy="4218692"/>
+          </a:xfrm>
+          <a:prstGeom prst="rect">
+            <a:avLst/>
+          </a:prstGeom>
+        </p:spPr>
+        <p:txBody>
+          <a:bodyPr vert="horz" lIns="91440" tIns="45720" rIns="91440" bIns="45720" rtlCol="0">
+            <a:normAutofit/>
+          </a:bodyPr>
+          <a:lstStyle>
+            <a:lvl1pPr marL="228600" indent="-228600" algn="l" defTabSz="914400" rtl="0" eaLnBrk="1" latinLnBrk="0" hangingPunct="1">
+              <a:lnSpc>
+                <a:spcPct val="120000"/>
+              </a:lnSpc>
+              <a:spcBef>
+                <a:spcPts val="1000"/>
+              </a:spcBef>
+              <a:buSzPct val="125000"/>
+              <a:buFont typeface="Arial" panose="020B0604020202020204" pitchFamily="34" charset="0"/>
+              <a:buChar char="•"/>
+              <a:defRPr sz="2400" kern="1200">
+                <a:solidFill>
+                  <a:schemeClr val="tx1"/>
+                </a:solidFill>
+                <a:latin typeface="+mn-lt"/>
+                <a:ea typeface="+mn-ea"/>
+                <a:cs typeface="+mn-cs"/>
+              </a:defRPr>
+            </a:lvl1pPr>
+            <a:lvl2pPr marL="685800" indent="-228600" algn="l" defTabSz="914400" rtl="0" eaLnBrk="1" latinLnBrk="0" hangingPunct="1">
+              <a:lnSpc>
+                <a:spcPct val="120000"/>
+              </a:lnSpc>
+              <a:spcBef>
+                <a:spcPts val="500"/>
+              </a:spcBef>
+              <a:buSzPct val="125000"/>
+              <a:buFont typeface="Arial" panose="020B0604020202020204" pitchFamily="34" charset="0"/>
+              <a:buChar char="•"/>
+              <a:defRPr sz="2000" kern="1200">
+                <a:solidFill>
+                  <a:schemeClr val="tx1"/>
+                </a:solidFill>
+                <a:latin typeface="+mn-lt"/>
+                <a:ea typeface="+mn-ea"/>
+                <a:cs typeface="+mn-cs"/>
+              </a:defRPr>
+            </a:lvl2pPr>
+            <a:lvl3pPr marL="1143000" indent="-228600" algn="l" defTabSz="914400" rtl="0" eaLnBrk="1" latinLnBrk="0" hangingPunct="1">
+              <a:lnSpc>
+                <a:spcPct val="120000"/>
+              </a:lnSpc>
+              <a:spcBef>
+                <a:spcPts val="500"/>
+              </a:spcBef>
+              <a:buSzPct val="125000"/>
+              <a:buFont typeface="Arial" panose="020B0604020202020204" pitchFamily="34" charset="0"/>
+              <a:buChar char="•"/>
+              <a:defRPr sz="1800" kern="1200">
+                <a:solidFill>
+                  <a:schemeClr val="tx1"/>
+                </a:solidFill>
+                <a:latin typeface="+mn-lt"/>
+                <a:ea typeface="+mn-ea"/>
+                <a:cs typeface="+mn-cs"/>
+              </a:defRPr>
+            </a:lvl3pPr>
+            <a:lvl4pPr marL="1600200" indent="-228600" algn="l" defTabSz="914400" rtl="0" eaLnBrk="1" latinLnBrk="0" hangingPunct="1">
+              <a:lnSpc>
+                <a:spcPct val="120000"/>
+              </a:lnSpc>
+              <a:spcBef>
+                <a:spcPts val="500"/>
+              </a:spcBef>
+              <a:buSzPct val="125000"/>
+              <a:buFont typeface="Arial" panose="020B0604020202020204" pitchFamily="34" charset="0"/>
+              <a:buChar char="•"/>
+              <a:defRPr sz="1600" kern="1200">
+                <a:solidFill>
+                  <a:schemeClr val="tx1"/>
+                </a:solidFill>
+                <a:latin typeface="+mn-lt"/>
+                <a:ea typeface="+mn-ea"/>
+                <a:cs typeface="+mn-cs"/>
+              </a:defRPr>
+            </a:lvl4pPr>
+            <a:lvl5pPr marL="2057400" indent="-228600" algn="l" defTabSz="914400" rtl="0" eaLnBrk="1" latinLnBrk="0" hangingPunct="1">
+              <a:lnSpc>
+                <a:spcPct val="120000"/>
+              </a:lnSpc>
+              <a:spcBef>
+                <a:spcPts val="500"/>
+              </a:spcBef>
+              <a:buSzPct val="125000"/>
+              <a:buFont typeface="Arial" panose="020B0604020202020204" pitchFamily="34" charset="0"/>
+              <a:buChar char="•"/>
+              <a:defRPr sz="1600" kern="1200">
+                <a:solidFill>
+                  <a:schemeClr val="tx1"/>
+                </a:solidFill>
+                <a:latin typeface="+mn-lt"/>
+                <a:ea typeface="+mn-ea"/>
+                <a:cs typeface="+mn-cs"/>
+              </a:defRPr>
+            </a:lvl5pPr>
+            <a:lvl6pPr marL="2514600" indent="-228600" algn="l" defTabSz="914400" rtl="0" eaLnBrk="1" latinLnBrk="0" hangingPunct="1">
+              <a:lnSpc>
+                <a:spcPct val="120000"/>
+              </a:lnSpc>
+              <a:spcBef>
+                <a:spcPts val="500"/>
+              </a:spcBef>
+              <a:buSzPct val="125000"/>
+              <a:buFont typeface="Arial" panose="020B0604020202020204" pitchFamily="34" charset="0"/>
+              <a:buChar char="•"/>
+              <a:defRPr sz="1400" kern="1200">
+                <a:solidFill>
+                  <a:schemeClr val="tx1"/>
+                </a:solidFill>
+                <a:latin typeface="+mn-lt"/>
+                <a:ea typeface="+mn-ea"/>
+                <a:cs typeface="+mn-cs"/>
+              </a:defRPr>
+            </a:lvl6pPr>
+            <a:lvl7pPr marL="2971800" indent="-228600" algn="l" defTabSz="914400" rtl="0" eaLnBrk="1" latinLnBrk="0" hangingPunct="1">
+              <a:lnSpc>
+                <a:spcPct val="120000"/>
+              </a:lnSpc>
+              <a:spcBef>
+                <a:spcPts val="500"/>
+              </a:spcBef>
+              <a:buSzPct val="125000"/>
+              <a:buFont typeface="Arial" panose="020B0604020202020204" pitchFamily="34" charset="0"/>
+              <a:buChar char="•"/>
+              <a:defRPr sz="1400" kern="1200">
+                <a:solidFill>
+                  <a:schemeClr val="tx1"/>
+                </a:solidFill>
+                <a:latin typeface="+mn-lt"/>
+                <a:ea typeface="+mn-ea"/>
+                <a:cs typeface="+mn-cs"/>
+              </a:defRPr>
+            </a:lvl7pPr>
+            <a:lvl8pPr marL="3429000" indent="-228600" algn="l" defTabSz="914400" rtl="0" eaLnBrk="1" latinLnBrk="0" hangingPunct="1">
+              <a:lnSpc>
+                <a:spcPct val="120000"/>
+              </a:lnSpc>
+              <a:spcBef>
+                <a:spcPts val="500"/>
+              </a:spcBef>
+              <a:buSzPct val="125000"/>
+              <a:buFont typeface="Arial" panose="020B0604020202020204" pitchFamily="34" charset="0"/>
+              <a:buChar char="•"/>
+              <a:defRPr sz="1400" kern="1200">
+                <a:solidFill>
+                  <a:schemeClr val="tx1"/>
+                </a:solidFill>
+                <a:latin typeface="+mn-lt"/>
+                <a:ea typeface="+mn-ea"/>
+                <a:cs typeface="+mn-cs"/>
+              </a:defRPr>
+            </a:lvl8pPr>
+            <a:lvl9pPr marL="3886200" indent="-228600" algn="l" defTabSz="914400" rtl="0" eaLnBrk="1" latinLnBrk="0" hangingPunct="1">
+              <a:lnSpc>
+                <a:spcPct val="120000"/>
+              </a:lnSpc>
+              <a:spcBef>
+                <a:spcPts val="500"/>
+              </a:spcBef>
+              <a:buSzPct val="125000"/>
+              <a:buFont typeface="Arial" panose="020B0604020202020204" pitchFamily="34" charset="0"/>
+              <a:buChar char="•"/>
+              <a:defRPr sz="1400" kern="1200">
+                <a:solidFill>
+                  <a:schemeClr val="tx1"/>
+                </a:solidFill>
+                <a:latin typeface="+mn-lt"/>
+                <a:ea typeface="+mn-ea"/>
+                <a:cs typeface="+mn-cs"/>
+              </a:defRPr>
+            </a:lvl9pPr>
+          </a:lstStyle>
+          <a:p>
+            <a:r>
+              <a:rPr lang="fr-FR" dirty="0">
+                <a:solidFill>
+                  <a:schemeClr val="bg2"/>
+                </a:solidFill>
+              </a:rPr>
+              <a:t>Serveur de base de données :</a:t>
+            </a:r>
+          </a:p>
+          <a:p>
+            <a:pPr lvl="1"/>
+            <a:r>
+              <a:rPr lang="fr-FR" dirty="0">
+                <a:solidFill>
+                  <a:schemeClr val="bg2"/>
+                </a:solidFill>
+              </a:rPr>
+              <a:t>Raspberry pi 3</a:t>
+            </a:r>
+          </a:p>
+          <a:p>
+            <a:pPr lvl="1"/>
+            <a:r>
+              <a:rPr lang="fr-FR" dirty="0" err="1">
+                <a:solidFill>
+                  <a:schemeClr val="bg2"/>
+                </a:solidFill>
+              </a:rPr>
+              <a:t>Rasbpian</a:t>
+            </a:r>
+            <a:endParaRPr lang="fr-FR" dirty="0">
+              <a:solidFill>
+                <a:schemeClr val="bg2"/>
+              </a:solidFill>
+            </a:endParaRPr>
+          </a:p>
+          <a:p>
+            <a:pPr lvl="1"/>
+            <a:r>
+              <a:rPr lang="fr-FR" dirty="0">
+                <a:solidFill>
+                  <a:schemeClr val="bg2"/>
+                </a:solidFill>
+              </a:rPr>
+              <a:t>Hébergera la base de données uniquement</a:t>
+            </a:r>
+          </a:p>
+          <a:p>
+            <a:pPr lvl="2"/>
+            <a:r>
+              <a:rPr lang="fr-FR" dirty="0">
+                <a:solidFill>
+                  <a:schemeClr val="bg2"/>
+                </a:solidFill>
+              </a:rPr>
+              <a:t>Base de données </a:t>
+            </a:r>
+            <a:r>
+              <a:rPr lang="fr-FR" dirty="0" err="1">
+                <a:solidFill>
+                  <a:schemeClr val="bg2"/>
+                </a:solidFill>
+              </a:rPr>
+              <a:t>MariaDB</a:t>
+            </a:r>
+            <a:endParaRPr lang="fr-FR" dirty="0">
+              <a:solidFill>
+                <a:schemeClr val="bg2"/>
+              </a:solidFill>
+            </a:endParaRPr>
+          </a:p>
+          <a:p>
+            <a:pPr lvl="1"/>
+            <a:r>
+              <a:rPr lang="fr-FR" dirty="0" err="1">
+                <a:solidFill>
+                  <a:schemeClr val="bg2"/>
+                </a:solidFill>
+              </a:rPr>
+              <a:t>Rejète</a:t>
+            </a:r>
+            <a:r>
+              <a:rPr lang="fr-FR" dirty="0">
+                <a:solidFill>
+                  <a:schemeClr val="bg2"/>
+                </a:solidFill>
+              </a:rPr>
+              <a:t> toute communication ayant une adresse </a:t>
+            </a:r>
+            <a:r>
+              <a:rPr lang="fr-FR" dirty="0" err="1">
+                <a:solidFill>
+                  <a:schemeClr val="bg2"/>
+                </a:solidFill>
+              </a:rPr>
+              <a:t>ip</a:t>
+            </a:r>
+            <a:r>
+              <a:rPr lang="fr-FR" dirty="0">
+                <a:solidFill>
+                  <a:schemeClr val="bg2"/>
+                </a:solidFill>
+              </a:rPr>
+              <a:t> différente du serveur</a:t>
+            </a:r>
+          </a:p>
+          <a:p>
+            <a:pPr lvl="1"/>
+            <a:r>
+              <a:rPr lang="fr-FR" dirty="0">
+                <a:solidFill>
+                  <a:schemeClr val="bg2"/>
+                </a:solidFill>
+              </a:rPr>
+              <a:t>Accessible uniquement depuis l’intranet (sous réseau 10.143.1.0/24)</a:t>
+            </a:r>
+          </a:p>
+        </p:txBody>
+      </p:sp>
+      <p:pic>
+        <p:nvPicPr>
+          <p:cNvPr id="23" name="Image 22">
+            <a:extLst>
+              <a:ext uri="{FF2B5EF4-FFF2-40B4-BE49-F238E27FC236}">
+                <a16:creationId xmlns:a16="http://schemas.microsoft.com/office/drawing/2014/main" id="{1607B157-EA88-496D-82D6-EE2D5DE7118A}"/>
+              </a:ext>
+            </a:extLst>
+          </p:cNvPr>
+          <p:cNvPicPr>
+            <a:picLocks noChangeAspect="1"/>
+          </p:cNvPicPr>
+          <p:nvPr/>
+        </p:nvPicPr>
+        <p:blipFill rotWithShape="1">
+          <a:blip r:embed="rId3">
+            <a:extLst>
+              <a:ext uri="{28A0092B-C50C-407E-A947-70E740481C1C}">
+                <a14:useLocalDpi xmlns:a14="http://schemas.microsoft.com/office/drawing/2010/main" val="0"/>
+              </a:ext>
+            </a:extLst>
+          </a:blip>
+          <a:srcRect t="12529"/>
+          <a:stretch/>
+        </p:blipFill>
+        <p:spPr>
+          <a:xfrm>
+            <a:off x="1733550" y="1009650"/>
+            <a:ext cx="8872961" cy="5848350"/>
+          </a:xfrm>
+          <a:prstGeom prst="rect">
+            <a:avLst/>
+          </a:prstGeom>
+        </p:spPr>
+      </p:pic>
+      <p:sp>
+        <p:nvSpPr>
+          <p:cNvPr id="24" name="Espace réservé du contenu 2">
+            <a:extLst>
+              <a:ext uri="{FF2B5EF4-FFF2-40B4-BE49-F238E27FC236}">
+                <a16:creationId xmlns:a16="http://schemas.microsoft.com/office/drawing/2014/main" id="{F411EB8D-6B1B-45FF-9B7D-6C9CE7E73055}"/>
+              </a:ext>
+            </a:extLst>
+          </p:cNvPr>
+          <p:cNvSpPr txBox="1">
+            <a:spLocks/>
+          </p:cNvSpPr>
+          <p:nvPr/>
+        </p:nvSpPr>
+        <p:spPr>
+          <a:xfrm>
+            <a:off x="468805" y="2120999"/>
+            <a:ext cx="11326912" cy="5117775"/>
+          </a:xfrm>
+          <a:prstGeom prst="rect">
+            <a:avLst/>
+          </a:prstGeom>
+        </p:spPr>
+        <p:txBody>
+          <a:bodyPr>
+            <a:normAutofit/>
+          </a:bodyPr>
+          <a:lstStyle>
+            <a:lvl1pPr marL="228600" indent="-228600" algn="l" defTabSz="914400" rtl="0" eaLnBrk="1" latinLnBrk="0" hangingPunct="1">
+              <a:lnSpc>
+                <a:spcPct val="90000"/>
+              </a:lnSpc>
+              <a:spcBef>
+                <a:spcPts val="1000"/>
+              </a:spcBef>
+              <a:buFont typeface="Arial" panose="020B0604020202020204" pitchFamily="34" charset="0"/>
+              <a:buChar char="•"/>
+              <a:defRPr sz="2800" kern="1200">
+                <a:solidFill>
+                  <a:schemeClr val="tx1"/>
+                </a:solidFill>
+                <a:latin typeface="+mn-lt"/>
+                <a:ea typeface="+mn-ea"/>
+                <a:cs typeface="+mn-cs"/>
+              </a:defRPr>
+            </a:lvl1pPr>
+            <a:lvl2pPr marL="685800" indent="-228600" algn="l" defTabSz="914400" rtl="0" eaLnBrk="1" latinLnBrk="0" hangingPunct="1">
+              <a:lnSpc>
+                <a:spcPct val="90000"/>
+              </a:lnSpc>
+              <a:spcBef>
+                <a:spcPts val="500"/>
+              </a:spcBef>
+              <a:buFont typeface="Arial" panose="020B0604020202020204" pitchFamily="34" charset="0"/>
+              <a:buChar char="•"/>
+              <a:defRPr sz="2400" kern="1200">
+                <a:solidFill>
+                  <a:schemeClr val="tx1"/>
+                </a:solidFill>
+                <a:latin typeface="+mn-lt"/>
+                <a:ea typeface="+mn-ea"/>
+                <a:cs typeface="+mn-cs"/>
+              </a:defRPr>
+            </a:lvl2pPr>
+            <a:lvl3pPr marL="1143000" indent="-228600" algn="l" defTabSz="914400" rtl="0" eaLnBrk="1" latinLnBrk="0" hangingPunct="1">
+              <a:lnSpc>
+                <a:spcPct val="90000"/>
+              </a:lnSpc>
+              <a:spcBef>
+                <a:spcPts val="500"/>
+              </a:spcBef>
+              <a:buFont typeface="Arial" panose="020B0604020202020204" pitchFamily="34" charset="0"/>
+              <a:buChar char="•"/>
+              <a:defRPr sz="2000" kern="1200">
+                <a:solidFill>
+                  <a:schemeClr val="tx1"/>
+                </a:solidFill>
+                <a:latin typeface="+mn-lt"/>
+                <a:ea typeface="+mn-ea"/>
+                <a:cs typeface="+mn-cs"/>
+              </a:defRPr>
+            </a:lvl3pPr>
+            <a:lvl4pPr marL="1600200" indent="-228600" algn="l" defTabSz="914400" rtl="0" eaLnBrk="1" latinLnBrk="0" hangingPunct="1">
+              <a:lnSpc>
+                <a:spcPct val="90000"/>
+              </a:lnSpc>
+              <a:spcBef>
+                <a:spcPts val="500"/>
+              </a:spcBef>
+              <a:buFont typeface="Arial" panose="020B0604020202020204" pitchFamily="34" charset="0"/>
+              <a:buChar char="•"/>
+              <a:defRPr sz="1800" kern="1200">
+                <a:solidFill>
+                  <a:schemeClr val="tx1"/>
+                </a:solidFill>
+                <a:latin typeface="+mn-lt"/>
+                <a:ea typeface="+mn-ea"/>
+                <a:cs typeface="+mn-cs"/>
+              </a:defRPr>
+            </a:lvl4pPr>
+            <a:lvl5pPr marL="2057400" indent="-228600" algn="l" defTabSz="914400" rtl="0" eaLnBrk="1" latinLnBrk="0" hangingPunct="1">
+              <a:lnSpc>
+                <a:spcPct val="90000"/>
+              </a:lnSpc>
+              <a:spcBef>
+                <a:spcPts val="500"/>
+              </a:spcBef>
+              <a:buFont typeface="Arial" panose="020B0604020202020204" pitchFamily="34" charset="0"/>
+              <a:buChar char="•"/>
+              <a:defRPr sz="1800" kern="1200">
+                <a:solidFill>
+                  <a:schemeClr val="tx1"/>
+                </a:solidFill>
+                <a:latin typeface="+mn-lt"/>
+                <a:ea typeface="+mn-ea"/>
+                <a:cs typeface="+mn-cs"/>
+              </a:defRPr>
+            </a:lvl5pPr>
+            <a:lvl6pPr marL="2514600" indent="-228600" algn="l" defTabSz="914400" rtl="0" eaLnBrk="1" latinLnBrk="0" hangingPunct="1">
+              <a:lnSpc>
+                <a:spcPct val="90000"/>
+              </a:lnSpc>
+              <a:spcBef>
+                <a:spcPts val="500"/>
+              </a:spcBef>
+              <a:buFont typeface="Arial" panose="020B0604020202020204" pitchFamily="34" charset="0"/>
+              <a:buChar char="•"/>
+              <a:defRPr sz="1800" kern="1200">
+                <a:solidFill>
+                  <a:schemeClr val="tx1"/>
+                </a:solidFill>
+                <a:latin typeface="+mn-lt"/>
+                <a:ea typeface="+mn-ea"/>
+                <a:cs typeface="+mn-cs"/>
+              </a:defRPr>
+            </a:lvl6pPr>
+            <a:lvl7pPr marL="2971800" indent="-228600" algn="l" defTabSz="914400" rtl="0" eaLnBrk="1" latinLnBrk="0" hangingPunct="1">
+              <a:lnSpc>
+                <a:spcPct val="90000"/>
+              </a:lnSpc>
+              <a:spcBef>
+                <a:spcPts val="500"/>
+              </a:spcBef>
+              <a:buFont typeface="Arial" panose="020B0604020202020204" pitchFamily="34" charset="0"/>
+              <a:buChar char="•"/>
+              <a:defRPr sz="1800" kern="1200">
+                <a:solidFill>
+                  <a:schemeClr val="tx1"/>
+                </a:solidFill>
+                <a:latin typeface="+mn-lt"/>
+                <a:ea typeface="+mn-ea"/>
+                <a:cs typeface="+mn-cs"/>
+              </a:defRPr>
+            </a:lvl7pPr>
+            <a:lvl8pPr marL="3429000" indent="-228600" algn="l" defTabSz="914400" rtl="0" eaLnBrk="1" latinLnBrk="0" hangingPunct="1">
+              <a:lnSpc>
+                <a:spcPct val="90000"/>
+              </a:lnSpc>
+              <a:spcBef>
+                <a:spcPts val="500"/>
+              </a:spcBef>
+              <a:buFont typeface="Arial" panose="020B0604020202020204" pitchFamily="34" charset="0"/>
+              <a:buChar char="•"/>
+              <a:defRPr sz="1800" kern="1200">
+                <a:solidFill>
+                  <a:schemeClr val="tx1"/>
+                </a:solidFill>
+                <a:latin typeface="+mn-lt"/>
+                <a:ea typeface="+mn-ea"/>
+                <a:cs typeface="+mn-cs"/>
+              </a:defRPr>
+            </a:lvl8pPr>
+            <a:lvl9pPr marL="3886200" indent="-228600" algn="l" defTabSz="914400" rtl="0" eaLnBrk="1" latinLnBrk="0" hangingPunct="1">
+              <a:lnSpc>
+                <a:spcPct val="90000"/>
+              </a:lnSpc>
+              <a:spcBef>
+                <a:spcPts val="500"/>
+              </a:spcBef>
+              <a:buFont typeface="Arial" panose="020B0604020202020204" pitchFamily="34" charset="0"/>
+              <a:buChar char="•"/>
+              <a:defRPr sz="1800" kern="1200">
+                <a:solidFill>
+                  <a:schemeClr val="tx1"/>
+                </a:solidFill>
+                <a:latin typeface="+mn-lt"/>
+                <a:ea typeface="+mn-ea"/>
+                <a:cs typeface="+mn-cs"/>
+              </a:defRPr>
+            </a:lvl9pPr>
+          </a:lstStyle>
+          <a:p>
+            <a:pPr marL="0" indent="0">
+              <a:buNone/>
+            </a:pPr>
+            <a:r>
+              <a:rPr lang="fr-FR" dirty="0">
+                <a:solidFill>
+                  <a:schemeClr val="bg2"/>
+                </a:solidFill>
+              </a:rPr>
+              <a:t>Conclusion :</a:t>
+            </a:r>
+          </a:p>
+          <a:p>
+            <a:pPr lvl="0"/>
+            <a:r>
+              <a:rPr lang="fr-FR" dirty="0">
+                <a:solidFill>
+                  <a:schemeClr val="bg2"/>
+                </a:solidFill>
+              </a:rPr>
+              <a:t>Configuration des serveurs Web et base de données </a:t>
+            </a:r>
+          </a:p>
+          <a:p>
+            <a:pPr lvl="0"/>
+            <a:r>
+              <a:rPr lang="fr-FR" dirty="0">
+                <a:solidFill>
+                  <a:schemeClr val="bg2"/>
+                </a:solidFill>
+              </a:rPr>
+              <a:t>Interopérabilité avec les autres parties </a:t>
+            </a:r>
+          </a:p>
+        </p:txBody>
+      </p:sp>
     </p:spTree>
   </p:cSld>
   <p:clrMapOvr>
     <a:masterClrMapping/>
   </p:clrMapOvr>
+  <p:timing>
+    <p:tnLst>
+      <p:par>
+        <p:cTn id="1" dur="indefinite" restart="never" nodeType="tmRoot">
+          <p:childTnLst>
+            <p:seq concurrent="1" nextAc="seek">
+              <p:cTn id="2" dur="indefinite" nodeType="mainSeq">
+                <p:childTnLst>
+                  <p:par>
+                    <p:cTn id="3" fill="hold">
+                      <p:stCondLst>
+                        <p:cond delay="indefinite"/>
+                        <p:cond evt="onBegin" delay="0">
+                          <p:tn val="2"/>
+                        </p:cond>
+                      </p:stCondLst>
+                      <p:childTnLst>
+                        <p:par>
+                          <p:cTn id="4" fill="hold">
+                            <p:stCondLst>
+                              <p:cond delay="0"/>
+                            </p:stCondLst>
+                            <p:childTnLst>
+                              <p:par>
+                                <p:cTn id="5" presetID="1" presetClass="exit" presetSubtype="0" fill="hold" nodeType="withEffect">
+                                  <p:stCondLst>
+                                    <p:cond delay="0"/>
+                                  </p:stCondLst>
+                                  <p:childTnLst>
+                                    <p:set>
+                                      <p:cBhvr>
+                                        <p:cTn id="6" dur="1" fill="hold">
+                                          <p:stCondLst>
+                                            <p:cond delay="0"/>
+                                          </p:stCondLst>
+                                        </p:cTn>
+                                        <p:tgtEl>
+                                          <p:spTgt spid="23"/>
+                                        </p:tgtEl>
+                                        <p:attrNameLst>
+                                          <p:attrName>style.visibility</p:attrName>
+                                        </p:attrNameLst>
+                                      </p:cBhvr>
+                                      <p:to>
+                                        <p:strVal val="hidden"/>
+                                      </p:to>
+                                    </p:set>
+                                  </p:childTnLst>
+                                </p:cTn>
+                              </p:par>
+                              <p:par>
+                                <p:cTn id="7" presetID="1" presetClass="exit" presetSubtype="0" fill="hold" grpId="2" nodeType="withEffect">
+                                  <p:stCondLst>
+                                    <p:cond delay="0"/>
+                                  </p:stCondLst>
+                                  <p:childTnLst>
+                                    <p:set>
+                                      <p:cBhvr>
+                                        <p:cTn id="8" dur="1" fill="hold">
+                                          <p:stCondLst>
+                                            <p:cond delay="0"/>
+                                          </p:stCondLst>
+                                        </p:cTn>
+                                        <p:tgtEl>
+                                          <p:spTgt spid="24"/>
+                                        </p:tgtEl>
+                                        <p:attrNameLst>
+                                          <p:attrName>style.visibility</p:attrName>
+                                        </p:attrNameLst>
+                                      </p:cBhvr>
+                                      <p:to>
+                                        <p:strVal val="hidden"/>
+                                      </p:to>
+                                    </p:set>
+                                  </p:childTnLst>
+                                </p:cTn>
+                              </p:par>
+                            </p:childTnLst>
+                          </p:cTn>
+                        </p:par>
+                      </p:childTnLst>
+                    </p:cTn>
+                  </p:par>
+                  <p:par>
+                    <p:cTn id="9" fill="hold">
+                      <p:stCondLst>
+                        <p:cond delay="indefinite"/>
+                      </p:stCondLst>
+                      <p:childTnLst>
+                        <p:par>
+                          <p:cTn id="10" fill="hold">
+                            <p:stCondLst>
+                              <p:cond delay="0"/>
+                            </p:stCondLst>
+                            <p:childTnLst>
+                              <p:par>
+                                <p:cTn id="11" presetID="16" presetClass="exit" presetSubtype="21" fill="hold" grpId="0" nodeType="clickEffect">
+                                  <p:stCondLst>
+                                    <p:cond delay="0"/>
+                                  </p:stCondLst>
+                                  <p:childTnLst>
+                                    <p:animEffect transition="out" filter="barn(inVertical)">
+                                      <p:cBhvr>
+                                        <p:cTn id="12" dur="500"/>
+                                        <p:tgtEl>
+                                          <p:spTgt spid="21"/>
+                                        </p:tgtEl>
+                                      </p:cBhvr>
+                                    </p:animEffect>
+                                    <p:set>
+                                      <p:cBhvr>
+                                        <p:cTn id="13" dur="1" fill="hold">
+                                          <p:stCondLst>
+                                            <p:cond delay="499"/>
+                                          </p:stCondLst>
+                                        </p:cTn>
+                                        <p:tgtEl>
+                                          <p:spTgt spid="21"/>
+                                        </p:tgtEl>
+                                        <p:attrNameLst>
+                                          <p:attrName>style.visibility</p:attrName>
+                                        </p:attrNameLst>
+                                      </p:cBhvr>
+                                      <p:to>
+                                        <p:strVal val="hidden"/>
+                                      </p:to>
+                                    </p:set>
+                                  </p:childTnLst>
+                                </p:cTn>
+                              </p:par>
+                              <p:par>
+                                <p:cTn id="14" presetID="16" presetClass="exit" presetSubtype="21" fill="hold" grpId="0" nodeType="withEffect">
+                                  <p:stCondLst>
+                                    <p:cond delay="0"/>
+                                  </p:stCondLst>
+                                  <p:childTnLst>
+                                    <p:animEffect transition="out" filter="barn(inVertical)">
+                                      <p:cBhvr>
+                                        <p:cTn id="15" dur="500"/>
+                                        <p:tgtEl>
+                                          <p:spTgt spid="22"/>
+                                        </p:tgtEl>
+                                      </p:cBhvr>
+                                    </p:animEffect>
+                                    <p:set>
+                                      <p:cBhvr>
+                                        <p:cTn id="16" dur="1" fill="hold">
+                                          <p:stCondLst>
+                                            <p:cond delay="499"/>
+                                          </p:stCondLst>
+                                        </p:cTn>
+                                        <p:tgtEl>
+                                          <p:spTgt spid="22"/>
+                                        </p:tgtEl>
+                                        <p:attrNameLst>
+                                          <p:attrName>style.visibility</p:attrName>
+                                        </p:attrNameLst>
+                                      </p:cBhvr>
+                                      <p:to>
+                                        <p:strVal val="hidden"/>
+                                      </p:to>
+                                    </p:set>
+                                  </p:childTnLst>
+                                </p:cTn>
+                              </p:par>
+                              <p:par>
+                                <p:cTn id="17" presetID="2" presetClass="entr" presetSubtype="4" fill="hold" nodeType="withEffect">
+                                  <p:stCondLst>
+                                    <p:cond delay="0"/>
+                                  </p:stCondLst>
+                                  <p:childTnLst>
+                                    <p:set>
+                                      <p:cBhvr>
+                                        <p:cTn id="18" dur="1" fill="hold">
+                                          <p:stCondLst>
+                                            <p:cond delay="0"/>
+                                          </p:stCondLst>
+                                        </p:cTn>
+                                        <p:tgtEl>
+                                          <p:spTgt spid="23"/>
+                                        </p:tgtEl>
+                                        <p:attrNameLst>
+                                          <p:attrName>style.visibility</p:attrName>
+                                        </p:attrNameLst>
+                                      </p:cBhvr>
+                                      <p:to>
+                                        <p:strVal val="visible"/>
+                                      </p:to>
+                                    </p:set>
+                                    <p:anim calcmode="lin" valueType="num">
+                                      <p:cBhvr additive="base">
+                                        <p:cTn id="19" dur="500" fill="hold"/>
+                                        <p:tgtEl>
+                                          <p:spTgt spid="23"/>
+                                        </p:tgtEl>
+                                        <p:attrNameLst>
+                                          <p:attrName>ppt_x</p:attrName>
+                                        </p:attrNameLst>
+                                      </p:cBhvr>
+                                      <p:tavLst>
+                                        <p:tav tm="0">
+                                          <p:val>
+                                            <p:strVal val="#ppt_x"/>
+                                          </p:val>
+                                        </p:tav>
+                                        <p:tav tm="100000">
+                                          <p:val>
+                                            <p:strVal val="#ppt_x"/>
+                                          </p:val>
+                                        </p:tav>
+                                      </p:tavLst>
+                                    </p:anim>
+                                    <p:anim calcmode="lin" valueType="num">
+                                      <p:cBhvr additive="base">
+                                        <p:cTn id="20" dur="500" fill="hold"/>
+                                        <p:tgtEl>
+                                          <p:spTgt spid="23"/>
+                                        </p:tgtEl>
+                                        <p:attrNameLst>
+                                          <p:attrName>ppt_y</p:attrName>
+                                        </p:attrNameLst>
+                                      </p:cBhvr>
+                                      <p:tavLst>
+                                        <p:tav tm="0">
+                                          <p:val>
+                                            <p:strVal val="1+#ppt_h/2"/>
+                                          </p:val>
+                                        </p:tav>
+                                        <p:tav tm="100000">
+                                          <p:val>
+                                            <p:strVal val="#ppt_y"/>
+                                          </p:val>
+                                        </p:tav>
+                                      </p:tavLst>
+                                    </p:anim>
+                                  </p:childTnLst>
+                                </p:cTn>
+                              </p:par>
+                            </p:childTnLst>
+                          </p:cTn>
+                        </p:par>
+                      </p:childTnLst>
+                    </p:cTn>
+                  </p:par>
+                  <p:par>
+                    <p:cTn id="21" fill="hold">
+                      <p:stCondLst>
+                        <p:cond delay="indefinite"/>
+                      </p:stCondLst>
+                      <p:childTnLst>
+                        <p:par>
+                          <p:cTn id="22" fill="hold">
+                            <p:stCondLst>
+                              <p:cond delay="0"/>
+                            </p:stCondLst>
+                            <p:childTnLst>
+                              <p:par>
+                                <p:cTn id="23" presetID="2" presetClass="exit" presetSubtype="4" fill="hold" nodeType="clickEffect">
+                                  <p:stCondLst>
+                                    <p:cond delay="0"/>
+                                  </p:stCondLst>
+                                  <p:childTnLst>
+                                    <p:anim calcmode="lin" valueType="num">
+                                      <p:cBhvr additive="base">
+                                        <p:cTn id="24" dur="500"/>
+                                        <p:tgtEl>
+                                          <p:spTgt spid="23"/>
+                                        </p:tgtEl>
+                                        <p:attrNameLst>
+                                          <p:attrName>ppt_x</p:attrName>
+                                        </p:attrNameLst>
+                                      </p:cBhvr>
+                                      <p:tavLst>
+                                        <p:tav tm="0">
+                                          <p:val>
+                                            <p:strVal val="ppt_x"/>
+                                          </p:val>
+                                        </p:tav>
+                                        <p:tav tm="100000">
+                                          <p:val>
+                                            <p:strVal val="ppt_x"/>
+                                          </p:val>
+                                        </p:tav>
+                                      </p:tavLst>
+                                    </p:anim>
+                                    <p:anim calcmode="lin" valueType="num">
+                                      <p:cBhvr additive="base">
+                                        <p:cTn id="25" dur="500"/>
+                                        <p:tgtEl>
+                                          <p:spTgt spid="23"/>
+                                        </p:tgtEl>
+                                        <p:attrNameLst>
+                                          <p:attrName>ppt_y</p:attrName>
+                                        </p:attrNameLst>
+                                      </p:cBhvr>
+                                      <p:tavLst>
+                                        <p:tav tm="0">
+                                          <p:val>
+                                            <p:strVal val="ppt_y"/>
+                                          </p:val>
+                                        </p:tav>
+                                        <p:tav tm="100000">
+                                          <p:val>
+                                            <p:strVal val="1+ppt_h/2"/>
+                                          </p:val>
+                                        </p:tav>
+                                      </p:tavLst>
+                                    </p:anim>
+                                    <p:set>
+                                      <p:cBhvr>
+                                        <p:cTn id="26" dur="1" fill="hold">
+                                          <p:stCondLst>
+                                            <p:cond delay="499"/>
+                                          </p:stCondLst>
+                                        </p:cTn>
+                                        <p:tgtEl>
+                                          <p:spTgt spid="23"/>
+                                        </p:tgtEl>
+                                        <p:attrNameLst>
+                                          <p:attrName>style.visibility</p:attrName>
+                                        </p:attrNameLst>
+                                      </p:cBhvr>
+                                      <p:to>
+                                        <p:strVal val="hidden"/>
+                                      </p:to>
+                                    </p:set>
+                                  </p:childTnLst>
+                                </p:cTn>
+                              </p:par>
+                              <p:par>
+                                <p:cTn id="27" presetID="1" presetClass="exit" presetSubtype="0" fill="hold" grpId="0" nodeType="withEffect">
+                                  <p:stCondLst>
+                                    <p:cond delay="0"/>
+                                  </p:stCondLst>
+                                  <p:childTnLst>
+                                    <p:set>
+                                      <p:cBhvr>
+                                        <p:cTn id="28" dur="1" fill="hold">
+                                          <p:stCondLst>
+                                            <p:cond delay="0"/>
+                                          </p:stCondLst>
+                                        </p:cTn>
+                                        <p:tgtEl>
+                                          <p:spTgt spid="24"/>
+                                        </p:tgtEl>
+                                        <p:attrNameLst>
+                                          <p:attrName>style.visibility</p:attrName>
+                                        </p:attrNameLst>
+                                      </p:cBhvr>
+                                      <p:to>
+                                        <p:strVal val="hidden"/>
+                                      </p:to>
+                                    </p:set>
+                                  </p:childTnLst>
+                                </p:cTn>
+                              </p:par>
+                            </p:childTnLst>
+                          </p:cTn>
+                        </p:par>
+                        <p:par>
+                          <p:cTn id="29" fill="hold">
+                            <p:stCondLst>
+                              <p:cond delay="500"/>
+                            </p:stCondLst>
+                            <p:childTnLst>
+                              <p:par>
+                                <p:cTn id="30" presetID="1" presetClass="entr" presetSubtype="0" fill="hold" grpId="1" nodeType="afterEffect">
+                                  <p:stCondLst>
+                                    <p:cond delay="0"/>
+                                  </p:stCondLst>
+                                  <p:childTnLst>
+                                    <p:set>
+                                      <p:cBhvr>
+                                        <p:cTn id="31" dur="1" fill="hold">
+                                          <p:stCondLst>
+                                            <p:cond delay="0"/>
+                                          </p:stCondLst>
+                                        </p:cTn>
+                                        <p:tgtEl>
+                                          <p:spTgt spid="24"/>
+                                        </p:tgtEl>
+                                        <p:attrNameLst>
+                                          <p:attrName>style.visibility</p:attrName>
+                                        </p:attrNameLst>
+                                      </p:cBhvr>
+                                      <p:to>
+                                        <p:strVal val="visible"/>
+                                      </p:to>
+                                    </p:set>
+                                  </p:childTnLst>
+                                </p:cTn>
+                              </p:par>
+                            </p:childTnLst>
+                          </p:cTn>
+                        </p:par>
+                      </p:childTnLst>
+                    </p:cTn>
+                  </p:par>
+                </p:childTnLst>
+              </p:cTn>
+              <p:prevCondLst>
+                <p:cond evt="onPrev" delay="0">
+                  <p:tgtEl>
+                    <p:sldTgt/>
+                  </p:tgtEl>
+                </p:cond>
+              </p:prevCondLst>
+              <p:nextCondLst>
+                <p:cond evt="onNext" delay="0">
+                  <p:tgtEl>
+                    <p:sldTgt/>
+                  </p:tgtEl>
+                </p:cond>
+              </p:nextCondLst>
+            </p:seq>
+          </p:childTnLst>
+        </p:cTn>
+      </p:par>
+    </p:tnLst>
+    <p:bldLst>
+      <p:bldP spid="21" grpId="0"/>
+      <p:bldP spid="22" grpId="0"/>
+      <p:bldP spid="24" grpId="0"/>
+      <p:bldP spid="24" grpId="1"/>
+      <p:bldP spid="24" grpId="2"/>
+    </p:bldLst>
+  </p:timing>
 </p:sld>
 </file>
 

</xml_diff>

<commit_message>
Partie Diapo Dorian Pennacchioni
</commit_message>
<xml_diff>
--- a/Diapo_commun/PresentationCommune.pptx
+++ b/Diapo_commun/PresentationCommune.pptx
@@ -5,6 +5,9 @@
     <p:sldMasterId id="2147483648" r:id="rId1"/>
     <p:sldMasterId id="2147483661" r:id="rId2"/>
   </p:sldMasterIdLst>
+  <p:notesMasterIdLst>
+    <p:notesMasterId r:id="rId20"/>
+  </p:notesMasterIdLst>
   <p:sldIdLst>
     <p:sldId id="256" r:id="rId3"/>
     <p:sldId id="257" r:id="rId4"/>
@@ -20,7 +23,9 @@
     <p:sldId id="266" r:id="rId14"/>
     <p:sldId id="267" r:id="rId15"/>
     <p:sldId id="268" r:id="rId16"/>
-    <p:sldId id="269" r:id="rId17"/>
+    <p:sldId id="271" r:id="rId17"/>
+    <p:sldId id="272" r:id="rId18"/>
+    <p:sldId id="269" r:id="rId19"/>
   </p:sldIdLst>
   <p:sldSz cx="12192000" cy="6858000"/>
   <p:notesSz cx="7559675" cy="10691813"/>
@@ -355,6 +360,523 @@
 </pc:chgInfo>
 </file>
 
+<file path=ppt/notesMasters/notesMaster1.xml><?xml version="1.0" encoding="utf-8"?>
+<p:notesMaster xmlns:a="http://schemas.openxmlformats.org/drawingml/2006/main" xmlns:r="http://schemas.openxmlformats.org/officeDocument/2006/relationships" xmlns:p="http://schemas.openxmlformats.org/presentationml/2006/main">
+  <p:cSld>
+    <p:bg>
+      <p:bgRef idx="1001">
+        <a:schemeClr val="bg1"/>
+      </p:bgRef>
+    </p:bg>
+    <p:spTree>
+      <p:nvGrpSpPr>
+        <p:cNvPr id="1" name=""/>
+        <p:cNvGrpSpPr/>
+        <p:nvPr/>
+      </p:nvGrpSpPr>
+      <p:grpSpPr>
+        <a:xfrm>
+          <a:off x="0" y="0"/>
+          <a:ext cx="0" cy="0"/>
+          <a:chOff x="0" y="0"/>
+          <a:chExt cx="0" cy="0"/>
+        </a:xfrm>
+      </p:grpSpPr>
+      <p:sp>
+        <p:nvSpPr>
+          <p:cNvPr id="2" name="Espace réservé de l'en-tête 1"/>
+          <p:cNvSpPr>
+            <a:spLocks noGrp="1"/>
+          </p:cNvSpPr>
+          <p:nvPr>
+            <p:ph type="hdr" sz="quarter"/>
+          </p:nvPr>
+        </p:nvSpPr>
+        <p:spPr>
+          <a:xfrm>
+            <a:off x="0" y="0"/>
+            <a:ext cx="3276600" cy="536575"/>
+          </a:xfrm>
+          <a:prstGeom prst="rect">
+            <a:avLst/>
+          </a:prstGeom>
+        </p:spPr>
+        <p:txBody>
+          <a:bodyPr vert="horz" lIns="91440" tIns="45720" rIns="91440" bIns="45720" rtlCol="0"/>
+          <a:lstStyle>
+            <a:lvl1pPr algn="l">
+              <a:defRPr sz="1200"/>
+            </a:lvl1pPr>
+          </a:lstStyle>
+          <a:p>
+            <a:endParaRPr lang="fr-FR"/>
+          </a:p>
+        </p:txBody>
+      </p:sp>
+      <p:sp>
+        <p:nvSpPr>
+          <p:cNvPr id="3" name="Espace réservé de la date 2"/>
+          <p:cNvSpPr>
+            <a:spLocks noGrp="1"/>
+          </p:cNvSpPr>
+          <p:nvPr>
+            <p:ph type="dt" idx="1"/>
+          </p:nvPr>
+        </p:nvSpPr>
+        <p:spPr>
+          <a:xfrm>
+            <a:off x="4281488" y="0"/>
+            <a:ext cx="3276600" cy="536575"/>
+          </a:xfrm>
+          <a:prstGeom prst="rect">
+            <a:avLst/>
+          </a:prstGeom>
+        </p:spPr>
+        <p:txBody>
+          <a:bodyPr vert="horz" lIns="91440" tIns="45720" rIns="91440" bIns="45720" rtlCol="0"/>
+          <a:lstStyle>
+            <a:lvl1pPr algn="r">
+              <a:defRPr sz="1200"/>
+            </a:lvl1pPr>
+          </a:lstStyle>
+          <a:p>
+            <a:fld id="{EC9A8D48-811A-4055-B218-CE83A36871B8}" type="datetimeFigureOut">
+              <a:rPr lang="fr-FR" smtClean="0"/>
+              <a:t>13/05/2021</a:t>
+            </a:fld>
+            <a:endParaRPr lang="fr-FR"/>
+          </a:p>
+        </p:txBody>
+      </p:sp>
+      <p:sp>
+        <p:nvSpPr>
+          <p:cNvPr id="4" name="Espace réservé de l'image des diapositives 3"/>
+          <p:cNvSpPr>
+            <a:spLocks noGrp="1" noRot="1" noChangeAspect="1"/>
+          </p:cNvSpPr>
+          <p:nvPr>
+            <p:ph type="sldImg" idx="2"/>
+          </p:nvPr>
+        </p:nvSpPr>
+        <p:spPr>
+          <a:xfrm>
+            <a:off x="573088" y="1336675"/>
+            <a:ext cx="6413500" cy="3608388"/>
+          </a:xfrm>
+          <a:prstGeom prst="rect">
+            <a:avLst/>
+          </a:prstGeom>
+          <a:noFill/>
+          <a:ln w="12700">
+            <a:solidFill>
+              <a:prstClr val="black"/>
+            </a:solidFill>
+          </a:ln>
+        </p:spPr>
+        <p:txBody>
+          <a:bodyPr vert="horz" lIns="91440" tIns="45720" rIns="91440" bIns="45720" rtlCol="0" anchor="ctr"/>
+          <a:lstStyle/>
+          <a:p>
+            <a:endParaRPr lang="fr-FR"/>
+          </a:p>
+        </p:txBody>
+      </p:sp>
+      <p:sp>
+        <p:nvSpPr>
+          <p:cNvPr id="5" name="Espace réservé des notes 4"/>
+          <p:cNvSpPr>
+            <a:spLocks noGrp="1"/>
+          </p:cNvSpPr>
+          <p:nvPr>
+            <p:ph type="body" sz="quarter" idx="3"/>
+          </p:nvPr>
+        </p:nvSpPr>
+        <p:spPr>
+          <a:xfrm>
+            <a:off x="755650" y="5145088"/>
+            <a:ext cx="6048375" cy="4210050"/>
+          </a:xfrm>
+          <a:prstGeom prst="rect">
+            <a:avLst/>
+          </a:prstGeom>
+        </p:spPr>
+        <p:txBody>
+          <a:bodyPr vert="horz" lIns="91440" tIns="45720" rIns="91440" bIns="45720" rtlCol="0"/>
+          <a:lstStyle/>
+          <a:p>
+            <a:pPr lvl="0"/>
+            <a:r>
+              <a:rPr lang="fr-FR"/>
+              <a:t>Cliquez pour modifier les styles du texte du masque</a:t>
+            </a:r>
+          </a:p>
+          <a:p>
+            <a:pPr lvl="1"/>
+            <a:r>
+              <a:rPr lang="fr-FR"/>
+              <a:t>Deuxième niveau</a:t>
+            </a:r>
+          </a:p>
+          <a:p>
+            <a:pPr lvl="2"/>
+            <a:r>
+              <a:rPr lang="fr-FR"/>
+              <a:t>Troisième niveau</a:t>
+            </a:r>
+          </a:p>
+          <a:p>
+            <a:pPr lvl="3"/>
+            <a:r>
+              <a:rPr lang="fr-FR"/>
+              <a:t>Quatrième niveau</a:t>
+            </a:r>
+          </a:p>
+          <a:p>
+            <a:pPr lvl="4"/>
+            <a:r>
+              <a:rPr lang="fr-FR"/>
+              <a:t>Cinquième niveau</a:t>
+            </a:r>
+          </a:p>
+        </p:txBody>
+      </p:sp>
+      <p:sp>
+        <p:nvSpPr>
+          <p:cNvPr id="6" name="Espace réservé du pied de page 5"/>
+          <p:cNvSpPr>
+            <a:spLocks noGrp="1"/>
+          </p:cNvSpPr>
+          <p:nvPr>
+            <p:ph type="ftr" sz="quarter" idx="4"/>
+          </p:nvPr>
+        </p:nvSpPr>
+        <p:spPr>
+          <a:xfrm>
+            <a:off x="0" y="10155238"/>
+            <a:ext cx="3276600" cy="536575"/>
+          </a:xfrm>
+          <a:prstGeom prst="rect">
+            <a:avLst/>
+          </a:prstGeom>
+        </p:spPr>
+        <p:txBody>
+          <a:bodyPr vert="horz" lIns="91440" tIns="45720" rIns="91440" bIns="45720" rtlCol="0" anchor="b"/>
+          <a:lstStyle>
+            <a:lvl1pPr algn="l">
+              <a:defRPr sz="1200"/>
+            </a:lvl1pPr>
+          </a:lstStyle>
+          <a:p>
+            <a:endParaRPr lang="fr-FR"/>
+          </a:p>
+        </p:txBody>
+      </p:sp>
+      <p:sp>
+        <p:nvSpPr>
+          <p:cNvPr id="7" name="Espace réservé du numéro de diapositive 6"/>
+          <p:cNvSpPr>
+            <a:spLocks noGrp="1"/>
+          </p:cNvSpPr>
+          <p:nvPr>
+            <p:ph type="sldNum" sz="quarter" idx="5"/>
+          </p:nvPr>
+        </p:nvSpPr>
+        <p:spPr>
+          <a:xfrm>
+            <a:off x="4281488" y="10155238"/>
+            <a:ext cx="3276600" cy="536575"/>
+          </a:xfrm>
+          <a:prstGeom prst="rect">
+            <a:avLst/>
+          </a:prstGeom>
+        </p:spPr>
+        <p:txBody>
+          <a:bodyPr vert="horz" lIns="91440" tIns="45720" rIns="91440" bIns="45720" rtlCol="0" anchor="b"/>
+          <a:lstStyle>
+            <a:lvl1pPr algn="r">
+              <a:defRPr sz="1200"/>
+            </a:lvl1pPr>
+          </a:lstStyle>
+          <a:p>
+            <a:fld id="{741171B4-A1B5-4DF7-90FF-2BB55EBEAF8E}" type="slidenum">
+              <a:rPr lang="fr-FR" smtClean="0"/>
+              <a:t>‹N°›</a:t>
+            </a:fld>
+            <a:endParaRPr lang="fr-FR"/>
+          </a:p>
+        </p:txBody>
+      </p:sp>
+    </p:spTree>
+    <p:extLst>
+      <p:ext uri="{BB962C8B-B14F-4D97-AF65-F5344CB8AC3E}">
+        <p14:creationId xmlns:p14="http://schemas.microsoft.com/office/powerpoint/2010/main" val="3611371270"/>
+      </p:ext>
+    </p:extLst>
+  </p:cSld>
+  <p:clrMap bg1="lt1" tx1="dk1" bg2="lt2" tx2="dk2" accent1="accent1" accent2="accent2" accent3="accent3" accent4="accent4" accent5="accent5" accent6="accent6" hlink="hlink" folHlink="folHlink"/>
+  <p:notesStyle>
+    <a:lvl1pPr marL="0" algn="l" defTabSz="914400" rtl="0" eaLnBrk="1" latinLnBrk="0" hangingPunct="1">
+      <a:defRPr sz="1200" kern="1200">
+        <a:solidFill>
+          <a:schemeClr val="tx1"/>
+        </a:solidFill>
+        <a:latin typeface="+mn-lt"/>
+        <a:ea typeface="+mn-ea"/>
+        <a:cs typeface="+mn-cs"/>
+      </a:defRPr>
+    </a:lvl1pPr>
+    <a:lvl2pPr marL="457200" algn="l" defTabSz="914400" rtl="0" eaLnBrk="1" latinLnBrk="0" hangingPunct="1">
+      <a:defRPr sz="1200" kern="1200">
+        <a:solidFill>
+          <a:schemeClr val="tx1"/>
+        </a:solidFill>
+        <a:latin typeface="+mn-lt"/>
+        <a:ea typeface="+mn-ea"/>
+        <a:cs typeface="+mn-cs"/>
+      </a:defRPr>
+    </a:lvl2pPr>
+    <a:lvl3pPr marL="914400" algn="l" defTabSz="914400" rtl="0" eaLnBrk="1" latinLnBrk="0" hangingPunct="1">
+      <a:defRPr sz="1200" kern="1200">
+        <a:solidFill>
+          <a:schemeClr val="tx1"/>
+        </a:solidFill>
+        <a:latin typeface="+mn-lt"/>
+        <a:ea typeface="+mn-ea"/>
+        <a:cs typeface="+mn-cs"/>
+      </a:defRPr>
+    </a:lvl3pPr>
+    <a:lvl4pPr marL="1371600" algn="l" defTabSz="914400" rtl="0" eaLnBrk="1" latinLnBrk="0" hangingPunct="1">
+      <a:defRPr sz="1200" kern="1200">
+        <a:solidFill>
+          <a:schemeClr val="tx1"/>
+        </a:solidFill>
+        <a:latin typeface="+mn-lt"/>
+        <a:ea typeface="+mn-ea"/>
+        <a:cs typeface="+mn-cs"/>
+      </a:defRPr>
+    </a:lvl4pPr>
+    <a:lvl5pPr marL="1828800" algn="l" defTabSz="914400" rtl="0" eaLnBrk="1" latinLnBrk="0" hangingPunct="1">
+      <a:defRPr sz="1200" kern="1200">
+        <a:solidFill>
+          <a:schemeClr val="tx1"/>
+        </a:solidFill>
+        <a:latin typeface="+mn-lt"/>
+        <a:ea typeface="+mn-ea"/>
+        <a:cs typeface="+mn-cs"/>
+      </a:defRPr>
+    </a:lvl5pPr>
+    <a:lvl6pPr marL="2286000" algn="l" defTabSz="914400" rtl="0" eaLnBrk="1" latinLnBrk="0" hangingPunct="1">
+      <a:defRPr sz="1200" kern="1200">
+        <a:solidFill>
+          <a:schemeClr val="tx1"/>
+        </a:solidFill>
+        <a:latin typeface="+mn-lt"/>
+        <a:ea typeface="+mn-ea"/>
+        <a:cs typeface="+mn-cs"/>
+      </a:defRPr>
+    </a:lvl6pPr>
+    <a:lvl7pPr marL="2743200" algn="l" defTabSz="914400" rtl="0" eaLnBrk="1" latinLnBrk="0" hangingPunct="1">
+      <a:defRPr sz="1200" kern="1200">
+        <a:solidFill>
+          <a:schemeClr val="tx1"/>
+        </a:solidFill>
+        <a:latin typeface="+mn-lt"/>
+        <a:ea typeface="+mn-ea"/>
+        <a:cs typeface="+mn-cs"/>
+      </a:defRPr>
+    </a:lvl7pPr>
+    <a:lvl8pPr marL="3200400" algn="l" defTabSz="914400" rtl="0" eaLnBrk="1" latinLnBrk="0" hangingPunct="1">
+      <a:defRPr sz="1200" kern="1200">
+        <a:solidFill>
+          <a:schemeClr val="tx1"/>
+        </a:solidFill>
+        <a:latin typeface="+mn-lt"/>
+        <a:ea typeface="+mn-ea"/>
+        <a:cs typeface="+mn-cs"/>
+      </a:defRPr>
+    </a:lvl8pPr>
+    <a:lvl9pPr marL="3657600" algn="l" defTabSz="914400" rtl="0" eaLnBrk="1" latinLnBrk="0" hangingPunct="1">
+      <a:defRPr sz="1200" kern="1200">
+        <a:solidFill>
+          <a:schemeClr val="tx1"/>
+        </a:solidFill>
+        <a:latin typeface="+mn-lt"/>
+        <a:ea typeface="+mn-ea"/>
+        <a:cs typeface="+mn-cs"/>
+      </a:defRPr>
+    </a:lvl9pPr>
+  </p:notesStyle>
+</p:notesMaster>
+</file>
+
+<file path=ppt/notesSlides/notesSlide1.xml><?xml version="1.0" encoding="utf-8"?>
+<p:notes xmlns:a="http://schemas.openxmlformats.org/drawingml/2006/main" xmlns:r="http://schemas.openxmlformats.org/officeDocument/2006/relationships" xmlns:p="http://schemas.openxmlformats.org/presentationml/2006/main">
+  <p:cSld>
+    <p:spTree>
+      <p:nvGrpSpPr>
+        <p:cNvPr id="1" name=""/>
+        <p:cNvGrpSpPr/>
+        <p:nvPr/>
+      </p:nvGrpSpPr>
+      <p:grpSpPr>
+        <a:xfrm>
+          <a:off x="0" y="0"/>
+          <a:ext cx="0" cy="0"/>
+          <a:chOff x="0" y="0"/>
+          <a:chExt cx="0" cy="0"/>
+        </a:xfrm>
+      </p:grpSpPr>
+      <p:sp>
+        <p:nvSpPr>
+          <p:cNvPr id="2" name="Espace réservé de l'image des diapositives 1"/>
+          <p:cNvSpPr>
+            <a:spLocks noGrp="1" noRot="1" noChangeAspect="1"/>
+          </p:cNvSpPr>
+          <p:nvPr>
+            <p:ph type="sldImg"/>
+          </p:nvPr>
+        </p:nvSpPr>
+        <p:spPr/>
+      </p:sp>
+      <p:sp>
+        <p:nvSpPr>
+          <p:cNvPr id="3" name="Espace réservé des notes 2"/>
+          <p:cNvSpPr>
+            <a:spLocks noGrp="1"/>
+          </p:cNvSpPr>
+          <p:nvPr>
+            <p:ph type="body" idx="1"/>
+          </p:nvPr>
+        </p:nvSpPr>
+        <p:spPr/>
+        <p:txBody>
+          <a:bodyPr/>
+          <a:lstStyle/>
+          <a:p>
+            <a:endParaRPr lang="fr-FR" dirty="0"/>
+          </a:p>
+        </p:txBody>
+      </p:sp>
+      <p:sp>
+        <p:nvSpPr>
+          <p:cNvPr id="4" name="Espace réservé du numéro de diapositive 3"/>
+          <p:cNvSpPr>
+            <a:spLocks noGrp="1"/>
+          </p:cNvSpPr>
+          <p:nvPr>
+            <p:ph type="sldNum" sz="quarter" idx="5"/>
+          </p:nvPr>
+        </p:nvSpPr>
+        <p:spPr/>
+        <p:txBody>
+          <a:bodyPr/>
+          <a:lstStyle/>
+          <a:p>
+            <a:fld id="{741171B4-A1B5-4DF7-90FF-2BB55EBEAF8E}" type="slidenum">
+              <a:rPr lang="fr-FR" smtClean="0"/>
+              <a:t>15</a:t>
+            </a:fld>
+            <a:endParaRPr lang="fr-FR"/>
+          </a:p>
+        </p:txBody>
+      </p:sp>
+    </p:spTree>
+    <p:extLst>
+      <p:ext uri="{BB962C8B-B14F-4D97-AF65-F5344CB8AC3E}">
+        <p14:creationId xmlns:p14="http://schemas.microsoft.com/office/powerpoint/2010/main" val="2110438634"/>
+      </p:ext>
+    </p:extLst>
+  </p:cSld>
+  <p:clrMapOvr>
+    <a:masterClrMapping/>
+  </p:clrMapOvr>
+</p:notes>
+</file>
+
+<file path=ppt/notesSlides/notesSlide2.xml><?xml version="1.0" encoding="utf-8"?>
+<p:notes xmlns:a="http://schemas.openxmlformats.org/drawingml/2006/main" xmlns:r="http://schemas.openxmlformats.org/officeDocument/2006/relationships" xmlns:p="http://schemas.openxmlformats.org/presentationml/2006/main">
+  <p:cSld>
+    <p:spTree>
+      <p:nvGrpSpPr>
+        <p:cNvPr id="1" name=""/>
+        <p:cNvGrpSpPr/>
+        <p:nvPr/>
+      </p:nvGrpSpPr>
+      <p:grpSpPr>
+        <a:xfrm>
+          <a:off x="0" y="0"/>
+          <a:ext cx="0" cy="0"/>
+          <a:chOff x="0" y="0"/>
+          <a:chExt cx="0" cy="0"/>
+        </a:xfrm>
+      </p:grpSpPr>
+      <p:sp>
+        <p:nvSpPr>
+          <p:cNvPr id="2" name="Espace réservé de l'image des diapositives 1"/>
+          <p:cNvSpPr>
+            <a:spLocks noGrp="1" noRot="1" noChangeAspect="1"/>
+          </p:cNvSpPr>
+          <p:nvPr>
+            <p:ph type="sldImg"/>
+          </p:nvPr>
+        </p:nvSpPr>
+        <p:spPr/>
+      </p:sp>
+      <p:sp>
+        <p:nvSpPr>
+          <p:cNvPr id="3" name="Espace réservé des notes 2"/>
+          <p:cNvSpPr>
+            <a:spLocks noGrp="1"/>
+          </p:cNvSpPr>
+          <p:nvPr>
+            <p:ph type="body" idx="1"/>
+          </p:nvPr>
+        </p:nvSpPr>
+        <p:spPr/>
+        <p:txBody>
+          <a:bodyPr/>
+          <a:lstStyle/>
+          <a:p>
+            <a:endParaRPr lang="fr-FR" dirty="0"/>
+          </a:p>
+        </p:txBody>
+      </p:sp>
+      <p:sp>
+        <p:nvSpPr>
+          <p:cNvPr id="4" name="Espace réservé du numéro de diapositive 3"/>
+          <p:cNvSpPr>
+            <a:spLocks noGrp="1"/>
+          </p:cNvSpPr>
+          <p:nvPr>
+            <p:ph type="sldNum" sz="quarter" idx="5"/>
+          </p:nvPr>
+        </p:nvSpPr>
+        <p:spPr/>
+        <p:txBody>
+          <a:bodyPr/>
+          <a:lstStyle/>
+          <a:p>
+            <a:fld id="{741171B4-A1B5-4DF7-90FF-2BB55EBEAF8E}" type="slidenum">
+              <a:rPr lang="fr-FR" smtClean="0"/>
+              <a:t>16</a:t>
+            </a:fld>
+            <a:endParaRPr lang="fr-FR"/>
+          </a:p>
+        </p:txBody>
+      </p:sp>
+    </p:spTree>
+    <p:extLst>
+      <p:ext uri="{BB962C8B-B14F-4D97-AF65-F5344CB8AC3E}">
+        <p14:creationId xmlns:p14="http://schemas.microsoft.com/office/powerpoint/2010/main" val="2110438634"/>
+      </p:ext>
+    </p:extLst>
+  </p:cSld>
+  <p:clrMapOvr>
+    <a:masterClrMapping/>
+  </p:clrMapOvr>
+</p:notes>
+</file>
+
 <file path=ppt/slideLayouts/slideLayout1.xml><?xml version="1.0" encoding="utf-8"?>
 <p:sldLayout xmlns:a="http://schemas.openxmlformats.org/drawingml/2006/main" xmlns:r="http://schemas.openxmlformats.org/officeDocument/2006/relationships" xmlns:p="http://schemas.openxmlformats.org/presentationml/2006/main" type="blank" preserve="1">
   <p:cSld name="Blank Slide">
@@ -6800,6 +7322,1561 @@
       </p:grpSpPr>
       <p:sp>
         <p:nvSpPr>
+          <p:cNvPr id="197" name="CustomShape 1"/>
+          <p:cNvSpPr/>
+          <p:nvPr/>
+        </p:nvSpPr>
+        <p:spPr>
+          <a:xfrm>
+            <a:off x="240" y="2012339"/>
+            <a:ext cx="12191760" cy="5496840"/>
+          </a:xfrm>
+          <a:prstGeom prst="rect">
+            <a:avLst/>
+          </a:prstGeom>
+          <a:gradFill rotWithShape="0">
+            <a:gsLst>
+              <a:gs pos="0">
+                <a:srgbClr val="3965B5"/>
+              </a:gs>
+              <a:gs pos="100000">
+                <a:srgbClr val="3965B5"/>
+              </a:gs>
+            </a:gsLst>
+            <a:lin ang="4200000"/>
+          </a:gradFill>
+          <a:ln>
+            <a:noFill/>
+          </a:ln>
+        </p:spPr>
+        <p:style>
+          <a:lnRef idx="2">
+            <a:schemeClr val="accent1">
+              <a:shade val="50000"/>
+            </a:schemeClr>
+          </a:lnRef>
+          <a:fillRef idx="1">
+            <a:schemeClr val="accent1"/>
+          </a:fillRef>
+          <a:effectRef idx="0">
+            <a:schemeClr val="accent1"/>
+          </a:effectRef>
+          <a:fontRef idx="minor"/>
+        </p:style>
+      </p:sp>
+      <p:grpSp>
+        <p:nvGrpSpPr>
+          <p:cNvPr id="198" name="Group 2"/>
+          <p:cNvGrpSpPr/>
+          <p:nvPr/>
+        </p:nvGrpSpPr>
+        <p:grpSpPr>
+          <a:xfrm>
+            <a:off x="0" y="360"/>
+            <a:ext cx="12191760" cy="3048840"/>
+            <a:chOff x="0" y="360"/>
+            <a:chExt cx="12191760" cy="3048840"/>
+          </a:xfrm>
+        </p:grpSpPr>
+        <p:pic>
+          <p:nvPicPr>
+            <p:cNvPr id="199" name="Picture 10"/>
+            <p:cNvPicPr/>
+            <p:nvPr/>
+          </p:nvPicPr>
+          <p:blipFill>
+            <a:blip r:embed="rId3"/>
+            <a:srcRect t="45717" b="9819"/>
+            <a:stretch/>
+          </p:blipFill>
+          <p:spPr>
+            <a:xfrm rot="10800000" flipH="1">
+              <a:off x="0" y="0"/>
+              <a:ext cx="12191760" cy="3048840"/>
+            </a:xfrm>
+            <a:prstGeom prst="rect">
+              <a:avLst/>
+            </a:prstGeom>
+            <a:ln w="0">
+              <a:noFill/>
+            </a:ln>
+          </p:spPr>
+        </p:pic>
+        <p:sp>
+          <p:nvSpPr>
+            <p:cNvPr id="200" name="CustomShape 3"/>
+            <p:cNvSpPr/>
+            <p:nvPr/>
+          </p:nvSpPr>
+          <p:spPr>
+            <a:xfrm flipV="1">
+              <a:off x="2067480" y="1076400"/>
+              <a:ext cx="373320" cy="405000"/>
+            </a:xfrm>
+            <a:prstGeom prst="ellipse">
+              <a:avLst/>
+            </a:prstGeom>
+            <a:solidFill>
+              <a:srgbClr val="FFFFFF"/>
+            </a:solidFill>
+            <a:ln>
+              <a:noFill/>
+            </a:ln>
+          </p:spPr>
+          <p:style>
+            <a:lnRef idx="2">
+              <a:schemeClr val="accent1">
+                <a:shade val="50000"/>
+              </a:schemeClr>
+            </a:lnRef>
+            <a:fillRef idx="1">
+              <a:schemeClr val="accent1"/>
+            </a:fillRef>
+            <a:effectRef idx="0">
+              <a:schemeClr val="accent1"/>
+            </a:effectRef>
+            <a:fontRef idx="minor"/>
+          </p:style>
+        </p:sp>
+      </p:grpSp>
+      <p:sp>
+        <p:nvSpPr>
+          <p:cNvPr id="201" name="TextShape 4"/>
+          <p:cNvSpPr txBox="1"/>
+          <p:nvPr/>
+        </p:nvSpPr>
+        <p:spPr>
+          <a:xfrm>
+            <a:off x="1179360" y="448200"/>
+            <a:ext cx="9833040" cy="1066320"/>
+          </a:xfrm>
+          <a:prstGeom prst="rect">
+            <a:avLst/>
+          </a:prstGeom>
+          <a:noFill/>
+          <a:ln w="0">
+            <a:noFill/>
+          </a:ln>
+        </p:spPr>
+        <p:txBody>
+          <a:bodyPr anchor="ctr">
+            <a:normAutofit fontScale="92500" lnSpcReduction="10000"/>
+          </a:bodyPr>
+          <a:lstStyle/>
+          <a:p>
+            <a:pPr marL="228600" indent="-228240">
+              <a:lnSpc>
+                <a:spcPct val="90000"/>
+              </a:lnSpc>
+              <a:spcBef>
+                <a:spcPts val="1001"/>
+              </a:spcBef>
+              <a:buClr>
+                <a:srgbClr val="FFFFFF"/>
+              </a:buClr>
+              <a:buFont typeface="Arial"/>
+              <a:buChar char="•"/>
+            </a:pPr>
+            <a:r>
+              <a:rPr lang="fr-FR" sz="4000" spc="-1" dirty="0">
+                <a:latin typeface="Calibri"/>
+              </a:rPr>
+              <a:t> VIII. </a:t>
+            </a:r>
+            <a:r>
+              <a:rPr lang="fr-FR" sz="4000" b="0" strike="noStrike" spc="-1" dirty="0">
+                <a:latin typeface="Calibri"/>
+              </a:rPr>
+              <a:t>Présentation de la partie : Application Web Admin</a:t>
+            </a:r>
+          </a:p>
+        </p:txBody>
+      </p:sp>
+      <p:sp>
+        <p:nvSpPr>
+          <p:cNvPr id="202" name="TextShape 5"/>
+          <p:cNvSpPr txBox="1"/>
+          <p:nvPr/>
+        </p:nvSpPr>
+        <p:spPr>
+          <a:xfrm>
+            <a:off x="838080" y="6356520"/>
+            <a:ext cx="2742840" cy="364680"/>
+          </a:xfrm>
+          <a:prstGeom prst="rect">
+            <a:avLst/>
+          </a:prstGeom>
+          <a:noFill/>
+          <a:ln w="0">
+            <a:noFill/>
+          </a:ln>
+        </p:spPr>
+        <p:txBody>
+          <a:bodyPr anchor="ctr">
+            <a:noAutofit/>
+          </a:bodyPr>
+          <a:lstStyle/>
+          <a:p>
+            <a:pPr>
+              <a:lnSpc>
+                <a:spcPct val="100000"/>
+              </a:lnSpc>
+            </a:pPr>
+            <a:r>
+              <a:rPr lang="fr-FR" sz="1200" b="0" strike="noStrike" spc="-1">
+                <a:solidFill>
+                  <a:srgbClr val="FFFFFF"/>
+                </a:solidFill>
+                <a:latin typeface="Calibri"/>
+              </a:rPr>
+              <a:t>LP IOTIA</a:t>
+            </a:r>
+            <a:endParaRPr lang="fr-FR" sz="1200" b="0" strike="noStrike" spc="-1">
+              <a:latin typeface="Times New Roman"/>
+            </a:endParaRPr>
+          </a:p>
+        </p:txBody>
+      </p:sp>
+      <p:sp>
+        <p:nvSpPr>
+          <p:cNvPr id="203" name="TextShape 6"/>
+          <p:cNvSpPr txBox="1"/>
+          <p:nvPr/>
+        </p:nvSpPr>
+        <p:spPr>
+          <a:xfrm>
+            <a:off x="8610480" y="6356520"/>
+            <a:ext cx="2742840" cy="364680"/>
+          </a:xfrm>
+          <a:prstGeom prst="rect">
+            <a:avLst/>
+          </a:prstGeom>
+          <a:noFill/>
+          <a:ln w="0">
+            <a:noFill/>
+          </a:ln>
+        </p:spPr>
+        <p:txBody>
+          <a:bodyPr anchor="ctr">
+            <a:noAutofit/>
+          </a:bodyPr>
+          <a:lstStyle/>
+          <a:p>
+            <a:pPr algn="r">
+              <a:lnSpc>
+                <a:spcPct val="100000"/>
+              </a:lnSpc>
+            </a:pPr>
+            <a:fld id="{541B49BA-3E84-433D-9E74-692EFDA0F3D7}" type="slidenum">
+              <a:rPr lang="fr-FR" sz="1200" b="0" strike="noStrike" spc="-1">
+                <a:solidFill>
+                  <a:srgbClr val="FFFFFF"/>
+                </a:solidFill>
+                <a:latin typeface="Calibri"/>
+              </a:rPr>
+              <a:t>15</a:t>
+            </a:fld>
+            <a:endParaRPr lang="fr-FR" sz="1200" b="0" strike="noStrike" spc="-1">
+              <a:latin typeface="Times New Roman"/>
+            </a:endParaRPr>
+          </a:p>
+        </p:txBody>
+      </p:sp>
+      <p:pic>
+        <p:nvPicPr>
+          <p:cNvPr id="1026" name="Picture 2" descr="Développer des applications .NET Core sur Linux et macOS | SoftFluent">
+            <a:extLst>
+              <a:ext uri="{FF2B5EF4-FFF2-40B4-BE49-F238E27FC236}">
+                <a16:creationId xmlns:a16="http://schemas.microsoft.com/office/drawing/2014/main" id="{AB802CC1-CF1E-4F93-80B5-2B1C63A8E58B}"/>
+              </a:ext>
+            </a:extLst>
+          </p:cNvPr>
+          <p:cNvPicPr>
+            <a:picLocks noChangeAspect="1" noChangeArrowheads="1"/>
+          </p:cNvPicPr>
+          <p:nvPr/>
+        </p:nvPicPr>
+        <p:blipFill>
+          <a:blip r:embed="rId4">
+            <a:extLst>
+              <a:ext uri="{28A0092B-C50C-407E-A947-70E740481C1C}">
+                <a14:useLocalDpi xmlns:a14="http://schemas.microsoft.com/office/drawing/2010/main" val="0"/>
+              </a:ext>
+            </a:extLst>
+          </a:blip>
+          <a:srcRect/>
+          <a:stretch>
+            <a:fillRect/>
+          </a:stretch>
+        </p:blipFill>
+        <p:spPr bwMode="auto">
+          <a:xfrm>
+            <a:off x="4848236" y="2389900"/>
+            <a:ext cx="2027972" cy="1066321"/>
+          </a:xfrm>
+          <a:prstGeom prst="rect">
+            <a:avLst/>
+          </a:prstGeom>
+          <a:noFill/>
+          <a:extLst>
+            <a:ext uri="{909E8E84-426E-40DD-AFC4-6F175D3DCCD1}">
+              <a14:hiddenFill xmlns:a14="http://schemas.microsoft.com/office/drawing/2010/main">
+                <a:solidFill>
+                  <a:srgbClr val="FFFFFF"/>
+                </a:solidFill>
+              </a14:hiddenFill>
+            </a:ext>
+          </a:extLst>
+        </p:spPr>
+      </p:pic>
+      <p:pic>
+        <p:nvPicPr>
+          <p:cNvPr id="10" name="Image 15">
+            <a:extLst>
+              <a:ext uri="{FF2B5EF4-FFF2-40B4-BE49-F238E27FC236}">
+                <a16:creationId xmlns:a16="http://schemas.microsoft.com/office/drawing/2014/main" id="{EA404832-CBA0-4DFB-9DE1-2B0A3DB5568D}"/>
+              </a:ext>
+            </a:extLst>
+          </p:cNvPr>
+          <p:cNvPicPr/>
+          <p:nvPr/>
+        </p:nvPicPr>
+        <p:blipFill>
+          <a:blip r:embed="rId5"/>
+          <a:stretch/>
+        </p:blipFill>
+        <p:spPr>
+          <a:xfrm>
+            <a:off x="6278968" y="3526860"/>
+            <a:ext cx="597240" cy="548883"/>
+          </a:xfrm>
+          <a:prstGeom prst="rect">
+            <a:avLst/>
+          </a:prstGeom>
+          <a:ln w="0">
+            <a:noFill/>
+          </a:ln>
+        </p:spPr>
+      </p:pic>
+      <p:pic>
+        <p:nvPicPr>
+          <p:cNvPr id="3" name="Image 2">
+            <a:extLst>
+              <a:ext uri="{FF2B5EF4-FFF2-40B4-BE49-F238E27FC236}">
+                <a16:creationId xmlns:a16="http://schemas.microsoft.com/office/drawing/2014/main" id="{D3D08115-32B9-4284-BDA5-9827D5FC0A84}"/>
+              </a:ext>
+            </a:extLst>
+          </p:cNvPr>
+          <p:cNvPicPr>
+            <a:picLocks noChangeAspect="1"/>
+          </p:cNvPicPr>
+          <p:nvPr/>
+        </p:nvPicPr>
+        <p:blipFill>
+          <a:blip r:embed="rId6"/>
+          <a:stretch>
+            <a:fillRect/>
+          </a:stretch>
+        </p:blipFill>
+        <p:spPr>
+          <a:xfrm>
+            <a:off x="4848236" y="3518288"/>
+            <a:ext cx="1300777" cy="548883"/>
+          </a:xfrm>
+          <a:prstGeom prst="rect">
+            <a:avLst/>
+          </a:prstGeom>
+        </p:spPr>
+      </p:pic>
+      <p:pic>
+        <p:nvPicPr>
+          <p:cNvPr id="2050" name="Picture 2" descr="API REST - IMCS | Conseil et Services Informatiques">
+            <a:extLst>
+              <a:ext uri="{FF2B5EF4-FFF2-40B4-BE49-F238E27FC236}">
+                <a16:creationId xmlns:a16="http://schemas.microsoft.com/office/drawing/2014/main" id="{643544DF-B3D3-4240-9A88-BCF2AD3B447E}"/>
+              </a:ext>
+            </a:extLst>
+          </p:cNvPr>
+          <p:cNvPicPr>
+            <a:picLocks noChangeAspect="1" noChangeArrowheads="1"/>
+          </p:cNvPicPr>
+          <p:nvPr/>
+        </p:nvPicPr>
+        <p:blipFill>
+          <a:blip r:embed="rId7">
+            <a:extLst>
+              <a:ext uri="{28A0092B-C50C-407E-A947-70E740481C1C}">
+                <a14:useLocalDpi xmlns:a14="http://schemas.microsoft.com/office/drawing/2010/main" val="0"/>
+              </a:ext>
+            </a:extLst>
+          </a:blip>
+          <a:srcRect/>
+          <a:stretch>
+            <a:fillRect/>
+          </a:stretch>
+        </p:blipFill>
+        <p:spPr bwMode="auto">
+          <a:xfrm>
+            <a:off x="9523028" y="4898957"/>
+            <a:ext cx="2347215" cy="1331138"/>
+          </a:xfrm>
+          <a:prstGeom prst="rect">
+            <a:avLst/>
+          </a:prstGeom>
+          <a:noFill/>
+          <a:extLst>
+            <a:ext uri="{909E8E84-426E-40DD-AFC4-6F175D3DCCD1}">
+              <a14:hiddenFill xmlns:a14="http://schemas.microsoft.com/office/drawing/2010/main">
+                <a:solidFill>
+                  <a:srgbClr val="FFFFFF"/>
+                </a:solidFill>
+              </a14:hiddenFill>
+            </a:ext>
+          </a:extLst>
+        </p:spPr>
+      </p:pic>
+      <p:pic>
+        <p:nvPicPr>
+          <p:cNvPr id="13" name="Picture 4" descr="Amazon RDS for MariaDB – Amazon Web Services (AWS)">
+            <a:extLst>
+              <a:ext uri="{FF2B5EF4-FFF2-40B4-BE49-F238E27FC236}">
+                <a16:creationId xmlns:a16="http://schemas.microsoft.com/office/drawing/2014/main" id="{AED3AA78-CBB7-4B0C-A113-FA570A8752C8}"/>
+              </a:ext>
+            </a:extLst>
+          </p:cNvPr>
+          <p:cNvPicPr/>
+          <p:nvPr/>
+        </p:nvPicPr>
+        <p:blipFill>
+          <a:blip r:embed="rId8"/>
+          <a:stretch/>
+        </p:blipFill>
+        <p:spPr>
+          <a:xfrm>
+            <a:off x="4848236" y="5053977"/>
+            <a:ext cx="2027972" cy="1193955"/>
+          </a:xfrm>
+          <a:prstGeom prst="rect">
+            <a:avLst/>
+          </a:prstGeom>
+          <a:ln w="0">
+            <a:noFill/>
+          </a:ln>
+        </p:spPr>
+      </p:pic>
+      <p:sp>
+        <p:nvSpPr>
+          <p:cNvPr id="2" name="Flèche : droite 1">
+            <a:extLst>
+              <a:ext uri="{FF2B5EF4-FFF2-40B4-BE49-F238E27FC236}">
+                <a16:creationId xmlns:a16="http://schemas.microsoft.com/office/drawing/2014/main" id="{2F711135-A9FC-44A4-894A-ACB6AF0F48D6}"/>
+              </a:ext>
+            </a:extLst>
+          </p:cNvPr>
+          <p:cNvSpPr/>
+          <p:nvPr/>
+        </p:nvSpPr>
+        <p:spPr>
+          <a:xfrm>
+            <a:off x="3276751" y="5407654"/>
+            <a:ext cx="1205049" cy="313276"/>
+          </a:xfrm>
+          <a:prstGeom prst="rightArrow">
+            <a:avLst/>
+          </a:prstGeom>
+          <a:solidFill>
+            <a:schemeClr val="bg1"/>
+          </a:solidFill>
+        </p:spPr>
+        <p:style>
+          <a:lnRef idx="2">
+            <a:schemeClr val="accent1">
+              <a:shade val="50000"/>
+            </a:schemeClr>
+          </a:lnRef>
+          <a:fillRef idx="1">
+            <a:schemeClr val="accent1"/>
+          </a:fillRef>
+          <a:effectRef idx="0">
+            <a:schemeClr val="accent1"/>
+          </a:effectRef>
+          <a:fontRef idx="minor">
+            <a:schemeClr val="lt1"/>
+          </a:fontRef>
+        </p:style>
+        <p:txBody>
+          <a:bodyPr rtlCol="0" anchor="ctr"/>
+          <a:lstStyle/>
+          <a:p>
+            <a:pPr algn="ctr"/>
+            <a:endParaRPr lang="fr-FR"/>
+          </a:p>
+        </p:txBody>
+      </p:sp>
+      <p:sp>
+        <p:nvSpPr>
+          <p:cNvPr id="4" name="Rectangle 3">
+            <a:extLst>
+              <a:ext uri="{FF2B5EF4-FFF2-40B4-BE49-F238E27FC236}">
+                <a16:creationId xmlns:a16="http://schemas.microsoft.com/office/drawing/2014/main" id="{A2CD1AF4-1132-48F5-B98A-07C3C4369F9A}"/>
+              </a:ext>
+            </a:extLst>
+          </p:cNvPr>
+          <p:cNvSpPr/>
+          <p:nvPr/>
+        </p:nvSpPr>
+        <p:spPr>
+          <a:xfrm>
+            <a:off x="321757" y="4898957"/>
+            <a:ext cx="2588868" cy="1331138"/>
+          </a:xfrm>
+          <a:prstGeom prst="rect">
+            <a:avLst/>
+          </a:prstGeom>
+          <a:solidFill>
+            <a:schemeClr val="bg1"/>
+          </a:solidFill>
+        </p:spPr>
+        <p:style>
+          <a:lnRef idx="2">
+            <a:schemeClr val="accent1">
+              <a:shade val="50000"/>
+            </a:schemeClr>
+          </a:lnRef>
+          <a:fillRef idx="1">
+            <a:schemeClr val="accent1"/>
+          </a:fillRef>
+          <a:effectRef idx="0">
+            <a:schemeClr val="accent1"/>
+          </a:effectRef>
+          <a:fontRef idx="minor">
+            <a:schemeClr val="lt1"/>
+          </a:fontRef>
+        </p:style>
+        <p:txBody>
+          <a:bodyPr rtlCol="0" anchor="ctr"/>
+          <a:lstStyle/>
+          <a:p>
+            <a:pPr algn="ctr"/>
+            <a:r>
+              <a:rPr lang="fr-FR" dirty="0">
+                <a:solidFill>
+                  <a:schemeClr val="tx1"/>
+                </a:solidFill>
+              </a:rPr>
+              <a:t>Smart-</a:t>
+            </a:r>
+            <a:r>
+              <a:rPr lang="fr-FR" dirty="0" err="1">
+                <a:solidFill>
+                  <a:schemeClr val="tx1"/>
+                </a:solidFill>
+              </a:rPr>
+              <a:t>ECovid</a:t>
+            </a:r>
+            <a:endParaRPr lang="fr-FR" dirty="0">
+              <a:solidFill>
+                <a:schemeClr val="tx1"/>
+              </a:solidFill>
+            </a:endParaRPr>
+          </a:p>
+        </p:txBody>
+      </p:sp>
+      <p:sp>
+        <p:nvSpPr>
+          <p:cNvPr id="17" name="Flèche : droite 16">
+            <a:extLst>
+              <a:ext uri="{FF2B5EF4-FFF2-40B4-BE49-F238E27FC236}">
+                <a16:creationId xmlns:a16="http://schemas.microsoft.com/office/drawing/2014/main" id="{F3AF99B8-87DC-4C5D-928A-F65617CE47E1}"/>
+              </a:ext>
+            </a:extLst>
+          </p:cNvPr>
+          <p:cNvSpPr/>
+          <p:nvPr/>
+        </p:nvSpPr>
+        <p:spPr>
+          <a:xfrm>
+            <a:off x="7597093" y="4998648"/>
+            <a:ext cx="1205049" cy="313276"/>
+          </a:xfrm>
+          <a:prstGeom prst="rightArrow">
+            <a:avLst/>
+          </a:prstGeom>
+          <a:solidFill>
+            <a:schemeClr val="bg1"/>
+          </a:solidFill>
+        </p:spPr>
+        <p:style>
+          <a:lnRef idx="2">
+            <a:schemeClr val="accent1">
+              <a:shade val="50000"/>
+            </a:schemeClr>
+          </a:lnRef>
+          <a:fillRef idx="1">
+            <a:schemeClr val="accent1"/>
+          </a:fillRef>
+          <a:effectRef idx="0">
+            <a:schemeClr val="accent1"/>
+          </a:effectRef>
+          <a:fontRef idx="minor">
+            <a:schemeClr val="lt1"/>
+          </a:fontRef>
+        </p:style>
+        <p:txBody>
+          <a:bodyPr rtlCol="0" anchor="ctr"/>
+          <a:lstStyle/>
+          <a:p>
+            <a:pPr algn="ctr"/>
+            <a:endParaRPr lang="fr-FR"/>
+          </a:p>
+        </p:txBody>
+      </p:sp>
+      <p:sp>
+        <p:nvSpPr>
+          <p:cNvPr id="18" name="Flèche : droite 17">
+            <a:extLst>
+              <a:ext uri="{FF2B5EF4-FFF2-40B4-BE49-F238E27FC236}">
+                <a16:creationId xmlns:a16="http://schemas.microsoft.com/office/drawing/2014/main" id="{49439133-18DB-44BB-94B9-C343DC36DCF0}"/>
+              </a:ext>
+            </a:extLst>
+          </p:cNvPr>
+          <p:cNvSpPr/>
+          <p:nvPr/>
+        </p:nvSpPr>
+        <p:spPr>
+          <a:xfrm rot="10800000">
+            <a:off x="7597093" y="5934656"/>
+            <a:ext cx="1205049" cy="313276"/>
+          </a:xfrm>
+          <a:prstGeom prst="rightArrow">
+            <a:avLst/>
+          </a:prstGeom>
+          <a:solidFill>
+            <a:schemeClr val="bg1"/>
+          </a:solidFill>
+        </p:spPr>
+        <p:style>
+          <a:lnRef idx="2">
+            <a:schemeClr val="accent1">
+              <a:shade val="50000"/>
+            </a:schemeClr>
+          </a:lnRef>
+          <a:fillRef idx="1">
+            <a:schemeClr val="accent1"/>
+          </a:fillRef>
+          <a:effectRef idx="0">
+            <a:schemeClr val="accent1"/>
+          </a:effectRef>
+          <a:fontRef idx="minor">
+            <a:schemeClr val="lt1"/>
+          </a:fontRef>
+        </p:style>
+        <p:txBody>
+          <a:bodyPr rtlCol="0" anchor="ctr"/>
+          <a:lstStyle/>
+          <a:p>
+            <a:pPr algn="ctr"/>
+            <a:endParaRPr lang="fr-FR"/>
+          </a:p>
+        </p:txBody>
+      </p:sp>
+      <p:sp>
+        <p:nvSpPr>
+          <p:cNvPr id="21" name="Flèche : droite 20">
+            <a:extLst>
+              <a:ext uri="{FF2B5EF4-FFF2-40B4-BE49-F238E27FC236}">
+                <a16:creationId xmlns:a16="http://schemas.microsoft.com/office/drawing/2014/main" id="{582B44A6-A34A-4464-81DB-D7A397330DEA}"/>
+              </a:ext>
+            </a:extLst>
+          </p:cNvPr>
+          <p:cNvSpPr/>
+          <p:nvPr/>
+        </p:nvSpPr>
+        <p:spPr>
+          <a:xfrm>
+            <a:off x="7597092" y="2735778"/>
+            <a:ext cx="1205049" cy="313276"/>
+          </a:xfrm>
+          <a:prstGeom prst="rightArrow">
+            <a:avLst/>
+          </a:prstGeom>
+          <a:solidFill>
+            <a:schemeClr val="bg1"/>
+          </a:solidFill>
+        </p:spPr>
+        <p:style>
+          <a:lnRef idx="2">
+            <a:schemeClr val="accent1">
+              <a:shade val="50000"/>
+            </a:schemeClr>
+          </a:lnRef>
+          <a:fillRef idx="1">
+            <a:schemeClr val="accent1"/>
+          </a:fillRef>
+          <a:effectRef idx="0">
+            <a:schemeClr val="accent1"/>
+          </a:effectRef>
+          <a:fontRef idx="minor">
+            <a:schemeClr val="lt1"/>
+          </a:fontRef>
+        </p:style>
+        <p:txBody>
+          <a:bodyPr rtlCol="0" anchor="ctr"/>
+          <a:lstStyle/>
+          <a:p>
+            <a:pPr algn="ctr"/>
+            <a:endParaRPr lang="fr-FR"/>
+          </a:p>
+        </p:txBody>
+      </p:sp>
+      <p:sp>
+        <p:nvSpPr>
+          <p:cNvPr id="22" name="Flèche : droite 21">
+            <a:extLst>
+              <a:ext uri="{FF2B5EF4-FFF2-40B4-BE49-F238E27FC236}">
+                <a16:creationId xmlns:a16="http://schemas.microsoft.com/office/drawing/2014/main" id="{A04AECB2-F03F-464E-81D3-60A48192C347}"/>
+              </a:ext>
+            </a:extLst>
+          </p:cNvPr>
+          <p:cNvSpPr/>
+          <p:nvPr/>
+        </p:nvSpPr>
+        <p:spPr>
+          <a:xfrm rot="16200000">
+            <a:off x="10251325" y="4200300"/>
+            <a:ext cx="890620" cy="353177"/>
+          </a:xfrm>
+          <a:prstGeom prst="rightArrow">
+            <a:avLst/>
+          </a:prstGeom>
+          <a:solidFill>
+            <a:schemeClr val="bg1"/>
+          </a:solidFill>
+        </p:spPr>
+        <p:style>
+          <a:lnRef idx="2">
+            <a:schemeClr val="accent1">
+              <a:shade val="50000"/>
+            </a:schemeClr>
+          </a:lnRef>
+          <a:fillRef idx="1">
+            <a:schemeClr val="accent1"/>
+          </a:fillRef>
+          <a:effectRef idx="0">
+            <a:schemeClr val="accent1"/>
+          </a:effectRef>
+          <a:fontRef idx="minor">
+            <a:schemeClr val="lt1"/>
+          </a:fontRef>
+        </p:style>
+        <p:txBody>
+          <a:bodyPr rtlCol="0" anchor="ctr"/>
+          <a:lstStyle/>
+          <a:p>
+            <a:pPr algn="ctr"/>
+            <a:endParaRPr lang="fr-FR"/>
+          </a:p>
+        </p:txBody>
+      </p:sp>
+      <p:pic>
+        <p:nvPicPr>
+          <p:cNvPr id="3074" name="Picture 2" descr="4. Programming Read/Write Services - RESTful .NET [Book]">
+            <a:extLst>
+              <a:ext uri="{FF2B5EF4-FFF2-40B4-BE49-F238E27FC236}">
+                <a16:creationId xmlns:a16="http://schemas.microsoft.com/office/drawing/2014/main" id="{E0B61632-72F3-4298-A16E-189AAE75CD0D}"/>
+              </a:ext>
+            </a:extLst>
+          </p:cNvPr>
+          <p:cNvPicPr>
+            <a:picLocks noChangeAspect="1" noChangeArrowheads="1"/>
+          </p:cNvPicPr>
+          <p:nvPr/>
+        </p:nvPicPr>
+        <p:blipFill rotWithShape="1">
+          <a:blip r:embed="rId9">
+            <a:extLst>
+              <a:ext uri="{28A0092B-C50C-407E-A947-70E740481C1C}">
+                <a14:useLocalDpi xmlns:a14="http://schemas.microsoft.com/office/drawing/2010/main" val="0"/>
+              </a:ext>
+            </a:extLst>
+          </a:blip>
+          <a:srcRect t="-1" r="69271" b="-1464"/>
+          <a:stretch/>
+        </p:blipFill>
+        <p:spPr bwMode="auto">
+          <a:xfrm>
+            <a:off x="10306176" y="2281989"/>
+            <a:ext cx="753776" cy="1565419"/>
+          </a:xfrm>
+          <a:prstGeom prst="rect">
+            <a:avLst/>
+          </a:prstGeom>
+          <a:noFill/>
+          <a:extLst>
+            <a:ext uri="{909E8E84-426E-40DD-AFC4-6F175D3DCCD1}">
+              <a14:hiddenFill xmlns:a14="http://schemas.microsoft.com/office/drawing/2010/main">
+                <a:solidFill>
+                  <a:srgbClr val="FFFFFF"/>
+                </a:solidFill>
+              </a14:hiddenFill>
+            </a:ext>
+          </a:extLst>
+        </p:spPr>
+      </p:pic>
+      <p:pic>
+        <p:nvPicPr>
+          <p:cNvPr id="7" name="Image 6">
+            <a:extLst>
+              <a:ext uri="{FF2B5EF4-FFF2-40B4-BE49-F238E27FC236}">
+                <a16:creationId xmlns:a16="http://schemas.microsoft.com/office/drawing/2014/main" id="{00BC4756-A5BC-46E9-8BD0-87A162C35C75}"/>
+              </a:ext>
+            </a:extLst>
+          </p:cNvPr>
+          <p:cNvPicPr>
+            <a:picLocks noChangeAspect="1"/>
+          </p:cNvPicPr>
+          <p:nvPr/>
+        </p:nvPicPr>
+        <p:blipFill>
+          <a:blip r:embed="rId10"/>
+          <a:stretch>
+            <a:fillRect/>
+          </a:stretch>
+        </p:blipFill>
+        <p:spPr>
+          <a:xfrm>
+            <a:off x="328044" y="2499206"/>
+            <a:ext cx="1066321" cy="1066321"/>
+          </a:xfrm>
+          <a:prstGeom prst="rect">
+            <a:avLst/>
+          </a:prstGeom>
+        </p:spPr>
+      </p:pic>
+      <p:pic>
+        <p:nvPicPr>
+          <p:cNvPr id="9" name="Image 8">
+            <a:extLst>
+              <a:ext uri="{FF2B5EF4-FFF2-40B4-BE49-F238E27FC236}">
+                <a16:creationId xmlns:a16="http://schemas.microsoft.com/office/drawing/2014/main" id="{75608D4D-9ED1-455B-82EA-B8A57E17305C}"/>
+              </a:ext>
+            </a:extLst>
+          </p:cNvPr>
+          <p:cNvPicPr>
+            <a:picLocks noChangeAspect="1"/>
+          </p:cNvPicPr>
+          <p:nvPr/>
+        </p:nvPicPr>
+        <p:blipFill>
+          <a:blip r:embed="rId11"/>
+          <a:stretch>
+            <a:fillRect/>
+          </a:stretch>
+        </p:blipFill>
+        <p:spPr>
+          <a:xfrm>
+            <a:off x="1811666" y="2466875"/>
+            <a:ext cx="1098652" cy="1098652"/>
+          </a:xfrm>
+          <a:prstGeom prst="rect">
+            <a:avLst/>
+          </a:prstGeom>
+        </p:spPr>
+      </p:pic>
+      <p:sp>
+        <p:nvSpPr>
+          <p:cNvPr id="27" name="Flèche : droite 26">
+            <a:extLst>
+              <a:ext uri="{FF2B5EF4-FFF2-40B4-BE49-F238E27FC236}">
+                <a16:creationId xmlns:a16="http://schemas.microsoft.com/office/drawing/2014/main" id="{247DA0F6-4C1D-4460-A023-284A6DEB1A23}"/>
+              </a:ext>
+            </a:extLst>
+          </p:cNvPr>
+          <p:cNvSpPr/>
+          <p:nvPr/>
+        </p:nvSpPr>
+        <p:spPr>
+          <a:xfrm>
+            <a:off x="3299409" y="2376710"/>
+            <a:ext cx="1205049" cy="313276"/>
+          </a:xfrm>
+          <a:prstGeom prst="rightArrow">
+            <a:avLst/>
+          </a:prstGeom>
+          <a:solidFill>
+            <a:schemeClr val="bg1"/>
+          </a:solidFill>
+        </p:spPr>
+        <p:style>
+          <a:lnRef idx="2">
+            <a:schemeClr val="accent1">
+              <a:shade val="50000"/>
+            </a:schemeClr>
+          </a:lnRef>
+          <a:fillRef idx="1">
+            <a:schemeClr val="accent1"/>
+          </a:fillRef>
+          <a:effectRef idx="0">
+            <a:schemeClr val="accent1"/>
+          </a:effectRef>
+          <a:fontRef idx="minor">
+            <a:schemeClr val="lt1"/>
+          </a:fontRef>
+        </p:style>
+        <p:txBody>
+          <a:bodyPr rtlCol="0" anchor="ctr"/>
+          <a:lstStyle/>
+          <a:p>
+            <a:pPr algn="ctr"/>
+            <a:endParaRPr lang="fr-FR"/>
+          </a:p>
+        </p:txBody>
+      </p:sp>
+      <p:sp>
+        <p:nvSpPr>
+          <p:cNvPr id="28" name="Flèche : droite 27">
+            <a:extLst>
+              <a:ext uri="{FF2B5EF4-FFF2-40B4-BE49-F238E27FC236}">
+                <a16:creationId xmlns:a16="http://schemas.microsoft.com/office/drawing/2014/main" id="{F5CD268D-1F2C-46E3-93EA-717E65C94F10}"/>
+              </a:ext>
+            </a:extLst>
+          </p:cNvPr>
+          <p:cNvSpPr/>
+          <p:nvPr/>
+        </p:nvSpPr>
+        <p:spPr>
+          <a:xfrm rot="10800000">
+            <a:off x="3276752" y="3325575"/>
+            <a:ext cx="1205049" cy="313276"/>
+          </a:xfrm>
+          <a:prstGeom prst="rightArrow">
+            <a:avLst/>
+          </a:prstGeom>
+          <a:solidFill>
+            <a:schemeClr val="bg1"/>
+          </a:solidFill>
+        </p:spPr>
+        <p:style>
+          <a:lnRef idx="2">
+            <a:schemeClr val="accent1">
+              <a:shade val="50000"/>
+            </a:schemeClr>
+          </a:lnRef>
+          <a:fillRef idx="1">
+            <a:schemeClr val="accent1"/>
+          </a:fillRef>
+          <a:effectRef idx="0">
+            <a:schemeClr val="accent1"/>
+          </a:effectRef>
+          <a:fontRef idx="minor">
+            <a:schemeClr val="lt1"/>
+          </a:fontRef>
+        </p:style>
+        <p:txBody>
+          <a:bodyPr rtlCol="0" anchor="ctr"/>
+          <a:lstStyle/>
+          <a:p>
+            <a:pPr algn="ctr"/>
+            <a:endParaRPr lang="fr-FR"/>
+          </a:p>
+        </p:txBody>
+      </p:sp>
+      <p:pic>
+        <p:nvPicPr>
+          <p:cNvPr id="4098" name="Picture 2" descr="Understanding the tymon/jwt-auth refresh token mechanism. When &amp; why  JWT_TTL, JWT_REFRESH_TTL. | by Syed Sirajul Islam Anik | Medium">
+            <a:extLst>
+              <a:ext uri="{FF2B5EF4-FFF2-40B4-BE49-F238E27FC236}">
+                <a16:creationId xmlns:a16="http://schemas.microsoft.com/office/drawing/2014/main" id="{25CBE03D-0D46-432A-8255-C5A9E5184750}"/>
+              </a:ext>
+            </a:extLst>
+          </p:cNvPr>
+          <p:cNvPicPr>
+            <a:picLocks noChangeAspect="1" noChangeArrowheads="1"/>
+          </p:cNvPicPr>
+          <p:nvPr/>
+        </p:nvPicPr>
+        <p:blipFill rotWithShape="1">
+          <a:blip r:embed="rId12">
+            <a:extLst>
+              <a:ext uri="{28A0092B-C50C-407E-A947-70E740481C1C}">
+                <a14:useLocalDpi xmlns:a14="http://schemas.microsoft.com/office/drawing/2010/main" val="0"/>
+              </a:ext>
+            </a:extLst>
+          </a:blip>
+          <a:srcRect l="31752" r="34940" b="-1049"/>
+          <a:stretch/>
+        </p:blipFill>
+        <p:spPr bwMode="auto">
+          <a:xfrm>
+            <a:off x="3554082" y="2689986"/>
+            <a:ext cx="650389" cy="591931"/>
+          </a:xfrm>
+          <a:prstGeom prst="rect">
+            <a:avLst/>
+          </a:prstGeom>
+          <a:noFill/>
+          <a:extLst>
+            <a:ext uri="{909E8E84-426E-40DD-AFC4-6F175D3DCCD1}">
+              <a14:hiddenFill xmlns:a14="http://schemas.microsoft.com/office/drawing/2010/main">
+                <a:solidFill>
+                  <a:srgbClr val="FFFFFF"/>
+                </a:solidFill>
+              </a14:hiddenFill>
+            </a:ext>
+          </a:extLst>
+        </p:spPr>
+      </p:pic>
+      <p:pic>
+        <p:nvPicPr>
+          <p:cNvPr id="29" name="Picture 2" descr="Understanding the tymon/jwt-auth refresh token mechanism. When &amp; why  JWT_TTL, JWT_REFRESH_TTL. | by Syed Sirajul Islam Anik | Medium">
+            <a:extLst>
+              <a:ext uri="{FF2B5EF4-FFF2-40B4-BE49-F238E27FC236}">
+                <a16:creationId xmlns:a16="http://schemas.microsoft.com/office/drawing/2014/main" id="{FCF9E21A-C63C-49A4-ADEF-2BCDFBAD19D2}"/>
+              </a:ext>
+            </a:extLst>
+          </p:cNvPr>
+          <p:cNvPicPr>
+            <a:picLocks noChangeAspect="1" noChangeArrowheads="1"/>
+          </p:cNvPicPr>
+          <p:nvPr/>
+        </p:nvPicPr>
+        <p:blipFill rotWithShape="1">
+          <a:blip r:embed="rId12">
+            <a:extLst>
+              <a:ext uri="{28A0092B-C50C-407E-A947-70E740481C1C}">
+                <a14:useLocalDpi xmlns:a14="http://schemas.microsoft.com/office/drawing/2010/main" val="0"/>
+              </a:ext>
+            </a:extLst>
+          </a:blip>
+          <a:srcRect l="31752" r="34940" b="-1049"/>
+          <a:stretch/>
+        </p:blipFill>
+        <p:spPr bwMode="auto">
+          <a:xfrm>
+            <a:off x="9228964" y="2583335"/>
+            <a:ext cx="650389" cy="591931"/>
+          </a:xfrm>
+          <a:prstGeom prst="rect">
+            <a:avLst/>
+          </a:prstGeom>
+          <a:noFill/>
+          <a:extLst>
+            <a:ext uri="{909E8E84-426E-40DD-AFC4-6F175D3DCCD1}">
+              <a14:hiddenFill xmlns:a14="http://schemas.microsoft.com/office/drawing/2010/main">
+                <a:solidFill>
+                  <a:srgbClr val="FFFFFF"/>
+                </a:solidFill>
+              </a14:hiddenFill>
+            </a:ext>
+          </a:extLst>
+        </p:spPr>
+      </p:pic>
+    </p:spTree>
+    <p:extLst>
+      <p:ext uri="{BB962C8B-B14F-4D97-AF65-F5344CB8AC3E}">
+        <p14:creationId xmlns:p14="http://schemas.microsoft.com/office/powerpoint/2010/main" val="3942794599"/>
+      </p:ext>
+    </p:extLst>
+  </p:cSld>
+  <p:clrMapOvr>
+    <a:masterClrMapping/>
+  </p:clrMapOvr>
+</p:sld>
+</file>
+
+<file path=ppt/slides/slide16.xml><?xml version="1.0" encoding="utf-8"?>
+<p:sld xmlns:a="http://schemas.openxmlformats.org/drawingml/2006/main" xmlns:r="http://schemas.openxmlformats.org/officeDocument/2006/relationships" xmlns:p="http://schemas.openxmlformats.org/presentationml/2006/main">
+  <p:cSld>
+    <p:bg>
+      <p:bgPr>
+        <a:solidFill>
+          <a:srgbClr val="000000"/>
+        </a:solidFill>
+        <a:effectLst/>
+      </p:bgPr>
+    </p:bg>
+    <p:spTree>
+      <p:nvGrpSpPr>
+        <p:cNvPr id="1" name=""/>
+        <p:cNvGrpSpPr/>
+        <p:nvPr/>
+      </p:nvGrpSpPr>
+      <p:grpSpPr>
+        <a:xfrm>
+          <a:off x="0" y="0"/>
+          <a:ext cx="0" cy="0"/>
+          <a:chOff x="0" y="0"/>
+          <a:chExt cx="0" cy="0"/>
+        </a:xfrm>
+      </p:grpSpPr>
+      <p:sp>
+        <p:nvSpPr>
+          <p:cNvPr id="197" name="CustomShape 1"/>
+          <p:cNvSpPr/>
+          <p:nvPr/>
+        </p:nvSpPr>
+        <p:spPr>
+          <a:xfrm>
+            <a:off x="240" y="2012339"/>
+            <a:ext cx="12191760" cy="5496840"/>
+          </a:xfrm>
+          <a:prstGeom prst="rect">
+            <a:avLst/>
+          </a:prstGeom>
+          <a:gradFill rotWithShape="0">
+            <a:gsLst>
+              <a:gs pos="0">
+                <a:srgbClr val="3965B5"/>
+              </a:gs>
+              <a:gs pos="100000">
+                <a:srgbClr val="3965B5"/>
+              </a:gs>
+            </a:gsLst>
+            <a:lin ang="4200000"/>
+          </a:gradFill>
+          <a:ln>
+            <a:noFill/>
+          </a:ln>
+        </p:spPr>
+        <p:style>
+          <a:lnRef idx="2">
+            <a:schemeClr val="accent1">
+              <a:shade val="50000"/>
+            </a:schemeClr>
+          </a:lnRef>
+          <a:fillRef idx="1">
+            <a:schemeClr val="accent1"/>
+          </a:fillRef>
+          <a:effectRef idx="0">
+            <a:schemeClr val="accent1"/>
+          </a:effectRef>
+          <a:fontRef idx="minor"/>
+        </p:style>
+      </p:sp>
+      <p:grpSp>
+        <p:nvGrpSpPr>
+          <p:cNvPr id="198" name="Group 2"/>
+          <p:cNvGrpSpPr/>
+          <p:nvPr/>
+        </p:nvGrpSpPr>
+        <p:grpSpPr>
+          <a:xfrm>
+            <a:off x="0" y="360"/>
+            <a:ext cx="12191760" cy="3048840"/>
+            <a:chOff x="0" y="360"/>
+            <a:chExt cx="12191760" cy="3048840"/>
+          </a:xfrm>
+        </p:grpSpPr>
+        <p:pic>
+          <p:nvPicPr>
+            <p:cNvPr id="199" name="Picture 10"/>
+            <p:cNvPicPr/>
+            <p:nvPr/>
+          </p:nvPicPr>
+          <p:blipFill>
+            <a:blip r:embed="rId3"/>
+            <a:srcRect t="45717" b="9819"/>
+            <a:stretch/>
+          </p:blipFill>
+          <p:spPr>
+            <a:xfrm rot="10800000" flipH="1">
+              <a:off x="0" y="0"/>
+              <a:ext cx="12191760" cy="3048840"/>
+            </a:xfrm>
+            <a:prstGeom prst="rect">
+              <a:avLst/>
+            </a:prstGeom>
+            <a:ln w="0">
+              <a:noFill/>
+            </a:ln>
+          </p:spPr>
+        </p:pic>
+        <p:sp>
+          <p:nvSpPr>
+            <p:cNvPr id="200" name="CustomShape 3"/>
+            <p:cNvSpPr/>
+            <p:nvPr/>
+          </p:nvSpPr>
+          <p:spPr>
+            <a:xfrm flipV="1">
+              <a:off x="2067480" y="1076400"/>
+              <a:ext cx="373320" cy="405000"/>
+            </a:xfrm>
+            <a:prstGeom prst="ellipse">
+              <a:avLst/>
+            </a:prstGeom>
+            <a:solidFill>
+              <a:srgbClr val="FFFFFF"/>
+            </a:solidFill>
+            <a:ln>
+              <a:noFill/>
+            </a:ln>
+          </p:spPr>
+          <p:style>
+            <a:lnRef idx="2">
+              <a:schemeClr val="accent1">
+                <a:shade val="50000"/>
+              </a:schemeClr>
+            </a:lnRef>
+            <a:fillRef idx="1">
+              <a:schemeClr val="accent1"/>
+            </a:fillRef>
+            <a:effectRef idx="0">
+              <a:schemeClr val="accent1"/>
+            </a:effectRef>
+            <a:fontRef idx="minor"/>
+          </p:style>
+        </p:sp>
+      </p:grpSp>
+      <p:sp>
+        <p:nvSpPr>
+          <p:cNvPr id="201" name="TextShape 4"/>
+          <p:cNvSpPr txBox="1"/>
+          <p:nvPr/>
+        </p:nvSpPr>
+        <p:spPr>
+          <a:xfrm>
+            <a:off x="1179360" y="448200"/>
+            <a:ext cx="9833040" cy="1066320"/>
+          </a:xfrm>
+          <a:prstGeom prst="rect">
+            <a:avLst/>
+          </a:prstGeom>
+          <a:noFill/>
+          <a:ln w="0">
+            <a:noFill/>
+          </a:ln>
+        </p:spPr>
+        <p:txBody>
+          <a:bodyPr anchor="ctr">
+            <a:normAutofit fontScale="92500" lnSpcReduction="10000"/>
+          </a:bodyPr>
+          <a:lstStyle/>
+          <a:p>
+            <a:pPr marL="228600" indent="-228240">
+              <a:lnSpc>
+                <a:spcPct val="90000"/>
+              </a:lnSpc>
+              <a:spcBef>
+                <a:spcPts val="1001"/>
+              </a:spcBef>
+              <a:buClr>
+                <a:srgbClr val="FFFFFF"/>
+              </a:buClr>
+              <a:buFont typeface="Arial"/>
+              <a:buChar char="•"/>
+            </a:pPr>
+            <a:r>
+              <a:rPr lang="fr-FR" sz="4000" spc="-1" dirty="0">
+                <a:latin typeface="Calibri"/>
+              </a:rPr>
+              <a:t> VIII. </a:t>
+            </a:r>
+            <a:r>
+              <a:rPr lang="fr-FR" sz="4000" b="0" strike="noStrike" spc="-1" dirty="0">
+                <a:latin typeface="Calibri"/>
+              </a:rPr>
+              <a:t>Présentation de la partie : Application Web Admin</a:t>
+            </a:r>
+          </a:p>
+        </p:txBody>
+      </p:sp>
+      <p:sp>
+        <p:nvSpPr>
+          <p:cNvPr id="202" name="TextShape 5"/>
+          <p:cNvSpPr txBox="1"/>
+          <p:nvPr/>
+        </p:nvSpPr>
+        <p:spPr>
+          <a:xfrm>
+            <a:off x="838080" y="6356520"/>
+            <a:ext cx="2742840" cy="364680"/>
+          </a:xfrm>
+          <a:prstGeom prst="rect">
+            <a:avLst/>
+          </a:prstGeom>
+          <a:noFill/>
+          <a:ln w="0">
+            <a:noFill/>
+          </a:ln>
+        </p:spPr>
+        <p:txBody>
+          <a:bodyPr anchor="ctr">
+            <a:noAutofit/>
+          </a:bodyPr>
+          <a:lstStyle/>
+          <a:p>
+            <a:pPr>
+              <a:lnSpc>
+                <a:spcPct val="100000"/>
+              </a:lnSpc>
+            </a:pPr>
+            <a:r>
+              <a:rPr lang="fr-FR" sz="1200" b="0" strike="noStrike" spc="-1">
+                <a:solidFill>
+                  <a:srgbClr val="FFFFFF"/>
+                </a:solidFill>
+                <a:latin typeface="Calibri"/>
+              </a:rPr>
+              <a:t>LP IOTIA</a:t>
+            </a:r>
+            <a:endParaRPr lang="fr-FR" sz="1200" b="0" strike="noStrike" spc="-1">
+              <a:latin typeface="Times New Roman"/>
+            </a:endParaRPr>
+          </a:p>
+        </p:txBody>
+      </p:sp>
+      <p:sp>
+        <p:nvSpPr>
+          <p:cNvPr id="203" name="TextShape 6"/>
+          <p:cNvSpPr txBox="1"/>
+          <p:nvPr/>
+        </p:nvSpPr>
+        <p:spPr>
+          <a:xfrm>
+            <a:off x="8610480" y="6356520"/>
+            <a:ext cx="2742840" cy="364680"/>
+          </a:xfrm>
+          <a:prstGeom prst="rect">
+            <a:avLst/>
+          </a:prstGeom>
+          <a:noFill/>
+          <a:ln w="0">
+            <a:noFill/>
+          </a:ln>
+        </p:spPr>
+        <p:txBody>
+          <a:bodyPr anchor="ctr">
+            <a:noAutofit/>
+          </a:bodyPr>
+          <a:lstStyle/>
+          <a:p>
+            <a:pPr algn="r">
+              <a:lnSpc>
+                <a:spcPct val="100000"/>
+              </a:lnSpc>
+            </a:pPr>
+            <a:fld id="{541B49BA-3E84-433D-9E74-692EFDA0F3D7}" type="slidenum">
+              <a:rPr lang="fr-FR" sz="1200" b="0" strike="noStrike" spc="-1">
+                <a:solidFill>
+                  <a:srgbClr val="FFFFFF"/>
+                </a:solidFill>
+                <a:latin typeface="Calibri"/>
+              </a:rPr>
+              <a:t>16</a:t>
+            </a:fld>
+            <a:endParaRPr lang="fr-FR" sz="1200" b="0" strike="noStrike" spc="-1">
+              <a:latin typeface="Times New Roman"/>
+            </a:endParaRPr>
+          </a:p>
+        </p:txBody>
+      </p:sp>
+      <p:pic>
+        <p:nvPicPr>
+          <p:cNvPr id="1026" name="Picture 2" descr="Développer des applications .NET Core sur Linux et macOS | SoftFluent">
+            <a:extLst>
+              <a:ext uri="{FF2B5EF4-FFF2-40B4-BE49-F238E27FC236}">
+                <a16:creationId xmlns:a16="http://schemas.microsoft.com/office/drawing/2014/main" id="{AB802CC1-CF1E-4F93-80B5-2B1C63A8E58B}"/>
+              </a:ext>
+            </a:extLst>
+          </p:cNvPr>
+          <p:cNvPicPr>
+            <a:picLocks noChangeAspect="1" noChangeArrowheads="1"/>
+          </p:cNvPicPr>
+          <p:nvPr/>
+        </p:nvPicPr>
+        <p:blipFill>
+          <a:blip r:embed="rId4">
+            <a:extLst>
+              <a:ext uri="{28A0092B-C50C-407E-A947-70E740481C1C}">
+                <a14:useLocalDpi xmlns:a14="http://schemas.microsoft.com/office/drawing/2010/main" val="0"/>
+              </a:ext>
+            </a:extLst>
+          </a:blip>
+          <a:srcRect/>
+          <a:stretch>
+            <a:fillRect/>
+          </a:stretch>
+        </p:blipFill>
+        <p:spPr bwMode="auto">
+          <a:xfrm>
+            <a:off x="4786242" y="2302672"/>
+            <a:ext cx="2027972" cy="1066321"/>
+          </a:xfrm>
+          <a:prstGeom prst="rect">
+            <a:avLst/>
+          </a:prstGeom>
+          <a:noFill/>
+          <a:extLst>
+            <a:ext uri="{909E8E84-426E-40DD-AFC4-6F175D3DCCD1}">
+              <a14:hiddenFill xmlns:a14="http://schemas.microsoft.com/office/drawing/2010/main">
+                <a:solidFill>
+                  <a:srgbClr val="FFFFFF"/>
+                </a:solidFill>
+              </a14:hiddenFill>
+            </a:ext>
+          </a:extLst>
+        </p:spPr>
+      </p:pic>
+      <p:pic>
+        <p:nvPicPr>
+          <p:cNvPr id="10" name="Image 15">
+            <a:extLst>
+              <a:ext uri="{FF2B5EF4-FFF2-40B4-BE49-F238E27FC236}">
+                <a16:creationId xmlns:a16="http://schemas.microsoft.com/office/drawing/2014/main" id="{EA404832-CBA0-4DFB-9DE1-2B0A3DB5568D}"/>
+              </a:ext>
+            </a:extLst>
+          </p:cNvPr>
+          <p:cNvPicPr/>
+          <p:nvPr/>
+        </p:nvPicPr>
+        <p:blipFill>
+          <a:blip r:embed="rId5"/>
+          <a:stretch/>
+        </p:blipFill>
+        <p:spPr>
+          <a:xfrm>
+            <a:off x="6216974" y="3439632"/>
+            <a:ext cx="597240" cy="548883"/>
+          </a:xfrm>
+          <a:prstGeom prst="rect">
+            <a:avLst/>
+          </a:prstGeom>
+          <a:ln w="0">
+            <a:noFill/>
+          </a:ln>
+        </p:spPr>
+      </p:pic>
+      <p:pic>
+        <p:nvPicPr>
+          <p:cNvPr id="3" name="Image 2">
+            <a:extLst>
+              <a:ext uri="{FF2B5EF4-FFF2-40B4-BE49-F238E27FC236}">
+                <a16:creationId xmlns:a16="http://schemas.microsoft.com/office/drawing/2014/main" id="{D3D08115-32B9-4284-BDA5-9827D5FC0A84}"/>
+              </a:ext>
+            </a:extLst>
+          </p:cNvPr>
+          <p:cNvPicPr>
+            <a:picLocks noChangeAspect="1"/>
+          </p:cNvPicPr>
+          <p:nvPr/>
+        </p:nvPicPr>
+        <p:blipFill>
+          <a:blip r:embed="rId6"/>
+          <a:stretch>
+            <a:fillRect/>
+          </a:stretch>
+        </p:blipFill>
+        <p:spPr>
+          <a:xfrm>
+            <a:off x="4786242" y="3431060"/>
+            <a:ext cx="1300777" cy="548883"/>
+          </a:xfrm>
+          <a:prstGeom prst="rect">
+            <a:avLst/>
+          </a:prstGeom>
+        </p:spPr>
+      </p:pic>
+      <p:pic>
+        <p:nvPicPr>
+          <p:cNvPr id="6" name="Image 5">
+            <a:extLst>
+              <a:ext uri="{FF2B5EF4-FFF2-40B4-BE49-F238E27FC236}">
+                <a16:creationId xmlns:a16="http://schemas.microsoft.com/office/drawing/2014/main" id="{CCDE56E9-27CC-48BB-8FB6-453F42EA351D}"/>
+              </a:ext>
+            </a:extLst>
+          </p:cNvPr>
+          <p:cNvPicPr>
+            <a:picLocks noChangeAspect="1"/>
+          </p:cNvPicPr>
+          <p:nvPr/>
+        </p:nvPicPr>
+        <p:blipFill>
+          <a:blip r:embed="rId7"/>
+          <a:stretch>
+            <a:fillRect/>
+          </a:stretch>
+        </p:blipFill>
+        <p:spPr>
+          <a:xfrm>
+            <a:off x="13472" y="3988515"/>
+            <a:ext cx="4772769" cy="2421285"/>
+          </a:xfrm>
+          <a:prstGeom prst="rect">
+            <a:avLst/>
+          </a:prstGeom>
+        </p:spPr>
+      </p:pic>
+      <p:pic>
+        <p:nvPicPr>
+          <p:cNvPr id="23" name="Image 22">
+            <a:extLst>
+              <a:ext uri="{FF2B5EF4-FFF2-40B4-BE49-F238E27FC236}">
+                <a16:creationId xmlns:a16="http://schemas.microsoft.com/office/drawing/2014/main" id="{3BA4610F-5F68-4569-8298-F5CEDD1FD888}"/>
+              </a:ext>
+            </a:extLst>
+          </p:cNvPr>
+          <p:cNvPicPr>
+            <a:picLocks noChangeAspect="1"/>
+          </p:cNvPicPr>
+          <p:nvPr/>
+        </p:nvPicPr>
+        <p:blipFill>
+          <a:blip r:embed="rId8"/>
+          <a:stretch>
+            <a:fillRect/>
+          </a:stretch>
+        </p:blipFill>
+        <p:spPr>
+          <a:xfrm>
+            <a:off x="6814214" y="3988515"/>
+            <a:ext cx="5393221" cy="2428856"/>
+          </a:xfrm>
+          <a:prstGeom prst="rect">
+            <a:avLst/>
+          </a:prstGeom>
+        </p:spPr>
+      </p:pic>
+    </p:spTree>
+    <p:extLst>
+      <p:ext uri="{BB962C8B-B14F-4D97-AF65-F5344CB8AC3E}">
+        <p14:creationId xmlns:p14="http://schemas.microsoft.com/office/powerpoint/2010/main" val="945393324"/>
+      </p:ext>
+    </p:extLst>
+  </p:cSld>
+  <p:clrMapOvr>
+    <a:masterClrMapping/>
+  </p:clrMapOvr>
+</p:sld>
+</file>
+
+<file path=ppt/slides/slide17.xml><?xml version="1.0" encoding="utf-8"?>
+<p:sld xmlns:a="http://schemas.openxmlformats.org/drawingml/2006/main" xmlns:r="http://schemas.openxmlformats.org/officeDocument/2006/relationships" xmlns:p="http://schemas.openxmlformats.org/presentationml/2006/main">
+  <p:cSld>
+    <p:bg>
+      <p:bgPr>
+        <a:solidFill>
+          <a:srgbClr val="000000"/>
+        </a:solidFill>
+        <a:effectLst/>
+      </p:bgPr>
+    </p:bg>
+    <p:spTree>
+      <p:nvGrpSpPr>
+        <p:cNvPr id="1" name=""/>
+        <p:cNvGrpSpPr/>
+        <p:nvPr/>
+      </p:nvGrpSpPr>
+      <p:grpSpPr>
+        <a:xfrm>
+          <a:off x="0" y="0"/>
+          <a:ext cx="0" cy="0"/>
+          <a:chOff x="0" y="0"/>
+          <a:chExt cx="0" cy="0"/>
+        </a:xfrm>
+      </p:grpSpPr>
+      <p:sp>
+        <p:nvSpPr>
           <p:cNvPr id="205" name="CustomShape 1"/>
           <p:cNvSpPr/>
           <p:nvPr/>
@@ -7106,7 +9183,7 @@
                 </a:solidFill>
                 <a:latin typeface="Calibri"/>
               </a:rPr>
-              <a:t>15</a:t>
+              <a:t>17</a:t>
             </a:fld>
             <a:endParaRPr lang="fr-FR" sz="1200" b="0" strike="noStrike" spc="-1">
               <a:latin typeface="Times New Roman"/>
@@ -7335,7 +9412,7 @@
         </p:spPr>
         <p:txBody>
           <a:bodyPr anchor="ctr">
-            <a:normAutofit lnSpcReduction="10000"/>
+            <a:normAutofit fontScale="92500" lnSpcReduction="20000"/>
           </a:bodyPr>
           <a:lstStyle/>
           <a:p>
@@ -7353,7 +9430,7 @@
               <a:buChar char="•"/>
             </a:pPr>
             <a:r>
-              <a:rPr lang="fr-FR" sz="2400" b="0" strike="noStrike" spc="-1">
+              <a:rPr lang="fr-FR" sz="2400" b="0" strike="noStrike" spc="-1" dirty="0">
                 <a:solidFill>
                   <a:srgbClr val="FFFFFF"/>
                 </a:solidFill>
@@ -7361,7 +9438,7 @@
               </a:rPr>
               <a:t>I. Présentation du projet </a:t>
             </a:r>
-            <a:endParaRPr lang="fr-FR" sz="2400" b="0" strike="noStrike" spc="-1">
+            <a:endParaRPr lang="fr-FR" sz="2400" b="0" strike="noStrike" spc="-1" dirty="0">
               <a:solidFill>
                 <a:srgbClr val="000000"/>
               </a:solidFill>
@@ -7383,7 +9460,7 @@
               <a:buChar char="•"/>
             </a:pPr>
             <a:r>
-              <a:rPr lang="fr-FR" sz="2400" b="0" strike="noStrike" spc="-1">
+              <a:rPr lang="fr-FR" sz="2400" b="0" strike="noStrike" spc="-1" dirty="0">
                 <a:solidFill>
                   <a:srgbClr val="FFFFFF"/>
                 </a:solidFill>
@@ -7391,7 +9468,7 @@
               </a:rPr>
               <a:t>II. Présentation de la partie : Infra BOX + Gateway</a:t>
             </a:r>
-            <a:endParaRPr lang="fr-FR" sz="2400" b="0" strike="noStrike" spc="-1">
+            <a:endParaRPr lang="fr-FR" sz="2400" b="0" strike="noStrike" spc="-1" dirty="0">
               <a:solidFill>
                 <a:srgbClr val="000000"/>
               </a:solidFill>
@@ -7413,7 +9490,7 @@
               <a:buChar char="•"/>
             </a:pPr>
             <a:r>
-              <a:rPr lang="fr-FR" sz="2400" b="0" strike="noStrike" spc="-1">
+              <a:rPr lang="fr-FR" sz="2400" b="0" strike="noStrike" spc="-1" dirty="0">
                 <a:solidFill>
                   <a:srgbClr val="FFFFFF"/>
                 </a:solidFill>
@@ -7421,7 +9498,7 @@
               </a:rPr>
               <a:t>III. Présentation de la partie : Application Mobile</a:t>
             </a:r>
-            <a:endParaRPr lang="fr-FR" sz="2400" b="0" strike="noStrike" spc="-1">
+            <a:endParaRPr lang="fr-FR" sz="2400" b="0" strike="noStrike" spc="-1" dirty="0">
               <a:solidFill>
                 <a:srgbClr val="000000"/>
               </a:solidFill>
@@ -7443,7 +9520,7 @@
               <a:buChar char="•"/>
             </a:pPr>
             <a:r>
-              <a:rPr lang="fr-FR" sz="2400" b="0" strike="noStrike" spc="-1">
+              <a:rPr lang="fr-FR" sz="2400" b="0" strike="noStrike" spc="-1" dirty="0">
                 <a:solidFill>
                   <a:srgbClr val="FFFFFF"/>
                 </a:solidFill>
@@ -7451,7 +9528,7 @@
               </a:rPr>
               <a:t>IV. Présentation de la partie : Serveur Web</a:t>
             </a:r>
-            <a:endParaRPr lang="fr-FR" sz="2400" b="0" strike="noStrike" spc="-1">
+            <a:endParaRPr lang="fr-FR" sz="2400" b="0" strike="noStrike" spc="-1" dirty="0">
               <a:solidFill>
                 <a:srgbClr val="000000"/>
               </a:solidFill>
@@ -7473,7 +9550,7 @@
               <a:buChar char="•"/>
             </a:pPr>
             <a:r>
-              <a:rPr lang="fr-FR" sz="2400" b="0" strike="noStrike" spc="-1">
+              <a:rPr lang="fr-FR" sz="2400" b="0" strike="noStrike" spc="-1" dirty="0">
                 <a:solidFill>
                   <a:srgbClr val="FFFFFF"/>
                 </a:solidFill>
@@ -7481,7 +9558,7 @@
               </a:rPr>
               <a:t>V. Présentation de la partie : Backend et base de données </a:t>
             </a:r>
-            <a:endParaRPr lang="fr-FR" sz="2400" b="0" strike="noStrike" spc="-1">
+            <a:endParaRPr lang="fr-FR" sz="2400" b="0" strike="noStrike" spc="-1" dirty="0">
               <a:solidFill>
                 <a:srgbClr val="000000"/>
               </a:solidFill>
@@ -7503,7 +9580,7 @@
               <a:buChar char="•"/>
             </a:pPr>
             <a:r>
-              <a:rPr lang="fr-FR" sz="2400" b="0" strike="noStrike" spc="-1">
+              <a:rPr lang="fr-FR" sz="2400" b="0" strike="noStrike" spc="-1" dirty="0">
                 <a:solidFill>
                   <a:srgbClr val="FFFFFF"/>
                 </a:solidFill>
@@ -7511,7 +9588,7 @@
               </a:rPr>
               <a:t>VI. Présentation de la partie : Web Service</a:t>
             </a:r>
-            <a:endParaRPr lang="fr-FR" sz="2400" b="0" strike="noStrike" spc="-1">
+            <a:endParaRPr lang="fr-FR" sz="2400" b="0" strike="noStrike" spc="-1" dirty="0">
               <a:solidFill>
                 <a:srgbClr val="000000"/>
               </a:solidFill>
@@ -7533,7 +9610,7 @@
               <a:buChar char="•"/>
             </a:pPr>
             <a:r>
-              <a:rPr lang="fr-FR" sz="2400" b="0" strike="noStrike" spc="-1">
+              <a:rPr lang="fr-FR" sz="2400" b="0" strike="noStrike" spc="-1" dirty="0">
                 <a:solidFill>
                   <a:srgbClr val="FFFFFF"/>
                 </a:solidFill>
@@ -7541,12 +9618,48 @@
               </a:rPr>
               <a:t>VII. Présentation de la partie : Capteurs/Actionneurs</a:t>
             </a:r>
-            <a:endParaRPr lang="fr-FR" sz="2400" b="0" strike="noStrike" spc="-1">
-              <a:solidFill>
-                <a:srgbClr val="000000"/>
-              </a:solidFill>
-              <a:latin typeface="Calibri"/>
-            </a:endParaRPr>
+          </a:p>
+          <a:p>
+            <a:pPr marL="228600" indent="-228240">
+              <a:lnSpc>
+                <a:spcPct val="90000"/>
+              </a:lnSpc>
+              <a:spcBef>
+                <a:spcPts val="1001"/>
+              </a:spcBef>
+              <a:buClr>
+                <a:srgbClr val="FFFFFF"/>
+              </a:buClr>
+              <a:buFont typeface="Arial"/>
+              <a:buChar char="•"/>
+            </a:pPr>
+            <a:r>
+              <a:rPr lang="fr-FR" sz="2400" spc="-1" dirty="0">
+                <a:solidFill>
+                  <a:srgbClr val="FFFFFF"/>
+                </a:solidFill>
+                <a:latin typeface="Calibri"/>
+              </a:rPr>
+              <a:t> VIII. </a:t>
+            </a:r>
+            <a:r>
+              <a:rPr lang="fr-FR" sz="2400" b="0" strike="noStrike" spc="-1" dirty="0">
+                <a:solidFill>
+                  <a:srgbClr val="FFFFFF"/>
+                </a:solidFill>
+                <a:latin typeface="Calibri"/>
+              </a:rPr>
+              <a:t>Présentation de la partie : Application Web </a:t>
+            </a:r>
+            <a:r>
+              <a:rPr lang="fr-FR" sz="2400" b="0" strike="noStrike" spc="-1" dirty="0">
+                <a:solidFill>
+                  <a:schemeClr val="bg1"/>
+                </a:solidFill>
+                <a:latin typeface="Calibri"/>
+              </a:rPr>
+              <a:t>Admin</a:t>
+            </a:r>
           </a:p>
         </p:txBody>
       </p:sp>
@@ -7851,78 +9964,6 @@
       </p:sp>
       <p:sp>
         <p:nvSpPr>
-          <p:cNvPr id="101" name="TextShape 5"/>
-          <p:cNvSpPr txBox="1"/>
-          <p:nvPr/>
-        </p:nvSpPr>
-        <p:spPr>
-          <a:xfrm>
-            <a:off x="1179360" y="3049200"/>
-            <a:ext cx="9833040" cy="2945160"/>
-          </a:xfrm>
-          <a:prstGeom prst="rect">
-            <a:avLst/>
-          </a:prstGeom>
-          <a:noFill/>
-          <a:ln w="0">
-            <a:noFill/>
-          </a:ln>
-        </p:spPr>
-        <p:txBody>
-          <a:bodyPr anchor="ctr">
-            <a:normAutofit/>
-          </a:bodyPr>
-          <a:lstStyle/>
-          <a:p>
-            <a:pPr marL="228600" indent="-228240">
-              <a:lnSpc>
-                <a:spcPct val="90000"/>
-              </a:lnSpc>
-              <a:spcBef>
-                <a:spcPts val="1001"/>
-              </a:spcBef>
-              <a:buClr>
-                <a:srgbClr val="FFFFFF"/>
-              </a:buClr>
-              <a:buFont typeface="Arial"/>
-              <a:buChar char="•"/>
-            </a:pPr>
-            <a:r>
-              <a:rPr lang="fr-FR" sz="2400" b="0" strike="noStrike" spc="-1">
-                <a:solidFill>
-                  <a:srgbClr val="FFFFFF"/>
-                </a:solidFill>
-                <a:latin typeface="Calibri"/>
-              </a:rPr>
-              <a:t>…</a:t>
-            </a:r>
-            <a:endParaRPr lang="fr-FR" sz="2400" b="0" strike="noStrike" spc="-1">
-              <a:solidFill>
-                <a:srgbClr val="000000"/>
-              </a:solidFill>
-              <a:latin typeface="Calibri"/>
-            </a:endParaRPr>
-          </a:p>
-          <a:p>
-            <a:pPr>
-              <a:lnSpc>
-                <a:spcPct val="90000"/>
-              </a:lnSpc>
-              <a:spcBef>
-                <a:spcPts val="1001"/>
-              </a:spcBef>
-            </a:pPr>
-            <a:endParaRPr lang="fr-FR" sz="2400" b="0" strike="noStrike" spc="-1">
-              <a:solidFill>
-                <a:srgbClr val="000000"/>
-              </a:solidFill>
-              <a:latin typeface="Calibri"/>
-            </a:endParaRPr>
-          </a:p>
-        </p:txBody>
-      </p:sp>
-      <p:sp>
-        <p:nvSpPr>
           <p:cNvPr id="102" name="TextShape 6"/>
           <p:cNvSpPr txBox="1"/>
           <p:nvPr/>
@@ -8008,6 +10049,682 @@
             <a:endParaRPr lang="fr-FR" sz="1200" b="0" strike="noStrike" spc="-1">
               <a:latin typeface="Times New Roman"/>
             </a:endParaRPr>
+          </a:p>
+        </p:txBody>
+      </p:sp>
+      <p:pic>
+        <p:nvPicPr>
+          <p:cNvPr id="10" name="Picture 2" descr="Développer des applications .NET Core sur Linux et macOS | SoftFluent">
+            <a:extLst>
+              <a:ext uri="{FF2B5EF4-FFF2-40B4-BE49-F238E27FC236}">
+                <a16:creationId xmlns:a16="http://schemas.microsoft.com/office/drawing/2014/main" id="{2CD39D55-BE99-4D8F-8512-64EB6E37EF0E}"/>
+              </a:ext>
+            </a:extLst>
+          </p:cNvPr>
+          <p:cNvPicPr>
+            <a:picLocks noChangeAspect="1" noChangeArrowheads="1"/>
+          </p:cNvPicPr>
+          <p:nvPr/>
+        </p:nvPicPr>
+        <p:blipFill>
+          <a:blip r:embed="rId3">
+            <a:extLst>
+              <a:ext uri="{28A0092B-C50C-407E-A947-70E740481C1C}">
+                <a14:useLocalDpi xmlns:a14="http://schemas.microsoft.com/office/drawing/2010/main" val="0"/>
+              </a:ext>
+            </a:extLst>
+          </a:blip>
+          <a:srcRect/>
+          <a:stretch>
+            <a:fillRect/>
+          </a:stretch>
+        </p:blipFill>
+        <p:spPr bwMode="auto">
+          <a:xfrm>
+            <a:off x="365605" y="2427120"/>
+            <a:ext cx="1500995" cy="789233"/>
+          </a:xfrm>
+          <a:prstGeom prst="rect">
+            <a:avLst/>
+          </a:prstGeom>
+          <a:noFill/>
+          <a:extLst>
+            <a:ext uri="{909E8E84-426E-40DD-AFC4-6F175D3DCCD1}">
+              <a14:hiddenFill xmlns:a14="http://schemas.microsoft.com/office/drawing/2010/main">
+                <a:solidFill>
+                  <a:srgbClr val="FFFFFF"/>
+                </a:solidFill>
+              </a14:hiddenFill>
+            </a:ext>
+          </a:extLst>
+        </p:spPr>
+      </p:pic>
+      <p:pic>
+        <p:nvPicPr>
+          <p:cNvPr id="11" name="Image 15">
+            <a:extLst>
+              <a:ext uri="{FF2B5EF4-FFF2-40B4-BE49-F238E27FC236}">
+                <a16:creationId xmlns:a16="http://schemas.microsoft.com/office/drawing/2014/main" id="{D0F475E6-681A-4F43-A285-F053EB5E1B62}"/>
+              </a:ext>
+            </a:extLst>
+          </p:cNvPr>
+          <p:cNvPicPr/>
+          <p:nvPr/>
+        </p:nvPicPr>
+        <p:blipFill>
+          <a:blip r:embed="rId4"/>
+          <a:stretch/>
+        </p:blipFill>
+        <p:spPr>
+          <a:xfrm>
+            <a:off x="1434892" y="3350205"/>
+            <a:ext cx="431708" cy="421778"/>
+          </a:xfrm>
+          <a:prstGeom prst="rect">
+            <a:avLst/>
+          </a:prstGeom>
+          <a:ln w="0">
+            <a:noFill/>
+          </a:ln>
+        </p:spPr>
+      </p:pic>
+      <p:pic>
+        <p:nvPicPr>
+          <p:cNvPr id="12" name="Image 11">
+            <a:extLst>
+              <a:ext uri="{FF2B5EF4-FFF2-40B4-BE49-F238E27FC236}">
+                <a16:creationId xmlns:a16="http://schemas.microsoft.com/office/drawing/2014/main" id="{BFAF6EC4-48D9-4E5C-9F2B-8C0EE33F0C2B}"/>
+              </a:ext>
+            </a:extLst>
+          </p:cNvPr>
+          <p:cNvPicPr>
+            <a:picLocks noChangeAspect="1"/>
+          </p:cNvPicPr>
+          <p:nvPr/>
+        </p:nvPicPr>
+        <p:blipFill>
+          <a:blip r:embed="rId5"/>
+          <a:stretch>
+            <a:fillRect/>
+          </a:stretch>
+        </p:blipFill>
+        <p:spPr>
+          <a:xfrm>
+            <a:off x="365605" y="3353191"/>
+            <a:ext cx="999556" cy="421778"/>
+          </a:xfrm>
+          <a:prstGeom prst="rect">
+            <a:avLst/>
+          </a:prstGeom>
+        </p:spPr>
+      </p:pic>
+      <p:pic>
+        <p:nvPicPr>
+          <p:cNvPr id="13" name="Picture 2" descr="API REST - IMCS | Conseil et Services Informatiques">
+            <a:extLst>
+              <a:ext uri="{FF2B5EF4-FFF2-40B4-BE49-F238E27FC236}">
+                <a16:creationId xmlns:a16="http://schemas.microsoft.com/office/drawing/2014/main" id="{7FB00B62-DFED-40F2-BBF5-2F587C64765C}"/>
+              </a:ext>
+            </a:extLst>
+          </p:cNvPr>
+          <p:cNvPicPr>
+            <a:picLocks noChangeAspect="1" noChangeArrowheads="1"/>
+          </p:cNvPicPr>
+          <p:nvPr/>
+        </p:nvPicPr>
+        <p:blipFill>
+          <a:blip r:embed="rId6">
+            <a:extLst>
+              <a:ext uri="{28A0092B-C50C-407E-A947-70E740481C1C}">
+                <a14:useLocalDpi xmlns:a14="http://schemas.microsoft.com/office/drawing/2010/main" val="0"/>
+              </a:ext>
+            </a:extLst>
+          </a:blip>
+          <a:srcRect/>
+          <a:stretch>
+            <a:fillRect/>
+          </a:stretch>
+        </p:blipFill>
+        <p:spPr bwMode="auto">
+          <a:xfrm>
+            <a:off x="1365161" y="4203201"/>
+            <a:ext cx="1391664" cy="789232"/>
+          </a:xfrm>
+          <a:prstGeom prst="rect">
+            <a:avLst/>
+          </a:prstGeom>
+          <a:noFill/>
+          <a:extLst>
+            <a:ext uri="{909E8E84-426E-40DD-AFC4-6F175D3DCCD1}">
+              <a14:hiddenFill xmlns:a14="http://schemas.microsoft.com/office/drawing/2010/main">
+                <a:solidFill>
+                  <a:srgbClr val="FFFFFF"/>
+                </a:solidFill>
+              </a14:hiddenFill>
+            </a:ext>
+          </a:extLst>
+        </p:spPr>
+      </p:pic>
+      <p:pic>
+        <p:nvPicPr>
+          <p:cNvPr id="14" name="Picture 4" descr="Amazon RDS for MariaDB – Amazon Web Services (AWS)">
+            <a:extLst>
+              <a:ext uri="{FF2B5EF4-FFF2-40B4-BE49-F238E27FC236}">
+                <a16:creationId xmlns:a16="http://schemas.microsoft.com/office/drawing/2014/main" id="{46F00BE8-3764-46C5-BB55-9BA274D69694}"/>
+              </a:ext>
+            </a:extLst>
+          </p:cNvPr>
+          <p:cNvPicPr/>
+          <p:nvPr/>
+        </p:nvPicPr>
+        <p:blipFill>
+          <a:blip r:embed="rId7"/>
+          <a:stretch/>
+        </p:blipFill>
+        <p:spPr>
+          <a:xfrm>
+            <a:off x="1240154" y="5540154"/>
+            <a:ext cx="1589291" cy="838423"/>
+          </a:xfrm>
+          <a:prstGeom prst="rect">
+            <a:avLst/>
+          </a:prstGeom>
+          <a:ln w="0">
+            <a:noFill/>
+          </a:ln>
+        </p:spPr>
+      </p:pic>
+      <p:pic>
+        <p:nvPicPr>
+          <p:cNvPr id="19" name="Image 14">
+            <a:extLst>
+              <a:ext uri="{FF2B5EF4-FFF2-40B4-BE49-F238E27FC236}">
+                <a16:creationId xmlns:a16="http://schemas.microsoft.com/office/drawing/2014/main" id="{7C2DB2DC-31FA-4D48-A583-56E5A1F18DE1}"/>
+              </a:ext>
+            </a:extLst>
+          </p:cNvPr>
+          <p:cNvPicPr/>
+          <p:nvPr/>
+        </p:nvPicPr>
+        <p:blipFill>
+          <a:blip r:embed="rId8"/>
+          <a:stretch/>
+        </p:blipFill>
+        <p:spPr>
+          <a:xfrm>
+            <a:off x="2256457" y="2441968"/>
+            <a:ext cx="1343160" cy="561240"/>
+          </a:xfrm>
+          <a:prstGeom prst="rect">
+            <a:avLst/>
+          </a:prstGeom>
+          <a:ln w="0">
+            <a:noFill/>
+          </a:ln>
+        </p:spPr>
+      </p:pic>
+      <p:pic>
+        <p:nvPicPr>
+          <p:cNvPr id="20" name="Image 15">
+            <a:extLst>
+              <a:ext uri="{FF2B5EF4-FFF2-40B4-BE49-F238E27FC236}">
+                <a16:creationId xmlns:a16="http://schemas.microsoft.com/office/drawing/2014/main" id="{B3FB520C-F728-4297-B1D6-08E8F1200FD6}"/>
+              </a:ext>
+            </a:extLst>
+          </p:cNvPr>
+          <p:cNvPicPr/>
+          <p:nvPr/>
+        </p:nvPicPr>
+        <p:blipFill>
+          <a:blip r:embed="rId4"/>
+          <a:stretch/>
+        </p:blipFill>
+        <p:spPr>
+          <a:xfrm>
+            <a:off x="2232205" y="3082000"/>
+            <a:ext cx="597240" cy="573480"/>
+          </a:xfrm>
+          <a:prstGeom prst="rect">
+            <a:avLst/>
+          </a:prstGeom>
+          <a:ln w="0">
+            <a:noFill/>
+          </a:ln>
+        </p:spPr>
+      </p:pic>
+      <p:pic>
+        <p:nvPicPr>
+          <p:cNvPr id="21" name="Image 17">
+            <a:extLst>
+              <a:ext uri="{FF2B5EF4-FFF2-40B4-BE49-F238E27FC236}">
+                <a16:creationId xmlns:a16="http://schemas.microsoft.com/office/drawing/2014/main" id="{A53CDA2F-E07B-4E27-AC1E-A6C5E7EF264F}"/>
+              </a:ext>
+            </a:extLst>
+          </p:cNvPr>
+          <p:cNvPicPr/>
+          <p:nvPr/>
+        </p:nvPicPr>
+        <p:blipFill>
+          <a:blip r:embed="rId9"/>
+          <a:stretch/>
+        </p:blipFill>
+        <p:spPr>
+          <a:xfrm>
+            <a:off x="3115417" y="3047086"/>
+            <a:ext cx="484200" cy="568440"/>
+          </a:xfrm>
+          <a:prstGeom prst="rect">
+            <a:avLst/>
+          </a:prstGeom>
+          <a:ln w="0">
+            <a:noFill/>
+          </a:ln>
+        </p:spPr>
+      </p:pic>
+      <p:cxnSp>
+        <p:nvCxnSpPr>
+          <p:cNvPr id="25" name="Connecteur droit avec flèche 24">
+            <a:extLst>
+              <a:ext uri="{FF2B5EF4-FFF2-40B4-BE49-F238E27FC236}">
+                <a16:creationId xmlns:a16="http://schemas.microsoft.com/office/drawing/2014/main" id="{9BC9B224-4DD2-488E-ADDC-9A97ED27621C}"/>
+              </a:ext>
+            </a:extLst>
+          </p:cNvPr>
+          <p:cNvCxnSpPr>
+            <a:cxnSpLocks/>
+          </p:cNvCxnSpPr>
+          <p:nvPr/>
+        </p:nvCxnSpPr>
+        <p:spPr>
+          <a:xfrm flipV="1">
+            <a:off x="1764406" y="3655481"/>
+            <a:ext cx="0" cy="547720"/>
+          </a:xfrm>
+          <a:prstGeom prst="straightConnector1">
+            <a:avLst/>
+          </a:prstGeom>
+          <a:ln>
+            <a:solidFill>
+              <a:schemeClr val="tx1"/>
+            </a:solidFill>
+            <a:tailEnd type="triangle"/>
+          </a:ln>
+        </p:spPr>
+        <p:style>
+          <a:lnRef idx="1">
+            <a:schemeClr val="accent1"/>
+          </a:lnRef>
+          <a:fillRef idx="0">
+            <a:schemeClr val="accent1"/>
+          </a:fillRef>
+          <a:effectRef idx="0">
+            <a:schemeClr val="accent1"/>
+          </a:effectRef>
+          <a:fontRef idx="minor">
+            <a:schemeClr val="tx1"/>
+          </a:fontRef>
+        </p:style>
+      </p:cxnSp>
+      <p:cxnSp>
+        <p:nvCxnSpPr>
+          <p:cNvPr id="29" name="Connecteur droit avec flèche 28">
+            <a:extLst>
+              <a:ext uri="{FF2B5EF4-FFF2-40B4-BE49-F238E27FC236}">
+                <a16:creationId xmlns:a16="http://schemas.microsoft.com/office/drawing/2014/main" id="{3409907B-3B14-4340-917E-AFA568F4B701}"/>
+              </a:ext>
+            </a:extLst>
+          </p:cNvPr>
+          <p:cNvCxnSpPr>
+            <a:cxnSpLocks/>
+          </p:cNvCxnSpPr>
+          <p:nvPr/>
+        </p:nvCxnSpPr>
+        <p:spPr>
+          <a:xfrm>
+            <a:off x="2440800" y="3615526"/>
+            <a:ext cx="1" cy="587675"/>
+          </a:xfrm>
+          <a:prstGeom prst="straightConnector1">
+            <a:avLst/>
+          </a:prstGeom>
+          <a:ln>
+            <a:solidFill>
+              <a:schemeClr val="tx1"/>
+            </a:solidFill>
+            <a:tailEnd type="triangle"/>
+          </a:ln>
+        </p:spPr>
+        <p:style>
+          <a:lnRef idx="1">
+            <a:schemeClr val="accent1"/>
+          </a:lnRef>
+          <a:fillRef idx="0">
+            <a:schemeClr val="accent1"/>
+          </a:fillRef>
+          <a:effectRef idx="0">
+            <a:schemeClr val="accent1"/>
+          </a:effectRef>
+          <a:fontRef idx="minor">
+            <a:schemeClr val="tx1"/>
+          </a:fontRef>
+        </p:style>
+      </p:cxnSp>
+      <p:cxnSp>
+        <p:nvCxnSpPr>
+          <p:cNvPr id="33" name="Connecteur droit avec flèche 32">
+            <a:extLst>
+              <a:ext uri="{FF2B5EF4-FFF2-40B4-BE49-F238E27FC236}">
+                <a16:creationId xmlns:a16="http://schemas.microsoft.com/office/drawing/2014/main" id="{B277F2E9-8F28-4896-8E30-9D5549CFA282}"/>
+              </a:ext>
+            </a:extLst>
+          </p:cNvPr>
+          <p:cNvCxnSpPr>
+            <a:cxnSpLocks/>
+          </p:cNvCxnSpPr>
+          <p:nvPr/>
+        </p:nvCxnSpPr>
+        <p:spPr>
+          <a:xfrm flipV="1">
+            <a:off x="2627290" y="3615526"/>
+            <a:ext cx="0" cy="587676"/>
+          </a:xfrm>
+          <a:prstGeom prst="straightConnector1">
+            <a:avLst/>
+          </a:prstGeom>
+          <a:ln>
+            <a:solidFill>
+              <a:schemeClr val="tx1"/>
+            </a:solidFill>
+            <a:tailEnd type="triangle"/>
+          </a:ln>
+        </p:spPr>
+        <p:style>
+          <a:lnRef idx="1">
+            <a:schemeClr val="accent1"/>
+          </a:lnRef>
+          <a:fillRef idx="0">
+            <a:schemeClr val="accent1"/>
+          </a:fillRef>
+          <a:effectRef idx="0">
+            <a:schemeClr val="accent1"/>
+          </a:effectRef>
+          <a:fontRef idx="minor">
+            <a:schemeClr val="tx1"/>
+          </a:fontRef>
+        </p:style>
+      </p:cxnSp>
+      <p:cxnSp>
+        <p:nvCxnSpPr>
+          <p:cNvPr id="39" name="Connecteur droit avec flèche 38">
+            <a:extLst>
+              <a:ext uri="{FF2B5EF4-FFF2-40B4-BE49-F238E27FC236}">
+                <a16:creationId xmlns:a16="http://schemas.microsoft.com/office/drawing/2014/main" id="{6B4DDA94-8295-4171-A5E8-BB225786B0A9}"/>
+              </a:ext>
+            </a:extLst>
+          </p:cNvPr>
+          <p:cNvCxnSpPr>
+            <a:cxnSpLocks/>
+          </p:cNvCxnSpPr>
+          <p:nvPr/>
+        </p:nvCxnSpPr>
+        <p:spPr>
+          <a:xfrm flipH="1">
+            <a:off x="1558344" y="3655480"/>
+            <a:ext cx="1" cy="547721"/>
+          </a:xfrm>
+          <a:prstGeom prst="straightConnector1">
+            <a:avLst/>
+          </a:prstGeom>
+          <a:ln>
+            <a:solidFill>
+              <a:schemeClr val="tx1"/>
+            </a:solidFill>
+            <a:tailEnd type="triangle"/>
+          </a:ln>
+        </p:spPr>
+        <p:style>
+          <a:lnRef idx="1">
+            <a:schemeClr val="accent1"/>
+          </a:lnRef>
+          <a:fillRef idx="0">
+            <a:schemeClr val="accent1"/>
+          </a:fillRef>
+          <a:effectRef idx="0">
+            <a:schemeClr val="accent1"/>
+          </a:effectRef>
+          <a:fontRef idx="minor">
+            <a:schemeClr val="tx1"/>
+          </a:fontRef>
+        </p:style>
+      </p:cxnSp>
+      <p:cxnSp>
+        <p:nvCxnSpPr>
+          <p:cNvPr id="44" name="Connecteur droit avec flèche 43">
+            <a:extLst>
+              <a:ext uri="{FF2B5EF4-FFF2-40B4-BE49-F238E27FC236}">
+                <a16:creationId xmlns:a16="http://schemas.microsoft.com/office/drawing/2014/main" id="{417E22B1-7DF6-470F-BF68-77CA158DEF5D}"/>
+              </a:ext>
+            </a:extLst>
+          </p:cNvPr>
+          <p:cNvCxnSpPr>
+            <a:cxnSpLocks/>
+          </p:cNvCxnSpPr>
+          <p:nvPr/>
+        </p:nvCxnSpPr>
+        <p:spPr>
+          <a:xfrm>
+            <a:off x="1650746" y="4992433"/>
+            <a:ext cx="0" cy="504767"/>
+          </a:xfrm>
+          <a:prstGeom prst="straightConnector1">
+            <a:avLst/>
+          </a:prstGeom>
+          <a:ln>
+            <a:solidFill>
+              <a:schemeClr val="tx1"/>
+            </a:solidFill>
+            <a:tailEnd type="triangle"/>
+          </a:ln>
+        </p:spPr>
+        <p:style>
+          <a:lnRef idx="1">
+            <a:schemeClr val="accent1"/>
+          </a:lnRef>
+          <a:fillRef idx="0">
+            <a:schemeClr val="accent1"/>
+          </a:fillRef>
+          <a:effectRef idx="0">
+            <a:schemeClr val="accent1"/>
+          </a:effectRef>
+          <a:fontRef idx="minor">
+            <a:schemeClr val="tx1"/>
+          </a:fontRef>
+        </p:style>
+      </p:cxnSp>
+      <p:cxnSp>
+        <p:nvCxnSpPr>
+          <p:cNvPr id="46" name="Connecteur droit avec flèche 45">
+            <a:extLst>
+              <a:ext uri="{FF2B5EF4-FFF2-40B4-BE49-F238E27FC236}">
+                <a16:creationId xmlns:a16="http://schemas.microsoft.com/office/drawing/2014/main" id="{4B37D197-FBFA-4425-A17E-2126A5F531D1}"/>
+              </a:ext>
+            </a:extLst>
+          </p:cNvPr>
+          <p:cNvCxnSpPr>
+            <a:cxnSpLocks/>
+          </p:cNvCxnSpPr>
+          <p:nvPr/>
+        </p:nvCxnSpPr>
+        <p:spPr>
+          <a:xfrm flipV="1">
+            <a:off x="2440800" y="4975495"/>
+            <a:ext cx="1" cy="521705"/>
+          </a:xfrm>
+          <a:prstGeom prst="straightConnector1">
+            <a:avLst/>
+          </a:prstGeom>
+          <a:ln>
+            <a:solidFill>
+              <a:schemeClr val="tx1"/>
+            </a:solidFill>
+            <a:tailEnd type="triangle"/>
+          </a:ln>
+        </p:spPr>
+        <p:style>
+          <a:lnRef idx="1">
+            <a:schemeClr val="accent1"/>
+          </a:lnRef>
+          <a:fillRef idx="0">
+            <a:schemeClr val="accent1"/>
+          </a:fillRef>
+          <a:effectRef idx="0">
+            <a:schemeClr val="accent1"/>
+          </a:effectRef>
+          <a:fontRef idx="minor">
+            <a:schemeClr val="tx1"/>
+          </a:fontRef>
+        </p:style>
+      </p:cxnSp>
+      <p:cxnSp>
+        <p:nvCxnSpPr>
+          <p:cNvPr id="47" name="Connecteur droit 46">
+            <a:extLst>
+              <a:ext uri="{FF2B5EF4-FFF2-40B4-BE49-F238E27FC236}">
+                <a16:creationId xmlns:a16="http://schemas.microsoft.com/office/drawing/2014/main" id="{09DD01C2-4830-4FE3-8B30-7CD2B71C9CA2}"/>
+              </a:ext>
+            </a:extLst>
+          </p:cNvPr>
+          <p:cNvCxnSpPr/>
+          <p:nvPr/>
+        </p:nvCxnSpPr>
+        <p:spPr>
+          <a:xfrm>
+            <a:off x="2067480" y="2279561"/>
+            <a:ext cx="0" cy="1492422"/>
+          </a:xfrm>
+          <a:prstGeom prst="line">
+            <a:avLst/>
+          </a:prstGeom>
+          <a:ln>
+            <a:solidFill>
+              <a:schemeClr val="tx1"/>
+            </a:solidFill>
+            <a:prstDash val="dash"/>
+          </a:ln>
+        </p:spPr>
+        <p:style>
+          <a:lnRef idx="1">
+            <a:schemeClr val="accent1"/>
+          </a:lnRef>
+          <a:fillRef idx="0">
+            <a:schemeClr val="accent1"/>
+          </a:fillRef>
+          <a:effectRef idx="0">
+            <a:schemeClr val="accent1"/>
+          </a:effectRef>
+          <a:fontRef idx="minor">
+            <a:schemeClr val="tx1"/>
+          </a:fontRef>
+        </p:style>
+      </p:cxnSp>
+      <p:cxnSp>
+        <p:nvCxnSpPr>
+          <p:cNvPr id="56" name="Connecteur droit avec flèche 55">
+            <a:extLst>
+              <a:ext uri="{FF2B5EF4-FFF2-40B4-BE49-F238E27FC236}">
+                <a16:creationId xmlns:a16="http://schemas.microsoft.com/office/drawing/2014/main" id="{3AC5EBED-E95B-4F0F-899F-01ACB26F3CC6}"/>
+              </a:ext>
+            </a:extLst>
+          </p:cNvPr>
+          <p:cNvCxnSpPr>
+            <a:cxnSpLocks/>
+            <a:stCxn id="14" idx="3"/>
+          </p:cNvCxnSpPr>
+          <p:nvPr/>
+        </p:nvCxnSpPr>
+        <p:spPr>
+          <a:xfrm>
+            <a:off x="2829445" y="5959366"/>
+            <a:ext cx="1575130" cy="0"/>
+          </a:xfrm>
+          <a:prstGeom prst="straightConnector1">
+            <a:avLst/>
+          </a:prstGeom>
+          <a:ln>
+            <a:solidFill>
+              <a:schemeClr val="tx1"/>
+            </a:solidFill>
+            <a:tailEnd type="triangle"/>
+          </a:ln>
+        </p:spPr>
+        <p:style>
+          <a:lnRef idx="1">
+            <a:schemeClr val="accent1"/>
+          </a:lnRef>
+          <a:fillRef idx="0">
+            <a:schemeClr val="accent1"/>
+          </a:fillRef>
+          <a:effectRef idx="0">
+            <a:schemeClr val="accent1"/>
+          </a:effectRef>
+          <a:fontRef idx="minor">
+            <a:schemeClr val="tx1"/>
+          </a:fontRef>
+        </p:style>
+      </p:cxnSp>
+      <p:sp>
+        <p:nvSpPr>
+          <p:cNvPr id="50" name="Rectangle 49">
+            <a:extLst>
+              <a:ext uri="{FF2B5EF4-FFF2-40B4-BE49-F238E27FC236}">
+                <a16:creationId xmlns:a16="http://schemas.microsoft.com/office/drawing/2014/main" id="{8FB149C3-BD7A-4F3D-91AD-2C4614B215E5}"/>
+              </a:ext>
+            </a:extLst>
+          </p:cNvPr>
+          <p:cNvSpPr/>
+          <p:nvPr/>
+        </p:nvSpPr>
+        <p:spPr>
+          <a:xfrm>
+            <a:off x="4687910" y="4829577"/>
+            <a:ext cx="3503051" cy="1403797"/>
+          </a:xfrm>
+          <a:prstGeom prst="rect">
+            <a:avLst/>
+          </a:prstGeom>
+          <a:solidFill>
+            <a:schemeClr val="bg1"/>
+          </a:solidFill>
+        </p:spPr>
+        <p:style>
+          <a:lnRef idx="2">
+            <a:schemeClr val="accent1">
+              <a:shade val="50000"/>
+            </a:schemeClr>
+          </a:lnRef>
+          <a:fillRef idx="1">
+            <a:schemeClr val="accent1"/>
+          </a:fillRef>
+          <a:effectRef idx="0">
+            <a:schemeClr val="accent1"/>
+          </a:effectRef>
+          <a:fontRef idx="minor">
+            <a:schemeClr val="lt1"/>
+          </a:fontRef>
+        </p:style>
+        <p:txBody>
+          <a:bodyPr rtlCol="0" anchor="ctr"/>
+          <a:lstStyle/>
+          <a:p>
+            <a:pPr algn="ctr"/>
+            <a:r>
+              <a:rPr lang="fr-FR" dirty="0">
+                <a:solidFill>
+                  <a:schemeClr val="tx1"/>
+                </a:solidFill>
+              </a:rPr>
+              <a:t>Faite LA SUITE DE VOTRE PARTIE </a:t>
+            </a:r>
           </a:p>
         </p:txBody>
       </p:sp>
@@ -13024,50 +15741,134 @@
           <a:lstStyle/>
           <a:p>
             <a:r>
-              <a:rPr lang="fr-FR" sz="1800" b="0" strike="noStrike" spc="-1">
+              <a:rPr lang="fr-FR" sz="1800" b="0" strike="noStrike" spc="-1" dirty="0">
                 <a:latin typeface="Arial"/>
               </a:rPr>
-              <a:t>-WebService REST réalisé en Node Js , qui est composé de 6 service.</a:t>
-            </a:r>
-          </a:p>
-          <a:p>
-            <a:r>
-              <a:rPr lang="fr-FR" sz="1800" b="0" strike="noStrike" spc="-1">
+              <a:t>-</a:t>
+            </a:r>
+            <a:r>
+              <a:rPr lang="fr-FR" sz="1800" b="0" strike="noStrike" spc="-1" dirty="0" err="1">
                 <a:latin typeface="Arial"/>
               </a:rPr>
-              <a:t>-Infra Admin sécurisé par token (JWT).</a:t>
-            </a:r>
-          </a:p>
-          <a:p>
-            <a:r>
-              <a:rPr lang="fr-FR" sz="1800" b="0" strike="noStrike" spc="-1">
+              <a:t>WebService</a:t>
+            </a:r>
+            <a:r>
+              <a:rPr lang="fr-FR" sz="1800" b="0" strike="noStrike" spc="-1" dirty="0">
                 <a:latin typeface="Arial"/>
               </a:rPr>
+              <a:t> REST réalisé en Node </a:t>
+            </a:r>
+            <a:r>
+              <a:rPr lang="fr-FR" sz="1800" b="0" strike="noStrike" spc="-1" dirty="0" err="1">
+                <a:latin typeface="Arial"/>
+              </a:rPr>
+              <a:t>Js</a:t>
+            </a:r>
+            <a:r>
+              <a:rPr lang="fr-FR" sz="1800" b="0" strike="noStrike" spc="-1" dirty="0">
+                <a:latin typeface="Arial"/>
+              </a:rPr>
+              <a:t> , qui est composé de 6 service.</a:t>
+            </a:r>
+          </a:p>
+          <a:p>
+            <a:r>
+              <a:rPr lang="fr-FR" sz="1800" b="0" strike="noStrike" spc="-1" dirty="0">
+                <a:latin typeface="Arial"/>
+              </a:rPr>
+              <a:t>-Infra Admin sécurisé par </a:t>
+            </a:r>
+            <a:r>
+              <a:rPr lang="fr-FR" sz="1800" b="0" strike="noStrike" spc="-1" dirty="0" err="1">
+                <a:latin typeface="Arial"/>
+              </a:rPr>
+              <a:t>token</a:t>
+            </a:r>
+            <a:r>
+              <a:rPr lang="fr-FR" sz="1800" b="0" strike="noStrike" spc="-1" dirty="0">
+                <a:latin typeface="Arial"/>
+              </a:rPr>
+              <a:t> (JWT).</a:t>
+            </a:r>
+          </a:p>
+          <a:p>
+            <a:r>
+              <a:rPr lang="fr-FR" sz="1800" b="0" strike="noStrike" spc="-1" dirty="0">
+                <a:latin typeface="Arial"/>
+              </a:rPr>
               <a:t>-Tourne sur un VPS sous un nom de domaine spécifique (webservice.lensalex.fr ).</a:t>
             </a:r>
           </a:p>
           <a:p>
             <a:r>
-              <a:rPr lang="fr-FR" sz="1800" b="0" strike="noStrike" spc="-1">
+              <a:rPr lang="fr-FR" sz="1800" b="0" strike="noStrike" spc="-1" dirty="0">
                 <a:latin typeface="Arial"/>
               </a:rPr>
-              <a:t>-Requête vers la base de données (mysql) pour GET , POST , DELETE ou PUT.</a:t>
-            </a:r>
-          </a:p>
-          <a:p>
-            <a:r>
-              <a:rPr lang="fr-FR" sz="1800" b="0" strike="noStrike" spc="-1">
+              <a:t>-Requête vers la base de données (</a:t>
+            </a:r>
+            <a:r>
+              <a:rPr lang="fr-FR" sz="1800" b="0" strike="noStrike" spc="-1" dirty="0" err="1">
                 <a:latin typeface="Arial"/>
               </a:rPr>
-              <a:t>-Chaque service possède ça documentation swagger.</a:t>
-            </a:r>
-          </a:p>
-          <a:p>
-            <a:r>
-              <a:rPr lang="fr-FR" sz="1800" b="0" strike="noStrike" spc="-1">
+              <a:t>mysql</a:t>
+            </a:r>
+            <a:r>
+              <a:rPr lang="fr-FR" sz="1800" b="0" strike="noStrike" spc="-1" dirty="0">
                 <a:latin typeface="Arial"/>
               </a:rPr>
-              <a:t>-Exploitation sur un site web (sous .net core) et application mobile (sous xamarin).</a:t>
+              <a:t>) pour GET , POST , DELETE ou PUT.</a:t>
+            </a:r>
+          </a:p>
+          <a:p>
+            <a:r>
+              <a:rPr lang="fr-FR" sz="1800" b="0" strike="noStrike" spc="-1" dirty="0">
+                <a:latin typeface="Arial"/>
+              </a:rPr>
+              <a:t>-Chaque service possède ça documentation </a:t>
+            </a:r>
+            <a:r>
+              <a:rPr lang="fr-FR" sz="1800" b="0" strike="noStrike" spc="-1" dirty="0" err="1">
+                <a:latin typeface="Arial"/>
+              </a:rPr>
+              <a:t>swagger</a:t>
+            </a:r>
+            <a:r>
+              <a:rPr lang="fr-FR" sz="1800" b="0" strike="noStrike" spc="-1" dirty="0">
+                <a:latin typeface="Arial"/>
+              </a:rPr>
+              <a:t>.</a:t>
+            </a:r>
+          </a:p>
+          <a:p>
+            <a:r>
+              <a:rPr lang="fr-FR" sz="1800" b="0" strike="noStrike" spc="-1" dirty="0">
+                <a:latin typeface="Arial"/>
+              </a:rPr>
+              <a:t>-Exploitation sur un site web (sous .net </a:t>
+            </a:r>
+            <a:r>
+              <a:rPr lang="fr-FR" sz="1800" b="0" strike="noStrike" spc="-1" dirty="0" err="1">
+                <a:latin typeface="Arial"/>
+              </a:rPr>
+              <a:t>core</a:t>
+            </a:r>
+            <a:r>
+              <a:rPr lang="fr-FR" sz="1800" b="0" strike="noStrike" spc="-1" dirty="0">
+                <a:latin typeface="Arial"/>
+              </a:rPr>
+              <a:t>) et application mobile (sous </a:t>
+            </a:r>
+            <a:r>
+              <a:rPr lang="fr-FR" sz="1800" b="0" strike="noStrike" spc="-1" dirty="0" err="1">
+                <a:latin typeface="Arial"/>
+              </a:rPr>
+              <a:t>xamarin</a:t>
+            </a:r>
+            <a:r>
+              <a:rPr lang="fr-FR" sz="1800" b="0" strike="noStrike" spc="-1" dirty="0">
+                <a:latin typeface="Arial"/>
+              </a:rPr>
+              <a:t>).</a:t>
             </a:r>
           </a:p>
         </p:txBody>
@@ -13597,4 +16398,299 @@
   <a:objectDefaults/>
   <a:extraClrSchemeLst/>
 </a:theme>
+</file>
+
+<file path=ppt/theme/theme3.xml><?xml version="1.0" encoding="utf-8"?>
+<a:theme xmlns:a="http://schemas.openxmlformats.org/drawingml/2006/main" name="Thème Office">
+  <a:themeElements>
+    <a:clrScheme name="Office">
+      <a:dk1>
+        <a:sysClr val="windowText" lastClr="000000"/>
+      </a:dk1>
+      <a:lt1>
+        <a:sysClr val="window" lastClr="FFFFFF"/>
+      </a:lt1>
+      <a:dk2>
+        <a:srgbClr val="44546A"/>
+      </a:dk2>
+      <a:lt2>
+        <a:srgbClr val="E7E6E6"/>
+      </a:lt2>
+      <a:accent1>
+        <a:srgbClr val="4472C4"/>
+      </a:accent1>
+      <a:accent2>
+        <a:srgbClr val="ED7D31"/>
+      </a:accent2>
+      <a:accent3>
+        <a:srgbClr val="A5A5A5"/>
+      </a:accent3>
+      <a:accent4>
+        <a:srgbClr val="FFC000"/>
+      </a:accent4>
+      <a:accent5>
+        <a:srgbClr val="5B9BD5"/>
+      </a:accent5>
+      <a:accent6>
+        <a:srgbClr val="70AD47"/>
+      </a:accent6>
+      <a:hlink>
+        <a:srgbClr val="0563C1"/>
+      </a:hlink>
+      <a:folHlink>
+        <a:srgbClr val="954F72"/>
+      </a:folHlink>
+    </a:clrScheme>
+    <a:fontScheme name="Office">
+      <a:majorFont>
+        <a:latin typeface="Calibri Light" panose="020F0302020204030204"/>
+        <a:ea typeface=""/>
+        <a:cs typeface=""/>
+        <a:font script="Jpan" typeface="游ゴシック Light"/>
+        <a:font script="Hang" typeface="맑은 고딕"/>
+        <a:font script="Hans" typeface="等线 Light"/>
+        <a:font script="Hant" typeface="新細明體"/>
+        <a:font script="Arab" typeface="Times New Roman"/>
+        <a:font script="Hebr" typeface="Times New Roman"/>
+        <a:font script="Thai" typeface="Angsana New"/>
+        <a:font script="Ethi" typeface="Nyala"/>
+        <a:font script="Beng" typeface="Vrinda"/>
+        <a:font script="Gujr" typeface="Shruti"/>
+        <a:font script="Khmr" typeface="MoolBoran"/>
+        <a:font script="Knda" typeface="Tunga"/>
+        <a:font script="Guru" typeface="Raavi"/>
+        <a:font script="Cans" typeface="Euphemia"/>
+        <a:font script="Cher" typeface="Plantagenet Cherokee"/>
+        <a:font script="Yiii" typeface="Microsoft Yi Baiti"/>
+        <a:font script="Tibt" typeface="Microsoft Himalaya"/>
+        <a:font script="Thaa" typeface="MV Boli"/>
+        <a:font script="Deva" typeface="Mangal"/>
+        <a:font script="Telu" typeface="Gautami"/>
+        <a:font script="Taml" typeface="Latha"/>
+        <a:font script="Syrc" typeface="Estrangelo Edessa"/>
+        <a:font script="Orya" typeface="Kalinga"/>
+        <a:font script="Mlym" typeface="Kartika"/>
+        <a:font script="Laoo" typeface="DokChampa"/>
+        <a:font script="Sinh" typeface="Iskoola Pota"/>
+        <a:font script="Mong" typeface="Mongolian Baiti"/>
+        <a:font script="Viet" typeface="Times New Roman"/>
+        <a:font script="Uigh" typeface="Microsoft Uighur"/>
+        <a:font script="Geor" typeface="Sylfaen"/>
+        <a:font script="Armn" typeface="Arial"/>
+        <a:font script="Bugi" typeface="Leelawadee UI"/>
+        <a:font script="Bopo" typeface="Microsoft JhengHei"/>
+        <a:font script="Java" typeface="Javanese Text"/>
+        <a:font script="Lisu" typeface="Segoe UI"/>
+        <a:font script="Mymr" typeface="Myanmar Text"/>
+        <a:font script="Nkoo" typeface="Ebrima"/>
+        <a:font script="Olck" typeface="Nirmala UI"/>
+        <a:font script="Osma" typeface="Ebrima"/>
+        <a:font script="Phag" typeface="Phagspa"/>
+        <a:font script="Syrn" typeface="Estrangelo Edessa"/>
+        <a:font script="Syrj" typeface="Estrangelo Edessa"/>
+        <a:font script="Syre" typeface="Estrangelo Edessa"/>
+        <a:font script="Sora" typeface="Nirmala UI"/>
+        <a:font script="Tale" typeface="Microsoft Tai Le"/>
+        <a:font script="Talu" typeface="Microsoft New Tai Lue"/>
+        <a:font script="Tfng" typeface="Ebrima"/>
+      </a:majorFont>
+      <a:minorFont>
+        <a:latin typeface="Calibri" panose="020F0502020204030204"/>
+        <a:ea typeface=""/>
+        <a:cs typeface=""/>
+        <a:font script="Jpan" typeface="游ゴシック"/>
+        <a:font script="Hang" typeface="맑은 고딕"/>
+        <a:font script="Hans" typeface="等线"/>
+        <a:font script="Hant" typeface="新細明體"/>
+        <a:font script="Arab" typeface="Arial"/>
+        <a:font script="Hebr" typeface="Arial"/>
+        <a:font script="Thai" typeface="Cordia New"/>
+        <a:font script="Ethi" typeface="Nyala"/>
+        <a:font script="Beng" typeface="Vrinda"/>
+        <a:font script="Gujr" typeface="Shruti"/>
+        <a:font script="Khmr" typeface="DaunPenh"/>
+        <a:font script="Knda" typeface="Tunga"/>
+        <a:font script="Guru" typeface="Raavi"/>
+        <a:font script="Cans" typeface="Euphemia"/>
+        <a:font script="Cher" typeface="Plantagenet Cherokee"/>
+        <a:font script="Yiii" typeface="Microsoft Yi Baiti"/>
+        <a:font script="Tibt" typeface="Microsoft Himalaya"/>
+        <a:font script="Thaa" typeface="MV Boli"/>
+        <a:font script="Deva" typeface="Mangal"/>
+        <a:font script="Telu" typeface="Gautami"/>
+        <a:font script="Taml" typeface="Latha"/>
+        <a:font script="Syrc" typeface="Estrangelo Edessa"/>
+        <a:font script="Orya" typeface="Kalinga"/>
+        <a:font script="Mlym" typeface="Kartika"/>
+        <a:font script="Laoo" typeface="DokChampa"/>
+        <a:font script="Sinh" typeface="Iskoola Pota"/>
+        <a:font script="Mong" typeface="Mongolian Baiti"/>
+        <a:font script="Viet" typeface="Arial"/>
+        <a:font script="Uigh" typeface="Microsoft Uighur"/>
+        <a:font script="Geor" typeface="Sylfaen"/>
+        <a:font script="Armn" typeface="Arial"/>
+        <a:font script="Bugi" typeface="Leelawadee UI"/>
+        <a:font script="Bopo" typeface="Microsoft JhengHei"/>
+        <a:font script="Java" typeface="Javanese Text"/>
+        <a:font script="Lisu" typeface="Segoe UI"/>
+        <a:font script="Mymr" typeface="Myanmar Text"/>
+        <a:font script="Nkoo" typeface="Ebrima"/>
+        <a:font script="Olck" typeface="Nirmala UI"/>
+        <a:font script="Osma" typeface="Ebrima"/>
+        <a:font script="Phag" typeface="Phagspa"/>
+        <a:font script="Syrn" typeface="Estrangelo Edessa"/>
+        <a:font script="Syrj" typeface="Estrangelo Edessa"/>
+        <a:font script="Syre" typeface="Estrangelo Edessa"/>
+        <a:font script="Sora" typeface="Nirmala UI"/>
+        <a:font script="Tale" typeface="Microsoft Tai Le"/>
+        <a:font script="Talu" typeface="Microsoft New Tai Lue"/>
+        <a:font script="Tfng" typeface="Ebrima"/>
+      </a:minorFont>
+    </a:fontScheme>
+    <a:fmtScheme name="Office">
+      <a:fillStyleLst>
+        <a:solidFill>
+          <a:schemeClr val="phClr"/>
+        </a:solidFill>
+        <a:gradFill rotWithShape="1">
+          <a:gsLst>
+            <a:gs pos="0">
+              <a:schemeClr val="phClr">
+                <a:lumMod val="110000"/>
+                <a:satMod val="105000"/>
+                <a:tint val="67000"/>
+              </a:schemeClr>
+            </a:gs>
+            <a:gs pos="50000">
+              <a:schemeClr val="phClr">
+                <a:lumMod val="105000"/>
+                <a:satMod val="103000"/>
+                <a:tint val="73000"/>
+              </a:schemeClr>
+            </a:gs>
+            <a:gs pos="100000">
+              <a:schemeClr val="phClr">
+                <a:lumMod val="105000"/>
+                <a:satMod val="109000"/>
+                <a:tint val="81000"/>
+              </a:schemeClr>
+            </a:gs>
+          </a:gsLst>
+          <a:lin ang="5400000" scaled="0"/>
+        </a:gradFill>
+        <a:gradFill rotWithShape="1">
+          <a:gsLst>
+            <a:gs pos="0">
+              <a:schemeClr val="phClr">
+                <a:satMod val="103000"/>
+                <a:lumMod val="102000"/>
+                <a:tint val="94000"/>
+              </a:schemeClr>
+            </a:gs>
+            <a:gs pos="50000">
+              <a:schemeClr val="phClr">
+                <a:satMod val="110000"/>
+                <a:lumMod val="100000"/>
+                <a:shade val="100000"/>
+              </a:schemeClr>
+            </a:gs>
+            <a:gs pos="100000">
+              <a:schemeClr val="phClr">
+                <a:lumMod val="99000"/>
+                <a:satMod val="120000"/>
+                <a:shade val="78000"/>
+              </a:schemeClr>
+            </a:gs>
+          </a:gsLst>
+          <a:lin ang="5400000" scaled="0"/>
+        </a:gradFill>
+      </a:fillStyleLst>
+      <a:lnStyleLst>
+        <a:ln w="6350" cap="flat" cmpd="sng" algn="ctr">
+          <a:solidFill>
+            <a:schemeClr val="phClr"/>
+          </a:solidFill>
+          <a:prstDash val="solid"/>
+          <a:miter lim="800000"/>
+        </a:ln>
+        <a:ln w="12700" cap="flat" cmpd="sng" algn="ctr">
+          <a:solidFill>
+            <a:schemeClr val="phClr"/>
+          </a:solidFill>
+          <a:prstDash val="solid"/>
+          <a:miter lim="800000"/>
+        </a:ln>
+        <a:ln w="19050" cap="flat" cmpd="sng" algn="ctr">
+          <a:solidFill>
+            <a:schemeClr val="phClr"/>
+          </a:solidFill>
+          <a:prstDash val="solid"/>
+          <a:miter lim="800000"/>
+        </a:ln>
+      </a:lnStyleLst>
+      <a:effectStyleLst>
+        <a:effectStyle>
+          <a:effectLst/>
+        </a:effectStyle>
+        <a:effectStyle>
+          <a:effectLst/>
+        </a:effectStyle>
+        <a:effectStyle>
+          <a:effectLst>
+            <a:outerShdw blurRad="57150" dist="19050" dir="5400000" algn="ctr" rotWithShape="0">
+              <a:srgbClr val="000000">
+                <a:alpha val="63000"/>
+              </a:srgbClr>
+            </a:outerShdw>
+          </a:effectLst>
+        </a:effectStyle>
+      </a:effectStyleLst>
+      <a:bgFillStyleLst>
+        <a:solidFill>
+          <a:schemeClr val="phClr"/>
+        </a:solidFill>
+        <a:solidFill>
+          <a:schemeClr val="phClr">
+            <a:tint val="95000"/>
+            <a:satMod val="170000"/>
+          </a:schemeClr>
+        </a:solidFill>
+        <a:gradFill rotWithShape="1">
+          <a:gsLst>
+            <a:gs pos="0">
+              <a:schemeClr val="phClr">
+                <a:tint val="93000"/>
+                <a:satMod val="150000"/>
+                <a:shade val="98000"/>
+                <a:lumMod val="102000"/>
+              </a:schemeClr>
+            </a:gs>
+            <a:gs pos="50000">
+              <a:schemeClr val="phClr">
+                <a:tint val="98000"/>
+                <a:satMod val="130000"/>
+                <a:shade val="90000"/>
+                <a:lumMod val="103000"/>
+              </a:schemeClr>
+            </a:gs>
+            <a:gs pos="100000">
+              <a:schemeClr val="phClr">
+                <a:shade val="63000"/>
+                <a:satMod val="120000"/>
+              </a:schemeClr>
+            </a:gs>
+          </a:gsLst>
+          <a:lin ang="5400000" scaled="0"/>
+        </a:gradFill>
+      </a:bgFillStyleLst>
+    </a:fmtScheme>
+  </a:themeElements>
+  <a:objectDefaults/>
+  <a:extraClrSchemeLst/>
+  <a:extLst>
+    <a:ext uri="{05A4C25C-085E-4340-85A3-A5531E510DB2}">
+      <thm15:themeFamily xmlns:thm15="http://schemas.microsoft.com/office/thememl/2012/main" name="Office Theme" id="{62F939B6-93AF-4DB8-9C6B-D6C7DFDC589F}" vid="{4A3C46E8-61CC-4603-A589-7422A47A8E4A}"/>
+    </a:ext>
+  </a:extLst>
+</a:theme>
 </file>
</xml_diff>

<commit_message>
Partie Diapo Dorian Pennacchioni modif
</commit_message>
<xml_diff>
--- a/Diapo_commun/PresentationCommune.pptx
+++ b/Diapo_commun/PresentationCommune.pptx
@@ -8673,86 +8673,10 @@
       </p:sp>
       <p:pic>
         <p:nvPicPr>
-          <p:cNvPr id="1026" name="Picture 2" descr="Développer des applications .NET Core sur Linux et macOS | SoftFluent">
+          <p:cNvPr id="9" name="Image 8">
             <a:extLst>
               <a:ext uri="{FF2B5EF4-FFF2-40B4-BE49-F238E27FC236}">
-                <a16:creationId xmlns:a16="http://schemas.microsoft.com/office/drawing/2014/main" id="{AB802CC1-CF1E-4F93-80B5-2B1C63A8E58B}"/>
-              </a:ext>
-            </a:extLst>
-          </p:cNvPr>
-          <p:cNvPicPr>
-            <a:picLocks noChangeAspect="1" noChangeArrowheads="1"/>
-          </p:cNvPicPr>
-          <p:nvPr/>
-        </p:nvPicPr>
-        <p:blipFill>
-          <a:blip r:embed="rId4">
-            <a:extLst>
-              <a:ext uri="{28A0092B-C50C-407E-A947-70E740481C1C}">
-                <a14:useLocalDpi xmlns:a14="http://schemas.microsoft.com/office/drawing/2010/main" val="0"/>
-              </a:ext>
-            </a:extLst>
-          </a:blip>
-          <a:srcRect/>
-          <a:stretch>
-            <a:fillRect/>
-          </a:stretch>
-        </p:blipFill>
-        <p:spPr bwMode="auto">
-          <a:xfrm>
-            <a:off x="4786242" y="2302672"/>
-            <a:ext cx="2027972" cy="1066321"/>
-          </a:xfrm>
-          <a:prstGeom prst="rect">
-            <a:avLst/>
-          </a:prstGeom>
-          <a:noFill/>
-          <a:extLst>
-            <a:ext uri="{909E8E84-426E-40DD-AFC4-6F175D3DCCD1}">
-              <a14:hiddenFill xmlns:a14="http://schemas.microsoft.com/office/drawing/2010/main">
-                <a:solidFill>
-                  <a:srgbClr val="FFFFFF"/>
-                </a:solidFill>
-              </a14:hiddenFill>
-            </a:ext>
-          </a:extLst>
-        </p:spPr>
-      </p:pic>
-      <p:pic>
-        <p:nvPicPr>
-          <p:cNvPr id="10" name="Image 15">
-            <a:extLst>
-              <a:ext uri="{FF2B5EF4-FFF2-40B4-BE49-F238E27FC236}">
-                <a16:creationId xmlns:a16="http://schemas.microsoft.com/office/drawing/2014/main" id="{EA404832-CBA0-4DFB-9DE1-2B0A3DB5568D}"/>
-              </a:ext>
-            </a:extLst>
-          </p:cNvPr>
-          <p:cNvPicPr/>
-          <p:nvPr/>
-        </p:nvPicPr>
-        <p:blipFill>
-          <a:blip r:embed="rId5"/>
-          <a:stretch/>
-        </p:blipFill>
-        <p:spPr>
-          <a:xfrm>
-            <a:off x="6216974" y="3439632"/>
-            <a:ext cx="597240" cy="548883"/>
-          </a:xfrm>
-          <a:prstGeom prst="rect">
-            <a:avLst/>
-          </a:prstGeom>
-          <a:ln w="0">
-            <a:noFill/>
-          </a:ln>
-        </p:spPr>
-      </p:pic>
-      <p:pic>
-        <p:nvPicPr>
-          <p:cNvPr id="3" name="Image 2">
-            <a:extLst>
-              <a:ext uri="{FF2B5EF4-FFF2-40B4-BE49-F238E27FC236}">
-                <a16:creationId xmlns:a16="http://schemas.microsoft.com/office/drawing/2014/main" id="{D3D08115-32B9-4284-BDA5-9827D5FC0A84}"/>
+                <a16:creationId xmlns:a16="http://schemas.microsoft.com/office/drawing/2014/main" id="{231001B5-AE35-41FF-8EC0-769D52BEEC2E}"/>
               </a:ext>
             </a:extLst>
           </p:cNvPr>
@@ -8762,75 +8686,15 @@
           <p:nvPr/>
         </p:nvPicPr>
         <p:blipFill>
-          <a:blip r:embed="rId6"/>
+          <a:blip r:embed="rId4"/>
           <a:stretch>
             <a:fillRect/>
           </a:stretch>
         </p:blipFill>
         <p:spPr>
           <a:xfrm>
-            <a:off x="4786242" y="3431060"/>
-            <a:ext cx="1300777" cy="548883"/>
-          </a:xfrm>
-          <a:prstGeom prst="rect">
-            <a:avLst/>
-          </a:prstGeom>
-        </p:spPr>
-      </p:pic>
-      <p:pic>
-        <p:nvPicPr>
-          <p:cNvPr id="6" name="Image 5">
-            <a:extLst>
-              <a:ext uri="{FF2B5EF4-FFF2-40B4-BE49-F238E27FC236}">
-                <a16:creationId xmlns:a16="http://schemas.microsoft.com/office/drawing/2014/main" id="{CCDE56E9-27CC-48BB-8FB6-453F42EA351D}"/>
-              </a:ext>
-            </a:extLst>
-          </p:cNvPr>
-          <p:cNvPicPr>
-            <a:picLocks noChangeAspect="1"/>
-          </p:cNvPicPr>
-          <p:nvPr/>
-        </p:nvPicPr>
-        <p:blipFill>
-          <a:blip r:embed="rId7"/>
-          <a:stretch>
-            <a:fillRect/>
-          </a:stretch>
-        </p:blipFill>
-        <p:spPr>
-          <a:xfrm>
-            <a:off x="13472" y="3988515"/>
-            <a:ext cx="4772769" cy="2421285"/>
-          </a:xfrm>
-          <a:prstGeom prst="rect">
-            <a:avLst/>
-          </a:prstGeom>
-        </p:spPr>
-      </p:pic>
-      <p:pic>
-        <p:nvPicPr>
-          <p:cNvPr id="23" name="Image 22">
-            <a:extLst>
-              <a:ext uri="{FF2B5EF4-FFF2-40B4-BE49-F238E27FC236}">
-                <a16:creationId xmlns:a16="http://schemas.microsoft.com/office/drawing/2014/main" id="{3BA4610F-5F68-4569-8298-F5CEDD1FD888}"/>
-              </a:ext>
-            </a:extLst>
-          </p:cNvPr>
-          <p:cNvPicPr>
-            <a:picLocks noChangeAspect="1"/>
-          </p:cNvPicPr>
-          <p:nvPr/>
-        </p:nvPicPr>
-        <p:blipFill>
-          <a:blip r:embed="rId8"/>
-          <a:stretch>
-            <a:fillRect/>
-          </a:stretch>
-        </p:blipFill>
-        <p:spPr>
-          <a:xfrm>
-            <a:off x="6814214" y="3988515"/>
-            <a:ext cx="5393221" cy="2428856"/>
+            <a:off x="1695330" y="1340308"/>
+            <a:ext cx="8801100" cy="5143500"/>
           </a:xfrm>
           <a:prstGeom prst="rect">
             <a:avLst/>

</xml_diff>

<commit_message>
Modification partie Serveur web et base de données
</commit_message>
<xml_diff>
--- a/Diapo_commun/PresentationCommune.pptx
+++ b/Diapo_commun/PresentationCommune.pptx
@@ -442,7 +442,7 @@
           <a:p>
             <a:fld id="{EC9A8D48-811A-4055-B218-CE83A36871B8}" type="datetimeFigureOut">
               <a:rPr lang="fr-FR" smtClean="0"/>
-              <a:t>13/05/2021</a:t>
+              <a:t>15/05/2021</a:t>
             </a:fld>
             <a:endParaRPr lang="fr-FR"/>
           </a:p>
@@ -774,6 +774,90 @@
           <a:p>
             <a:fld id="{741171B4-A1B5-4DF7-90FF-2BB55EBEAF8E}" type="slidenum">
               <a:rPr lang="fr-FR" smtClean="0"/>
+              <a:t>7</a:t>
+            </a:fld>
+            <a:endParaRPr lang="fr-FR"/>
+          </a:p>
+        </p:txBody>
+      </p:sp>
+    </p:spTree>
+    <p:extLst>
+      <p:ext uri="{BB962C8B-B14F-4D97-AF65-F5344CB8AC3E}">
+        <p14:creationId xmlns:p14="http://schemas.microsoft.com/office/powerpoint/2010/main" val="3011282316"/>
+      </p:ext>
+    </p:extLst>
+  </p:cSld>
+  <p:clrMapOvr>
+    <a:masterClrMapping/>
+  </p:clrMapOvr>
+</p:notes>
+</file>
+
+<file path=ppt/notesSlides/notesSlide2.xml><?xml version="1.0" encoding="utf-8"?>
+<p:notes xmlns:a="http://schemas.openxmlformats.org/drawingml/2006/main" xmlns:r="http://schemas.openxmlformats.org/officeDocument/2006/relationships" xmlns:p="http://schemas.openxmlformats.org/presentationml/2006/main">
+  <p:cSld>
+    <p:spTree>
+      <p:nvGrpSpPr>
+        <p:cNvPr id="1" name=""/>
+        <p:cNvGrpSpPr/>
+        <p:nvPr/>
+      </p:nvGrpSpPr>
+      <p:grpSpPr>
+        <a:xfrm>
+          <a:off x="0" y="0"/>
+          <a:ext cx="0" cy="0"/>
+          <a:chOff x="0" y="0"/>
+          <a:chExt cx="0" cy="0"/>
+        </a:xfrm>
+      </p:grpSpPr>
+      <p:sp>
+        <p:nvSpPr>
+          <p:cNvPr id="2" name="Espace réservé de l'image des diapositives 1"/>
+          <p:cNvSpPr>
+            <a:spLocks noGrp="1" noRot="1" noChangeAspect="1"/>
+          </p:cNvSpPr>
+          <p:nvPr>
+            <p:ph type="sldImg"/>
+          </p:nvPr>
+        </p:nvSpPr>
+        <p:spPr/>
+      </p:sp>
+      <p:sp>
+        <p:nvSpPr>
+          <p:cNvPr id="3" name="Espace réservé des notes 2"/>
+          <p:cNvSpPr>
+            <a:spLocks noGrp="1"/>
+          </p:cNvSpPr>
+          <p:nvPr>
+            <p:ph type="body" idx="1"/>
+          </p:nvPr>
+        </p:nvSpPr>
+        <p:spPr/>
+        <p:txBody>
+          <a:bodyPr/>
+          <a:lstStyle/>
+          <a:p>
+            <a:endParaRPr lang="fr-FR" dirty="0"/>
+          </a:p>
+        </p:txBody>
+      </p:sp>
+      <p:sp>
+        <p:nvSpPr>
+          <p:cNvPr id="4" name="Espace réservé du numéro de diapositive 3"/>
+          <p:cNvSpPr>
+            <a:spLocks noGrp="1"/>
+          </p:cNvSpPr>
+          <p:nvPr>
+            <p:ph type="sldNum" sz="quarter" idx="5"/>
+          </p:nvPr>
+        </p:nvSpPr>
+        <p:spPr/>
+        <p:txBody>
+          <a:bodyPr/>
+          <a:lstStyle/>
+          <a:p>
+            <a:fld id="{741171B4-A1B5-4DF7-90FF-2BB55EBEAF8E}" type="slidenum">
+              <a:rPr lang="fr-FR" smtClean="0"/>
               <a:t>15</a:t>
             </a:fld>
             <a:endParaRPr lang="fr-FR"/>
@@ -793,7 +877,7 @@
 </p:notes>
 </file>
 
-<file path=ppt/notesSlides/notesSlide2.xml><?xml version="1.0" encoding="utf-8"?>
+<file path=ppt/notesSlides/notesSlide3.xml><?xml version="1.0" encoding="utf-8"?>
 <p:notes xmlns:a="http://schemas.openxmlformats.org/drawingml/2006/main" xmlns:r="http://schemas.openxmlformats.org/officeDocument/2006/relationships" xmlns:p="http://schemas.openxmlformats.org/presentationml/2006/main">
   <p:cSld>
     <p:spTree>
@@ -5676,7 +5760,7 @@
               </a:lnSpc>
             </a:pPr>
             <a:r>
-              <a:rPr lang="fr-FR" sz="4000" b="0" strike="noStrike" spc="-1">
+              <a:rPr lang="fr-FR" sz="4000" b="0" strike="noStrike" spc="-1" dirty="0">
                 <a:solidFill>
                   <a:srgbClr val="3F3F3F"/>
                 </a:solidFill>
@@ -5685,15 +5769,15 @@
               <a:t>VI. </a:t>
             </a:r>
             <a:r>
-              <a:rPr lang="fr-FR" sz="4000" b="0" strike="noStrike" spc="-1">
+              <a:rPr lang="fr-FR" sz="4000" b="0" strike="noStrike" spc="-1" dirty="0">
                 <a:solidFill>
                   <a:srgbClr val="000000"/>
                 </a:solidFill>
                 <a:latin typeface="Calibri Light"/>
               </a:rPr>
-              <a:t>Présentation de la partie : Web Service</a:t>
+              <a:t>Web Service</a:t>
             </a:r>
-            <a:endParaRPr lang="fr-FR" sz="4000" b="0" strike="noStrike" spc="-1">
+            <a:endParaRPr lang="fr-FR" sz="4000" b="0" strike="noStrike" spc="-1" dirty="0">
               <a:solidFill>
                 <a:srgbClr val="000000"/>
               </a:solidFill>
@@ -6056,7 +6140,7 @@
         </p:spPr>
         <p:txBody>
           <a:bodyPr anchor="ctr">
-            <a:normAutofit fontScale="92500" lnSpcReduction="10000"/>
+            <a:normAutofit/>
           </a:bodyPr>
           <a:lstStyle/>
           <a:p>
@@ -6066,7 +6150,7 @@
               </a:lnSpc>
             </a:pPr>
             <a:r>
-              <a:rPr lang="fr-FR" sz="4000" b="0" strike="noStrike" spc="-1">
+              <a:rPr lang="fr-FR" sz="4000" b="0" strike="noStrike" spc="-1" dirty="0">
                 <a:solidFill>
                   <a:srgbClr val="3F3F3F"/>
                 </a:solidFill>
@@ -6075,15 +6159,15 @@
               <a:t>VII</a:t>
             </a:r>
             <a:r>
-              <a:rPr lang="fr-FR" sz="4000" b="0" strike="noStrike" spc="-1">
+              <a:rPr lang="fr-FR" sz="4000" b="0" strike="noStrike" spc="-1" dirty="0">
                 <a:solidFill>
                   <a:srgbClr val="000000"/>
                 </a:solidFill>
                 <a:latin typeface="Calibri Light"/>
               </a:rPr>
-              <a:t>. Présentation de la partie : Capteurs/Actionneurs</a:t>
+              <a:t>. Capteurs/Actionneurs</a:t>
             </a:r>
-            <a:endParaRPr lang="fr-FR" sz="4000" b="0" strike="noStrike" spc="-1">
+            <a:endParaRPr lang="fr-FR" sz="4000" b="0" strike="noStrike" spc="-1" dirty="0">
               <a:solidFill>
                 <a:srgbClr val="000000"/>
               </a:solidFill>
@@ -6483,7 +6567,7 @@
         </p:spPr>
         <p:txBody>
           <a:bodyPr anchor="ctr">
-            <a:normAutofit fontScale="92500" lnSpcReduction="10000"/>
+            <a:normAutofit/>
           </a:bodyPr>
           <a:lstStyle/>
           <a:p>
@@ -6493,7 +6577,7 @@
               </a:lnSpc>
             </a:pPr>
             <a:r>
-              <a:rPr lang="fr-FR" sz="4000" b="0" strike="noStrike" spc="-1">
+              <a:rPr lang="fr-FR" sz="4000" b="0" strike="noStrike" spc="-1" dirty="0">
                 <a:solidFill>
                   <a:srgbClr val="3F3F3F"/>
                 </a:solidFill>
@@ -6502,15 +6586,15 @@
               <a:t>VII</a:t>
             </a:r>
             <a:r>
-              <a:rPr lang="fr-FR" sz="4000" b="0" strike="noStrike" spc="-1">
+              <a:rPr lang="fr-FR" sz="4000" b="0" strike="noStrike" spc="-1" dirty="0">
                 <a:solidFill>
                   <a:srgbClr val="000000"/>
                 </a:solidFill>
                 <a:latin typeface="Calibri Light"/>
               </a:rPr>
-              <a:t>. Présentation de la partie : Capteurs/Actionneurs</a:t>
+              <a:t>. Capteurs/Actionneurs</a:t>
             </a:r>
-            <a:endParaRPr lang="fr-FR" sz="4000" b="0" strike="noStrike" spc="-1">
+            <a:endParaRPr lang="fr-FR" sz="4000" b="0" strike="noStrike" spc="-1" dirty="0">
               <a:solidFill>
                 <a:srgbClr val="000000"/>
               </a:solidFill>
@@ -6816,7 +6900,7 @@
         </p:spPr>
         <p:txBody>
           <a:bodyPr anchor="ctr">
-            <a:normAutofit fontScale="92500" lnSpcReduction="10000"/>
+            <a:normAutofit/>
           </a:bodyPr>
           <a:lstStyle/>
           <a:p>
@@ -6826,7 +6910,7 @@
               </a:lnSpc>
             </a:pPr>
             <a:r>
-              <a:rPr lang="fr-FR" sz="4000" b="0" strike="noStrike" spc="-1">
+              <a:rPr lang="fr-FR" sz="4000" b="0" strike="noStrike" spc="-1" dirty="0">
                 <a:solidFill>
                   <a:srgbClr val="3F3F3F"/>
                 </a:solidFill>
@@ -6835,15 +6919,15 @@
               <a:t>VII</a:t>
             </a:r>
             <a:r>
-              <a:rPr lang="fr-FR" sz="4000" b="0" strike="noStrike" spc="-1">
+              <a:rPr lang="fr-FR" sz="4000" b="0" strike="noStrike" spc="-1" dirty="0">
                 <a:solidFill>
                   <a:srgbClr val="000000"/>
                 </a:solidFill>
                 <a:latin typeface="Calibri Light"/>
               </a:rPr>
-              <a:t>. Présentation de la partie : Capteurs/Actionneurs</a:t>
+              <a:t>. Capteurs/Actionneurs</a:t>
             </a:r>
-            <a:endParaRPr lang="fr-FR" sz="4000" b="0" strike="noStrike" spc="-1">
+            <a:endParaRPr lang="fr-FR" sz="4000" b="0" strike="noStrike" spc="-1" dirty="0">
               <a:solidFill>
                 <a:srgbClr val="000000"/>
               </a:solidFill>
@@ -7138,7 +7222,7 @@
         </p:spPr>
         <p:txBody>
           <a:bodyPr anchor="ctr">
-            <a:normAutofit fontScale="92500" lnSpcReduction="10000"/>
+            <a:normAutofit/>
           </a:bodyPr>
           <a:lstStyle/>
           <a:p>
@@ -7148,7 +7232,7 @@
               </a:lnSpc>
             </a:pPr>
             <a:r>
-              <a:rPr lang="fr-FR" sz="4000" b="0" strike="noStrike" spc="-1">
+              <a:rPr lang="fr-FR" sz="4000" b="0" strike="noStrike" spc="-1" dirty="0">
                 <a:solidFill>
                   <a:srgbClr val="3F3F3F"/>
                 </a:solidFill>
@@ -7157,15 +7241,15 @@
               <a:t>VII</a:t>
             </a:r>
             <a:r>
-              <a:rPr lang="fr-FR" sz="4000" b="0" strike="noStrike" spc="-1">
+              <a:rPr lang="fr-FR" sz="4000" b="0" strike="noStrike" spc="-1" dirty="0">
                 <a:solidFill>
                   <a:srgbClr val="000000"/>
                 </a:solidFill>
                 <a:latin typeface="Calibri Light"/>
               </a:rPr>
-              <a:t>. Présentation de la partie : Capteurs/Actionneurs</a:t>
+              <a:t>. Capteurs/Actionneurs</a:t>
             </a:r>
-            <a:endParaRPr lang="fr-FR" sz="4000" b="0" strike="noStrike" spc="-1">
+            <a:endParaRPr lang="fr-FR" sz="4000" b="0" strike="noStrike" spc="-1" dirty="0">
               <a:solidFill>
                 <a:srgbClr val="000000"/>
               </a:solidFill>
@@ -7460,7 +7544,7 @@
         </p:spPr>
         <p:txBody>
           <a:bodyPr anchor="ctr">
-            <a:normAutofit fontScale="92500" lnSpcReduction="10000"/>
+            <a:normAutofit/>
           </a:bodyPr>
           <a:lstStyle/>
           <a:p>
@@ -7487,7 +7571,7 @@
               <a:rPr lang="fr-FR" sz="4000" b="0" strike="noStrike" spc="-1" dirty="0">
                 <a:latin typeface="Calibri"/>
               </a:rPr>
-              <a:t>Présentation de la partie : Application Web Admin </a:t>
+              <a:t>Application Web Admin </a:t>
             </a:r>
           </a:p>
         </p:txBody>
@@ -8549,7 +8633,7 @@
         </p:spPr>
         <p:txBody>
           <a:bodyPr anchor="ctr">
-            <a:normAutofit fontScale="92500" lnSpcReduction="10000"/>
+            <a:normAutofit/>
           </a:bodyPr>
           <a:lstStyle/>
           <a:p>
@@ -8576,7 +8660,7 @@
               <a:rPr lang="fr-FR" sz="4000" b="0" strike="noStrike" spc="-1" dirty="0">
                 <a:latin typeface="Calibri"/>
               </a:rPr>
-              <a:t>Présentation de la partie : Application Web Admin </a:t>
+              <a:t>Application Web Admin </a:t>
             </a:r>
           </a:p>
         </p:txBody>
@@ -9330,7 +9414,7 @@
                 </a:solidFill>
                 <a:latin typeface="Calibri"/>
               </a:rPr>
-              <a:t>II. Présentation de la partie : Infra BOX + Gateway</a:t>
+              <a:t>II. Infra BOX + Gateway</a:t>
             </a:r>
             <a:endParaRPr lang="fr-FR" sz="2400" b="0" strike="noStrike" spc="-1" dirty="0">
               <a:solidFill>
@@ -9360,7 +9444,7 @@
                 </a:solidFill>
                 <a:latin typeface="Calibri"/>
               </a:rPr>
-              <a:t>III. Présentation de la partie : Application Mobile</a:t>
+              <a:t>III. Application Mobile</a:t>
             </a:r>
             <a:endParaRPr lang="fr-FR" sz="2400" b="0" strike="noStrike" spc="-1" dirty="0">
               <a:solidFill>
@@ -9390,7 +9474,7 @@
                 </a:solidFill>
                 <a:latin typeface="Calibri"/>
               </a:rPr>
-              <a:t>IV. Présentation de la partie : Serveur Web</a:t>
+              <a:t>IV. Serveur Web</a:t>
             </a:r>
             <a:endParaRPr lang="fr-FR" sz="2400" b="0" strike="noStrike" spc="-1" dirty="0">
               <a:solidFill>
@@ -9420,7 +9504,7 @@
                 </a:solidFill>
                 <a:latin typeface="Calibri"/>
               </a:rPr>
-              <a:t>V. Présentation de la partie : Backend et base de données </a:t>
+              <a:t>V. Backend et base de données </a:t>
             </a:r>
             <a:endParaRPr lang="fr-FR" sz="2400" b="0" strike="noStrike" spc="-1" dirty="0">
               <a:solidFill>
@@ -9450,7 +9534,7 @@
                 </a:solidFill>
                 <a:latin typeface="Calibri"/>
               </a:rPr>
-              <a:t>VI. Présentation de la partie : Web Service</a:t>
+              <a:t>VI. Web Service</a:t>
             </a:r>
             <a:endParaRPr lang="fr-FR" sz="2400" b="0" strike="noStrike" spc="-1" dirty="0">
               <a:solidFill>
@@ -9480,7 +9564,7 @@
                 </a:solidFill>
                 <a:latin typeface="Calibri"/>
               </a:rPr>
-              <a:t>VII. Présentation de la partie : Capteurs/Actionneurs</a:t>
+              <a:t>VII. Capteurs/Actionneurs</a:t>
             </a:r>
           </a:p>
           <a:p>
@@ -9513,7 +9597,7 @@
                 </a:solidFill>
                 <a:latin typeface="Calibri"/>
               </a:rPr>
-              <a:t>Présentation de la partie : Application Web </a:t>
+              <a:t>Application Web </a:t>
             </a:r>
             <a:r>
               <a:rPr lang="fr-FR" sz="2400" b="0" strike="noStrike" spc="-1" dirty="0">
@@ -10765,7 +10849,7 @@
         </p:spPr>
         <p:txBody>
           <a:bodyPr anchor="ctr">
-            <a:normAutofit fontScale="92500"/>
+            <a:normAutofit/>
           </a:bodyPr>
           <a:lstStyle/>
           <a:p>
@@ -10775,7 +10859,7 @@
               </a:lnSpc>
             </a:pPr>
             <a:r>
-              <a:rPr lang="fr-FR" sz="4000" b="0" strike="noStrike" spc="-1">
+              <a:rPr lang="fr-FR" sz="4000" b="0" strike="noStrike" spc="-1" dirty="0">
                 <a:solidFill>
                   <a:srgbClr val="3F3F3F"/>
                 </a:solidFill>
@@ -10784,15 +10868,15 @@
               <a:t>II. </a:t>
             </a:r>
             <a:r>
-              <a:rPr lang="fr-FR" sz="4000" b="0" strike="noStrike" spc="-1">
+              <a:rPr lang="fr-FR" sz="4000" b="0" strike="noStrike" spc="-1" dirty="0">
                 <a:solidFill>
                   <a:srgbClr val="000000"/>
                 </a:solidFill>
                 <a:latin typeface="Calibri Light"/>
               </a:rPr>
-              <a:t>Présentation de la partie : Infra BOX + Gateway </a:t>
+              <a:t>Infra BOX + Gateway </a:t>
             </a:r>
-            <a:endParaRPr lang="fr-FR" sz="4000" b="0" strike="noStrike" spc="-1">
+            <a:endParaRPr lang="fr-FR" sz="4000" b="0" strike="noStrike" spc="-1" dirty="0">
               <a:solidFill>
                 <a:srgbClr val="000000"/>
               </a:solidFill>
@@ -11098,7 +11182,7 @@
         </p:spPr>
         <p:txBody>
           <a:bodyPr anchor="ctr">
-            <a:normAutofit fontScale="92500"/>
+            <a:normAutofit/>
           </a:bodyPr>
           <a:lstStyle/>
           <a:p>
@@ -11108,7 +11192,7 @@
               </a:lnSpc>
             </a:pPr>
             <a:r>
-              <a:rPr lang="fr-FR" sz="4000" b="0" strike="noStrike" spc="-1">
+              <a:rPr lang="fr-FR" sz="4000" b="0" strike="noStrike" spc="-1" dirty="0">
                 <a:solidFill>
                   <a:srgbClr val="3F3F3F"/>
                 </a:solidFill>
@@ -11117,15 +11201,15 @@
               <a:t>III</a:t>
             </a:r>
             <a:r>
-              <a:rPr lang="fr-FR" sz="4000" b="0" strike="noStrike" spc="-1">
+              <a:rPr lang="fr-FR" sz="4000" b="0" strike="noStrike" spc="-1" dirty="0">
                 <a:solidFill>
                   <a:srgbClr val="000000"/>
                 </a:solidFill>
                 <a:latin typeface="Calibri Light"/>
               </a:rPr>
-              <a:t>.I Présentation de la partie : Application Mobile</a:t>
+              <a:t>.I Application Mobile</a:t>
             </a:r>
-            <a:endParaRPr lang="fr-FR" sz="4000" b="0" strike="noStrike" spc="-1">
+            <a:endParaRPr lang="fr-FR" sz="4000" b="0" strike="noStrike" spc="-1" dirty="0">
               <a:solidFill>
                 <a:srgbClr val="000000"/>
               </a:solidFill>
@@ -11879,7 +11963,7 @@
         </p:spPr>
         <p:txBody>
           <a:bodyPr anchor="ctr">
-            <a:normAutofit fontScale="92500"/>
+            <a:normAutofit/>
           </a:bodyPr>
           <a:lstStyle/>
           <a:p>
@@ -11889,7 +11973,7 @@
               </a:lnSpc>
             </a:pPr>
             <a:r>
-              <a:rPr lang="fr-FR" sz="4000" b="0" strike="noStrike" spc="-1">
+              <a:rPr lang="fr-FR" sz="4000" b="0" strike="noStrike" spc="-1" dirty="0">
                 <a:solidFill>
                   <a:srgbClr val="3F3F3F"/>
                 </a:solidFill>
@@ -11898,15 +11982,15 @@
               <a:t>III</a:t>
             </a:r>
             <a:r>
-              <a:rPr lang="fr-FR" sz="4000" b="0" strike="noStrike" spc="-1">
+              <a:rPr lang="fr-FR" sz="4000" b="0" strike="noStrike" spc="-1" dirty="0">
                 <a:solidFill>
                   <a:srgbClr val="000000"/>
                 </a:solidFill>
                 <a:latin typeface="Calibri Light"/>
               </a:rPr>
-              <a:t>.II Présentation de la partie : Application Mobile</a:t>
+              <a:t>.II Application Mobile</a:t>
             </a:r>
-            <a:endParaRPr lang="fr-FR" sz="4000" b="0" strike="noStrike" spc="-1">
+            <a:endParaRPr lang="fr-FR" sz="4000" b="0" strike="noStrike" spc="-1" dirty="0">
               <a:solidFill>
                 <a:srgbClr val="000000"/>
               </a:solidFill>
@@ -12595,7 +12679,7 @@
             <p:nvPr/>
           </p:nvPicPr>
           <p:blipFill>
-            <a:blip r:embed="rId2"/>
+            <a:blip r:embed="rId3"/>
             <a:srcRect t="45717" b="9819"/>
             <a:stretch/>
           </p:blipFill>
@@ -12910,10 +12994,10 @@
         </p:nvGrpSpPr>
         <p:grpSpPr>
           <a:xfrm>
-            <a:off x="0" y="360"/>
-            <a:ext cx="12192000" cy="2552767"/>
-            <a:chOff x="0" y="360"/>
-            <a:chExt cx="12191760" cy="3048840"/>
+            <a:off x="0" y="120"/>
+            <a:ext cx="12192000" cy="2050621"/>
+            <a:chOff x="0" y="-1"/>
+            <a:chExt cx="12192000" cy="3075832"/>
           </a:xfrm>
         </p:grpSpPr>
         <p:pic>
@@ -12929,14 +13013,14 @@
             <p:nvPr/>
           </p:nvPicPr>
           <p:blipFill>
-            <a:blip r:embed="rId2"/>
+            <a:blip r:embed="rId3"/>
             <a:srcRect t="45717" b="9819"/>
             <a:stretch/>
           </p:blipFill>
           <p:spPr>
             <a:xfrm rot="10800000" flipH="1">
-              <a:off x="0" y="0"/>
-              <a:ext cx="12191760" cy="3048840"/>
+              <a:off x="0" y="-1"/>
+              <a:ext cx="12192000" cy="3075832"/>
             </a:xfrm>
             <a:prstGeom prst="rect">
               <a:avLst/>
@@ -12991,78 +13075,6 @@
       </p:grpSp>
       <p:sp>
         <p:nvSpPr>
-          <p:cNvPr id="14" name="TextShape 4">
-            <a:extLst>
-              <a:ext uri="{FF2B5EF4-FFF2-40B4-BE49-F238E27FC236}">
-                <a16:creationId xmlns:a16="http://schemas.microsoft.com/office/drawing/2014/main" id="{8331CDFA-D7BF-4624-AE23-4E0AFA837F1B}"/>
-              </a:ext>
-            </a:extLst>
-          </p:cNvPr>
-          <p:cNvSpPr txBox="1"/>
-          <p:nvPr/>
-        </p:nvSpPr>
-        <p:spPr>
-          <a:xfrm>
-            <a:off x="350691" y="448200"/>
-            <a:ext cx="11563141" cy="1066320"/>
-          </a:xfrm>
-          <a:prstGeom prst="rect">
-            <a:avLst/>
-          </a:prstGeom>
-          <a:noFill/>
-          <a:ln w="0">
-            <a:noFill/>
-          </a:ln>
-        </p:spPr>
-        <p:txBody>
-          <a:bodyPr anchor="ctr">
-            <a:normAutofit fontScale="92500" lnSpcReduction="10000"/>
-          </a:bodyPr>
-          <a:lstStyle/>
-          <a:p>
-            <a:pPr>
-              <a:lnSpc>
-                <a:spcPct val="90000"/>
-              </a:lnSpc>
-            </a:pPr>
-            <a:r>
-              <a:rPr lang="fr-FR" sz="4000" b="0" strike="noStrike" spc="-1" dirty="0">
-                <a:solidFill>
-                  <a:srgbClr val="3F3F3F"/>
-                </a:solidFill>
-                <a:latin typeface="Calibri Light"/>
-              </a:rPr>
-              <a:t>IV. </a:t>
-            </a:r>
-            <a:r>
-              <a:rPr lang="fr-FR" sz="4000" b="0" strike="noStrike" spc="-1" dirty="0">
-                <a:solidFill>
-                  <a:srgbClr val="000000"/>
-                </a:solidFill>
-                <a:latin typeface="Calibri Light"/>
-              </a:rPr>
-              <a:t>Présentation de la partie :</a:t>
-            </a:r>
-            <a:r>
-              <a:rPr lang="fr-FR" sz="4000" spc="-1" dirty="0">
-                <a:solidFill>
-                  <a:srgbClr val="000000"/>
-                </a:solidFill>
-                <a:latin typeface="Calibri Light"/>
-              </a:rPr>
-              <a:t> Serveurs Web, de base de données</a:t>
-            </a:r>
-            <a:endParaRPr lang="fr-FR" sz="4000" b="0" strike="noStrike" spc="-1" dirty="0">
-              <a:solidFill>
-                <a:srgbClr val="000000"/>
-              </a:solidFill>
-              <a:latin typeface="Calibri"/>
-            </a:endParaRPr>
-          </a:p>
-        </p:txBody>
-      </p:sp>
-      <p:sp>
-        <p:nvSpPr>
           <p:cNvPr id="15" name="TextShape 5">
             <a:extLst>
               <a:ext uri="{FF2B5EF4-FFF2-40B4-BE49-F238E27FC236}">
@@ -13131,7 +13143,7 @@
         </p:nvSpPr>
         <p:spPr>
           <a:xfrm>
-            <a:off x="838080" y="6356520"/>
+            <a:off x="599101" y="6516034"/>
             <a:ext cx="2742840" cy="364680"/>
           </a:xfrm>
           <a:prstGeom prst="rect">
@@ -13277,57 +13289,6 @@
       </p:sp>
       <p:sp>
         <p:nvSpPr>
-          <p:cNvPr id="19" name="TextShape 6">
-            <a:extLst>
-              <a:ext uri="{FF2B5EF4-FFF2-40B4-BE49-F238E27FC236}">
-                <a16:creationId xmlns:a16="http://schemas.microsoft.com/office/drawing/2014/main" id="{EA85691A-6DED-45CA-B8E2-53B52E8D7E20}"/>
-              </a:ext>
-            </a:extLst>
-          </p:cNvPr>
-          <p:cNvSpPr txBox="1"/>
-          <p:nvPr/>
-        </p:nvSpPr>
-        <p:spPr>
-          <a:xfrm>
-            <a:off x="838080" y="6356520"/>
-            <a:ext cx="2742840" cy="364680"/>
-          </a:xfrm>
-          <a:prstGeom prst="rect">
-            <a:avLst/>
-          </a:prstGeom>
-          <a:noFill/>
-          <a:ln w="0">
-            <a:noFill/>
-          </a:ln>
-        </p:spPr>
-        <p:txBody>
-          <a:bodyPr anchor="ctr">
-            <a:noAutofit/>
-          </a:bodyPr>
-          <a:lstStyle/>
-          <a:p>
-            <a:pPr>
-              <a:lnSpc>
-                <a:spcPct val="100000"/>
-              </a:lnSpc>
-            </a:pPr>
-            <a:r>
-              <a:rPr lang="fr-FR" sz="1200" b="0" strike="noStrike" spc="-1">
-                <a:solidFill>
-                  <a:srgbClr val="FFFFFF"/>
-                </a:solidFill>
-                <a:latin typeface="Calibri"/>
-              </a:rPr>
-              <a:t>LP IOTIA</a:t>
-            </a:r>
-            <a:endParaRPr lang="fr-FR" sz="1200" b="0" strike="noStrike" spc="-1">
-              <a:latin typeface="Times New Roman"/>
-            </a:endParaRPr>
-          </a:p>
-        </p:txBody>
-      </p:sp>
-      <p:sp>
-        <p:nvSpPr>
           <p:cNvPr id="20" name="TextShape 7">
             <a:extLst>
               <a:ext uri="{FF2B5EF4-FFF2-40B4-BE49-F238E27FC236}">
@@ -13379,10 +13340,394 @@
       </p:sp>
       <p:sp>
         <p:nvSpPr>
-          <p:cNvPr id="21" name="Espace réservé du contenu 2">
+          <p:cNvPr id="58" name="TextShape 5">
             <a:extLst>
               <a:ext uri="{FF2B5EF4-FFF2-40B4-BE49-F238E27FC236}">
-                <a16:creationId xmlns:a16="http://schemas.microsoft.com/office/drawing/2014/main" id="{4B5AC380-C1CE-4185-8A0F-F5A04270243C}"/>
+                <a16:creationId xmlns:a16="http://schemas.microsoft.com/office/drawing/2014/main" id="{9C81F0B3-6CFA-4C8C-B2A2-856F88877437}"/>
+              </a:ext>
+            </a:extLst>
+          </p:cNvPr>
+          <p:cNvSpPr txBox="1"/>
+          <p:nvPr/>
+        </p:nvSpPr>
+        <p:spPr>
+          <a:xfrm>
+            <a:off x="1179360" y="3049200"/>
+            <a:ext cx="9833040" cy="2945160"/>
+          </a:xfrm>
+          <a:prstGeom prst="rect">
+            <a:avLst/>
+          </a:prstGeom>
+          <a:noFill/>
+          <a:ln w="0">
+            <a:noFill/>
+          </a:ln>
+        </p:spPr>
+        <p:txBody>
+          <a:bodyPr anchor="ctr">
+            <a:normAutofit/>
+          </a:bodyPr>
+          <a:lstStyle/>
+          <a:p>
+            <a:pPr>
+              <a:lnSpc>
+                <a:spcPct val="90000"/>
+              </a:lnSpc>
+              <a:spcBef>
+                <a:spcPts val="1001"/>
+              </a:spcBef>
+            </a:pPr>
+            <a:endParaRPr lang="fr-FR" sz="2800" b="0" strike="noStrike" spc="-1">
+              <a:solidFill>
+                <a:srgbClr val="000000"/>
+              </a:solidFill>
+              <a:latin typeface="Calibri"/>
+            </a:endParaRPr>
+          </a:p>
+          <a:p>
+            <a:endParaRPr lang="fr-FR" sz="2800" b="0" strike="noStrike" spc="-1">
+              <a:solidFill>
+                <a:srgbClr val="000000"/>
+              </a:solidFill>
+              <a:latin typeface="Calibri"/>
+            </a:endParaRPr>
+          </a:p>
+        </p:txBody>
+      </p:sp>
+      <p:sp>
+        <p:nvSpPr>
+          <p:cNvPr id="60" name="TextShape 7">
+            <a:extLst>
+              <a:ext uri="{FF2B5EF4-FFF2-40B4-BE49-F238E27FC236}">
+                <a16:creationId xmlns:a16="http://schemas.microsoft.com/office/drawing/2014/main" id="{D1FF147F-C0F8-49BF-B086-E9DE2C51F1AF}"/>
+              </a:ext>
+            </a:extLst>
+          </p:cNvPr>
+          <p:cNvSpPr txBox="1"/>
+          <p:nvPr/>
+        </p:nvSpPr>
+        <p:spPr>
+          <a:xfrm>
+            <a:off x="8610480" y="6356520"/>
+            <a:ext cx="2742840" cy="364680"/>
+          </a:xfrm>
+          <a:prstGeom prst="rect">
+            <a:avLst/>
+          </a:prstGeom>
+          <a:noFill/>
+          <a:ln w="0">
+            <a:noFill/>
+          </a:ln>
+        </p:spPr>
+        <p:txBody>
+          <a:bodyPr anchor="ctr">
+            <a:noAutofit/>
+          </a:bodyPr>
+          <a:lstStyle/>
+          <a:p>
+            <a:pPr algn="r">
+              <a:lnSpc>
+                <a:spcPct val="100000"/>
+              </a:lnSpc>
+            </a:pPr>
+            <a:fld id="{AB127B7B-A1D3-4150-B341-D24BF54BBC47}" type="slidenum">
+              <a:rPr lang="fr-FR" sz="1200" b="0" strike="noStrike" spc="-1">
+                <a:solidFill>
+                  <a:srgbClr val="FFFFFF"/>
+                </a:solidFill>
+                <a:latin typeface="Calibri"/>
+              </a:rPr>
+              <a:t>7</a:t>
+            </a:fld>
+            <a:endParaRPr lang="fr-FR" sz="1200" b="0" strike="noStrike" spc="-1">
+              <a:latin typeface="Times New Roman"/>
+            </a:endParaRPr>
+          </a:p>
+        </p:txBody>
+      </p:sp>
+      <p:sp>
+        <p:nvSpPr>
+          <p:cNvPr id="61" name="TextShape 4">
+            <a:extLst>
+              <a:ext uri="{FF2B5EF4-FFF2-40B4-BE49-F238E27FC236}">
+                <a16:creationId xmlns:a16="http://schemas.microsoft.com/office/drawing/2014/main" id="{85EFF90E-6735-4996-AD52-4894654EE77D}"/>
+              </a:ext>
+            </a:extLst>
+          </p:cNvPr>
+          <p:cNvSpPr txBox="1"/>
+          <p:nvPr/>
+        </p:nvSpPr>
+        <p:spPr>
+          <a:xfrm>
+            <a:off x="388459" y="-3525"/>
+            <a:ext cx="11563141" cy="1066320"/>
+          </a:xfrm>
+          <a:prstGeom prst="rect">
+            <a:avLst/>
+          </a:prstGeom>
+          <a:noFill/>
+          <a:ln w="0">
+            <a:noFill/>
+          </a:ln>
+        </p:spPr>
+        <p:txBody>
+          <a:bodyPr anchor="ctr">
+            <a:normAutofit/>
+          </a:bodyPr>
+          <a:lstStyle/>
+          <a:p>
+            <a:pPr>
+              <a:lnSpc>
+                <a:spcPct val="90000"/>
+              </a:lnSpc>
+            </a:pPr>
+            <a:r>
+              <a:rPr lang="fr-FR" sz="4000" b="0" strike="noStrike" spc="-1" dirty="0">
+                <a:solidFill>
+                  <a:srgbClr val="3F3F3F"/>
+                </a:solidFill>
+                <a:latin typeface="Calibri Light"/>
+              </a:rPr>
+              <a:t>IV. </a:t>
+            </a:r>
+            <a:r>
+              <a:rPr lang="fr-FR" sz="4000" spc="-1" dirty="0">
+                <a:solidFill>
+                  <a:srgbClr val="000000"/>
+                </a:solidFill>
+                <a:latin typeface="Calibri Light"/>
+              </a:rPr>
+              <a:t>Serveur Web et serveur de base de données</a:t>
+            </a:r>
+            <a:endParaRPr lang="fr-FR" sz="4000" b="0" strike="noStrike" spc="-1" dirty="0">
+              <a:solidFill>
+                <a:srgbClr val="000000"/>
+              </a:solidFill>
+              <a:latin typeface="Calibri"/>
+            </a:endParaRPr>
+          </a:p>
+        </p:txBody>
+      </p:sp>
+      <p:sp>
+        <p:nvSpPr>
+          <p:cNvPr id="62" name="TextShape 5">
+            <a:extLst>
+              <a:ext uri="{FF2B5EF4-FFF2-40B4-BE49-F238E27FC236}">
+                <a16:creationId xmlns:a16="http://schemas.microsoft.com/office/drawing/2014/main" id="{BBAC4E68-7B5A-4A00-8F92-E4BD93038E22}"/>
+              </a:ext>
+            </a:extLst>
+          </p:cNvPr>
+          <p:cNvSpPr txBox="1"/>
+          <p:nvPr/>
+        </p:nvSpPr>
+        <p:spPr>
+          <a:xfrm>
+            <a:off x="1179360" y="3049200"/>
+            <a:ext cx="9833040" cy="2945160"/>
+          </a:xfrm>
+          <a:prstGeom prst="rect">
+            <a:avLst/>
+          </a:prstGeom>
+          <a:noFill/>
+          <a:ln w="0">
+            <a:noFill/>
+          </a:ln>
+        </p:spPr>
+        <p:txBody>
+          <a:bodyPr anchor="ctr">
+            <a:normAutofit/>
+          </a:bodyPr>
+          <a:lstStyle/>
+          <a:p>
+            <a:pPr>
+              <a:lnSpc>
+                <a:spcPct val="90000"/>
+              </a:lnSpc>
+              <a:spcBef>
+                <a:spcPts val="1001"/>
+              </a:spcBef>
+            </a:pPr>
+            <a:endParaRPr lang="fr-FR" sz="2800" b="0" strike="noStrike" spc="-1">
+              <a:solidFill>
+                <a:srgbClr val="000000"/>
+              </a:solidFill>
+              <a:latin typeface="Calibri"/>
+            </a:endParaRPr>
+          </a:p>
+          <a:p>
+            <a:endParaRPr lang="fr-FR" sz="2800" b="0" strike="noStrike" spc="-1">
+              <a:solidFill>
+                <a:srgbClr val="000000"/>
+              </a:solidFill>
+              <a:latin typeface="Calibri"/>
+            </a:endParaRPr>
+          </a:p>
+        </p:txBody>
+      </p:sp>
+      <p:sp>
+        <p:nvSpPr>
+          <p:cNvPr id="64" name="TextShape 7">
+            <a:extLst>
+              <a:ext uri="{FF2B5EF4-FFF2-40B4-BE49-F238E27FC236}">
+                <a16:creationId xmlns:a16="http://schemas.microsoft.com/office/drawing/2014/main" id="{02E475D7-75CF-441F-BBC3-21CA5A1181B5}"/>
+              </a:ext>
+            </a:extLst>
+          </p:cNvPr>
+          <p:cNvSpPr txBox="1"/>
+          <p:nvPr/>
+        </p:nvSpPr>
+        <p:spPr>
+          <a:xfrm>
+            <a:off x="8610480" y="6356520"/>
+            <a:ext cx="2742840" cy="364680"/>
+          </a:xfrm>
+          <a:prstGeom prst="rect">
+            <a:avLst/>
+          </a:prstGeom>
+          <a:noFill/>
+          <a:ln w="0">
+            <a:noFill/>
+          </a:ln>
+        </p:spPr>
+        <p:txBody>
+          <a:bodyPr anchor="ctr">
+            <a:noAutofit/>
+          </a:bodyPr>
+          <a:lstStyle/>
+          <a:p>
+            <a:pPr algn="r">
+              <a:lnSpc>
+                <a:spcPct val="100000"/>
+              </a:lnSpc>
+            </a:pPr>
+            <a:fld id="{AB127B7B-A1D3-4150-B341-D24BF54BBC47}" type="slidenum">
+              <a:rPr lang="fr-FR" sz="1200" b="0" strike="noStrike" spc="-1">
+                <a:solidFill>
+                  <a:srgbClr val="FFFFFF"/>
+                </a:solidFill>
+                <a:latin typeface="Calibri"/>
+              </a:rPr>
+              <a:t>7</a:t>
+            </a:fld>
+            <a:endParaRPr lang="fr-FR" sz="1200" b="0" strike="noStrike" spc="-1">
+              <a:latin typeface="Times New Roman"/>
+            </a:endParaRPr>
+          </a:p>
+        </p:txBody>
+      </p:sp>
+      <p:sp>
+        <p:nvSpPr>
+          <p:cNvPr id="65" name="TextShape 5">
+            <a:extLst>
+              <a:ext uri="{FF2B5EF4-FFF2-40B4-BE49-F238E27FC236}">
+                <a16:creationId xmlns:a16="http://schemas.microsoft.com/office/drawing/2014/main" id="{57E29DEF-05D8-4BC9-A285-2207AC754C16}"/>
+              </a:ext>
+            </a:extLst>
+          </p:cNvPr>
+          <p:cNvSpPr txBox="1"/>
+          <p:nvPr/>
+        </p:nvSpPr>
+        <p:spPr>
+          <a:xfrm>
+            <a:off x="1179360" y="3049200"/>
+            <a:ext cx="9833040" cy="2945160"/>
+          </a:xfrm>
+          <a:prstGeom prst="rect">
+            <a:avLst/>
+          </a:prstGeom>
+          <a:noFill/>
+          <a:ln w="0">
+            <a:noFill/>
+          </a:ln>
+        </p:spPr>
+        <p:txBody>
+          <a:bodyPr anchor="ctr">
+            <a:normAutofit/>
+          </a:bodyPr>
+          <a:lstStyle/>
+          <a:p>
+            <a:pPr>
+              <a:lnSpc>
+                <a:spcPct val="90000"/>
+              </a:lnSpc>
+              <a:spcBef>
+                <a:spcPts val="1001"/>
+              </a:spcBef>
+            </a:pPr>
+            <a:endParaRPr lang="fr-FR" sz="2800" b="0" strike="noStrike" spc="-1">
+              <a:solidFill>
+                <a:srgbClr val="000000"/>
+              </a:solidFill>
+              <a:latin typeface="Calibri"/>
+            </a:endParaRPr>
+          </a:p>
+          <a:p>
+            <a:endParaRPr lang="fr-FR" sz="2800" b="0" strike="noStrike" spc="-1">
+              <a:solidFill>
+                <a:srgbClr val="000000"/>
+              </a:solidFill>
+              <a:latin typeface="Calibri"/>
+            </a:endParaRPr>
+          </a:p>
+        </p:txBody>
+      </p:sp>
+      <p:sp>
+        <p:nvSpPr>
+          <p:cNvPr id="66" name="TextShape 7">
+            <a:extLst>
+              <a:ext uri="{FF2B5EF4-FFF2-40B4-BE49-F238E27FC236}">
+                <a16:creationId xmlns:a16="http://schemas.microsoft.com/office/drawing/2014/main" id="{BC005FAA-79E5-4971-A2D9-16F31A52CC6F}"/>
+              </a:ext>
+            </a:extLst>
+          </p:cNvPr>
+          <p:cNvSpPr txBox="1"/>
+          <p:nvPr/>
+        </p:nvSpPr>
+        <p:spPr>
+          <a:xfrm>
+            <a:off x="8610480" y="6356520"/>
+            <a:ext cx="2742840" cy="364680"/>
+          </a:xfrm>
+          <a:prstGeom prst="rect">
+            <a:avLst/>
+          </a:prstGeom>
+          <a:noFill/>
+          <a:ln w="0">
+            <a:noFill/>
+          </a:ln>
+        </p:spPr>
+        <p:txBody>
+          <a:bodyPr anchor="ctr">
+            <a:noAutofit/>
+          </a:bodyPr>
+          <a:lstStyle/>
+          <a:p>
+            <a:pPr algn="r">
+              <a:lnSpc>
+                <a:spcPct val="100000"/>
+              </a:lnSpc>
+            </a:pPr>
+            <a:fld id="{89852E89-60D3-43A7-B38E-7FD2E7927657}" type="slidenum">
+              <a:rPr lang="fr-FR" sz="1200" b="0" strike="noStrike" spc="-1">
+                <a:solidFill>
+                  <a:srgbClr val="FFFFFF"/>
+                </a:solidFill>
+                <a:latin typeface="Calibri"/>
+              </a:rPr>
+              <a:t>7</a:t>
+            </a:fld>
+            <a:endParaRPr lang="fr-FR" sz="1200" b="0" strike="noStrike" spc="-1">
+              <a:latin typeface="Times New Roman"/>
+            </a:endParaRPr>
+          </a:p>
+        </p:txBody>
+      </p:sp>
+      <p:sp>
+        <p:nvSpPr>
+          <p:cNvPr id="67" name="Espace réservé du contenu 2">
+            <a:extLst>
+              <a:ext uri="{FF2B5EF4-FFF2-40B4-BE49-F238E27FC236}">
+                <a16:creationId xmlns:a16="http://schemas.microsoft.com/office/drawing/2014/main" id="{500CE0F3-D931-464C-A710-C349E59154D3}"/>
               </a:ext>
             </a:extLst>
           </p:cNvPr>
@@ -13569,13 +13914,14 @@
             </a:lvl9pPr>
           </a:lstStyle>
           <a:p>
-            <a:pPr>
+            <a:pPr marL="0" indent="0">
               <a:lnSpc>
                 <a:spcPct val="100000"/>
               </a:lnSpc>
+              <a:buNone/>
             </a:pPr>
             <a:r>
-              <a:rPr lang="fr-FR" sz="2400" dirty="0">
+              <a:rPr lang="fr-FR" sz="2000" dirty="0">
                 <a:solidFill>
                   <a:schemeClr val="bg2"/>
                 </a:solidFill>
@@ -13584,7 +13930,7 @@
             </a:r>
           </a:p>
           <a:p>
-            <a:pPr lvl="1">
+            <a:pPr>
               <a:lnSpc>
                 <a:spcPct val="100000"/>
               </a:lnSpc>
@@ -13599,7 +13945,7 @@
             </a:r>
           </a:p>
           <a:p>
-            <a:pPr lvl="1">
+            <a:pPr>
               <a:lnSpc>
                 <a:spcPct val="100000"/>
               </a:lnSpc>
@@ -13610,73 +13956,11 @@
                   <a:schemeClr val="bg2"/>
                 </a:solidFill>
               </a:rPr>
-              <a:t>A deux interfaces </a:t>
+              <a:t>Deux interfaces </a:t>
             </a:r>
           </a:p>
           <a:p>
-            <a:pPr lvl="2">
-              <a:lnSpc>
-                <a:spcPct val="100000"/>
-              </a:lnSpc>
-            </a:pPr>
-            <a:r>
-              <a:rPr lang="fr-FR" sz="1800" dirty="0">
-                <a:solidFill>
-                  <a:schemeClr val="bg2"/>
-                </a:solidFill>
-              </a:rPr>
-              <a:t>Une sur le sous réseau 134.59.143.0/27 avec l’adresse </a:t>
-            </a:r>
-            <a:r>
-              <a:rPr lang="fr-FR" sz="1800" dirty="0" err="1">
-                <a:solidFill>
-                  <a:schemeClr val="bg2"/>
-                </a:solidFill>
-              </a:rPr>
-              <a:t>ip</a:t>
-            </a:r>
-            <a:r>
-              <a:rPr lang="fr-FR" sz="1800" dirty="0">
-                <a:solidFill>
-                  <a:schemeClr val="bg2"/>
-                </a:solidFill>
-              </a:rPr>
-              <a:t> 134.59.143.225</a:t>
-            </a:r>
-          </a:p>
-          <a:p>
-            <a:pPr lvl="2">
-              <a:lnSpc>
-                <a:spcPct val="100000"/>
-              </a:lnSpc>
-            </a:pPr>
-            <a:r>
-              <a:rPr lang="fr-FR" sz="1800" dirty="0">
-                <a:solidFill>
-                  <a:schemeClr val="bg2"/>
-                </a:solidFill>
-              </a:rPr>
-              <a:t>Une sur le sous réseau 10.143.1.0/24 avec l’adresse </a:t>
-            </a:r>
-            <a:r>
-              <a:rPr lang="fr-FR" sz="1800" dirty="0" err="1">
-                <a:solidFill>
-                  <a:schemeClr val="bg2"/>
-                </a:solidFill>
-              </a:rPr>
-              <a:t>ip</a:t>
-            </a:r>
-            <a:r>
-              <a:rPr lang="fr-FR" sz="1800" dirty="0">
-                <a:solidFill>
-                  <a:schemeClr val="bg2"/>
-                </a:solidFill>
-              </a:rPr>
-              <a:t> 10.143.1.225</a:t>
-            </a:r>
-          </a:p>
-          <a:p>
-            <a:pPr lvl="1">
+            <a:pPr>
               <a:lnSpc>
                 <a:spcPct val="100000"/>
               </a:lnSpc>
@@ -13691,101 +13975,6 @@
             </a:r>
           </a:p>
           <a:p>
-            <a:pPr lvl="2">
-              <a:lnSpc>
-                <a:spcPct val="100000"/>
-              </a:lnSpc>
-            </a:pPr>
-            <a:r>
-              <a:rPr lang="fr-FR" sz="1800" dirty="0">
-                <a:solidFill>
-                  <a:schemeClr val="bg2"/>
-                </a:solidFill>
-              </a:rPr>
-              <a:t>Smart-</a:t>
-            </a:r>
-            <a:r>
-              <a:rPr lang="fr-FR" sz="1800" dirty="0" err="1">
-                <a:solidFill>
-                  <a:schemeClr val="bg2"/>
-                </a:solidFill>
-              </a:rPr>
-              <a:t>Ecovid</a:t>
-            </a:r>
-            <a:r>
-              <a:rPr lang="fr-FR" sz="1800" dirty="0">
-                <a:solidFill>
-                  <a:schemeClr val="bg2"/>
-                </a:solidFill>
-              </a:rPr>
-              <a:t> développer en ASP. Net </a:t>
-            </a:r>
-            <a:r>
-              <a:rPr lang="fr-FR" sz="1800" dirty="0" err="1">
-                <a:solidFill>
-                  <a:schemeClr val="bg2"/>
-                </a:solidFill>
-              </a:rPr>
-              <a:t>Core</a:t>
-            </a:r>
-            <a:endParaRPr lang="fr-FR" sz="1800" dirty="0">
-              <a:solidFill>
-                <a:schemeClr val="bg2"/>
-              </a:solidFill>
-            </a:endParaRPr>
-          </a:p>
-          <a:p>
-            <a:pPr lvl="2">
-              <a:lnSpc>
-                <a:spcPct val="100000"/>
-              </a:lnSpc>
-            </a:pPr>
-            <a:r>
-              <a:rPr lang="fr-FR" sz="1800" dirty="0" err="1">
-                <a:solidFill>
-                  <a:schemeClr val="bg2"/>
-                </a:solidFill>
-              </a:rPr>
-              <a:t>WebServices</a:t>
-            </a:r>
-            <a:r>
-              <a:rPr lang="fr-FR" sz="1800" dirty="0">
-                <a:solidFill>
-                  <a:schemeClr val="bg2"/>
-                </a:solidFill>
-              </a:rPr>
-              <a:t> développer en </a:t>
-            </a:r>
-            <a:r>
-              <a:rPr lang="fr-FR" sz="1800" dirty="0" err="1">
-                <a:solidFill>
-                  <a:schemeClr val="bg2"/>
-                </a:solidFill>
-              </a:rPr>
-              <a:t>NodeJS</a:t>
-            </a:r>
-            <a:endParaRPr lang="fr-FR" sz="1800" dirty="0">
-              <a:solidFill>
-                <a:schemeClr val="bg2"/>
-              </a:solidFill>
-            </a:endParaRPr>
-          </a:p>
-          <a:p>
-            <a:pPr lvl="2">
-              <a:lnSpc>
-                <a:spcPct val="100000"/>
-              </a:lnSpc>
-            </a:pPr>
-            <a:r>
-              <a:rPr lang="fr-FR" sz="1800" dirty="0">
-                <a:solidFill>
-                  <a:schemeClr val="bg2"/>
-                </a:solidFill>
-              </a:rPr>
-              <a:t>Ainsi que PhpMyAdmin</a:t>
-            </a:r>
-          </a:p>
-          <a:p>
             <a:pPr lvl="1">
               <a:lnSpc>
                 <a:spcPct val="100000"/>
@@ -13797,17 +13986,112 @@
                   <a:schemeClr val="bg2"/>
                 </a:solidFill>
               </a:rPr>
-              <a:t>Hébergera le broker MQTT centrale</a:t>
+              <a:t>Smart-</a:t>
             </a:r>
-          </a:p>
-        </p:txBody>
-      </p:sp>
-      <p:sp>
-        <p:nvSpPr>
-          <p:cNvPr id="22" name="Espace réservé du contenu 2">
+            <a:r>
+              <a:rPr lang="fr-FR" sz="2000" dirty="0" err="1">
+                <a:solidFill>
+                  <a:schemeClr val="bg2"/>
+                </a:solidFill>
+              </a:rPr>
+              <a:t>Ecovid</a:t>
+            </a:r>
+            <a:r>
+              <a:rPr lang="fr-FR" sz="2000" dirty="0">
+                <a:solidFill>
+                  <a:schemeClr val="bg2"/>
+                </a:solidFill>
+              </a:rPr>
+              <a:t> développé en ASP. Net </a:t>
+            </a:r>
+            <a:r>
+              <a:rPr lang="fr-FR" sz="2000" dirty="0" err="1">
+                <a:solidFill>
+                  <a:schemeClr val="bg2"/>
+                </a:solidFill>
+              </a:rPr>
+              <a:t>Core</a:t>
+            </a:r>
+            <a:endParaRPr lang="fr-FR" sz="2000" dirty="0">
+              <a:solidFill>
+                <a:schemeClr val="bg2"/>
+              </a:solidFill>
+            </a:endParaRPr>
+          </a:p>
+          <a:p>
+            <a:pPr lvl="1">
+              <a:lnSpc>
+                <a:spcPct val="100000"/>
+              </a:lnSpc>
+            </a:pPr>
+            <a:r>
+              <a:rPr lang="fr-FR" sz="2000" dirty="0" err="1">
+                <a:solidFill>
+                  <a:schemeClr val="bg2"/>
+                </a:solidFill>
+              </a:rPr>
+              <a:t>WebServices</a:t>
+            </a:r>
+            <a:r>
+              <a:rPr lang="fr-FR" sz="2000" dirty="0">
+                <a:solidFill>
+                  <a:schemeClr val="bg2"/>
+                </a:solidFill>
+              </a:rPr>
+              <a:t> développés en </a:t>
+            </a:r>
+            <a:r>
+              <a:rPr lang="fr-FR" sz="2000" dirty="0" err="1">
+                <a:solidFill>
+                  <a:schemeClr val="bg2"/>
+                </a:solidFill>
+              </a:rPr>
+              <a:t>NodeJS</a:t>
+            </a:r>
+            <a:endParaRPr lang="fr-FR" sz="2000" dirty="0">
+              <a:solidFill>
+                <a:schemeClr val="bg2"/>
+              </a:solidFill>
+            </a:endParaRPr>
+          </a:p>
+          <a:p>
+            <a:pPr lvl="1">
+              <a:lnSpc>
+                <a:spcPct val="100000"/>
+              </a:lnSpc>
+            </a:pPr>
+            <a:r>
+              <a:rPr lang="fr-FR" sz="2000" dirty="0">
+                <a:solidFill>
+                  <a:schemeClr val="bg2"/>
+                </a:solidFill>
+              </a:rPr>
+              <a:t>Ainsi que PhpMyAdmin</a:t>
+            </a:r>
+          </a:p>
+          <a:p>
+            <a:pPr lvl="1">
+              <a:lnSpc>
+                <a:spcPct val="100000"/>
+              </a:lnSpc>
+            </a:pPr>
+            <a:r>
+              <a:rPr lang="fr-FR" sz="2000" dirty="0">
+                <a:solidFill>
+                  <a:schemeClr val="bg2"/>
+                </a:solidFill>
+              </a:rPr>
+              <a:t>Un broker MQTT central</a:t>
+            </a:r>
+          </a:p>
+        </p:txBody>
+      </p:sp>
+      <p:sp>
+        <p:nvSpPr>
+          <p:cNvPr id="68" name="Espace réservé du contenu 2">
             <a:extLst>
               <a:ext uri="{FF2B5EF4-FFF2-40B4-BE49-F238E27FC236}">
-                <a16:creationId xmlns:a16="http://schemas.microsoft.com/office/drawing/2014/main" id="{5FF3DCC0-1B57-4CF1-8B37-D5F86FA78102}"/>
+                <a16:creationId xmlns:a16="http://schemas.microsoft.com/office/drawing/2014/main" id="{76BD2B9D-9688-413A-9B21-7861E596195F}"/>
               </a:ext>
             </a:extLst>
           </p:cNvPr>
@@ -13818,7 +14102,7 @@
         </p:nvSpPr>
         <p:spPr>
           <a:xfrm>
-            <a:off x="6726690" y="1876680"/>
+            <a:off x="6744644" y="1843514"/>
             <a:ext cx="5240136" cy="4218692"/>
           </a:xfrm>
           <a:prstGeom prst="rect">
@@ -14003,8 +14287,14 @@
             </a:lvl9pPr>
           </a:lstStyle>
           <a:p>
+            <a:pPr marL="0" indent="0">
+              <a:lnSpc>
+                <a:spcPct val="100000"/>
+              </a:lnSpc>
+              <a:buNone/>
+            </a:pPr>
             <a:r>
-              <a:rPr lang="fr-FR" dirty="0">
+              <a:rPr lang="fr-FR" sz="2000" dirty="0">
                 <a:solidFill>
                   <a:schemeClr val="bg2"/>
                 </a:solidFill>
@@ -14013,9 +14303,13 @@
             </a:r>
           </a:p>
           <a:p>
-            <a:pPr lvl="1"/>
+            <a:pPr>
+              <a:lnSpc>
+                <a:spcPct val="100000"/>
+              </a:lnSpc>
+            </a:pPr>
             <a:r>
-              <a:rPr lang="fr-FR" dirty="0">
+              <a:rPr lang="fr-FR" sz="2000" dirty="0">
                 <a:solidFill>
                   <a:schemeClr val="bg2"/>
                 </a:solidFill>
@@ -14024,42 +14318,46 @@
             </a:r>
           </a:p>
           <a:p>
-            <a:pPr lvl="1"/>
+            <a:pPr>
+              <a:lnSpc>
+                <a:spcPct val="100000"/>
+              </a:lnSpc>
+            </a:pPr>
             <a:r>
-              <a:rPr lang="fr-FR" dirty="0" err="1">
+              <a:rPr lang="fr-FR" sz="2000" dirty="0" err="1">
                 <a:solidFill>
                   <a:schemeClr val="bg2"/>
                 </a:solidFill>
               </a:rPr>
               <a:t>Rasbpian</a:t>
             </a:r>
-            <a:endParaRPr lang="fr-FR" dirty="0">
+            <a:endParaRPr lang="fr-FR" sz="2000" dirty="0">
               <a:solidFill>
                 <a:schemeClr val="bg2"/>
               </a:solidFill>
             </a:endParaRPr>
           </a:p>
           <a:p>
-            <a:pPr lvl="1"/>
+            <a:pPr>
+              <a:lnSpc>
+                <a:spcPct val="100000"/>
+              </a:lnSpc>
+            </a:pPr>
             <a:r>
-              <a:rPr lang="fr-FR" dirty="0">
+              <a:rPr lang="fr-FR" sz="2000" dirty="0">
                 <a:solidFill>
                   <a:schemeClr val="bg2"/>
                 </a:solidFill>
               </a:rPr>
-              <a:t>Hébergera la base de données uniquement</a:t>
+              <a:t>Hébergera la base de données</a:t>
             </a:r>
           </a:p>
           <a:p>
-            <a:pPr lvl="2"/>
-            <a:r>
-              <a:rPr lang="fr-FR" dirty="0">
-                <a:solidFill>
-                  <a:schemeClr val="bg2"/>
-                </a:solidFill>
-              </a:rPr>
-              <a:t>Base de données </a:t>
-            </a:r>
+            <a:pPr lvl="1">
+              <a:lnSpc>
+                <a:spcPct val="100000"/>
+              </a:lnSpc>
+            </a:pPr>
             <a:r>
               <a:rPr lang="fr-FR" dirty="0" err="1">
                 <a:solidFill>
@@ -14068,32 +14366,31 @@
               </a:rPr>
               <a:t>MariaDB</a:t>
             </a:r>
-            <a:endParaRPr lang="fr-FR" dirty="0">
-              <a:solidFill>
-                <a:schemeClr val="bg2"/>
-              </a:solidFill>
-            </a:endParaRPr>
-          </a:p>
-          <a:p>
-            <a:pPr lvl="1"/>
-            <a:r>
-              <a:rPr lang="fr-FR" dirty="0" err="1">
-                <a:solidFill>
-                  <a:schemeClr val="bg2"/>
-                </a:solidFill>
-              </a:rPr>
-              <a:t>Rejète</a:t>
-            </a:r>
             <a:r>
               <a:rPr lang="fr-FR" dirty="0">
                 <a:solidFill>
                   <a:schemeClr val="bg2"/>
                 </a:solidFill>
               </a:rPr>
-              <a:t> toute communication ayant une adresse </a:t>
+              <a:t> 10</a:t>
+            </a:r>
+          </a:p>
+          <a:p>
+            <a:pPr>
+              <a:lnSpc>
+                <a:spcPct val="100000"/>
+              </a:lnSpc>
+            </a:pPr>
+            <a:r>
+              <a:rPr lang="fr-FR" sz="2000" dirty="0">
+                <a:solidFill>
+                  <a:schemeClr val="bg2"/>
+                </a:solidFill>
+              </a:rPr>
+              <a:t>Rejette toutes communications ayant une adresse </a:t>
             </a:r>
             <a:r>
-              <a:rPr lang="fr-FR" dirty="0" err="1">
+              <a:rPr lang="fr-FR" sz="2000" dirty="0" err="1">
                 <a:solidFill>
                   <a:schemeClr val="bg2"/>
                 </a:solidFill>
@@ -14101,33 +14398,37 @@
               <a:t>ip</a:t>
             </a:r>
             <a:r>
-              <a:rPr lang="fr-FR" dirty="0">
+              <a:rPr lang="fr-FR" sz="2000" dirty="0">
                 <a:solidFill>
                   <a:schemeClr val="bg2"/>
                 </a:solidFill>
               </a:rPr>
-              <a:t> différente du serveur</a:t>
+              <a:t> différente de la plage de l’intranet</a:t>
             </a:r>
           </a:p>
           <a:p>
-            <a:pPr lvl="1"/>
+            <a:pPr>
+              <a:lnSpc>
+                <a:spcPct val="100000"/>
+              </a:lnSpc>
+            </a:pPr>
             <a:r>
-              <a:rPr lang="fr-FR" dirty="0">
+              <a:rPr lang="fr-FR" sz="2000" dirty="0">
                 <a:solidFill>
                   <a:schemeClr val="bg2"/>
                 </a:solidFill>
               </a:rPr>
-              <a:t>Accessible uniquement depuis l’intranet (sous réseau 10.143.1.0/24)</a:t>
+              <a:t>Accessible uniquement depuis l’intranet</a:t>
             </a:r>
           </a:p>
         </p:txBody>
       </p:sp>
       <p:pic>
         <p:nvPicPr>
-          <p:cNvPr id="23" name="Image 22">
+          <p:cNvPr id="69" name="Image 68">
             <a:extLst>
               <a:ext uri="{FF2B5EF4-FFF2-40B4-BE49-F238E27FC236}">
-                <a16:creationId xmlns:a16="http://schemas.microsoft.com/office/drawing/2014/main" id="{1607B157-EA88-496D-82D6-EE2D5DE7118A}"/>
+                <a16:creationId xmlns:a16="http://schemas.microsoft.com/office/drawing/2014/main" id="{8CD0FB90-A692-44B7-A330-08472403CEF3}"/>
               </a:ext>
             </a:extLst>
           </p:cNvPr>
@@ -14137,250 +14438,1404 @@
           <p:nvPr/>
         </p:nvPicPr>
         <p:blipFill rotWithShape="1">
-          <a:blip r:embed="rId3">
+          <a:blip r:embed="rId4">
             <a:extLst>
               <a:ext uri="{28A0092B-C50C-407E-A947-70E740481C1C}">
                 <a14:useLocalDpi xmlns:a14="http://schemas.microsoft.com/office/drawing/2010/main" val="0"/>
               </a:ext>
             </a:extLst>
           </a:blip>
-          <a:srcRect t="12529"/>
+          <a:srcRect t="11121" r="28960"/>
           <a:stretch/>
         </p:blipFill>
         <p:spPr>
           <a:xfrm>
-            <a:off x="1733550" y="1009650"/>
-            <a:ext cx="8872961" cy="5848350"/>
+            <a:off x="2265775" y="780231"/>
+            <a:ext cx="8018190" cy="6095372"/>
           </a:xfrm>
           <a:prstGeom prst="rect">
             <a:avLst/>
           </a:prstGeom>
         </p:spPr>
       </p:pic>
-      <p:sp>
-        <p:nvSpPr>
-          <p:cNvPr id="24" name="Espace réservé du contenu 2">
+      <p:graphicFrame>
+        <p:nvGraphicFramePr>
+          <p:cNvPr id="70" name="Tableau 7">
             <a:extLst>
               <a:ext uri="{FF2B5EF4-FFF2-40B4-BE49-F238E27FC236}">
-                <a16:creationId xmlns:a16="http://schemas.microsoft.com/office/drawing/2014/main" id="{F411EB8D-6B1B-45FF-9B7D-6C9CE7E73055}"/>
+                <a16:creationId xmlns:a16="http://schemas.microsoft.com/office/drawing/2014/main" id="{734F2B32-E630-4637-B239-6325096C45B0}"/>
               </a:ext>
             </a:extLst>
           </p:cNvPr>
-          <p:cNvSpPr txBox="1">
-            <a:spLocks/>
-          </p:cNvSpPr>
+          <p:cNvGraphicFramePr>
+            <a:graphicFrameLocks noGrp="1"/>
+          </p:cNvGraphicFramePr>
+          <p:nvPr>
+            <p:extLst>
+              <p:ext uri="{D42A27DB-BD31-4B8C-83A1-F6EECF244321}">
+                <p14:modId xmlns:p14="http://schemas.microsoft.com/office/powerpoint/2010/main" val="3734455910"/>
+              </p:ext>
+            </p:extLst>
+          </p:nvPr>
+        </p:nvGraphicFramePr>
+        <p:xfrm>
+          <a:off x="236239" y="1875667"/>
+          <a:ext cx="5693096" cy="4663440"/>
+        </p:xfrm>
+        <a:graphic>
+          <a:graphicData uri="http://schemas.openxmlformats.org/drawingml/2006/table">
+            <a:tbl>
+              <a:tblPr firstRow="1" bandRow="1">
+                <a:tableStyleId>{5C22544A-7EE6-4342-B048-85BDC9FD1C3A}</a:tableStyleId>
+              </a:tblPr>
+              <a:tblGrid>
+                <a:gridCol w="5228803">
+                  <a:extLst>
+                    <a:ext uri="{9D8B030D-6E8A-4147-A177-3AD203B41FA5}">
+                      <a16:colId xmlns:a16="http://schemas.microsoft.com/office/drawing/2014/main" val="2904378242"/>
+                    </a:ext>
+                  </a:extLst>
+                </a:gridCol>
+                <a:gridCol w="464293">
+                  <a:extLst>
+                    <a:ext uri="{9D8B030D-6E8A-4147-A177-3AD203B41FA5}">
+                      <a16:colId xmlns:a16="http://schemas.microsoft.com/office/drawing/2014/main" val="2045041980"/>
+                    </a:ext>
+                  </a:extLst>
+                </a:gridCol>
+              </a:tblGrid>
+              <a:tr h="370840">
+                <a:tc>
+                  <a:txBody>
+                    <a:bodyPr/>
+                    <a:lstStyle/>
+                    <a:p>
+                      <a:r>
+                        <a:rPr lang="fr-FR" sz="2000" dirty="0"/>
+                        <a:t>Serveur Web</a:t>
+                      </a:r>
+                    </a:p>
+                  </a:txBody>
+                  <a:tcPr>
+                    <a:noFill/>
+                  </a:tcPr>
+                </a:tc>
+                <a:tc>
+                  <a:txBody>
+                    <a:bodyPr/>
+                    <a:lstStyle/>
+                    <a:p>
+                      <a:endParaRPr lang="fr-FR" sz="2000"/>
+                    </a:p>
+                  </a:txBody>
+                  <a:tcPr>
+                    <a:noFill/>
+                  </a:tcPr>
+                </a:tc>
+                <a:extLst>
+                  <a:ext uri="{0D108BD9-81ED-4DB2-BD59-A6C34878D82A}">
+                    <a16:rowId xmlns:a16="http://schemas.microsoft.com/office/drawing/2014/main" val="3665255342"/>
+                  </a:ext>
+                </a:extLst>
+              </a:tr>
+              <a:tr h="370840">
+                <a:tc>
+                  <a:txBody>
+                    <a:bodyPr/>
+                    <a:lstStyle/>
+                    <a:p>
+                      <a:r>
+                        <a:rPr lang="fr-FR" sz="1800" dirty="0">
+                          <a:solidFill>
+                            <a:schemeClr val="bg1"/>
+                          </a:solidFill>
+                        </a:rPr>
+                        <a:t>Installation </a:t>
+                      </a:r>
+                      <a:r>
+                        <a:rPr lang="fr-FR" sz="1800" dirty="0" err="1">
+                          <a:solidFill>
+                            <a:schemeClr val="bg1"/>
+                          </a:solidFill>
+                        </a:rPr>
+                        <a:t>NodeJs</a:t>
+                      </a:r>
+                      <a:endParaRPr lang="fr-FR" sz="1800" dirty="0">
+                        <a:solidFill>
+                          <a:schemeClr val="bg1"/>
+                        </a:solidFill>
+                      </a:endParaRPr>
+                    </a:p>
+                  </a:txBody>
+                  <a:tcPr>
+                    <a:noFill/>
+                  </a:tcPr>
+                </a:tc>
+                <a:tc>
+                  <a:txBody>
+                    <a:bodyPr/>
+                    <a:lstStyle/>
+                    <a:p>
+                      <a:pPr marL="0" marR="0" lvl="0" indent="0" algn="l" defTabSz="914400" rtl="0" eaLnBrk="1" fontAlgn="auto" latinLnBrk="0" hangingPunct="1">
+                        <a:lnSpc>
+                          <a:spcPct val="100000"/>
+                        </a:lnSpc>
+                        <a:spcBef>
+                          <a:spcPts val="0"/>
+                        </a:spcBef>
+                        <a:spcAft>
+                          <a:spcPts val="0"/>
+                        </a:spcAft>
+                        <a:buClrTx/>
+                        <a:buSzTx/>
+                        <a:buFontTx/>
+                        <a:buNone/>
+                        <a:tabLst/>
+                        <a:defRPr/>
+                      </a:pPr>
+                      <a:r>
+                        <a:rPr kumimoji="0" lang="fr-FR" sz="2800" b="1" i="0" u="none" strike="noStrike" kern="1200" cap="none" spc="0" normalizeH="0" baseline="0" noProof="0" dirty="0">
+                          <a:ln>
+                            <a:noFill/>
+                          </a:ln>
+                          <a:solidFill>
+                            <a:srgbClr val="00B050"/>
+                          </a:solidFill>
+                          <a:effectLst/>
+                          <a:uLnTx/>
+                          <a:uFillTx/>
+                          <a:latin typeface="+mn-lt"/>
+                          <a:ea typeface="+mn-ea"/>
+                          <a:cs typeface="Calibri"/>
+                          <a:sym typeface="Wingdings" panose="05000000000000000000" pitchFamily="2" charset="2"/>
+                        </a:rPr>
+                        <a:t></a:t>
+                      </a:r>
+                      <a:endParaRPr kumimoji="0" lang="fr-FR" sz="1800" b="1" i="0" u="none" strike="noStrike" kern="1200" cap="none" spc="0" normalizeH="0" baseline="0" noProof="0" dirty="0">
+                        <a:ln>
+                          <a:noFill/>
+                        </a:ln>
+                        <a:solidFill>
+                          <a:srgbClr val="00B050"/>
+                        </a:solidFill>
+                        <a:effectLst/>
+                        <a:uLnTx/>
+                        <a:uFillTx/>
+                        <a:latin typeface="+mn-lt"/>
+                        <a:ea typeface="+mn-ea"/>
+                        <a:cs typeface="Calibri"/>
+                        <a:sym typeface="Wingdings" panose="05000000000000000000" pitchFamily="2" charset="2"/>
+                      </a:endParaRPr>
+                    </a:p>
+                  </a:txBody>
+                  <a:tcPr>
+                    <a:noFill/>
+                  </a:tcPr>
+                </a:tc>
+                <a:extLst>
+                  <a:ext uri="{0D108BD9-81ED-4DB2-BD59-A6C34878D82A}">
+                    <a16:rowId xmlns:a16="http://schemas.microsoft.com/office/drawing/2014/main" val="660466286"/>
+                  </a:ext>
+                </a:extLst>
+              </a:tr>
+              <a:tr h="370840">
+                <a:tc>
+                  <a:txBody>
+                    <a:bodyPr/>
+                    <a:lstStyle/>
+                    <a:p>
+                      <a:pPr marL="0" marR="0" lvl="0" indent="0" algn="l" defTabSz="914400" rtl="0" eaLnBrk="1" fontAlgn="auto" latinLnBrk="0" hangingPunct="1">
+                        <a:lnSpc>
+                          <a:spcPct val="100000"/>
+                        </a:lnSpc>
+                        <a:spcBef>
+                          <a:spcPts val="0"/>
+                        </a:spcBef>
+                        <a:spcAft>
+                          <a:spcPts val="0"/>
+                        </a:spcAft>
+                        <a:buClrTx/>
+                        <a:buSzTx/>
+                        <a:buFontTx/>
+                        <a:buNone/>
+                        <a:tabLst/>
+                        <a:defRPr/>
+                      </a:pPr>
+                      <a:r>
+                        <a:rPr lang="fr-FR" sz="1800" dirty="0">
+                          <a:solidFill>
+                            <a:schemeClr val="bg1"/>
+                          </a:solidFill>
+                        </a:rPr>
+                        <a:t>Installation .Net </a:t>
+                      </a:r>
+                      <a:r>
+                        <a:rPr lang="fr-FR" sz="1800" dirty="0" err="1">
+                          <a:solidFill>
+                            <a:schemeClr val="bg1"/>
+                          </a:solidFill>
+                        </a:rPr>
+                        <a:t>Core</a:t>
+                      </a:r>
+                      <a:endParaRPr lang="fr-FR" sz="1800" dirty="0">
+                        <a:solidFill>
+                          <a:schemeClr val="bg1"/>
+                        </a:solidFill>
+                      </a:endParaRPr>
+                    </a:p>
+                  </a:txBody>
+                  <a:tcPr>
+                    <a:noFill/>
+                  </a:tcPr>
+                </a:tc>
+                <a:tc>
+                  <a:txBody>
+                    <a:bodyPr/>
+                    <a:lstStyle/>
+                    <a:p>
+                      <a:pPr marL="0" marR="0" lvl="0" indent="0" algn="l" defTabSz="914400" rtl="0" eaLnBrk="1" fontAlgn="auto" latinLnBrk="0" hangingPunct="1">
+                        <a:lnSpc>
+                          <a:spcPct val="100000"/>
+                        </a:lnSpc>
+                        <a:spcBef>
+                          <a:spcPts val="0"/>
+                        </a:spcBef>
+                        <a:spcAft>
+                          <a:spcPts val="0"/>
+                        </a:spcAft>
+                        <a:buClrTx/>
+                        <a:buSzTx/>
+                        <a:buFontTx/>
+                        <a:buNone/>
+                        <a:tabLst/>
+                        <a:defRPr/>
+                      </a:pPr>
+                      <a:r>
+                        <a:rPr kumimoji="0" lang="fr-FR" sz="2800" b="1" i="0" u="none" strike="noStrike" kern="1200" cap="none" spc="0" normalizeH="0" baseline="0" noProof="0" dirty="0">
+                          <a:ln>
+                            <a:noFill/>
+                          </a:ln>
+                          <a:solidFill>
+                            <a:srgbClr val="00B050"/>
+                          </a:solidFill>
+                          <a:effectLst/>
+                          <a:uLnTx/>
+                          <a:uFillTx/>
+                          <a:latin typeface="+mn-lt"/>
+                          <a:ea typeface="+mn-ea"/>
+                          <a:cs typeface="Calibri"/>
+                          <a:sym typeface="Wingdings" panose="05000000000000000000" pitchFamily="2" charset="2"/>
+                        </a:rPr>
+                        <a:t></a:t>
+                      </a:r>
+                      <a:endParaRPr kumimoji="0" lang="fr-FR" sz="1800" b="1" i="0" u="none" strike="noStrike" kern="1200" cap="none" spc="0" normalizeH="0" baseline="0" noProof="0" dirty="0">
+                        <a:ln>
+                          <a:noFill/>
+                        </a:ln>
+                        <a:solidFill>
+                          <a:srgbClr val="00B050"/>
+                        </a:solidFill>
+                        <a:effectLst/>
+                        <a:uLnTx/>
+                        <a:uFillTx/>
+                        <a:latin typeface="+mn-lt"/>
+                        <a:ea typeface="+mn-ea"/>
+                        <a:cs typeface="Calibri"/>
+                        <a:sym typeface="Wingdings" panose="05000000000000000000" pitchFamily="2" charset="2"/>
+                      </a:endParaRPr>
+                    </a:p>
+                  </a:txBody>
+                  <a:tcPr>
+                    <a:noFill/>
+                  </a:tcPr>
+                </a:tc>
+                <a:extLst>
+                  <a:ext uri="{0D108BD9-81ED-4DB2-BD59-A6C34878D82A}">
+                    <a16:rowId xmlns:a16="http://schemas.microsoft.com/office/drawing/2014/main" val="1363299400"/>
+                  </a:ext>
+                </a:extLst>
+              </a:tr>
+              <a:tr h="370840">
+                <a:tc>
+                  <a:txBody>
+                    <a:bodyPr/>
+                    <a:lstStyle/>
+                    <a:p>
+                      <a:pPr marL="0" marR="0" lvl="0" indent="0" algn="l" defTabSz="914400" rtl="0" eaLnBrk="1" fontAlgn="auto" latinLnBrk="0" hangingPunct="1">
+                        <a:lnSpc>
+                          <a:spcPct val="100000"/>
+                        </a:lnSpc>
+                        <a:spcBef>
+                          <a:spcPts val="0"/>
+                        </a:spcBef>
+                        <a:spcAft>
+                          <a:spcPts val="0"/>
+                        </a:spcAft>
+                        <a:buClrTx/>
+                        <a:buSzTx/>
+                        <a:buFontTx/>
+                        <a:buNone/>
+                        <a:tabLst/>
+                        <a:defRPr/>
+                      </a:pPr>
+                      <a:r>
+                        <a:rPr lang="fr-FR" sz="1800" dirty="0">
+                          <a:solidFill>
+                            <a:schemeClr val="bg1"/>
+                          </a:solidFill>
+                        </a:rPr>
+                        <a:t>Configuration IIS</a:t>
+                      </a:r>
+                    </a:p>
+                  </a:txBody>
+                  <a:tcPr>
+                    <a:noFill/>
+                  </a:tcPr>
+                </a:tc>
+                <a:tc>
+                  <a:txBody>
+                    <a:bodyPr/>
+                    <a:lstStyle/>
+                    <a:p>
+                      <a:pPr marL="0" marR="0" lvl="0" indent="0" algn="l" defTabSz="914400" rtl="0" eaLnBrk="1" fontAlgn="auto" latinLnBrk="0" hangingPunct="1">
+                        <a:lnSpc>
+                          <a:spcPct val="100000"/>
+                        </a:lnSpc>
+                        <a:spcBef>
+                          <a:spcPts val="0"/>
+                        </a:spcBef>
+                        <a:spcAft>
+                          <a:spcPts val="0"/>
+                        </a:spcAft>
+                        <a:buClrTx/>
+                        <a:buSzTx/>
+                        <a:buFontTx/>
+                        <a:buNone/>
+                        <a:tabLst/>
+                        <a:defRPr/>
+                      </a:pPr>
+                      <a:r>
+                        <a:rPr kumimoji="0" lang="fr-FR" sz="2800" b="1" i="0" u="none" strike="noStrike" kern="1200" cap="none" spc="0" normalizeH="0" baseline="0" noProof="0" dirty="0">
+                          <a:ln>
+                            <a:noFill/>
+                          </a:ln>
+                          <a:solidFill>
+                            <a:srgbClr val="00B050"/>
+                          </a:solidFill>
+                          <a:effectLst/>
+                          <a:uLnTx/>
+                          <a:uFillTx/>
+                          <a:latin typeface="+mn-lt"/>
+                          <a:ea typeface="+mn-ea"/>
+                          <a:cs typeface="Calibri"/>
+                          <a:sym typeface="Wingdings" panose="05000000000000000000" pitchFamily="2" charset="2"/>
+                        </a:rPr>
+                        <a:t></a:t>
+                      </a:r>
+                      <a:endParaRPr kumimoji="0" lang="fr-FR" sz="1800" b="1" i="0" u="none" strike="noStrike" kern="1200" cap="none" spc="0" normalizeH="0" baseline="0" noProof="0" dirty="0">
+                        <a:ln>
+                          <a:noFill/>
+                        </a:ln>
+                        <a:solidFill>
+                          <a:srgbClr val="00B050"/>
+                        </a:solidFill>
+                        <a:effectLst/>
+                        <a:uLnTx/>
+                        <a:uFillTx/>
+                        <a:latin typeface="+mn-lt"/>
+                        <a:ea typeface="+mn-ea"/>
+                        <a:cs typeface="Calibri"/>
+                        <a:sym typeface="Wingdings" panose="05000000000000000000" pitchFamily="2" charset="2"/>
+                      </a:endParaRPr>
+                    </a:p>
+                  </a:txBody>
+                  <a:tcPr>
+                    <a:noFill/>
+                  </a:tcPr>
+                </a:tc>
+                <a:extLst>
+                  <a:ext uri="{0D108BD9-81ED-4DB2-BD59-A6C34878D82A}">
+                    <a16:rowId xmlns:a16="http://schemas.microsoft.com/office/drawing/2014/main" val="2734971059"/>
+                  </a:ext>
+                </a:extLst>
+              </a:tr>
+              <a:tr h="370840">
+                <a:tc>
+                  <a:txBody>
+                    <a:bodyPr/>
+                    <a:lstStyle/>
+                    <a:p>
+                      <a:r>
+                        <a:rPr lang="fr-FR" sz="1800" dirty="0">
+                          <a:solidFill>
+                            <a:schemeClr val="bg1"/>
+                          </a:solidFill>
+                        </a:rPr>
+                        <a:t>Installation/Configuration de PhpMyAdmin 4</a:t>
+                      </a:r>
+                    </a:p>
+                  </a:txBody>
+                  <a:tcPr>
+                    <a:noFill/>
+                  </a:tcPr>
+                </a:tc>
+                <a:tc>
+                  <a:txBody>
+                    <a:bodyPr/>
+                    <a:lstStyle/>
+                    <a:p>
+                      <a:pPr marL="0" marR="0" lvl="0" indent="0" algn="l" defTabSz="914400" rtl="0" eaLnBrk="1" fontAlgn="auto" latinLnBrk="0" hangingPunct="1">
+                        <a:lnSpc>
+                          <a:spcPct val="100000"/>
+                        </a:lnSpc>
+                        <a:spcBef>
+                          <a:spcPts val="0"/>
+                        </a:spcBef>
+                        <a:spcAft>
+                          <a:spcPts val="0"/>
+                        </a:spcAft>
+                        <a:buClrTx/>
+                        <a:buSzTx/>
+                        <a:buFontTx/>
+                        <a:buNone/>
+                        <a:tabLst/>
+                        <a:defRPr/>
+                      </a:pPr>
+                      <a:r>
+                        <a:rPr kumimoji="0" lang="fr-FR" sz="2800" b="1" i="0" u="none" strike="noStrike" kern="1200" cap="none" spc="0" normalizeH="0" baseline="0" noProof="0" dirty="0">
+                          <a:ln>
+                            <a:noFill/>
+                          </a:ln>
+                          <a:solidFill>
+                            <a:srgbClr val="00B050"/>
+                          </a:solidFill>
+                          <a:effectLst/>
+                          <a:uLnTx/>
+                          <a:uFillTx/>
+                          <a:latin typeface="+mn-lt"/>
+                          <a:ea typeface="+mn-ea"/>
+                          <a:cs typeface="Calibri"/>
+                          <a:sym typeface="Wingdings" panose="05000000000000000000" pitchFamily="2" charset="2"/>
+                        </a:rPr>
+                        <a:t></a:t>
+                      </a:r>
+                      <a:endParaRPr kumimoji="0" lang="fr-FR" sz="1800" b="1" i="0" u="none" strike="noStrike" kern="1200" cap="none" spc="0" normalizeH="0" baseline="0" noProof="0" dirty="0">
+                        <a:ln>
+                          <a:noFill/>
+                        </a:ln>
+                        <a:solidFill>
+                          <a:srgbClr val="00B050"/>
+                        </a:solidFill>
+                        <a:effectLst/>
+                        <a:uLnTx/>
+                        <a:uFillTx/>
+                        <a:latin typeface="+mn-lt"/>
+                        <a:ea typeface="+mn-ea"/>
+                        <a:cs typeface="Calibri"/>
+                        <a:sym typeface="Wingdings" panose="05000000000000000000" pitchFamily="2" charset="2"/>
+                      </a:endParaRPr>
+                    </a:p>
+                  </a:txBody>
+                  <a:tcPr>
+                    <a:noFill/>
+                  </a:tcPr>
+                </a:tc>
+                <a:extLst>
+                  <a:ext uri="{0D108BD9-81ED-4DB2-BD59-A6C34878D82A}">
+                    <a16:rowId xmlns:a16="http://schemas.microsoft.com/office/drawing/2014/main" val="1035230644"/>
+                  </a:ext>
+                </a:extLst>
+              </a:tr>
+              <a:tr h="460143">
+                <a:tc>
+                  <a:txBody>
+                    <a:bodyPr/>
+                    <a:lstStyle/>
+                    <a:p>
+                      <a:r>
+                        <a:rPr lang="fr-FR" sz="1800" dirty="0">
+                          <a:solidFill>
+                            <a:schemeClr val="bg1"/>
+                          </a:solidFill>
+                        </a:rPr>
+                        <a:t>Ouverture des ports 80, 8081, 8082</a:t>
+                      </a:r>
+                    </a:p>
+                  </a:txBody>
+                  <a:tcPr>
+                    <a:noFill/>
+                  </a:tcPr>
+                </a:tc>
+                <a:tc>
+                  <a:txBody>
+                    <a:bodyPr/>
+                    <a:lstStyle/>
+                    <a:p>
+                      <a:pPr marL="0" marR="0" lvl="0" indent="0" algn="l" defTabSz="914400" rtl="0" eaLnBrk="1" fontAlgn="auto" latinLnBrk="0" hangingPunct="1">
+                        <a:lnSpc>
+                          <a:spcPct val="100000"/>
+                        </a:lnSpc>
+                        <a:spcBef>
+                          <a:spcPts val="0"/>
+                        </a:spcBef>
+                        <a:spcAft>
+                          <a:spcPts val="0"/>
+                        </a:spcAft>
+                        <a:buClrTx/>
+                        <a:buSzTx/>
+                        <a:buFontTx/>
+                        <a:buNone/>
+                        <a:tabLst/>
+                        <a:defRPr/>
+                      </a:pPr>
+                      <a:r>
+                        <a:rPr lang="fr-FR" sz="2800" b="1" kern="1200" dirty="0">
+                          <a:solidFill>
+                            <a:schemeClr val="accent4"/>
+                          </a:solidFill>
+                          <a:latin typeface="+mn-lt"/>
+                          <a:ea typeface="+mn-ea"/>
+                          <a:cs typeface="Calibri"/>
+                          <a:sym typeface="Wingdings" panose="05000000000000000000" pitchFamily="2" charset="2"/>
+                        </a:rPr>
+                        <a:t></a:t>
+                      </a:r>
+                      <a:endParaRPr lang="fr-FR" sz="2800" b="1" dirty="0">
+                        <a:solidFill>
+                          <a:schemeClr val="accent4"/>
+                        </a:solidFill>
+                      </a:endParaRPr>
+                    </a:p>
+                  </a:txBody>
+                  <a:tcPr>
+                    <a:noFill/>
+                  </a:tcPr>
+                </a:tc>
+                <a:extLst>
+                  <a:ext uri="{0D108BD9-81ED-4DB2-BD59-A6C34878D82A}">
+                    <a16:rowId xmlns:a16="http://schemas.microsoft.com/office/drawing/2014/main" val="1132552388"/>
+                  </a:ext>
+                </a:extLst>
+              </a:tr>
+              <a:tr h="370840">
+                <a:tc>
+                  <a:txBody>
+                    <a:bodyPr/>
+                    <a:lstStyle/>
+                    <a:p>
+                      <a:r>
+                        <a:rPr lang="fr-FR" sz="1800" dirty="0">
+                          <a:solidFill>
+                            <a:schemeClr val="bg1"/>
+                          </a:solidFill>
+                        </a:rPr>
+                        <a:t>Installation broker d’un client MQTT</a:t>
+                      </a:r>
+                    </a:p>
+                  </a:txBody>
+                  <a:tcPr>
+                    <a:noFill/>
+                  </a:tcPr>
+                </a:tc>
+                <a:tc>
+                  <a:txBody>
+                    <a:bodyPr/>
+                    <a:lstStyle/>
+                    <a:p>
+                      <a:pPr marL="0" marR="0" lvl="0" indent="0" algn="l" defTabSz="914400" rtl="0" eaLnBrk="1" fontAlgn="auto" latinLnBrk="0" hangingPunct="1">
+                        <a:lnSpc>
+                          <a:spcPct val="100000"/>
+                        </a:lnSpc>
+                        <a:spcBef>
+                          <a:spcPts val="0"/>
+                        </a:spcBef>
+                        <a:spcAft>
+                          <a:spcPts val="0"/>
+                        </a:spcAft>
+                        <a:buClrTx/>
+                        <a:buSzTx/>
+                        <a:buFontTx/>
+                        <a:buNone/>
+                        <a:tabLst/>
+                        <a:defRPr/>
+                      </a:pPr>
+                      <a:r>
+                        <a:rPr kumimoji="0" lang="fr-FR" sz="2800" b="1" i="0" u="none" strike="noStrike" kern="1200" cap="none" spc="0" normalizeH="0" baseline="0" noProof="0" dirty="0">
+                          <a:ln>
+                            <a:noFill/>
+                          </a:ln>
+                          <a:solidFill>
+                            <a:srgbClr val="00B050"/>
+                          </a:solidFill>
+                          <a:effectLst/>
+                          <a:uLnTx/>
+                          <a:uFillTx/>
+                          <a:latin typeface="+mn-lt"/>
+                          <a:ea typeface="+mn-ea"/>
+                          <a:cs typeface="Calibri"/>
+                          <a:sym typeface="Wingdings" panose="05000000000000000000" pitchFamily="2" charset="2"/>
+                        </a:rPr>
+                        <a:t></a:t>
+                      </a:r>
+                      <a:endParaRPr kumimoji="0" lang="fr-FR" sz="1800" b="1" i="0" u="none" strike="noStrike" kern="1200" cap="none" spc="0" normalizeH="0" baseline="0" noProof="0" dirty="0">
+                        <a:ln>
+                          <a:noFill/>
+                        </a:ln>
+                        <a:solidFill>
+                          <a:srgbClr val="00B050"/>
+                        </a:solidFill>
+                        <a:effectLst/>
+                        <a:uLnTx/>
+                        <a:uFillTx/>
+                        <a:latin typeface="+mn-lt"/>
+                        <a:ea typeface="+mn-ea"/>
+                        <a:cs typeface="Calibri"/>
+                        <a:sym typeface="Wingdings" panose="05000000000000000000" pitchFamily="2" charset="2"/>
+                      </a:endParaRPr>
+                    </a:p>
+                  </a:txBody>
+                  <a:tcPr>
+                    <a:noFill/>
+                  </a:tcPr>
+                </a:tc>
+                <a:extLst>
+                  <a:ext uri="{0D108BD9-81ED-4DB2-BD59-A6C34878D82A}">
+                    <a16:rowId xmlns:a16="http://schemas.microsoft.com/office/drawing/2014/main" val="1051618852"/>
+                  </a:ext>
+                </a:extLst>
+              </a:tr>
+              <a:tr h="370840">
+                <a:tc>
+                  <a:txBody>
+                    <a:bodyPr/>
+                    <a:lstStyle/>
+                    <a:p>
+                      <a:r>
+                        <a:rPr lang="fr-FR" sz="1800" dirty="0">
+                          <a:solidFill>
+                            <a:schemeClr val="bg1"/>
+                          </a:solidFill>
+                        </a:rPr>
+                        <a:t>Configuration de </a:t>
+                      </a:r>
+                      <a:r>
+                        <a:rPr lang="fr-FR" sz="1800" dirty="0" err="1">
+                          <a:solidFill>
+                            <a:schemeClr val="bg1"/>
+                          </a:solidFill>
+                        </a:rPr>
+                        <a:t>Let’s</a:t>
+                      </a:r>
+                      <a:r>
+                        <a:rPr lang="fr-FR" sz="1800" dirty="0">
+                          <a:solidFill>
+                            <a:schemeClr val="bg1"/>
+                          </a:solidFill>
+                        </a:rPr>
+                        <a:t> </a:t>
+                      </a:r>
+                      <a:r>
+                        <a:rPr lang="fr-FR" sz="1800" dirty="0" err="1">
+                          <a:solidFill>
+                            <a:schemeClr val="bg1"/>
+                          </a:solidFill>
+                        </a:rPr>
+                        <a:t>Encpryt</a:t>
+                      </a:r>
+                      <a:r>
+                        <a:rPr lang="fr-FR" sz="1800" dirty="0">
+                          <a:solidFill>
+                            <a:schemeClr val="bg1"/>
+                          </a:solidFill>
+                        </a:rPr>
+                        <a:t> pour TLS</a:t>
+                      </a:r>
+                    </a:p>
+                  </a:txBody>
+                  <a:tcPr>
+                    <a:noFill/>
+                  </a:tcPr>
+                </a:tc>
+                <a:tc>
+                  <a:txBody>
+                    <a:bodyPr/>
+                    <a:lstStyle/>
+                    <a:p>
+                      <a:pPr marL="0" marR="0" lvl="0" indent="0" algn="l" defTabSz="914400" rtl="0" eaLnBrk="1" fontAlgn="auto" latinLnBrk="0" hangingPunct="1">
+                        <a:lnSpc>
+                          <a:spcPct val="100000"/>
+                        </a:lnSpc>
+                        <a:spcBef>
+                          <a:spcPts val="0"/>
+                        </a:spcBef>
+                        <a:spcAft>
+                          <a:spcPts val="0"/>
+                        </a:spcAft>
+                        <a:buClrTx/>
+                        <a:buSzTx/>
+                        <a:buFontTx/>
+                        <a:buNone/>
+                        <a:tabLst/>
+                        <a:defRPr/>
+                      </a:pPr>
+                      <a:r>
+                        <a:rPr lang="fr-FR" sz="2800" b="1" kern="1200" dirty="0">
+                          <a:solidFill>
+                            <a:schemeClr val="accent4"/>
+                          </a:solidFill>
+                          <a:latin typeface="+mn-lt"/>
+                          <a:ea typeface="+mn-ea"/>
+                          <a:cs typeface="Calibri"/>
+                          <a:sym typeface="Wingdings" panose="05000000000000000000" pitchFamily="2" charset="2"/>
+                        </a:rPr>
+                        <a:t></a:t>
+                      </a:r>
+                      <a:endParaRPr lang="fr-FR" sz="2800" b="1" dirty="0">
+                        <a:solidFill>
+                          <a:schemeClr val="accent4"/>
+                        </a:solidFill>
+                      </a:endParaRPr>
+                    </a:p>
+                  </a:txBody>
+                  <a:tcPr>
+                    <a:noFill/>
+                  </a:tcPr>
+                </a:tc>
+                <a:extLst>
+                  <a:ext uri="{0D108BD9-81ED-4DB2-BD59-A6C34878D82A}">
+                    <a16:rowId xmlns:a16="http://schemas.microsoft.com/office/drawing/2014/main" val="42255930"/>
+                  </a:ext>
+                </a:extLst>
+              </a:tr>
+              <a:tr h="370840">
+                <a:tc>
+                  <a:txBody>
+                    <a:bodyPr/>
+                    <a:lstStyle/>
+                    <a:p>
+                      <a:pPr marL="0" marR="0" lvl="0" indent="0" algn="l" defTabSz="914400" rtl="0" eaLnBrk="1" fontAlgn="auto" latinLnBrk="0" hangingPunct="1">
+                        <a:lnSpc>
+                          <a:spcPct val="100000"/>
+                        </a:lnSpc>
+                        <a:spcBef>
+                          <a:spcPts val="0"/>
+                        </a:spcBef>
+                        <a:spcAft>
+                          <a:spcPts val="0"/>
+                        </a:spcAft>
+                        <a:buClrTx/>
+                        <a:buSzTx/>
+                        <a:buFontTx/>
+                        <a:buNone/>
+                        <a:tabLst/>
+                        <a:defRPr/>
+                      </a:pPr>
+                      <a:r>
+                        <a:rPr lang="fr-FR" sz="1800" dirty="0">
+                          <a:solidFill>
+                            <a:schemeClr val="bg1"/>
+                          </a:solidFill>
+                        </a:rPr>
+                        <a:t>Tâche planifiée : mise à jour du projet Smart </a:t>
+                      </a:r>
+                      <a:r>
+                        <a:rPr lang="fr-FR" sz="1800" dirty="0" err="1">
+                          <a:solidFill>
+                            <a:schemeClr val="bg1"/>
+                          </a:solidFill>
+                        </a:rPr>
+                        <a:t>Ecovid</a:t>
+                      </a:r>
+                      <a:r>
+                        <a:rPr lang="fr-FR" sz="1800" dirty="0">
+                          <a:solidFill>
+                            <a:schemeClr val="bg1"/>
+                          </a:solidFill>
+                        </a:rPr>
+                        <a:t> + Webservices</a:t>
+                      </a:r>
+                    </a:p>
+                  </a:txBody>
+                  <a:tcPr>
+                    <a:noFill/>
+                  </a:tcPr>
+                </a:tc>
+                <a:tc>
+                  <a:txBody>
+                    <a:bodyPr/>
+                    <a:lstStyle/>
+                    <a:p>
+                      <a:pPr marL="0" marR="0" lvl="0" indent="0" algn="l" defTabSz="914400" rtl="0" eaLnBrk="1" fontAlgn="auto" latinLnBrk="0" hangingPunct="1">
+                        <a:lnSpc>
+                          <a:spcPct val="100000"/>
+                        </a:lnSpc>
+                        <a:spcBef>
+                          <a:spcPts val="0"/>
+                        </a:spcBef>
+                        <a:spcAft>
+                          <a:spcPts val="0"/>
+                        </a:spcAft>
+                        <a:buClrTx/>
+                        <a:buSzTx/>
+                        <a:buFontTx/>
+                        <a:buNone/>
+                        <a:tabLst/>
+                        <a:defRPr/>
+                      </a:pPr>
+                      <a:r>
+                        <a:rPr lang="fr-FR" sz="2800" b="1" kern="1200" dirty="0">
+                          <a:solidFill>
+                            <a:schemeClr val="accent4"/>
+                          </a:solidFill>
+                          <a:latin typeface="+mn-lt"/>
+                          <a:ea typeface="+mn-ea"/>
+                          <a:cs typeface="Calibri"/>
+                          <a:sym typeface="Wingdings" panose="05000000000000000000" pitchFamily="2" charset="2"/>
+                        </a:rPr>
+                        <a:t></a:t>
+                      </a:r>
+                      <a:endParaRPr lang="fr-FR" sz="2800" b="1" dirty="0">
+                        <a:solidFill>
+                          <a:schemeClr val="accent4"/>
+                        </a:solidFill>
+                      </a:endParaRPr>
+                    </a:p>
+                  </a:txBody>
+                  <a:tcPr>
+                    <a:noFill/>
+                  </a:tcPr>
+                </a:tc>
+                <a:extLst>
+                  <a:ext uri="{0D108BD9-81ED-4DB2-BD59-A6C34878D82A}">
+                    <a16:rowId xmlns:a16="http://schemas.microsoft.com/office/drawing/2014/main" val="1061189645"/>
+                  </a:ext>
+                </a:extLst>
+              </a:tr>
+            </a:tbl>
+          </a:graphicData>
+        </a:graphic>
+      </p:graphicFrame>
+      <p:graphicFrame>
+        <p:nvGraphicFramePr>
+          <p:cNvPr id="71" name="Tableau 7">
+            <a:extLst>
+              <a:ext uri="{FF2B5EF4-FFF2-40B4-BE49-F238E27FC236}">
+                <a16:creationId xmlns:a16="http://schemas.microsoft.com/office/drawing/2014/main" id="{26FC625A-A5C9-424E-ABBF-DB053C723A14}"/>
+              </a:ext>
+            </a:extLst>
+          </p:cNvPr>
+          <p:cNvGraphicFramePr>
+            <a:graphicFrameLocks noGrp="1"/>
+          </p:cNvGraphicFramePr>
+          <p:nvPr>
+            <p:extLst>
+              <p:ext uri="{D42A27DB-BD31-4B8C-83A1-F6EECF244321}">
+                <p14:modId xmlns:p14="http://schemas.microsoft.com/office/powerpoint/2010/main" val="1992518732"/>
+              </p:ext>
+            </p:extLst>
+          </p:nvPr>
+        </p:nvGraphicFramePr>
+        <p:xfrm>
+          <a:off x="6291564" y="1864907"/>
+          <a:ext cx="5693096" cy="2468880"/>
+        </p:xfrm>
+        <a:graphic>
+          <a:graphicData uri="http://schemas.openxmlformats.org/drawingml/2006/table">
+            <a:tbl>
+              <a:tblPr firstRow="1" bandRow="1">
+                <a:tableStyleId>{5C22544A-7EE6-4342-B048-85BDC9FD1C3A}</a:tableStyleId>
+              </a:tblPr>
+              <a:tblGrid>
+                <a:gridCol w="4991811">
+                  <a:extLst>
+                    <a:ext uri="{9D8B030D-6E8A-4147-A177-3AD203B41FA5}">
+                      <a16:colId xmlns:a16="http://schemas.microsoft.com/office/drawing/2014/main" val="2904378242"/>
+                    </a:ext>
+                  </a:extLst>
+                </a:gridCol>
+                <a:gridCol w="701285">
+                  <a:extLst>
+                    <a:ext uri="{9D8B030D-6E8A-4147-A177-3AD203B41FA5}">
+                      <a16:colId xmlns:a16="http://schemas.microsoft.com/office/drawing/2014/main" val="2045041980"/>
+                    </a:ext>
+                  </a:extLst>
+                </a:gridCol>
+              </a:tblGrid>
+              <a:tr h="370840">
+                <a:tc>
+                  <a:txBody>
+                    <a:bodyPr/>
+                    <a:lstStyle/>
+                    <a:p>
+                      <a:r>
+                        <a:rPr lang="fr-FR" sz="2000" dirty="0"/>
+                        <a:t>Serveur de base de données </a:t>
+                      </a:r>
+                    </a:p>
+                  </a:txBody>
+                  <a:tcPr>
+                    <a:noFill/>
+                  </a:tcPr>
+                </a:tc>
+                <a:tc>
+                  <a:txBody>
+                    <a:bodyPr/>
+                    <a:lstStyle/>
+                    <a:p>
+                      <a:endParaRPr lang="fr-FR" sz="2000"/>
+                    </a:p>
+                  </a:txBody>
+                  <a:tcPr>
+                    <a:noFill/>
+                  </a:tcPr>
+                </a:tc>
+                <a:extLst>
+                  <a:ext uri="{0D108BD9-81ED-4DB2-BD59-A6C34878D82A}">
+                    <a16:rowId xmlns:a16="http://schemas.microsoft.com/office/drawing/2014/main" val="3665255342"/>
+                  </a:ext>
+                </a:extLst>
+              </a:tr>
+              <a:tr h="370840">
+                <a:tc>
+                  <a:txBody>
+                    <a:bodyPr/>
+                    <a:lstStyle/>
+                    <a:p>
+                      <a:r>
+                        <a:rPr lang="fr-FR" sz="1800" dirty="0">
+                          <a:solidFill>
+                            <a:schemeClr val="bg1"/>
+                          </a:solidFill>
+                        </a:rPr>
+                        <a:t>Configuration d’open-</a:t>
+                      </a:r>
+                      <a:r>
+                        <a:rPr lang="fr-FR" sz="1800" dirty="0" err="1">
+                          <a:solidFill>
+                            <a:schemeClr val="bg1"/>
+                          </a:solidFill>
+                        </a:rPr>
+                        <a:t>Ssh</a:t>
+                      </a:r>
+                      <a:r>
+                        <a:rPr lang="fr-FR" sz="1800" dirty="0">
+                          <a:solidFill>
+                            <a:schemeClr val="bg1"/>
+                          </a:solidFill>
+                        </a:rPr>
+                        <a:t> </a:t>
+                      </a:r>
+                    </a:p>
+                  </a:txBody>
+                  <a:tcPr>
+                    <a:noFill/>
+                  </a:tcPr>
+                </a:tc>
+                <a:tc>
+                  <a:txBody>
+                    <a:bodyPr/>
+                    <a:lstStyle/>
+                    <a:p>
+                      <a:pPr marL="0" marR="0" lvl="0" indent="0" algn="l" defTabSz="914400" rtl="0" eaLnBrk="1" fontAlgn="auto" latinLnBrk="0" hangingPunct="1">
+                        <a:lnSpc>
+                          <a:spcPct val="100000"/>
+                        </a:lnSpc>
+                        <a:spcBef>
+                          <a:spcPts val="0"/>
+                        </a:spcBef>
+                        <a:spcAft>
+                          <a:spcPts val="0"/>
+                        </a:spcAft>
+                        <a:buClrTx/>
+                        <a:buSzTx/>
+                        <a:buFontTx/>
+                        <a:buNone/>
+                        <a:tabLst/>
+                        <a:defRPr/>
+                      </a:pPr>
+                      <a:r>
+                        <a:rPr lang="fr-FR" sz="2800" b="1" kern="1200" dirty="0">
+                          <a:solidFill>
+                            <a:srgbClr val="00B050"/>
+                          </a:solidFill>
+                          <a:latin typeface="+mn-lt"/>
+                          <a:ea typeface="+mn-ea"/>
+                          <a:cs typeface="Calibri"/>
+                          <a:sym typeface="Wingdings" panose="05000000000000000000" pitchFamily="2" charset="2"/>
+                        </a:rPr>
+                        <a:t></a:t>
+                      </a:r>
+                      <a:endParaRPr lang="fr-FR" sz="1800" b="1" kern="1200" dirty="0">
+                        <a:solidFill>
+                          <a:srgbClr val="00B050"/>
+                        </a:solidFill>
+                        <a:latin typeface="+mn-lt"/>
+                        <a:ea typeface="+mn-ea"/>
+                        <a:cs typeface="Calibri"/>
+                        <a:sym typeface="Wingdings" panose="05000000000000000000" pitchFamily="2" charset="2"/>
+                      </a:endParaRPr>
+                    </a:p>
+                  </a:txBody>
+                  <a:tcPr>
+                    <a:noFill/>
+                  </a:tcPr>
+                </a:tc>
+                <a:extLst>
+                  <a:ext uri="{0D108BD9-81ED-4DB2-BD59-A6C34878D82A}">
+                    <a16:rowId xmlns:a16="http://schemas.microsoft.com/office/drawing/2014/main" val="660466286"/>
+                  </a:ext>
+                </a:extLst>
+              </a:tr>
+              <a:tr h="370840">
+                <a:tc>
+                  <a:txBody>
+                    <a:bodyPr/>
+                    <a:lstStyle/>
+                    <a:p>
+                      <a:pPr marL="0" marR="0" lvl="0" indent="0" algn="l" defTabSz="914400" rtl="0" eaLnBrk="1" fontAlgn="auto" latinLnBrk="0" hangingPunct="1">
+                        <a:lnSpc>
+                          <a:spcPct val="100000"/>
+                        </a:lnSpc>
+                        <a:spcBef>
+                          <a:spcPts val="0"/>
+                        </a:spcBef>
+                        <a:spcAft>
+                          <a:spcPts val="0"/>
+                        </a:spcAft>
+                        <a:buClrTx/>
+                        <a:buSzTx/>
+                        <a:buFontTx/>
+                        <a:buNone/>
+                        <a:tabLst/>
+                        <a:defRPr/>
+                      </a:pPr>
+                      <a:r>
+                        <a:rPr lang="fr-FR" sz="1800" dirty="0">
+                          <a:solidFill>
+                            <a:schemeClr val="bg1"/>
+                          </a:solidFill>
+                        </a:rPr>
+                        <a:t>Configuration d’</a:t>
+                      </a:r>
+                      <a:r>
+                        <a:rPr lang="fr-FR" sz="1800" dirty="0" err="1">
+                          <a:solidFill>
+                            <a:schemeClr val="bg1"/>
+                          </a:solidFill>
+                        </a:rPr>
+                        <a:t>iptables</a:t>
+                      </a:r>
+                      <a:endParaRPr lang="fr-FR" sz="1800" dirty="0">
+                        <a:solidFill>
+                          <a:schemeClr val="bg1"/>
+                        </a:solidFill>
+                      </a:endParaRPr>
+                    </a:p>
+                  </a:txBody>
+                  <a:tcPr>
+                    <a:noFill/>
+                  </a:tcPr>
+                </a:tc>
+                <a:tc>
+                  <a:txBody>
+                    <a:bodyPr/>
+                    <a:lstStyle/>
+                    <a:p>
+                      <a:pPr marL="0" marR="0" lvl="0" indent="0" algn="l" defTabSz="914400" rtl="0" eaLnBrk="1" fontAlgn="auto" latinLnBrk="0" hangingPunct="1">
+                        <a:lnSpc>
+                          <a:spcPct val="100000"/>
+                        </a:lnSpc>
+                        <a:spcBef>
+                          <a:spcPts val="0"/>
+                        </a:spcBef>
+                        <a:spcAft>
+                          <a:spcPts val="0"/>
+                        </a:spcAft>
+                        <a:buClrTx/>
+                        <a:buSzTx/>
+                        <a:buFontTx/>
+                        <a:buNone/>
+                        <a:tabLst/>
+                        <a:defRPr/>
+                      </a:pPr>
+                      <a:r>
+                        <a:rPr kumimoji="0" lang="fr-FR" sz="2800" b="1" i="0" u="none" strike="noStrike" kern="1200" cap="none" spc="0" normalizeH="0" baseline="0" noProof="0" dirty="0">
+                          <a:ln>
+                            <a:noFill/>
+                          </a:ln>
+                          <a:solidFill>
+                            <a:srgbClr val="00B050"/>
+                          </a:solidFill>
+                          <a:effectLst/>
+                          <a:uLnTx/>
+                          <a:uFillTx/>
+                          <a:latin typeface="+mn-lt"/>
+                          <a:ea typeface="+mn-ea"/>
+                          <a:cs typeface="Calibri"/>
+                          <a:sym typeface="Wingdings" panose="05000000000000000000" pitchFamily="2" charset="2"/>
+                        </a:rPr>
+                        <a:t></a:t>
+                      </a:r>
+                      <a:endParaRPr kumimoji="0" lang="fr-FR" sz="1800" b="1" i="0" u="none" strike="noStrike" kern="1200" cap="none" spc="0" normalizeH="0" baseline="0" noProof="0" dirty="0">
+                        <a:ln>
+                          <a:noFill/>
+                        </a:ln>
+                        <a:solidFill>
+                          <a:srgbClr val="00B050"/>
+                        </a:solidFill>
+                        <a:effectLst/>
+                        <a:uLnTx/>
+                        <a:uFillTx/>
+                        <a:latin typeface="+mn-lt"/>
+                        <a:ea typeface="+mn-ea"/>
+                        <a:cs typeface="Calibri"/>
+                        <a:sym typeface="Wingdings" panose="05000000000000000000" pitchFamily="2" charset="2"/>
+                      </a:endParaRPr>
+                    </a:p>
+                  </a:txBody>
+                  <a:tcPr>
+                    <a:noFill/>
+                  </a:tcPr>
+                </a:tc>
+                <a:extLst>
+                  <a:ext uri="{0D108BD9-81ED-4DB2-BD59-A6C34878D82A}">
+                    <a16:rowId xmlns:a16="http://schemas.microsoft.com/office/drawing/2014/main" val="1363299400"/>
+                  </a:ext>
+                </a:extLst>
+              </a:tr>
+              <a:tr h="370840">
+                <a:tc>
+                  <a:txBody>
+                    <a:bodyPr/>
+                    <a:lstStyle/>
+                    <a:p>
+                      <a:pPr marL="0" marR="0" lvl="0" indent="0" algn="l" defTabSz="914400" rtl="0" eaLnBrk="1" fontAlgn="auto" latinLnBrk="0" hangingPunct="1">
+                        <a:lnSpc>
+                          <a:spcPct val="100000"/>
+                        </a:lnSpc>
+                        <a:spcBef>
+                          <a:spcPts val="0"/>
+                        </a:spcBef>
+                        <a:spcAft>
+                          <a:spcPts val="0"/>
+                        </a:spcAft>
+                        <a:buClrTx/>
+                        <a:buSzTx/>
+                        <a:buFontTx/>
+                        <a:buNone/>
+                        <a:tabLst/>
+                        <a:defRPr/>
+                      </a:pPr>
+                      <a:r>
+                        <a:rPr lang="fr-FR" sz="1800" dirty="0">
+                          <a:solidFill>
+                            <a:schemeClr val="bg1"/>
+                          </a:solidFill>
+                        </a:rPr>
+                        <a:t>Configuration IIS</a:t>
+                      </a:r>
+                    </a:p>
+                  </a:txBody>
+                  <a:tcPr>
+                    <a:noFill/>
+                  </a:tcPr>
+                </a:tc>
+                <a:tc>
+                  <a:txBody>
+                    <a:bodyPr/>
+                    <a:lstStyle/>
+                    <a:p>
+                      <a:pPr marL="0" marR="0" lvl="0" indent="0" algn="l" defTabSz="914400" rtl="0" eaLnBrk="1" fontAlgn="auto" latinLnBrk="0" hangingPunct="1">
+                        <a:lnSpc>
+                          <a:spcPct val="100000"/>
+                        </a:lnSpc>
+                        <a:spcBef>
+                          <a:spcPts val="0"/>
+                        </a:spcBef>
+                        <a:spcAft>
+                          <a:spcPts val="0"/>
+                        </a:spcAft>
+                        <a:buClrTx/>
+                        <a:buSzTx/>
+                        <a:buFontTx/>
+                        <a:buNone/>
+                        <a:tabLst/>
+                        <a:defRPr/>
+                      </a:pPr>
+                      <a:r>
+                        <a:rPr kumimoji="0" lang="fr-FR" sz="2800" b="1" i="0" u="none" strike="noStrike" kern="1200" cap="none" spc="0" normalizeH="0" baseline="0" noProof="0" dirty="0">
+                          <a:ln>
+                            <a:noFill/>
+                          </a:ln>
+                          <a:solidFill>
+                            <a:srgbClr val="00B050"/>
+                          </a:solidFill>
+                          <a:effectLst/>
+                          <a:uLnTx/>
+                          <a:uFillTx/>
+                          <a:latin typeface="+mn-lt"/>
+                          <a:ea typeface="+mn-ea"/>
+                          <a:cs typeface="Calibri"/>
+                          <a:sym typeface="Wingdings" panose="05000000000000000000" pitchFamily="2" charset="2"/>
+                        </a:rPr>
+                        <a:t></a:t>
+                      </a:r>
+                      <a:endParaRPr kumimoji="0" lang="fr-FR" sz="1800" b="1" i="0" u="none" strike="noStrike" kern="1200" cap="none" spc="0" normalizeH="0" baseline="0" noProof="0" dirty="0">
+                        <a:ln>
+                          <a:noFill/>
+                        </a:ln>
+                        <a:solidFill>
+                          <a:srgbClr val="00B050"/>
+                        </a:solidFill>
+                        <a:effectLst/>
+                        <a:uLnTx/>
+                        <a:uFillTx/>
+                        <a:latin typeface="+mn-lt"/>
+                        <a:ea typeface="+mn-ea"/>
+                        <a:cs typeface="Calibri"/>
+                        <a:sym typeface="Wingdings" panose="05000000000000000000" pitchFamily="2" charset="2"/>
+                      </a:endParaRPr>
+                    </a:p>
+                  </a:txBody>
+                  <a:tcPr>
+                    <a:noFill/>
+                  </a:tcPr>
+                </a:tc>
+                <a:extLst>
+                  <a:ext uri="{0D108BD9-81ED-4DB2-BD59-A6C34878D82A}">
+                    <a16:rowId xmlns:a16="http://schemas.microsoft.com/office/drawing/2014/main" val="2734971059"/>
+                  </a:ext>
+                </a:extLst>
+              </a:tr>
+              <a:tr h="370840">
+                <a:tc>
+                  <a:txBody>
+                    <a:bodyPr/>
+                    <a:lstStyle/>
+                    <a:p>
+                      <a:r>
+                        <a:rPr lang="fr-FR" sz="1800" dirty="0">
+                          <a:solidFill>
+                            <a:schemeClr val="bg1"/>
+                          </a:solidFill>
+                        </a:rPr>
+                        <a:t>Configuration de Maria DB 10</a:t>
+                      </a:r>
+                    </a:p>
+                  </a:txBody>
+                  <a:tcPr>
+                    <a:noFill/>
+                  </a:tcPr>
+                </a:tc>
+                <a:tc>
+                  <a:txBody>
+                    <a:bodyPr/>
+                    <a:lstStyle/>
+                    <a:p>
+                      <a:pPr marL="0" marR="0" lvl="0" indent="0" algn="l" defTabSz="914400" rtl="0" eaLnBrk="1" fontAlgn="auto" latinLnBrk="0" hangingPunct="1">
+                        <a:lnSpc>
+                          <a:spcPct val="100000"/>
+                        </a:lnSpc>
+                        <a:spcBef>
+                          <a:spcPts val="0"/>
+                        </a:spcBef>
+                        <a:spcAft>
+                          <a:spcPts val="0"/>
+                        </a:spcAft>
+                        <a:buClrTx/>
+                        <a:buSzTx/>
+                        <a:buFontTx/>
+                        <a:buNone/>
+                        <a:tabLst/>
+                        <a:defRPr/>
+                      </a:pPr>
+                      <a:r>
+                        <a:rPr kumimoji="0" lang="fr-FR" sz="2800" b="1" i="0" u="none" strike="noStrike" kern="1200" cap="none" spc="0" normalizeH="0" baseline="0" noProof="0" dirty="0">
+                          <a:ln>
+                            <a:noFill/>
+                          </a:ln>
+                          <a:solidFill>
+                            <a:srgbClr val="00B050"/>
+                          </a:solidFill>
+                          <a:effectLst/>
+                          <a:uLnTx/>
+                          <a:uFillTx/>
+                          <a:latin typeface="+mn-lt"/>
+                          <a:ea typeface="+mn-ea"/>
+                          <a:cs typeface="Calibri"/>
+                          <a:sym typeface="Wingdings" panose="05000000000000000000" pitchFamily="2" charset="2"/>
+                        </a:rPr>
+                        <a:t></a:t>
+                      </a:r>
+                      <a:endParaRPr kumimoji="0" lang="fr-FR" sz="1800" b="1" i="0" u="none" strike="noStrike" kern="1200" cap="none" spc="0" normalizeH="0" baseline="0" noProof="0" dirty="0">
+                        <a:ln>
+                          <a:noFill/>
+                        </a:ln>
+                        <a:solidFill>
+                          <a:srgbClr val="00B050"/>
+                        </a:solidFill>
+                        <a:effectLst/>
+                        <a:uLnTx/>
+                        <a:uFillTx/>
+                        <a:latin typeface="+mn-lt"/>
+                        <a:ea typeface="+mn-ea"/>
+                        <a:cs typeface="Calibri"/>
+                        <a:sym typeface="Wingdings" panose="05000000000000000000" pitchFamily="2" charset="2"/>
+                      </a:endParaRPr>
+                    </a:p>
+                  </a:txBody>
+                  <a:tcPr>
+                    <a:noFill/>
+                  </a:tcPr>
+                </a:tc>
+                <a:extLst>
+                  <a:ext uri="{0D108BD9-81ED-4DB2-BD59-A6C34878D82A}">
+                    <a16:rowId xmlns:a16="http://schemas.microsoft.com/office/drawing/2014/main" val="1035230644"/>
+                  </a:ext>
+                </a:extLst>
+              </a:tr>
+            </a:tbl>
+          </a:graphicData>
+        </a:graphic>
+      </p:graphicFrame>
+      <p:sp>
+        <p:nvSpPr>
+          <p:cNvPr id="72" name="ZoneTexte 71">
+            <a:extLst>
+              <a:ext uri="{FF2B5EF4-FFF2-40B4-BE49-F238E27FC236}">
+                <a16:creationId xmlns:a16="http://schemas.microsoft.com/office/drawing/2014/main" id="{F32C56D6-0E77-42ED-AA65-0A823F0442F9}"/>
+              </a:ext>
+            </a:extLst>
+          </p:cNvPr>
+          <p:cNvSpPr txBox="1"/>
           <p:nvPr/>
         </p:nvSpPr>
         <p:spPr>
           <a:xfrm>
-            <a:off x="468805" y="2120999"/>
-            <a:ext cx="11326912" cy="5117775"/>
-          </a:xfrm>
-          <a:prstGeom prst="rect">
-            <a:avLst/>
-          </a:prstGeom>
-        </p:spPr>
-        <p:txBody>
-          <a:bodyPr>
-            <a:normAutofit/>
+            <a:off x="257756" y="1414655"/>
+            <a:ext cx="3489158" cy="461665"/>
+          </a:xfrm>
+          <a:prstGeom prst="rect">
+            <a:avLst/>
+          </a:prstGeom>
+          <a:noFill/>
+        </p:spPr>
+        <p:txBody>
+          <a:bodyPr wrap="square" rtlCol="0">
+            <a:spAutoFit/>
           </a:bodyPr>
-          <a:lstStyle>
-            <a:lvl1pPr marL="228600" indent="-228600" algn="l" defTabSz="914400" rtl="0" eaLnBrk="1" latinLnBrk="0" hangingPunct="1">
-              <a:lnSpc>
-                <a:spcPct val="90000"/>
-              </a:lnSpc>
-              <a:spcBef>
-                <a:spcPts val="1000"/>
-              </a:spcBef>
-              <a:buFont typeface="Arial" panose="020B0604020202020204" pitchFamily="34" charset="0"/>
-              <a:buChar char="•"/>
-              <a:defRPr sz="2800" kern="1200">
-                <a:solidFill>
-                  <a:schemeClr val="tx1"/>
-                </a:solidFill>
-                <a:latin typeface="+mn-lt"/>
-                <a:ea typeface="+mn-ea"/>
-                <a:cs typeface="+mn-cs"/>
-              </a:defRPr>
-            </a:lvl1pPr>
-            <a:lvl2pPr marL="685800" indent="-228600" algn="l" defTabSz="914400" rtl="0" eaLnBrk="1" latinLnBrk="0" hangingPunct="1">
-              <a:lnSpc>
-                <a:spcPct val="90000"/>
-              </a:lnSpc>
-              <a:spcBef>
-                <a:spcPts val="500"/>
-              </a:spcBef>
-              <a:buFont typeface="Arial" panose="020B0604020202020204" pitchFamily="34" charset="0"/>
-              <a:buChar char="•"/>
-              <a:defRPr sz="2400" kern="1200">
-                <a:solidFill>
-                  <a:schemeClr val="tx1"/>
-                </a:solidFill>
-                <a:latin typeface="+mn-lt"/>
-                <a:ea typeface="+mn-ea"/>
-                <a:cs typeface="+mn-cs"/>
-              </a:defRPr>
-            </a:lvl2pPr>
-            <a:lvl3pPr marL="1143000" indent="-228600" algn="l" defTabSz="914400" rtl="0" eaLnBrk="1" latinLnBrk="0" hangingPunct="1">
-              <a:lnSpc>
-                <a:spcPct val="90000"/>
-              </a:lnSpc>
-              <a:spcBef>
-                <a:spcPts val="500"/>
-              </a:spcBef>
-              <a:buFont typeface="Arial" panose="020B0604020202020204" pitchFamily="34" charset="0"/>
-              <a:buChar char="•"/>
-              <a:defRPr sz="2000" kern="1200">
-                <a:solidFill>
-                  <a:schemeClr val="tx1"/>
-                </a:solidFill>
-                <a:latin typeface="+mn-lt"/>
-                <a:ea typeface="+mn-ea"/>
-                <a:cs typeface="+mn-cs"/>
-              </a:defRPr>
-            </a:lvl3pPr>
-            <a:lvl4pPr marL="1600200" indent="-228600" algn="l" defTabSz="914400" rtl="0" eaLnBrk="1" latinLnBrk="0" hangingPunct="1">
-              <a:lnSpc>
-                <a:spcPct val="90000"/>
-              </a:lnSpc>
-              <a:spcBef>
-                <a:spcPts val="500"/>
-              </a:spcBef>
-              <a:buFont typeface="Arial" panose="020B0604020202020204" pitchFamily="34" charset="0"/>
-              <a:buChar char="•"/>
-              <a:defRPr sz="1800" kern="1200">
-                <a:solidFill>
-                  <a:schemeClr val="tx1"/>
-                </a:solidFill>
-                <a:latin typeface="+mn-lt"/>
-                <a:ea typeface="+mn-ea"/>
-                <a:cs typeface="+mn-cs"/>
-              </a:defRPr>
-            </a:lvl4pPr>
-            <a:lvl5pPr marL="2057400" indent="-228600" algn="l" defTabSz="914400" rtl="0" eaLnBrk="1" latinLnBrk="0" hangingPunct="1">
-              <a:lnSpc>
-                <a:spcPct val="90000"/>
-              </a:lnSpc>
-              <a:spcBef>
-                <a:spcPts val="500"/>
-              </a:spcBef>
-              <a:buFont typeface="Arial" panose="020B0604020202020204" pitchFamily="34" charset="0"/>
-              <a:buChar char="•"/>
-              <a:defRPr sz="1800" kern="1200">
-                <a:solidFill>
-                  <a:schemeClr val="tx1"/>
-                </a:solidFill>
-                <a:latin typeface="+mn-lt"/>
-                <a:ea typeface="+mn-ea"/>
-                <a:cs typeface="+mn-cs"/>
-              </a:defRPr>
-            </a:lvl5pPr>
-            <a:lvl6pPr marL="2514600" indent="-228600" algn="l" defTabSz="914400" rtl="0" eaLnBrk="1" latinLnBrk="0" hangingPunct="1">
-              <a:lnSpc>
-                <a:spcPct val="90000"/>
-              </a:lnSpc>
-              <a:spcBef>
-                <a:spcPts val="500"/>
-              </a:spcBef>
-              <a:buFont typeface="Arial" panose="020B0604020202020204" pitchFamily="34" charset="0"/>
-              <a:buChar char="•"/>
-              <a:defRPr sz="1800" kern="1200">
-                <a:solidFill>
-                  <a:schemeClr val="tx1"/>
-                </a:solidFill>
-                <a:latin typeface="+mn-lt"/>
-                <a:ea typeface="+mn-ea"/>
-                <a:cs typeface="+mn-cs"/>
-              </a:defRPr>
-            </a:lvl6pPr>
-            <a:lvl7pPr marL="2971800" indent="-228600" algn="l" defTabSz="914400" rtl="0" eaLnBrk="1" latinLnBrk="0" hangingPunct="1">
-              <a:lnSpc>
-                <a:spcPct val="90000"/>
-              </a:lnSpc>
-              <a:spcBef>
-                <a:spcPts val="500"/>
-              </a:spcBef>
-              <a:buFont typeface="Arial" panose="020B0604020202020204" pitchFamily="34" charset="0"/>
-              <a:buChar char="•"/>
-              <a:defRPr sz="1800" kern="1200">
-                <a:solidFill>
-                  <a:schemeClr val="tx1"/>
-                </a:solidFill>
-                <a:latin typeface="+mn-lt"/>
-                <a:ea typeface="+mn-ea"/>
-                <a:cs typeface="+mn-cs"/>
-              </a:defRPr>
-            </a:lvl7pPr>
-            <a:lvl8pPr marL="3429000" indent="-228600" algn="l" defTabSz="914400" rtl="0" eaLnBrk="1" latinLnBrk="0" hangingPunct="1">
-              <a:lnSpc>
-                <a:spcPct val="90000"/>
-              </a:lnSpc>
-              <a:spcBef>
-                <a:spcPts val="500"/>
-              </a:spcBef>
-              <a:buFont typeface="Arial" panose="020B0604020202020204" pitchFamily="34" charset="0"/>
-              <a:buChar char="•"/>
-              <a:defRPr sz="1800" kern="1200">
-                <a:solidFill>
-                  <a:schemeClr val="tx1"/>
-                </a:solidFill>
-                <a:latin typeface="+mn-lt"/>
-                <a:ea typeface="+mn-ea"/>
-                <a:cs typeface="+mn-cs"/>
-              </a:defRPr>
-            </a:lvl8pPr>
-            <a:lvl9pPr marL="3886200" indent="-228600" algn="l" defTabSz="914400" rtl="0" eaLnBrk="1" latinLnBrk="0" hangingPunct="1">
-              <a:lnSpc>
-                <a:spcPct val="90000"/>
-              </a:lnSpc>
-              <a:spcBef>
-                <a:spcPts val="500"/>
-              </a:spcBef>
-              <a:buFont typeface="Arial" panose="020B0604020202020204" pitchFamily="34" charset="0"/>
-              <a:buChar char="•"/>
-              <a:defRPr sz="1800" kern="1200">
-                <a:solidFill>
-                  <a:schemeClr val="tx1"/>
-                </a:solidFill>
-                <a:latin typeface="+mn-lt"/>
-                <a:ea typeface="+mn-ea"/>
-                <a:cs typeface="+mn-cs"/>
-              </a:defRPr>
-            </a:lvl9pPr>
-          </a:lstStyle>
+          <a:lstStyle/>
           <a:p>
             <a:pPr marL="0" indent="0">
               <a:buNone/>
             </a:pPr>
             <a:r>
-              <a:rPr lang="fr-FR" dirty="0">
+              <a:rPr lang="fr-FR" sz="2400" dirty="0">
                 <a:solidFill>
-                  <a:schemeClr val="bg2"/>
+                  <a:schemeClr val="bg1"/>
                 </a:solidFill>
               </a:rPr>
-              <a:t>Conclusion :</a:t>
-            </a:r>
-          </a:p>
-          <a:p>
-            <a:pPr lvl="0"/>
-            <a:r>
-              <a:rPr lang="fr-FR" dirty="0">
-                <a:solidFill>
-                  <a:schemeClr val="bg2"/>
-                </a:solidFill>
-              </a:rPr>
-              <a:t>Configuration des serveurs Web et base de données </a:t>
-            </a:r>
-          </a:p>
-          <a:p>
-            <a:pPr lvl="0"/>
-            <a:r>
-              <a:rPr lang="fr-FR" dirty="0">
-                <a:solidFill>
-                  <a:schemeClr val="bg2"/>
-                </a:solidFill>
-              </a:rPr>
-              <a:t>Interopérabilité avec les autres parties </a:t>
+              <a:t>Etat d’avancement : </a:t>
             </a:r>
           </a:p>
         </p:txBody>
@@ -14427,7 +15882,7 @@
                                           </p:stCondLst>
                                         </p:cTn>
                                         <p:tgtEl>
-                                          <p:spTgt spid="23"/>
+                                          <p:spTgt spid="69"/>
                                         </p:tgtEl>
                                         <p:attrNameLst>
                                           <p:attrName>style.visibility</p:attrName>
@@ -14441,7 +15896,7 @@
                                 </p:cTn>
                               </p:par>
                               <p:par>
-                                <p:cTn id="7" presetID="1" presetClass="exit" presetSubtype="0" fill="hold" grpId="2" nodeType="withEffect">
+                                <p:cTn id="7" presetID="1" presetClass="exit" presetSubtype="0" fill="hold" grpId="0" nodeType="withEffect">
                                   <p:stCondLst>
                                     <p:cond delay="0"/>
                                   </p:stCondLst>
@@ -14454,7 +15909,61 @@
                                           </p:stCondLst>
                                         </p:cTn>
                                         <p:tgtEl>
-                                          <p:spTgt spid="24"/>
+                                          <p:spTgt spid="72"/>
+                                        </p:tgtEl>
+                                        <p:attrNameLst>
+                                          <p:attrName>style.visibility</p:attrName>
+                                        </p:attrNameLst>
+                                      </p:cBhvr>
+                                      <p:to>
+                                        <p:strVal val="hidden"/>
+                                      </p:to>
+                                    </p:set>
+                                  </p:childTnLst>
+                                </p:cTn>
+                              </p:par>
+                              <p:par>
+                                <p:cTn id="9" presetID="1" presetClass="exit" presetSubtype="0" fill="hold" nodeType="withEffect">
+                                  <p:stCondLst>
+                                    <p:cond delay="0"/>
+                                  </p:stCondLst>
+                                  <p:childTnLst>
+                                    <p:set>
+                                      <p:cBhvr>
+                                        <p:cTn id="10" dur="1" fill="hold">
+                                          <p:stCondLst>
+                                            <p:cond delay="0"/>
+                                          </p:stCondLst>
+                                        </p:cTn>
+                                        <p:tgtEl>
+                                          <p:spTgt spid="70"/>
+                                        </p:tgtEl>
+                                        <p:attrNameLst>
+                                          <p:attrName>style.visibility</p:attrName>
+                                        </p:attrNameLst>
+                                      </p:cBhvr>
+                                      <p:to>
+                                        <p:strVal val="hidden"/>
+                                      </p:to>
+                                    </p:set>
+                                  </p:childTnLst>
+                                </p:cTn>
+                              </p:par>
+                              <p:par>
+                                <p:cTn id="11" presetID="1" presetClass="exit" presetSubtype="0" fill="hold" nodeType="withEffect">
+                                  <p:stCondLst>
+                                    <p:cond delay="0"/>
+                                  </p:stCondLst>
+                                  <p:childTnLst>
+                                    <p:set>
+                                      <p:cBhvr>
+                                        <p:cTn id="12" dur="1" fill="hold">
+                                          <p:stCondLst>
+                                            <p:cond delay="0"/>
+                                          </p:stCondLst>
+                                        </p:cTn>
+                                        <p:tgtEl>
+                                          <p:spTgt spid="71"/>
                                         </p:tgtEl>
                                         <p:attrNameLst>
                                           <p:attrName>style.visibility</p:attrName>
@@ -14474,40 +15983,40 @@
                     </p:cTn>
                   </p:par>
                   <p:par>
-                    <p:cTn id="9" fill="hold">
+                    <p:cTn id="13" fill="hold">
                       <p:stCondLst>
                         <p:cond delay="indefinite"/>
                       </p:stCondLst>
                       <p:childTnLst>
                         <p:par>
-                          <p:cTn id="10" fill="hold">
+                          <p:cTn id="14" fill="hold">
                             <p:stCondLst>
                               <p:cond delay="0"/>
                             </p:stCondLst>
                             <p:childTnLst>
                               <p:par>
-                                <p:cTn id="11" presetID="16" presetClass="exit" presetSubtype="21" fill="hold" grpId="0" nodeType="clickEffect">
+                                <p:cTn id="15" presetID="16" presetClass="exit" presetSubtype="21" fill="hold" grpId="0" nodeType="clickEffect">
                                   <p:stCondLst>
                                     <p:cond delay="0"/>
                                   </p:stCondLst>
                                   <p:childTnLst>
                                     <p:animEffect transition="out" filter="barn(inVertical)">
                                       <p:cBhvr>
-                                        <p:cTn id="12" dur="500"/>
+                                        <p:cTn id="16" dur="500"/>
                                         <p:tgtEl>
-                                          <p:spTgt spid="21"/>
+                                          <p:spTgt spid="67"/>
                                         </p:tgtEl>
                                       </p:cBhvr>
                                     </p:animEffect>
                                     <p:set>
                                       <p:cBhvr>
-                                        <p:cTn id="13" dur="1" fill="hold">
+                                        <p:cTn id="17" dur="1" fill="hold">
                                           <p:stCondLst>
                                             <p:cond delay="499"/>
                                           </p:stCondLst>
                                         </p:cTn>
                                         <p:tgtEl>
-                                          <p:spTgt spid="21"/>
+                                          <p:spTgt spid="67"/>
                                         </p:tgtEl>
                                         <p:attrNameLst>
                                           <p:attrName>style.visibility</p:attrName>
@@ -14521,28 +16030,28 @@
                                 </p:cTn>
                               </p:par>
                               <p:par>
-                                <p:cTn id="14" presetID="16" presetClass="exit" presetSubtype="21" fill="hold" grpId="0" nodeType="withEffect">
+                                <p:cTn id="18" presetID="16" presetClass="exit" presetSubtype="21" fill="hold" grpId="0" nodeType="withEffect">
                                   <p:stCondLst>
                                     <p:cond delay="0"/>
                                   </p:stCondLst>
                                   <p:childTnLst>
                                     <p:animEffect transition="out" filter="barn(inVertical)">
                                       <p:cBhvr>
-                                        <p:cTn id="15" dur="500"/>
+                                        <p:cTn id="19" dur="500"/>
                                         <p:tgtEl>
-                                          <p:spTgt spid="22"/>
+                                          <p:spTgt spid="68"/>
                                         </p:tgtEl>
                                       </p:cBhvr>
                                     </p:animEffect>
                                     <p:set>
                                       <p:cBhvr>
-                                        <p:cTn id="16" dur="1" fill="hold">
+                                        <p:cTn id="20" dur="1" fill="hold">
                                           <p:stCondLst>
                                             <p:cond delay="499"/>
                                           </p:stCondLst>
                                         </p:cTn>
                                         <p:tgtEl>
-                                          <p:spTgt spid="22"/>
+                                          <p:spTgt spid="68"/>
                                         </p:tgtEl>
                                         <p:attrNameLst>
                                           <p:attrName>style.visibility</p:attrName>
@@ -14556,20 +16065,20 @@
                                 </p:cTn>
                               </p:par>
                               <p:par>
-                                <p:cTn id="17" presetID="2" presetClass="entr" presetSubtype="4" fill="hold" nodeType="withEffect">
+                                <p:cTn id="21" presetID="2" presetClass="entr" presetSubtype="4" fill="hold" nodeType="withEffect">
                                   <p:stCondLst>
                                     <p:cond delay="0"/>
                                   </p:stCondLst>
                                   <p:childTnLst>
                                     <p:set>
                                       <p:cBhvr>
-                                        <p:cTn id="18" dur="1" fill="hold">
+                                        <p:cTn id="22" dur="1" fill="hold">
                                           <p:stCondLst>
                                             <p:cond delay="0"/>
                                           </p:stCondLst>
                                         </p:cTn>
                                         <p:tgtEl>
-                                          <p:spTgt spid="23"/>
+                                          <p:spTgt spid="69"/>
                                         </p:tgtEl>
                                         <p:attrNameLst>
                                           <p:attrName>style.visibility</p:attrName>
@@ -14581,9 +16090,9 @@
                                     </p:set>
                                     <p:anim calcmode="lin" valueType="num">
                                       <p:cBhvr additive="base">
-                                        <p:cTn id="19" dur="500" fill="hold"/>
+                                        <p:cTn id="23" dur="500" fill="hold"/>
                                         <p:tgtEl>
-                                          <p:spTgt spid="23"/>
+                                          <p:spTgt spid="69"/>
                                         </p:tgtEl>
                                         <p:attrNameLst>
                                           <p:attrName>ppt_x</p:attrName>
@@ -14604,9 +16113,9 @@
                                     </p:anim>
                                     <p:anim calcmode="lin" valueType="num">
                                       <p:cBhvr additive="base">
-                                        <p:cTn id="20" dur="500" fill="hold"/>
+                                        <p:cTn id="24" dur="500" fill="hold"/>
                                         <p:tgtEl>
-                                          <p:spTgt spid="23"/>
+                                          <p:spTgt spid="69"/>
                                         </p:tgtEl>
                                         <p:attrNameLst>
                                           <p:attrName>ppt_y</p:attrName>
@@ -14635,78 +16144,32 @@
                     </p:cTn>
                   </p:par>
                   <p:par>
-                    <p:cTn id="21" fill="hold">
+                    <p:cTn id="25" fill="hold">
                       <p:stCondLst>
                         <p:cond delay="indefinite"/>
                       </p:stCondLst>
                       <p:childTnLst>
                         <p:par>
-                          <p:cTn id="22" fill="hold">
+                          <p:cTn id="26" fill="hold">
                             <p:stCondLst>
                               <p:cond delay="0"/>
                             </p:stCondLst>
                             <p:childTnLst>
                               <p:par>
-                                <p:cTn id="23" presetID="2" presetClass="exit" presetSubtype="4" fill="hold" nodeType="clickEffect">
+                                <p:cTn id="27" presetID="1" presetClass="exit" presetSubtype="0" fill="hold" nodeType="clickEffect">
                                   <p:stCondLst>
                                     <p:cond delay="0"/>
                                   </p:stCondLst>
                                   <p:childTnLst>
-                                    <p:anim calcmode="lin" valueType="num">
-                                      <p:cBhvr additive="base">
-                                        <p:cTn id="24" dur="500"/>
-                                        <p:tgtEl>
-                                          <p:spTgt spid="23"/>
-                                        </p:tgtEl>
-                                        <p:attrNameLst>
-                                          <p:attrName>ppt_x</p:attrName>
-                                        </p:attrNameLst>
-                                      </p:cBhvr>
-                                      <p:tavLst>
-                                        <p:tav tm="0">
-                                          <p:val>
-                                            <p:strVal val="ppt_x"/>
-                                          </p:val>
-                                        </p:tav>
-                                        <p:tav tm="100000">
-                                          <p:val>
-                                            <p:strVal val="ppt_x"/>
-                                          </p:val>
-                                        </p:tav>
-                                      </p:tavLst>
-                                    </p:anim>
-                                    <p:anim calcmode="lin" valueType="num">
-                                      <p:cBhvr additive="base">
-                                        <p:cTn id="25" dur="500"/>
-                                        <p:tgtEl>
-                                          <p:spTgt spid="23"/>
-                                        </p:tgtEl>
-                                        <p:attrNameLst>
-                                          <p:attrName>ppt_y</p:attrName>
-                                        </p:attrNameLst>
-                                      </p:cBhvr>
-                                      <p:tavLst>
-                                        <p:tav tm="0">
-                                          <p:val>
-                                            <p:strVal val="ppt_y"/>
-                                          </p:val>
-                                        </p:tav>
-                                        <p:tav tm="100000">
-                                          <p:val>
-                                            <p:strVal val="1+ppt_h/2"/>
-                                          </p:val>
-                                        </p:tav>
-                                      </p:tavLst>
-                                    </p:anim>
                                     <p:set>
                                       <p:cBhvr>
-                                        <p:cTn id="26" dur="1" fill="hold">
+                                        <p:cTn id="28" dur="1" fill="hold">
                                           <p:stCondLst>
-                                            <p:cond delay="499"/>
+                                            <p:cond delay="0"/>
                                           </p:stCondLst>
                                         </p:cTn>
                                         <p:tgtEl>
-                                          <p:spTgt spid="23"/>
+                                          <p:spTgt spid="69"/>
                                         </p:tgtEl>
                                         <p:attrNameLst>
                                           <p:attrName>style.visibility</p:attrName>
@@ -14720,56 +16183,20 @@
                                 </p:cTn>
                               </p:par>
                               <p:par>
-                                <p:cTn id="27" presetID="1" presetClass="exit" presetSubtype="0" fill="hold" grpId="0" nodeType="withEffect">
+                                <p:cTn id="29" presetID="2" presetClass="entr" presetSubtype="4" fill="hold" grpId="1" nodeType="withEffect">
                                   <p:stCondLst>
                                     <p:cond delay="0"/>
                                   </p:stCondLst>
                                   <p:childTnLst>
                                     <p:set>
                                       <p:cBhvr>
-                                        <p:cTn id="28" dur="1" fill="hold">
+                                        <p:cTn id="30" dur="1" fill="hold">
                                           <p:stCondLst>
                                             <p:cond delay="0"/>
                                           </p:stCondLst>
                                         </p:cTn>
                                         <p:tgtEl>
-                                          <p:spTgt spid="24"/>
-                                        </p:tgtEl>
-                                        <p:attrNameLst>
-                                          <p:attrName>style.visibility</p:attrName>
-                                        </p:attrNameLst>
-                                      </p:cBhvr>
-                                      <p:to>
-                                        <p:strVal val="hidden"/>
-                                      </p:to>
-                                    </p:set>
-                                  </p:childTnLst>
-                                </p:cTn>
-                              </p:par>
-                            </p:childTnLst>
-                          </p:cTn>
-                        </p:par>
-                        <p:par>
-                          <p:cTn id="29" fill="hold">
-                            <p:stCondLst>
-                              <p:cond delay="500"/>
-                            </p:stCondLst>
-                            <p:childTnLst>
-                              <p:par>
-                                <p:cTn id="30" presetID="1" presetClass="entr" presetSubtype="0" fill="hold" grpId="1" nodeType="afterEffect">
-                                  <p:stCondLst>
-                                    <p:cond delay="0"/>
-                                  </p:stCondLst>
-                                  <p:childTnLst>
-                                    <p:set>
-                                      <p:cBhvr>
-                                        <p:cTn id="31" dur="1" fill="hold">
-                                          <p:stCondLst>
-                                            <p:cond delay="0"/>
-                                          </p:stCondLst>
-                                        </p:cTn>
-                                        <p:tgtEl>
-                                          <p:spTgt spid="24"/>
+                                          <p:spTgt spid="72"/>
                                         </p:tgtEl>
                                         <p:attrNameLst>
                                           <p:attrName>style.visibility</p:attrName>
@@ -14779,6 +16206,198 @@
                                         <p:strVal val="visible"/>
                                       </p:to>
                                     </p:set>
+                                    <p:anim calcmode="lin" valueType="num">
+                                      <p:cBhvr additive="base">
+                                        <p:cTn id="31" dur="500" fill="hold"/>
+                                        <p:tgtEl>
+                                          <p:spTgt spid="72"/>
+                                        </p:tgtEl>
+                                        <p:attrNameLst>
+                                          <p:attrName>ppt_x</p:attrName>
+                                        </p:attrNameLst>
+                                      </p:cBhvr>
+                                      <p:tavLst>
+                                        <p:tav tm="0">
+                                          <p:val>
+                                            <p:strVal val="#ppt_x"/>
+                                          </p:val>
+                                        </p:tav>
+                                        <p:tav tm="100000">
+                                          <p:val>
+                                            <p:strVal val="#ppt_x"/>
+                                          </p:val>
+                                        </p:tav>
+                                      </p:tavLst>
+                                    </p:anim>
+                                    <p:anim calcmode="lin" valueType="num">
+                                      <p:cBhvr additive="base">
+                                        <p:cTn id="32" dur="500" fill="hold"/>
+                                        <p:tgtEl>
+                                          <p:spTgt spid="72"/>
+                                        </p:tgtEl>
+                                        <p:attrNameLst>
+                                          <p:attrName>ppt_y</p:attrName>
+                                        </p:attrNameLst>
+                                      </p:cBhvr>
+                                      <p:tavLst>
+                                        <p:tav tm="0">
+                                          <p:val>
+                                            <p:strVal val="1+#ppt_h/2"/>
+                                          </p:val>
+                                        </p:tav>
+                                        <p:tav tm="100000">
+                                          <p:val>
+                                            <p:strVal val="#ppt_y"/>
+                                          </p:val>
+                                        </p:tav>
+                                      </p:tavLst>
+                                    </p:anim>
+                                  </p:childTnLst>
+                                </p:cTn>
+                              </p:par>
+                              <p:par>
+                                <p:cTn id="33" presetID="2" presetClass="entr" presetSubtype="4" fill="hold" nodeType="withEffect">
+                                  <p:stCondLst>
+                                    <p:cond delay="0"/>
+                                  </p:stCondLst>
+                                  <p:childTnLst>
+                                    <p:set>
+                                      <p:cBhvr>
+                                        <p:cTn id="34" dur="1" fill="hold">
+                                          <p:stCondLst>
+                                            <p:cond delay="0"/>
+                                          </p:stCondLst>
+                                        </p:cTn>
+                                        <p:tgtEl>
+                                          <p:spTgt spid="70"/>
+                                        </p:tgtEl>
+                                        <p:attrNameLst>
+                                          <p:attrName>style.visibility</p:attrName>
+                                        </p:attrNameLst>
+                                      </p:cBhvr>
+                                      <p:to>
+                                        <p:strVal val="visible"/>
+                                      </p:to>
+                                    </p:set>
+                                    <p:anim calcmode="lin" valueType="num">
+                                      <p:cBhvr additive="base">
+                                        <p:cTn id="35" dur="500" fill="hold"/>
+                                        <p:tgtEl>
+                                          <p:spTgt spid="70"/>
+                                        </p:tgtEl>
+                                        <p:attrNameLst>
+                                          <p:attrName>ppt_x</p:attrName>
+                                        </p:attrNameLst>
+                                      </p:cBhvr>
+                                      <p:tavLst>
+                                        <p:tav tm="0">
+                                          <p:val>
+                                            <p:strVal val="#ppt_x"/>
+                                          </p:val>
+                                        </p:tav>
+                                        <p:tav tm="100000">
+                                          <p:val>
+                                            <p:strVal val="#ppt_x"/>
+                                          </p:val>
+                                        </p:tav>
+                                      </p:tavLst>
+                                    </p:anim>
+                                    <p:anim calcmode="lin" valueType="num">
+                                      <p:cBhvr additive="base">
+                                        <p:cTn id="36" dur="500" fill="hold"/>
+                                        <p:tgtEl>
+                                          <p:spTgt spid="70"/>
+                                        </p:tgtEl>
+                                        <p:attrNameLst>
+                                          <p:attrName>ppt_y</p:attrName>
+                                        </p:attrNameLst>
+                                      </p:cBhvr>
+                                      <p:tavLst>
+                                        <p:tav tm="0">
+                                          <p:val>
+                                            <p:strVal val="1+#ppt_h/2"/>
+                                          </p:val>
+                                        </p:tav>
+                                        <p:tav tm="100000">
+                                          <p:val>
+                                            <p:strVal val="#ppt_y"/>
+                                          </p:val>
+                                        </p:tav>
+                                      </p:tavLst>
+                                    </p:anim>
+                                  </p:childTnLst>
+                                </p:cTn>
+                              </p:par>
+                              <p:par>
+                                <p:cTn id="37" presetID="2" presetClass="entr" presetSubtype="4" fill="hold" nodeType="withEffect">
+                                  <p:stCondLst>
+                                    <p:cond delay="0"/>
+                                  </p:stCondLst>
+                                  <p:childTnLst>
+                                    <p:set>
+                                      <p:cBhvr>
+                                        <p:cTn id="38" dur="1" fill="hold">
+                                          <p:stCondLst>
+                                            <p:cond delay="0"/>
+                                          </p:stCondLst>
+                                        </p:cTn>
+                                        <p:tgtEl>
+                                          <p:spTgt spid="71"/>
+                                        </p:tgtEl>
+                                        <p:attrNameLst>
+                                          <p:attrName>style.visibility</p:attrName>
+                                        </p:attrNameLst>
+                                      </p:cBhvr>
+                                      <p:to>
+                                        <p:strVal val="visible"/>
+                                      </p:to>
+                                    </p:set>
+                                    <p:anim calcmode="lin" valueType="num">
+                                      <p:cBhvr additive="base">
+                                        <p:cTn id="39" dur="500" fill="hold"/>
+                                        <p:tgtEl>
+                                          <p:spTgt spid="71"/>
+                                        </p:tgtEl>
+                                        <p:attrNameLst>
+                                          <p:attrName>ppt_x</p:attrName>
+                                        </p:attrNameLst>
+                                      </p:cBhvr>
+                                      <p:tavLst>
+                                        <p:tav tm="0">
+                                          <p:val>
+                                            <p:strVal val="#ppt_x"/>
+                                          </p:val>
+                                        </p:tav>
+                                        <p:tav tm="100000">
+                                          <p:val>
+                                            <p:strVal val="#ppt_x"/>
+                                          </p:val>
+                                        </p:tav>
+                                      </p:tavLst>
+                                    </p:anim>
+                                    <p:anim calcmode="lin" valueType="num">
+                                      <p:cBhvr additive="base">
+                                        <p:cTn id="40" dur="500" fill="hold"/>
+                                        <p:tgtEl>
+                                          <p:spTgt spid="71"/>
+                                        </p:tgtEl>
+                                        <p:attrNameLst>
+                                          <p:attrName>ppt_y</p:attrName>
+                                        </p:attrNameLst>
+                                      </p:cBhvr>
+                                      <p:tavLst>
+                                        <p:tav tm="0">
+                                          <p:val>
+                                            <p:strVal val="1+#ppt_h/2"/>
+                                          </p:val>
+                                        </p:tav>
+                                        <p:tav tm="100000">
+                                          <p:val>
+                                            <p:strVal val="#ppt_y"/>
+                                          </p:val>
+                                        </p:tav>
+                                      </p:tavLst>
+                                    </p:anim>
                                   </p:childTnLst>
                                 </p:cTn>
                               </p:par>
@@ -14810,11 +16429,10 @@
       </p:par>
     </p:tnLst>
     <p:bldLst>
-      <p:bldP spid="21" grpId="0"/>
-      <p:bldP spid="22" grpId="0"/>
-      <p:bldP spid="24" grpId="0"/>
-      <p:bldP spid="24" grpId="1"/>
-      <p:bldP spid="24" grpId="2"/>
+      <p:bldP spid="67" grpId="0"/>
+      <p:bldP spid="68" grpId="0"/>
+      <p:bldP spid="72" grpId="0"/>
+      <p:bldP spid="72" grpId="1"/>
     </p:bldLst>
   </p:timing>
 </p:sld>
@@ -14985,7 +16603,7 @@
         </p:spPr>
         <p:txBody>
           <a:bodyPr anchor="ctr">
-            <a:normAutofit lnSpcReduction="10000"/>
+            <a:normAutofit/>
           </a:bodyPr>
           <a:lstStyle/>
           <a:p>
@@ -14995,7 +16613,7 @@
               </a:lnSpc>
             </a:pPr>
             <a:r>
-              <a:rPr lang="fr-FR" sz="4000" b="0" strike="noStrike" spc="-1">
+              <a:rPr lang="fr-FR" sz="4000" b="0" strike="noStrike" spc="-1" dirty="0">
                 <a:solidFill>
                   <a:srgbClr val="3F3F3F"/>
                 </a:solidFill>
@@ -15004,15 +16622,15 @@
               <a:t>V. </a:t>
             </a:r>
             <a:r>
-              <a:rPr lang="fr-FR" sz="3600" b="0" strike="noStrike" spc="-1">
+              <a:rPr lang="fr-FR" sz="3600" b="0" strike="noStrike" spc="-1" dirty="0">
                 <a:solidFill>
                   <a:srgbClr val="000000"/>
                 </a:solidFill>
                 <a:latin typeface="Calibri Light"/>
               </a:rPr>
-              <a:t>Présentation de la partie : Backend et base de données </a:t>
+              <a:t>Backend et base de données </a:t>
             </a:r>
-            <a:endParaRPr lang="fr-FR" sz="3600" b="0" strike="noStrike" spc="-1">
+            <a:endParaRPr lang="fr-FR" sz="3600" b="0" strike="noStrike" spc="-1" dirty="0">
               <a:solidFill>
                 <a:srgbClr val="000000"/>
               </a:solidFill>
@@ -15344,7 +16962,7 @@
               </a:lnSpc>
             </a:pPr>
             <a:r>
-              <a:rPr lang="fr-FR" sz="4000" b="0" strike="noStrike" spc="-1">
+              <a:rPr lang="fr-FR" sz="4000" b="0" strike="noStrike" spc="-1" dirty="0">
                 <a:solidFill>
                   <a:srgbClr val="3F3F3F"/>
                 </a:solidFill>
@@ -15353,15 +16971,15 @@
               <a:t>VI. </a:t>
             </a:r>
             <a:r>
-              <a:rPr lang="fr-FR" sz="4000" b="0" strike="noStrike" spc="-1">
+              <a:rPr lang="fr-FR" sz="4000" b="0" strike="noStrike" spc="-1" dirty="0">
                 <a:solidFill>
                   <a:srgbClr val="000000"/>
                 </a:solidFill>
                 <a:latin typeface="Calibri Light"/>
               </a:rPr>
-              <a:t>Présentation de la partie : Web Service</a:t>
+              <a:t>Web Service</a:t>
             </a:r>
-            <a:endParaRPr lang="fr-FR" sz="4000" b="0" strike="noStrike" spc="-1">
+            <a:endParaRPr lang="fr-FR" sz="4000" b="0" strike="noStrike" spc="-1" dirty="0">
               <a:solidFill>
                 <a:srgbClr val="000000"/>
               </a:solidFill>

</xml_diff>

<commit_message>
modifs alex pas fini attendre avant de push
</commit_message>
<xml_diff>
--- a/Diapo_commun/PresentationCommune.pptx
+++ b/Diapo_commun/PresentationCommune.pptx
@@ -6,7 +6,7 @@
     <p:sldMasterId id="2147483661" r:id="rId2"/>
   </p:sldMasterIdLst>
   <p:notesMasterIdLst>
-    <p:notesMasterId r:id="rId20"/>
+    <p:notesMasterId r:id="rId21"/>
   </p:notesMasterIdLst>
   <p:sldIdLst>
     <p:sldId id="256" r:id="rId3"/>
@@ -18,14 +18,15 @@
     <p:sldId id="262" r:id="rId9"/>
     <p:sldId id="263" r:id="rId10"/>
     <p:sldId id="264" r:id="rId11"/>
-    <p:sldId id="270" r:id="rId12"/>
-    <p:sldId id="265" r:id="rId13"/>
-    <p:sldId id="266" r:id="rId14"/>
-    <p:sldId id="267" r:id="rId15"/>
-    <p:sldId id="268" r:id="rId16"/>
-    <p:sldId id="271" r:id="rId17"/>
-    <p:sldId id="272" r:id="rId18"/>
-    <p:sldId id="269" r:id="rId19"/>
+    <p:sldId id="273" r:id="rId12"/>
+    <p:sldId id="270" r:id="rId13"/>
+    <p:sldId id="265" r:id="rId14"/>
+    <p:sldId id="266" r:id="rId15"/>
+    <p:sldId id="267" r:id="rId16"/>
+    <p:sldId id="268" r:id="rId17"/>
+    <p:sldId id="271" r:id="rId18"/>
+    <p:sldId id="272" r:id="rId19"/>
+    <p:sldId id="269" r:id="rId20"/>
   </p:sldIdLst>
   <p:sldSz cx="12192000" cy="6858000"/>
   <p:notesSz cx="7559675" cy="10691813"/>
@@ -858,7 +859,7 @@
           <a:p>
             <a:fld id="{741171B4-A1B5-4DF7-90FF-2BB55EBEAF8E}" type="slidenum">
               <a:rPr lang="fr-FR" smtClean="0"/>
-              <a:t>15</a:t>
+              <a:t>16</a:t>
             </a:fld>
             <a:endParaRPr lang="fr-FR"/>
           </a:p>
@@ -942,7 +943,7 @@
           <a:p>
             <a:fld id="{741171B4-A1B5-4DF7-90FF-2BB55EBEAF8E}" type="slidenum">
               <a:rPr lang="fr-FR" smtClean="0"/>
-              <a:t>16</a:t>
+              <a:t>17</a:t>
             </a:fld>
             <a:endParaRPr lang="fr-FR"/>
           </a:p>
@@ -5618,7 +5619,7 @@
         </p:nvSpPr>
         <p:spPr>
           <a:xfrm>
-            <a:off x="0" y="1360800"/>
+            <a:off x="0" y="1361160"/>
             <a:ext cx="12191760" cy="5496840"/>
           </a:xfrm>
           <a:prstGeom prst="rect">
@@ -5926,6 +5927,549 @@
           </a:p>
         </p:txBody>
       </p:sp>
+      <p:grpSp>
+        <p:nvGrpSpPr>
+          <p:cNvPr id="16" name="Group 2">
+            <a:extLst>
+              <a:ext uri="{FF2B5EF4-FFF2-40B4-BE49-F238E27FC236}">
+                <a16:creationId xmlns:a16="http://schemas.microsoft.com/office/drawing/2014/main" id="{6A49982D-5055-4C14-B0C9-08CB61717D19}"/>
+              </a:ext>
+            </a:extLst>
+          </p:cNvPr>
+          <p:cNvGrpSpPr/>
+          <p:nvPr/>
+        </p:nvGrpSpPr>
+        <p:grpSpPr>
+          <a:xfrm>
+            <a:off x="0" y="-43020"/>
+            <a:ext cx="12191760" cy="3048840"/>
+            <a:chOff x="0" y="360"/>
+            <a:chExt cx="12191760" cy="3048840"/>
+          </a:xfrm>
+        </p:grpSpPr>
+        <p:pic>
+          <p:nvPicPr>
+            <p:cNvPr id="17" name="Picture 10">
+              <a:extLst>
+                <a:ext uri="{FF2B5EF4-FFF2-40B4-BE49-F238E27FC236}">
+                  <a16:creationId xmlns:a16="http://schemas.microsoft.com/office/drawing/2014/main" id="{B72641CD-9BB5-4A5F-8006-74B578FEF674}"/>
+                </a:ext>
+              </a:extLst>
+            </p:cNvPr>
+            <p:cNvPicPr/>
+            <p:nvPr/>
+          </p:nvPicPr>
+          <p:blipFill>
+            <a:blip r:embed="rId2"/>
+            <a:srcRect t="45717" b="9819"/>
+            <a:stretch/>
+          </p:blipFill>
+          <p:spPr>
+            <a:xfrm rot="10800000" flipH="1">
+              <a:off x="0" y="0"/>
+              <a:ext cx="12191760" cy="3048840"/>
+            </a:xfrm>
+            <a:prstGeom prst="rect">
+              <a:avLst/>
+            </a:prstGeom>
+            <a:ln w="0">
+              <a:noFill/>
+            </a:ln>
+          </p:spPr>
+        </p:pic>
+        <p:sp>
+          <p:nvSpPr>
+            <p:cNvPr id="18" name="CustomShape 3">
+              <a:extLst>
+                <a:ext uri="{FF2B5EF4-FFF2-40B4-BE49-F238E27FC236}">
+                  <a16:creationId xmlns:a16="http://schemas.microsoft.com/office/drawing/2014/main" id="{64A5E7BD-F345-4B5B-9F57-7ADD647321B8}"/>
+                </a:ext>
+              </a:extLst>
+            </p:cNvPr>
+            <p:cNvSpPr/>
+            <p:nvPr/>
+          </p:nvSpPr>
+          <p:spPr>
+            <a:xfrm flipV="1">
+              <a:off x="2067480" y="1076400"/>
+              <a:ext cx="373320" cy="405000"/>
+            </a:xfrm>
+            <a:prstGeom prst="ellipse">
+              <a:avLst/>
+            </a:prstGeom>
+            <a:solidFill>
+              <a:srgbClr val="FFFFFF"/>
+            </a:solidFill>
+            <a:ln>
+              <a:noFill/>
+            </a:ln>
+          </p:spPr>
+          <p:style>
+            <a:lnRef idx="2">
+              <a:schemeClr val="accent1">
+                <a:shade val="50000"/>
+              </a:schemeClr>
+            </a:lnRef>
+            <a:fillRef idx="1">
+              <a:schemeClr val="accent1"/>
+            </a:fillRef>
+            <a:effectRef idx="0">
+              <a:schemeClr val="accent1"/>
+            </a:effectRef>
+            <a:fontRef idx="minor"/>
+          </p:style>
+        </p:sp>
+      </p:grpSp>
+      <p:sp>
+        <p:nvSpPr>
+          <p:cNvPr id="22" name="ZoneTexte 21">
+            <a:extLst>
+              <a:ext uri="{FF2B5EF4-FFF2-40B4-BE49-F238E27FC236}">
+                <a16:creationId xmlns:a16="http://schemas.microsoft.com/office/drawing/2014/main" id="{53FE8E48-8A0B-419B-8A5B-C09FC2E69D6E}"/>
+              </a:ext>
+            </a:extLst>
+          </p:cNvPr>
+          <p:cNvSpPr txBox="1"/>
+          <p:nvPr/>
+        </p:nvSpPr>
+        <p:spPr>
+          <a:xfrm>
+            <a:off x="1039305" y="723432"/>
+            <a:ext cx="6245258" cy="646331"/>
+          </a:xfrm>
+          <a:prstGeom prst="rect">
+            <a:avLst/>
+          </a:prstGeom>
+          <a:noFill/>
+        </p:spPr>
+        <p:txBody>
+          <a:bodyPr wrap="square">
+            <a:spAutoFit/>
+          </a:bodyPr>
+          <a:lstStyle/>
+          <a:p>
+            <a:pPr>
+              <a:lnSpc>
+                <a:spcPct val="90000"/>
+              </a:lnSpc>
+            </a:pPr>
+            <a:r>
+              <a:rPr lang="fr-FR" sz="4000" b="0" strike="noStrike" spc="-1" dirty="0">
+                <a:solidFill>
+                  <a:srgbClr val="3F3F3F"/>
+                </a:solidFill>
+                <a:latin typeface="Calibri Light"/>
+              </a:rPr>
+              <a:t>VI. </a:t>
+            </a:r>
+            <a:r>
+              <a:rPr lang="fr-FR" sz="4000" b="0" strike="noStrike" spc="-1" dirty="0">
+                <a:solidFill>
+                  <a:srgbClr val="000000"/>
+                </a:solidFill>
+                <a:latin typeface="Calibri Light"/>
+              </a:rPr>
+              <a:t>Web Service</a:t>
+            </a:r>
+            <a:endParaRPr lang="fr-FR" sz="4000" b="0" strike="noStrike" spc="-1" dirty="0">
+              <a:solidFill>
+                <a:srgbClr val="000000"/>
+              </a:solidFill>
+              <a:latin typeface="Calibri"/>
+            </a:endParaRPr>
+          </a:p>
+        </p:txBody>
+      </p:sp>
+      <p:pic>
+        <p:nvPicPr>
+          <p:cNvPr id="3" name="Image 2" descr="Une image contenant texte&#10;&#10;Description générée automatiquement">
+            <a:extLst>
+              <a:ext uri="{FF2B5EF4-FFF2-40B4-BE49-F238E27FC236}">
+                <a16:creationId xmlns:a16="http://schemas.microsoft.com/office/drawing/2014/main" id="{1B691C00-9F84-47DC-944D-63B0A151464D}"/>
+              </a:ext>
+            </a:extLst>
+          </p:cNvPr>
+          <p:cNvPicPr>
+            <a:picLocks noChangeAspect="1"/>
+          </p:cNvPicPr>
+          <p:nvPr/>
+        </p:nvPicPr>
+        <p:blipFill>
+          <a:blip r:embed="rId3">
+            <a:extLst>
+              <a:ext uri="{28A0092B-C50C-407E-A947-70E740481C1C}">
+                <a14:useLocalDpi xmlns:a14="http://schemas.microsoft.com/office/drawing/2010/main" val="0"/>
+              </a:ext>
+            </a:extLst>
+          </a:blip>
+          <a:stretch>
+            <a:fillRect/>
+          </a:stretch>
+        </p:blipFill>
+        <p:spPr>
+          <a:xfrm>
+            <a:off x="159972" y="2583208"/>
+            <a:ext cx="4561656" cy="2563827"/>
+          </a:xfrm>
+          <a:prstGeom prst="rect">
+            <a:avLst/>
+          </a:prstGeom>
+        </p:spPr>
+      </p:pic>
+    </p:spTree>
+    <p:extLst>
+      <p:ext uri="{BB962C8B-B14F-4D97-AF65-F5344CB8AC3E}">
+        <p14:creationId xmlns:p14="http://schemas.microsoft.com/office/powerpoint/2010/main" val="2090212912"/>
+      </p:ext>
+    </p:extLst>
+  </p:cSld>
+  <p:clrMapOvr>
+    <a:masterClrMapping/>
+  </p:clrMapOvr>
+</p:sld>
+</file>
+
+<file path=ppt/slides/slide11.xml><?xml version="1.0" encoding="utf-8"?>
+<p:sld xmlns:a="http://schemas.openxmlformats.org/drawingml/2006/main" xmlns:r="http://schemas.openxmlformats.org/officeDocument/2006/relationships" xmlns:p="http://schemas.openxmlformats.org/presentationml/2006/main">
+  <p:cSld>
+    <p:bg>
+      <p:bgPr>
+        <a:solidFill>
+          <a:srgbClr val="000000"/>
+        </a:solidFill>
+        <a:effectLst/>
+      </p:bgPr>
+    </p:bg>
+    <p:spTree>
+      <p:nvGrpSpPr>
+        <p:cNvPr id="1" name=""/>
+        <p:cNvGrpSpPr/>
+        <p:nvPr/>
+      </p:nvGrpSpPr>
+      <p:grpSpPr>
+        <a:xfrm>
+          <a:off x="0" y="0"/>
+          <a:ext cx="0" cy="0"/>
+          <a:chOff x="0" y="0"/>
+          <a:chExt cx="0" cy="0"/>
+        </a:xfrm>
+      </p:grpSpPr>
+      <p:sp>
+        <p:nvSpPr>
+          <p:cNvPr id="156" name="CustomShape 1"/>
+          <p:cNvSpPr/>
+          <p:nvPr/>
+        </p:nvSpPr>
+        <p:spPr>
+          <a:xfrm>
+            <a:off x="0" y="1360800"/>
+            <a:ext cx="12191760" cy="5496840"/>
+          </a:xfrm>
+          <a:prstGeom prst="rect">
+            <a:avLst/>
+          </a:prstGeom>
+          <a:gradFill rotWithShape="0">
+            <a:gsLst>
+              <a:gs pos="0">
+                <a:srgbClr val="3965B5"/>
+              </a:gs>
+              <a:gs pos="100000">
+                <a:srgbClr val="3965B5"/>
+              </a:gs>
+            </a:gsLst>
+            <a:lin ang="4200000"/>
+          </a:gradFill>
+          <a:ln>
+            <a:noFill/>
+          </a:ln>
+        </p:spPr>
+        <p:style>
+          <a:lnRef idx="2">
+            <a:schemeClr val="accent1">
+              <a:shade val="50000"/>
+            </a:schemeClr>
+          </a:lnRef>
+          <a:fillRef idx="1">
+            <a:schemeClr val="accent1"/>
+          </a:fillRef>
+          <a:effectRef idx="0">
+            <a:schemeClr val="accent1"/>
+          </a:effectRef>
+          <a:fontRef idx="minor"/>
+        </p:style>
+      </p:sp>
+      <p:grpSp>
+        <p:nvGrpSpPr>
+          <p:cNvPr id="157" name="Group 2"/>
+          <p:cNvGrpSpPr/>
+          <p:nvPr/>
+        </p:nvGrpSpPr>
+        <p:grpSpPr>
+          <a:xfrm>
+            <a:off x="0" y="360"/>
+            <a:ext cx="12191760" cy="3048840"/>
+            <a:chOff x="0" y="360"/>
+            <a:chExt cx="12191760" cy="3048840"/>
+          </a:xfrm>
+        </p:grpSpPr>
+        <p:pic>
+          <p:nvPicPr>
+            <p:cNvPr id="158" name="Picture 10"/>
+            <p:cNvPicPr/>
+            <p:nvPr/>
+          </p:nvPicPr>
+          <p:blipFill>
+            <a:blip r:embed="rId2"/>
+            <a:srcRect t="45717" b="9819"/>
+            <a:stretch/>
+          </p:blipFill>
+          <p:spPr>
+            <a:xfrm rot="10800000" flipH="1">
+              <a:off x="0" y="0"/>
+              <a:ext cx="12191760" cy="3048840"/>
+            </a:xfrm>
+            <a:prstGeom prst="rect">
+              <a:avLst/>
+            </a:prstGeom>
+            <a:ln w="0">
+              <a:noFill/>
+            </a:ln>
+          </p:spPr>
+        </p:pic>
+        <p:sp>
+          <p:nvSpPr>
+            <p:cNvPr id="159" name="CustomShape 3"/>
+            <p:cNvSpPr/>
+            <p:nvPr/>
+          </p:nvSpPr>
+          <p:spPr>
+            <a:xfrm flipV="1">
+              <a:off x="2067480" y="1076400"/>
+              <a:ext cx="373320" cy="405000"/>
+            </a:xfrm>
+            <a:prstGeom prst="ellipse">
+              <a:avLst/>
+            </a:prstGeom>
+            <a:solidFill>
+              <a:srgbClr val="FFFFFF"/>
+            </a:solidFill>
+            <a:ln>
+              <a:noFill/>
+            </a:ln>
+          </p:spPr>
+          <p:style>
+            <a:lnRef idx="2">
+              <a:schemeClr val="accent1">
+                <a:shade val="50000"/>
+              </a:schemeClr>
+            </a:lnRef>
+            <a:fillRef idx="1">
+              <a:schemeClr val="accent1"/>
+            </a:fillRef>
+            <a:effectRef idx="0">
+              <a:schemeClr val="accent1"/>
+            </a:effectRef>
+            <a:fontRef idx="minor"/>
+          </p:style>
+        </p:sp>
+      </p:grpSp>
+      <p:sp>
+        <p:nvSpPr>
+          <p:cNvPr id="160" name="TextShape 4"/>
+          <p:cNvSpPr txBox="1"/>
+          <p:nvPr/>
+        </p:nvSpPr>
+        <p:spPr>
+          <a:xfrm>
+            <a:off x="1179360" y="448200"/>
+            <a:ext cx="9833040" cy="1066320"/>
+          </a:xfrm>
+          <a:prstGeom prst="rect">
+            <a:avLst/>
+          </a:prstGeom>
+          <a:noFill/>
+          <a:ln w="0">
+            <a:noFill/>
+          </a:ln>
+        </p:spPr>
+        <p:txBody>
+          <a:bodyPr anchor="ctr">
+            <a:normAutofit/>
+          </a:bodyPr>
+          <a:lstStyle/>
+          <a:p>
+            <a:pPr>
+              <a:lnSpc>
+                <a:spcPct val="90000"/>
+              </a:lnSpc>
+            </a:pPr>
+            <a:r>
+              <a:rPr lang="fr-FR" sz="4000" b="0" strike="noStrike" spc="-1" dirty="0">
+                <a:solidFill>
+                  <a:srgbClr val="3F3F3F"/>
+                </a:solidFill>
+                <a:latin typeface="Calibri Light"/>
+              </a:rPr>
+              <a:t>VI. </a:t>
+            </a:r>
+            <a:r>
+              <a:rPr lang="fr-FR" sz="4000" b="0" strike="noStrike" spc="-1" dirty="0">
+                <a:solidFill>
+                  <a:srgbClr val="000000"/>
+                </a:solidFill>
+                <a:latin typeface="Calibri Light"/>
+              </a:rPr>
+              <a:t>Web Service</a:t>
+            </a:r>
+            <a:endParaRPr lang="fr-FR" sz="4000" b="0" strike="noStrike" spc="-1" dirty="0">
+              <a:solidFill>
+                <a:srgbClr val="000000"/>
+              </a:solidFill>
+              <a:latin typeface="Calibri"/>
+            </a:endParaRPr>
+          </a:p>
+        </p:txBody>
+      </p:sp>
+      <p:sp>
+        <p:nvSpPr>
+          <p:cNvPr id="161" name="TextShape 5"/>
+          <p:cNvSpPr txBox="1"/>
+          <p:nvPr/>
+        </p:nvSpPr>
+        <p:spPr>
+          <a:xfrm>
+            <a:off x="1179360" y="3049200"/>
+            <a:ext cx="9833040" cy="2945160"/>
+          </a:xfrm>
+          <a:prstGeom prst="rect">
+            <a:avLst/>
+          </a:prstGeom>
+          <a:noFill/>
+          <a:ln w="0">
+            <a:noFill/>
+          </a:ln>
+        </p:spPr>
+        <p:txBody>
+          <a:bodyPr anchor="ctr">
+            <a:normAutofit/>
+          </a:bodyPr>
+          <a:lstStyle/>
+          <a:p>
+            <a:pPr>
+              <a:lnSpc>
+                <a:spcPct val="90000"/>
+              </a:lnSpc>
+              <a:spcBef>
+                <a:spcPts val="1001"/>
+              </a:spcBef>
+            </a:pPr>
+            <a:endParaRPr lang="fr-FR" sz="2800" b="0" strike="noStrike" spc="-1">
+              <a:solidFill>
+                <a:srgbClr val="000000"/>
+              </a:solidFill>
+              <a:latin typeface="Calibri"/>
+            </a:endParaRPr>
+          </a:p>
+          <a:p>
+            <a:endParaRPr lang="fr-FR" sz="2800" b="0" strike="noStrike" spc="-1">
+              <a:solidFill>
+                <a:srgbClr val="000000"/>
+              </a:solidFill>
+              <a:latin typeface="Calibri"/>
+            </a:endParaRPr>
+          </a:p>
+        </p:txBody>
+      </p:sp>
+      <p:sp>
+        <p:nvSpPr>
+          <p:cNvPr id="162" name="TextShape 6"/>
+          <p:cNvSpPr txBox="1"/>
+          <p:nvPr/>
+        </p:nvSpPr>
+        <p:spPr>
+          <a:xfrm>
+            <a:off x="838080" y="6356520"/>
+            <a:ext cx="2742840" cy="364680"/>
+          </a:xfrm>
+          <a:prstGeom prst="rect">
+            <a:avLst/>
+          </a:prstGeom>
+          <a:noFill/>
+          <a:ln w="0">
+            <a:noFill/>
+          </a:ln>
+        </p:spPr>
+        <p:txBody>
+          <a:bodyPr anchor="ctr">
+            <a:noAutofit/>
+          </a:bodyPr>
+          <a:lstStyle/>
+          <a:p>
+            <a:pPr>
+              <a:lnSpc>
+                <a:spcPct val="100000"/>
+              </a:lnSpc>
+            </a:pPr>
+            <a:r>
+              <a:rPr lang="fr-FR" sz="1200" b="0" strike="noStrike" spc="-1">
+                <a:solidFill>
+                  <a:srgbClr val="FFFFFF"/>
+                </a:solidFill>
+                <a:latin typeface="Calibri"/>
+              </a:rPr>
+              <a:t>LP IOTIA</a:t>
+            </a:r>
+            <a:endParaRPr lang="fr-FR" sz="1200" b="0" strike="noStrike" spc="-1">
+              <a:latin typeface="Times New Roman"/>
+            </a:endParaRPr>
+          </a:p>
+        </p:txBody>
+      </p:sp>
+      <p:sp>
+        <p:nvSpPr>
+          <p:cNvPr id="163" name="TextShape 7"/>
+          <p:cNvSpPr txBox="1"/>
+          <p:nvPr/>
+        </p:nvSpPr>
+        <p:spPr>
+          <a:xfrm>
+            <a:off x="8610480" y="6356520"/>
+            <a:ext cx="2742840" cy="364680"/>
+          </a:xfrm>
+          <a:prstGeom prst="rect">
+            <a:avLst/>
+          </a:prstGeom>
+          <a:noFill/>
+          <a:ln w="0">
+            <a:noFill/>
+          </a:ln>
+        </p:spPr>
+        <p:txBody>
+          <a:bodyPr anchor="ctr">
+            <a:noAutofit/>
+          </a:bodyPr>
+          <a:lstStyle/>
+          <a:p>
+            <a:pPr algn="r">
+              <a:lnSpc>
+                <a:spcPct val="100000"/>
+              </a:lnSpc>
+            </a:pPr>
+            <a:fld id="{8E43A575-004B-4A81-819A-C42D477DA0A4}" type="slidenum">
+              <a:rPr lang="fr-FR" sz="1200" b="0" strike="noStrike" spc="-1">
+                <a:solidFill>
+                  <a:srgbClr val="FFFFFF"/>
+                </a:solidFill>
+                <a:latin typeface="Calibri"/>
+              </a:rPr>
+              <a:t>11</a:t>
+            </a:fld>
+            <a:endParaRPr lang="fr-FR" sz="1200" b="0" strike="noStrike" spc="-1">
+              <a:latin typeface="Times New Roman"/>
+            </a:endParaRPr>
+          </a:p>
+        </p:txBody>
+      </p:sp>
       <p:pic>
         <p:nvPicPr>
           <p:cNvPr id="3" name="Image 2">
@@ -5975,7 +6519,7 @@
 </p:sld>
 </file>
 
-<file path=ppt/slides/slide11.xml><?xml version="1.0" encoding="utf-8"?>
+<file path=ppt/slides/slide12.xml><?xml version="1.0" encoding="utf-8"?>
 <p:sld xmlns:a="http://schemas.openxmlformats.org/drawingml/2006/main" xmlns:r="http://schemas.openxmlformats.org/officeDocument/2006/relationships" xmlns:p="http://schemas.openxmlformats.org/presentationml/2006/main">
   <p:cSld>
     <p:bg>
@@ -6258,7 +6802,7 @@
                 </a:solidFill>
                 <a:latin typeface="Calibri"/>
               </a:rPr>
-              <a:t>11</a:t>
+              <a:t>12</a:t>
             </a:fld>
             <a:endParaRPr lang="fr-FR" sz="1200" b="0" strike="noStrike" spc="-1">
               <a:latin typeface="Times New Roman"/>
@@ -6402,7 +6946,7 @@
 </p:sld>
 </file>
 
-<file path=ppt/slides/slide12.xml><?xml version="1.0" encoding="utf-8"?>
+<file path=ppt/slides/slide13.xml><?xml version="1.0" encoding="utf-8"?>
 <p:sld xmlns:a="http://schemas.openxmlformats.org/drawingml/2006/main" xmlns:r="http://schemas.openxmlformats.org/officeDocument/2006/relationships" xmlns:p="http://schemas.openxmlformats.org/presentationml/2006/main">
   <p:cSld>
     <p:bg>
@@ -6685,7 +7229,7 @@
                 </a:solidFill>
                 <a:latin typeface="Calibri"/>
               </a:rPr>
-              <a:t>12</a:t>
+              <a:t>13</a:t>
             </a:fld>
             <a:endParaRPr lang="fr-FR" sz="1200" b="0" strike="noStrike" spc="-1">
               <a:latin typeface="Times New Roman"/>
@@ -6735,7 +7279,7 @@
 </p:sld>
 </file>
 
-<file path=ppt/slides/slide13.xml><?xml version="1.0" encoding="utf-8"?>
+<file path=ppt/slides/slide14.xml><?xml version="1.0" encoding="utf-8"?>
 <p:sld xmlns:a="http://schemas.openxmlformats.org/drawingml/2006/main" xmlns:r="http://schemas.openxmlformats.org/officeDocument/2006/relationships" xmlns:p="http://schemas.openxmlformats.org/presentationml/2006/main">
   <p:cSld>
     <p:bg>
@@ -7018,7 +7562,7 @@
                 </a:solidFill>
                 <a:latin typeface="Calibri"/>
               </a:rPr>
-              <a:t>13</a:t>
+              <a:t>14</a:t>
             </a:fld>
             <a:endParaRPr lang="fr-FR" sz="1200" b="0" strike="noStrike" spc="-1">
               <a:latin typeface="Times New Roman"/>
@@ -7057,7 +7601,7 @@
 </p:sld>
 </file>
 
-<file path=ppt/slides/slide14.xml><?xml version="1.0" encoding="utf-8"?>
+<file path=ppt/slides/slide15.xml><?xml version="1.0" encoding="utf-8"?>
 <p:sld xmlns:a="http://schemas.openxmlformats.org/drawingml/2006/main" xmlns:r="http://schemas.openxmlformats.org/officeDocument/2006/relationships" xmlns:p="http://schemas.openxmlformats.org/presentationml/2006/main">
   <p:cSld>
     <p:bg>
@@ -7340,7 +7884,7 @@
                 </a:solidFill>
                 <a:latin typeface="Calibri"/>
               </a:rPr>
-              <a:t>14</a:t>
+              <a:t>15</a:t>
             </a:fld>
             <a:endParaRPr lang="fr-FR" sz="1200" b="0" strike="noStrike" spc="-1">
               <a:latin typeface="Times New Roman"/>
@@ -7379,7 +7923,7 @@
 </p:sld>
 </file>
 
-<file path=ppt/slides/slide15.xml><?xml version="1.0" encoding="utf-8"?>
+<file path=ppt/slides/slide16.xml><?xml version="1.0" encoding="utf-8"?>
 <p:sld xmlns:a="http://schemas.openxmlformats.org/drawingml/2006/main" xmlns:r="http://schemas.openxmlformats.org/officeDocument/2006/relationships" xmlns:p="http://schemas.openxmlformats.org/presentationml/2006/main">
   <p:cSld>
     <p:bg>
@@ -7658,7 +8202,7 @@
                 </a:solidFill>
                 <a:latin typeface="Calibri"/>
               </a:rPr>
-              <a:t>15</a:t>
+              <a:t>16</a:t>
             </a:fld>
             <a:endParaRPr lang="fr-FR" sz="1200" b="0" strike="noStrike" spc="-1">
               <a:latin typeface="Times New Roman"/>
@@ -8468,7 +9012,7 @@
 </p:sld>
 </file>
 
-<file path=ppt/slides/slide16.xml><?xml version="1.0" encoding="utf-8"?>
+<file path=ppt/slides/slide17.xml><?xml version="1.0" encoding="utf-8"?>
 <p:sld xmlns:a="http://schemas.openxmlformats.org/drawingml/2006/main" xmlns:r="http://schemas.openxmlformats.org/officeDocument/2006/relationships" xmlns:p="http://schemas.openxmlformats.org/presentationml/2006/main">
   <p:cSld>
     <p:bg>
@@ -8747,7 +9291,7 @@
                 </a:solidFill>
                 <a:latin typeface="Calibri"/>
               </a:rPr>
-              <a:t>16</a:t>
+              <a:t>17</a:t>
             </a:fld>
             <a:endParaRPr lang="fr-FR" sz="1200" b="0" strike="noStrike" spc="-1">
               <a:latin typeface="Times New Roman"/>
@@ -8798,7 +9342,7 @@
 </p:sld>
 </file>
 
-<file path=ppt/slides/slide17.xml><?xml version="1.0" encoding="utf-8"?>
+<file path=ppt/slides/slide18.xml><?xml version="1.0" encoding="utf-8"?>
 <p:sld xmlns:a="http://schemas.openxmlformats.org/drawingml/2006/main" xmlns:r="http://schemas.openxmlformats.org/officeDocument/2006/relationships" xmlns:p="http://schemas.openxmlformats.org/presentationml/2006/main">
   <p:cSld>
     <p:bg>
@@ -9131,7 +9675,7 @@
                 </a:solidFill>
                 <a:latin typeface="Calibri"/>
               </a:rPr>
-              <a:t>17</a:t>
+              <a:t>18</a:t>
             </a:fld>
             <a:endParaRPr lang="fr-FR" sz="1200" b="0" strike="noStrike" spc="-1">
               <a:latin typeface="Times New Roman"/>
@@ -17432,7 +17976,7 @@
         </p:nvGrpSpPr>
         <p:grpSpPr>
           <a:xfrm>
-            <a:off x="0" y="-18494"/>
+            <a:off x="0" y="-43020"/>
             <a:ext cx="12191760" cy="3048840"/>
             <a:chOff x="0" y="360"/>
             <a:chExt cx="12191760" cy="3048840"/>
@@ -17511,6 +18055,66 @@
           </p:style>
         </p:sp>
       </p:grpSp>
+      <p:sp>
+        <p:nvSpPr>
+          <p:cNvPr id="22" name="ZoneTexte 21">
+            <a:extLst>
+              <a:ext uri="{FF2B5EF4-FFF2-40B4-BE49-F238E27FC236}">
+                <a16:creationId xmlns:a16="http://schemas.microsoft.com/office/drawing/2014/main" id="{53FE8E48-8A0B-419B-8A5B-C09FC2E69D6E}"/>
+              </a:ext>
+            </a:extLst>
+          </p:cNvPr>
+          <p:cNvSpPr txBox="1"/>
+          <p:nvPr/>
+        </p:nvSpPr>
+        <p:spPr>
+          <a:xfrm>
+            <a:off x="1039305" y="723432"/>
+            <a:ext cx="6245258" cy="646331"/>
+          </a:xfrm>
+          <a:prstGeom prst="rect">
+            <a:avLst/>
+          </a:prstGeom>
+          <a:noFill/>
+        </p:spPr>
+        <p:txBody>
+          <a:bodyPr wrap="square">
+            <a:spAutoFit/>
+          </a:bodyPr>
+          <a:lstStyle/>
+          <a:p>
+            <a:pPr>
+              <a:lnSpc>
+                <a:spcPct val="90000"/>
+              </a:lnSpc>
+            </a:pPr>
+            <a:r>
+              <a:rPr lang="fr-FR" sz="4000" b="0" strike="noStrike" spc="-1" dirty="0">
+                <a:solidFill>
+                  <a:srgbClr val="3F3F3F"/>
+                </a:solidFill>
+                <a:latin typeface="Calibri Light"/>
+              </a:rPr>
+              <a:t>VI. </a:t>
+            </a:r>
+            <a:r>
+              <a:rPr lang="fr-FR" sz="4000" b="0" strike="noStrike" spc="-1" dirty="0">
+                <a:solidFill>
+                  <a:srgbClr val="000000"/>
+                </a:solidFill>
+                <a:latin typeface="Calibri Light"/>
+              </a:rPr>
+              <a:t>Web Service</a:t>
+            </a:r>
+            <a:endParaRPr lang="fr-FR" sz="4000" b="0" strike="noStrike" spc="-1" dirty="0">
+              <a:solidFill>
+                <a:srgbClr val="000000"/>
+              </a:solidFill>
+              <a:latin typeface="Calibri"/>
+            </a:endParaRPr>
+          </a:p>
+        </p:txBody>
+      </p:sp>
     </p:spTree>
   </p:cSld>
   <p:clrMapOvr>

</xml_diff>

<commit_message>
update alex 2eme page
</commit_message>
<xml_diff>
--- a/Diapo_commun/PresentationCommune.pptx
+++ b/Diapo_commun/PresentationCommune.pptx
@@ -6034,7 +6034,7 @@
         </p:nvSpPr>
         <p:spPr>
           <a:xfrm>
-            <a:off x="1039305" y="723432"/>
+            <a:off x="6859271" y="208300"/>
             <a:ext cx="6245258" cy="646331"/>
           </a:xfrm>
           <a:prstGeom prst="rect">
@@ -6108,8 +6108,116 @@
         </p:blipFill>
         <p:spPr>
           <a:xfrm>
-            <a:off x="159972" y="2583208"/>
+            <a:off x="0" y="3715293"/>
             <a:ext cx="4561656" cy="2563827"/>
+          </a:xfrm>
+          <a:prstGeom prst="rect">
+            <a:avLst/>
+          </a:prstGeom>
+        </p:spPr>
+      </p:pic>
+      <p:pic>
+        <p:nvPicPr>
+          <p:cNvPr id="5" name="Image 4">
+            <a:extLst>
+              <a:ext uri="{FF2B5EF4-FFF2-40B4-BE49-F238E27FC236}">
+                <a16:creationId xmlns:a16="http://schemas.microsoft.com/office/drawing/2014/main" id="{089AF844-7CA8-4127-8050-E6C9B3B1C0CD}"/>
+              </a:ext>
+            </a:extLst>
+          </p:cNvPr>
+          <p:cNvPicPr>
+            <a:picLocks noChangeAspect="1"/>
+          </p:cNvPicPr>
+          <p:nvPr/>
+        </p:nvPicPr>
+        <p:blipFill>
+          <a:blip r:embed="rId4">
+            <a:extLst>
+              <a:ext uri="{28A0092B-C50C-407E-A947-70E740481C1C}">
+                <a14:useLocalDpi xmlns:a14="http://schemas.microsoft.com/office/drawing/2010/main" val="0"/>
+              </a:ext>
+            </a:extLst>
+          </a:blip>
+          <a:stretch>
+            <a:fillRect/>
+          </a:stretch>
+        </p:blipFill>
+        <p:spPr>
+          <a:xfrm>
+            <a:off x="4967926" y="1361160"/>
+            <a:ext cx="7224074" cy="4995360"/>
+          </a:xfrm>
+          <a:prstGeom prst="rect">
+            <a:avLst/>
+          </a:prstGeom>
+        </p:spPr>
+      </p:pic>
+      <p:pic>
+        <p:nvPicPr>
+          <p:cNvPr id="9" name="Image 8">
+            <a:extLst>
+              <a:ext uri="{FF2B5EF4-FFF2-40B4-BE49-F238E27FC236}">
+                <a16:creationId xmlns:a16="http://schemas.microsoft.com/office/drawing/2014/main" id="{14B88D6C-207D-4B5E-83B4-BE3E027973B6}"/>
+              </a:ext>
+            </a:extLst>
+          </p:cNvPr>
+          <p:cNvPicPr>
+            <a:picLocks noChangeAspect="1"/>
+          </p:cNvPicPr>
+          <p:nvPr/>
+        </p:nvPicPr>
+        <p:blipFill>
+          <a:blip r:embed="rId5">
+            <a:extLst>
+              <a:ext uri="{28A0092B-C50C-407E-A947-70E740481C1C}">
+                <a14:useLocalDpi xmlns:a14="http://schemas.microsoft.com/office/drawing/2010/main" val="0"/>
+              </a:ext>
+            </a:extLst>
+          </a:blip>
+          <a:stretch>
+            <a:fillRect/>
+          </a:stretch>
+        </p:blipFill>
+        <p:spPr>
+          <a:xfrm>
+            <a:off x="240" y="-29593"/>
+            <a:ext cx="4967686" cy="1806222"/>
+          </a:xfrm>
+          <a:prstGeom prst="rect">
+            <a:avLst/>
+          </a:prstGeom>
+        </p:spPr>
+      </p:pic>
+      <p:pic>
+        <p:nvPicPr>
+          <p:cNvPr id="13" name="Image 12" descr="Une image contenant texte&#10;&#10;Description générée automatiquement">
+            <a:extLst>
+              <a:ext uri="{FF2B5EF4-FFF2-40B4-BE49-F238E27FC236}">
+                <a16:creationId xmlns:a16="http://schemas.microsoft.com/office/drawing/2014/main" id="{73E6BF96-54C9-42B9-BF8F-07DC7F2D3B2E}"/>
+              </a:ext>
+            </a:extLst>
+          </p:cNvPr>
+          <p:cNvPicPr>
+            <a:picLocks noChangeAspect="1"/>
+          </p:cNvPicPr>
+          <p:nvPr/>
+        </p:nvPicPr>
+        <p:blipFill>
+          <a:blip r:embed="rId6">
+            <a:extLst>
+              <a:ext uri="{28A0092B-C50C-407E-A947-70E740481C1C}">
+                <a14:useLocalDpi xmlns:a14="http://schemas.microsoft.com/office/drawing/2010/main" val="0"/>
+              </a:ext>
+            </a:extLst>
+          </a:blip>
+          <a:stretch>
+            <a:fillRect/>
+          </a:stretch>
+        </p:blipFill>
+        <p:spPr>
+          <a:xfrm>
+            <a:off x="0" y="1681528"/>
+            <a:ext cx="4967686" cy="1815513"/>
           </a:xfrm>
           <a:prstGeom prst="rect">
             <a:avLst/>

</xml_diff>

<commit_message>
Modificaion Etat d'avancement Partie Serveur
</commit_message>
<xml_diff>
--- a/Diapo_commun/PresentationCommune.pptx
+++ b/Diapo_commun/PresentationCommune.pptx
@@ -15102,7 +15102,7 @@
         </p:blipFill>
         <p:spPr>
           <a:xfrm>
-            <a:off x="2265775" y="780231"/>
+            <a:off x="1907486" y="772085"/>
             <a:ext cx="8018190" cy="6095372"/>
           </a:xfrm>
           <a:prstGeom prst="rect">
@@ -15125,7 +15125,7 @@
           <p:nvPr>
             <p:extLst>
               <p:ext uri="{D42A27DB-BD31-4B8C-83A1-F6EECF244321}">
-                <p14:modId xmlns:p14="http://schemas.microsoft.com/office/powerpoint/2010/main" val="3734455910"/>
+                <p14:modId xmlns:p14="http://schemas.microsoft.com/office/powerpoint/2010/main" val="2513201605"/>
               </p:ext>
             </p:extLst>
           </p:nvPr>
@@ -15141,14 +15141,14 @@
                 <a:tableStyleId>{5C22544A-7EE6-4342-B048-85BDC9FD1C3A}</a:tableStyleId>
               </a:tblPr>
               <a:tblGrid>
-                <a:gridCol w="5228803">
+                <a:gridCol w="5196895">
                   <a:extLst>
                     <a:ext uri="{9D8B030D-6E8A-4147-A177-3AD203B41FA5}">
                       <a16:colId xmlns:a16="http://schemas.microsoft.com/office/drawing/2014/main" val="2904378242"/>
                     </a:ext>
                   </a:extLst>
                 </a:gridCol>
-                <a:gridCol w="464293">
+                <a:gridCol w="496201">
                   <a:extLst>
                     <a:ext uri="{9D8B030D-6E8A-4147-A177-3AD203B41FA5}">
                       <a16:colId xmlns:a16="http://schemas.microsoft.com/office/drawing/2014/main" val="2045041980"/>
@@ -15246,37 +15246,21 @@
                         <a:defRPr/>
                       </a:pPr>
                       <a:r>
-                        <a:rPr kumimoji="0" lang="fr-FR" sz="2800" b="1" i="0" u="none" strike="noStrike" kern="1200" cap="none" spc="0" normalizeH="0" baseline="0" noProof="0" dirty="0">
-                          <a:ln>
-                            <a:noFill/>
-                          </a:ln>
+                        <a:rPr lang="fr-FR" sz="2800" b="1" kern="1200" dirty="0">
                           <a:solidFill>
-                            <a:srgbClr val="00B050"/>
+                            <a:schemeClr val="accent4"/>
                           </a:solidFill>
-                          <a:effectLst/>
-                          <a:uLnTx/>
-                          <a:uFillTx/>
                           <a:latin typeface="+mn-lt"/>
                           <a:ea typeface="+mn-ea"/>
                           <a:cs typeface="Calibri"/>
                           <a:sym typeface="Wingdings" panose="05000000000000000000" pitchFamily="2" charset="2"/>
                         </a:rPr>
-                        <a:t></a:t>
+                        <a:t></a:t>
                       </a:r>
-                      <a:endParaRPr kumimoji="0" lang="fr-FR" sz="1800" b="1" i="0" u="none" strike="noStrike" kern="1200" cap="none" spc="0" normalizeH="0" baseline="0" noProof="0" dirty="0">
-                        <a:ln>
-                          <a:noFill/>
-                        </a:ln>
+                      <a:endParaRPr lang="fr-FR" sz="2800" b="1" dirty="0">
                         <a:solidFill>
-                          <a:srgbClr val="00B050"/>
+                          <a:schemeClr val="accent4"/>
                         </a:solidFill>
-                        <a:effectLst/>
-                        <a:uLnTx/>
-                        <a:uFillTx/>
-                        <a:latin typeface="+mn-lt"/>
-                        <a:ea typeface="+mn-ea"/>
-                        <a:cs typeface="Calibri"/>
-                        <a:sym typeface="Wingdings" panose="05000000000000000000" pitchFamily="2" charset="2"/>
                       </a:endParaRPr>
                     </a:p>
                   </a:txBody>
@@ -15641,21 +15625,37 @@
                         <a:defRPr/>
                       </a:pPr>
                       <a:r>
-                        <a:rPr lang="fr-FR" sz="2800" b="1" kern="1200" dirty="0">
+                        <a:rPr kumimoji="0" lang="fr-FR" sz="2800" b="1" i="0" u="none" strike="noStrike" kern="1200" cap="none" spc="0" normalizeH="0" baseline="0" noProof="0" dirty="0">
+                          <a:ln>
+                            <a:noFill/>
+                          </a:ln>
                           <a:solidFill>
-                            <a:schemeClr val="accent4"/>
+                            <a:srgbClr val="00B050"/>
                           </a:solidFill>
+                          <a:effectLst/>
+                          <a:uLnTx/>
+                          <a:uFillTx/>
                           <a:latin typeface="+mn-lt"/>
                           <a:ea typeface="+mn-ea"/>
                           <a:cs typeface="Calibri"/>
                           <a:sym typeface="Wingdings" panose="05000000000000000000" pitchFamily="2" charset="2"/>
                         </a:rPr>
-                        <a:t></a:t>
+                        <a:t></a:t>
                       </a:r>
-                      <a:endParaRPr lang="fr-FR" sz="2800" b="1" dirty="0">
+                      <a:endParaRPr kumimoji="0" lang="fr-FR" sz="1800" b="1" i="0" u="none" strike="noStrike" kern="1200" cap="none" spc="0" normalizeH="0" baseline="0" noProof="0" dirty="0">
+                        <a:ln>
+                          <a:noFill/>
+                        </a:ln>
                         <a:solidFill>
-                          <a:schemeClr val="accent4"/>
+                          <a:srgbClr val="00B050"/>
                         </a:solidFill>
+                        <a:effectLst/>
+                        <a:uLnTx/>
+                        <a:uFillTx/>
+                        <a:latin typeface="+mn-lt"/>
+                        <a:ea typeface="+mn-ea"/>
+                        <a:cs typeface="Calibri"/>
+                        <a:sym typeface="Wingdings" panose="05000000000000000000" pitchFamily="2" charset="2"/>
                       </a:endParaRPr>
                     </a:p>
                   </a:txBody>

</xml_diff>